<commit_message>
nz: updated the slideshow, adding the very basic examples
</commit_message>
<xml_diff>
--- a/sinatra.pptx
+++ b/sinatra.pptx
@@ -4,10 +4,16 @@
   <p:sldMasterIdLst>
     <p:sldMasterId id="2147483660" r:id="rId1"/>
   </p:sldMasterIdLst>
+  <p:notesMasterIdLst>
+    <p:notesMasterId r:id="rId8"/>
+  </p:notesMasterIdLst>
   <p:sldIdLst>
     <p:sldId id="256" r:id="rId2"/>
     <p:sldId id="258" r:id="rId3"/>
     <p:sldId id="257" r:id="rId4"/>
+    <p:sldId id="259" r:id="rId5"/>
+    <p:sldId id="261" r:id="rId6"/>
+    <p:sldId id="260" r:id="rId7"/>
   </p:sldIdLst>
   <p:sldSz cx="9144000" cy="6858000" type="screen4x3"/>
   <p:notesSz cx="6858000" cy="9144000"/>
@@ -107,6 +113,555 @@
     </a:lvl9pPr>
   </p:defaultTextStyle>
 </p:presentation>
+</file>
+
+<file path=ppt/notesMasters/notesMaster1.xml><?xml version="1.0" encoding="utf-8"?>
+<p:notesMaster xmlns:a="http://schemas.openxmlformats.org/drawingml/2006/main" xmlns:r="http://schemas.openxmlformats.org/officeDocument/2006/relationships" xmlns:mc="http://schemas.openxmlformats.org/markup-compatibility/2006" xmlns:mv="urn:schemas-microsoft-com:mac:vml" xmlns:p="http://schemas.openxmlformats.org/presentationml/2006/main" mc:Ignorable="mv" mc:PreserveAttributes="mv:*">
+  <p:cSld>
+    <p:bg>
+      <p:bgRef idx="1001">
+        <a:schemeClr val="bg1"/>
+      </p:bgRef>
+    </p:bg>
+    <p:spTree>
+      <p:nvGrpSpPr>
+        <p:cNvPr id="1" name=""/>
+        <p:cNvGrpSpPr/>
+        <p:nvPr/>
+      </p:nvGrpSpPr>
+      <p:grpSpPr>
+        <a:xfrm>
+          <a:off x="0" y="0"/>
+          <a:ext cx="0" cy="0"/>
+          <a:chOff x="0" y="0"/>
+          <a:chExt cx="0" cy="0"/>
+        </a:xfrm>
+      </p:grpSpPr>
+      <p:sp>
+        <p:nvSpPr>
+          <p:cNvPr id="2" name="Header Placeholder 1"/>
+          <p:cNvSpPr>
+            <a:spLocks noGrp="1"/>
+          </p:cNvSpPr>
+          <p:nvPr>
+            <p:ph type="hdr" sz="quarter"/>
+          </p:nvPr>
+        </p:nvSpPr>
+        <p:spPr>
+          <a:xfrm>
+            <a:off x="0" y="0"/>
+            <a:ext cx="2971800" cy="457200"/>
+          </a:xfrm>
+          <a:prstGeom prst="rect">
+            <a:avLst/>
+          </a:prstGeom>
+        </p:spPr>
+        <p:txBody>
+          <a:bodyPr vert="horz" lIns="91440" tIns="45720" rIns="91440" bIns="45720" rtlCol="0"/>
+          <a:lstStyle>
+            <a:lvl1pPr algn="l">
+              <a:defRPr sz="1200"/>
+            </a:lvl1pPr>
+          </a:lstStyle>
+          <a:p>
+            <a:endParaRPr lang="en-US"/>
+          </a:p>
+        </p:txBody>
+      </p:sp>
+      <p:sp>
+        <p:nvSpPr>
+          <p:cNvPr id="3" name="Date Placeholder 2"/>
+          <p:cNvSpPr>
+            <a:spLocks noGrp="1"/>
+          </p:cNvSpPr>
+          <p:nvPr>
+            <p:ph type="dt" idx="1"/>
+          </p:nvPr>
+        </p:nvSpPr>
+        <p:spPr>
+          <a:xfrm>
+            <a:off x="3884613" y="0"/>
+            <a:ext cx="2971800" cy="457200"/>
+          </a:xfrm>
+          <a:prstGeom prst="rect">
+            <a:avLst/>
+          </a:prstGeom>
+        </p:spPr>
+        <p:txBody>
+          <a:bodyPr vert="horz" lIns="91440" tIns="45720" rIns="91440" bIns="45720" rtlCol="0"/>
+          <a:lstStyle>
+            <a:lvl1pPr algn="r">
+              <a:defRPr sz="1200"/>
+            </a:lvl1pPr>
+          </a:lstStyle>
+          <a:p>
+            <a:fld id="{FEBA1754-3910-A94B-AF97-8DE201D32E78}" type="datetimeFigureOut">
+              <a:rPr lang="en-US" smtClean="0"/>
+              <a:t>7/17/10</a:t>
+            </a:fld>
+            <a:endParaRPr lang="en-US"/>
+          </a:p>
+        </p:txBody>
+      </p:sp>
+      <p:sp>
+        <p:nvSpPr>
+          <p:cNvPr id="4" name="Slide Image Placeholder 3"/>
+          <p:cNvSpPr>
+            <a:spLocks noGrp="1" noRot="1" noChangeAspect="1"/>
+          </p:cNvSpPr>
+          <p:nvPr>
+            <p:ph type="sldImg" idx="2"/>
+          </p:nvPr>
+        </p:nvSpPr>
+        <p:spPr>
+          <a:xfrm>
+            <a:off x="1143000" y="685800"/>
+            <a:ext cx="4572000" cy="3429000"/>
+          </a:xfrm>
+          <a:prstGeom prst="rect">
+            <a:avLst/>
+          </a:prstGeom>
+          <a:noFill/>
+          <a:ln w="12700">
+            <a:solidFill>
+              <a:prstClr val="black"/>
+            </a:solidFill>
+          </a:ln>
+        </p:spPr>
+        <p:txBody>
+          <a:bodyPr vert="horz" lIns="91440" tIns="45720" rIns="91440" bIns="45720" rtlCol="0" anchor="ctr"/>
+          <a:lstStyle/>
+          <a:p>
+            <a:endParaRPr lang="en-US"/>
+          </a:p>
+        </p:txBody>
+      </p:sp>
+      <p:sp>
+        <p:nvSpPr>
+          <p:cNvPr id="5" name="Notes Placeholder 4"/>
+          <p:cNvSpPr>
+            <a:spLocks noGrp="1"/>
+          </p:cNvSpPr>
+          <p:nvPr>
+            <p:ph type="body" sz="quarter" idx="3"/>
+          </p:nvPr>
+        </p:nvSpPr>
+        <p:spPr>
+          <a:xfrm>
+            <a:off x="685800" y="4343400"/>
+            <a:ext cx="5486400" cy="4114800"/>
+          </a:xfrm>
+          <a:prstGeom prst="rect">
+            <a:avLst/>
+          </a:prstGeom>
+        </p:spPr>
+        <p:txBody>
+          <a:bodyPr vert="horz" lIns="91440" tIns="45720" rIns="91440" bIns="45720" rtlCol="0">
+            <a:normAutofit/>
+          </a:bodyPr>
+          <a:lstStyle/>
+          <a:p>
+            <a:pPr lvl="0"/>
+            <a:r>
+              <a:rPr lang="en-US" smtClean="0"/>
+              <a:t>Click to edit Master text styles</a:t>
+            </a:r>
+          </a:p>
+          <a:p>
+            <a:pPr lvl="1"/>
+            <a:r>
+              <a:rPr lang="en-US" smtClean="0"/>
+              <a:t>Second level</a:t>
+            </a:r>
+          </a:p>
+          <a:p>
+            <a:pPr lvl="2"/>
+            <a:r>
+              <a:rPr lang="en-US" smtClean="0"/>
+              <a:t>Third level</a:t>
+            </a:r>
+          </a:p>
+          <a:p>
+            <a:pPr lvl="3"/>
+            <a:r>
+              <a:rPr lang="en-US" smtClean="0"/>
+              <a:t>Fourth level</a:t>
+            </a:r>
+          </a:p>
+          <a:p>
+            <a:pPr lvl="4"/>
+            <a:r>
+              <a:rPr lang="en-US" smtClean="0"/>
+              <a:t>Fifth level</a:t>
+            </a:r>
+            <a:endParaRPr lang="en-US"/>
+          </a:p>
+        </p:txBody>
+      </p:sp>
+      <p:sp>
+        <p:nvSpPr>
+          <p:cNvPr id="6" name="Footer Placeholder 5"/>
+          <p:cNvSpPr>
+            <a:spLocks noGrp="1"/>
+          </p:cNvSpPr>
+          <p:nvPr>
+            <p:ph type="ftr" sz="quarter" idx="4"/>
+          </p:nvPr>
+        </p:nvSpPr>
+        <p:spPr>
+          <a:xfrm>
+            <a:off x="0" y="8685213"/>
+            <a:ext cx="2971800" cy="457200"/>
+          </a:xfrm>
+          <a:prstGeom prst="rect">
+            <a:avLst/>
+          </a:prstGeom>
+        </p:spPr>
+        <p:txBody>
+          <a:bodyPr vert="horz" lIns="91440" tIns="45720" rIns="91440" bIns="45720" rtlCol="0" anchor="b"/>
+          <a:lstStyle>
+            <a:lvl1pPr algn="l">
+              <a:defRPr sz="1200"/>
+            </a:lvl1pPr>
+          </a:lstStyle>
+          <a:p>
+            <a:endParaRPr lang="en-US"/>
+          </a:p>
+        </p:txBody>
+      </p:sp>
+      <p:sp>
+        <p:nvSpPr>
+          <p:cNvPr id="7" name="Slide Number Placeholder 6"/>
+          <p:cNvSpPr>
+            <a:spLocks noGrp="1"/>
+          </p:cNvSpPr>
+          <p:nvPr>
+            <p:ph type="sldNum" sz="quarter" idx="5"/>
+          </p:nvPr>
+        </p:nvSpPr>
+        <p:spPr>
+          <a:xfrm>
+            <a:off x="3884613" y="8685213"/>
+            <a:ext cx="2971800" cy="457200"/>
+          </a:xfrm>
+          <a:prstGeom prst="rect">
+            <a:avLst/>
+          </a:prstGeom>
+        </p:spPr>
+        <p:txBody>
+          <a:bodyPr vert="horz" lIns="91440" tIns="45720" rIns="91440" bIns="45720" rtlCol="0" anchor="b"/>
+          <a:lstStyle>
+            <a:lvl1pPr algn="r">
+              <a:defRPr sz="1200"/>
+            </a:lvl1pPr>
+          </a:lstStyle>
+          <a:p>
+            <a:fld id="{4355A105-26B0-5043-A7EC-94C834C82E90}" type="slidenum">
+              <a:rPr lang="en-US" smtClean="0"/>
+              <a:t>‹#›</a:t>
+            </a:fld>
+            <a:endParaRPr lang="en-US"/>
+          </a:p>
+        </p:txBody>
+      </p:sp>
+    </p:spTree>
+  </p:cSld>
+  <p:clrMap bg1="lt1" tx1="dk1" bg2="lt2" tx2="dk2" accent1="accent1" accent2="accent2" accent3="accent3" accent4="accent4" accent5="accent5" accent6="accent6" hlink="hlink" folHlink="folHlink"/>
+  <p:notesStyle>
+    <a:lvl1pPr marL="0" algn="l" defTabSz="457200" rtl="0" eaLnBrk="1" latinLnBrk="0" hangingPunct="1">
+      <a:defRPr sz="1200" kern="1200">
+        <a:solidFill>
+          <a:schemeClr val="tx1"/>
+        </a:solidFill>
+        <a:latin typeface="+mn-lt"/>
+        <a:ea typeface="+mn-ea"/>
+        <a:cs typeface="+mn-cs"/>
+      </a:defRPr>
+    </a:lvl1pPr>
+    <a:lvl2pPr marL="457200" algn="l" defTabSz="457200" rtl="0" eaLnBrk="1" latinLnBrk="0" hangingPunct="1">
+      <a:defRPr sz="1200" kern="1200">
+        <a:solidFill>
+          <a:schemeClr val="tx1"/>
+        </a:solidFill>
+        <a:latin typeface="+mn-lt"/>
+        <a:ea typeface="+mn-ea"/>
+        <a:cs typeface="+mn-cs"/>
+      </a:defRPr>
+    </a:lvl2pPr>
+    <a:lvl3pPr marL="914400" algn="l" defTabSz="457200" rtl="0" eaLnBrk="1" latinLnBrk="0" hangingPunct="1">
+      <a:defRPr sz="1200" kern="1200">
+        <a:solidFill>
+          <a:schemeClr val="tx1"/>
+        </a:solidFill>
+        <a:latin typeface="+mn-lt"/>
+        <a:ea typeface="+mn-ea"/>
+        <a:cs typeface="+mn-cs"/>
+      </a:defRPr>
+    </a:lvl3pPr>
+    <a:lvl4pPr marL="1371600" algn="l" defTabSz="457200" rtl="0" eaLnBrk="1" latinLnBrk="0" hangingPunct="1">
+      <a:defRPr sz="1200" kern="1200">
+        <a:solidFill>
+          <a:schemeClr val="tx1"/>
+        </a:solidFill>
+        <a:latin typeface="+mn-lt"/>
+        <a:ea typeface="+mn-ea"/>
+        <a:cs typeface="+mn-cs"/>
+      </a:defRPr>
+    </a:lvl4pPr>
+    <a:lvl5pPr marL="1828800" algn="l" defTabSz="457200" rtl="0" eaLnBrk="1" latinLnBrk="0" hangingPunct="1">
+      <a:defRPr sz="1200" kern="1200">
+        <a:solidFill>
+          <a:schemeClr val="tx1"/>
+        </a:solidFill>
+        <a:latin typeface="+mn-lt"/>
+        <a:ea typeface="+mn-ea"/>
+        <a:cs typeface="+mn-cs"/>
+      </a:defRPr>
+    </a:lvl5pPr>
+    <a:lvl6pPr marL="2286000" algn="l" defTabSz="457200" rtl="0" eaLnBrk="1" latinLnBrk="0" hangingPunct="1">
+      <a:defRPr sz="1200" kern="1200">
+        <a:solidFill>
+          <a:schemeClr val="tx1"/>
+        </a:solidFill>
+        <a:latin typeface="+mn-lt"/>
+        <a:ea typeface="+mn-ea"/>
+        <a:cs typeface="+mn-cs"/>
+      </a:defRPr>
+    </a:lvl6pPr>
+    <a:lvl7pPr marL="2743200" algn="l" defTabSz="457200" rtl="0" eaLnBrk="1" latinLnBrk="0" hangingPunct="1">
+      <a:defRPr sz="1200" kern="1200">
+        <a:solidFill>
+          <a:schemeClr val="tx1"/>
+        </a:solidFill>
+        <a:latin typeface="+mn-lt"/>
+        <a:ea typeface="+mn-ea"/>
+        <a:cs typeface="+mn-cs"/>
+      </a:defRPr>
+    </a:lvl7pPr>
+    <a:lvl8pPr marL="3200400" algn="l" defTabSz="457200" rtl="0" eaLnBrk="1" latinLnBrk="0" hangingPunct="1">
+      <a:defRPr sz="1200" kern="1200">
+        <a:solidFill>
+          <a:schemeClr val="tx1"/>
+        </a:solidFill>
+        <a:latin typeface="+mn-lt"/>
+        <a:ea typeface="+mn-ea"/>
+        <a:cs typeface="+mn-cs"/>
+      </a:defRPr>
+    </a:lvl8pPr>
+    <a:lvl9pPr marL="3657600" algn="l" defTabSz="457200" rtl="0" eaLnBrk="1" latinLnBrk="0" hangingPunct="1">
+      <a:defRPr sz="1200" kern="1200">
+        <a:solidFill>
+          <a:schemeClr val="tx1"/>
+        </a:solidFill>
+        <a:latin typeface="+mn-lt"/>
+        <a:ea typeface="+mn-ea"/>
+        <a:cs typeface="+mn-cs"/>
+      </a:defRPr>
+    </a:lvl9pPr>
+  </p:notesStyle>
+</p:notesMaster>
+</file>
+
+<file path=ppt/notesSlides/notesSlide1.xml><?xml version="1.0" encoding="utf-8"?>
+<p:notes xmlns:a="http://schemas.openxmlformats.org/drawingml/2006/main" xmlns:r="http://schemas.openxmlformats.org/officeDocument/2006/relationships" xmlns:mc="http://schemas.openxmlformats.org/markup-compatibility/2006" xmlns:mv="urn:schemas-microsoft-com:mac:vml" xmlns:p="http://schemas.openxmlformats.org/presentationml/2006/main" mc:Ignorable="mv" mc:PreserveAttributes="mv:*">
+  <p:cSld>
+    <p:spTree>
+      <p:nvGrpSpPr>
+        <p:cNvPr id="1" name=""/>
+        <p:cNvGrpSpPr/>
+        <p:nvPr/>
+      </p:nvGrpSpPr>
+      <p:grpSpPr>
+        <a:xfrm>
+          <a:off x="0" y="0"/>
+          <a:ext cx="0" cy="0"/>
+          <a:chOff x="0" y="0"/>
+          <a:chExt cx="0" cy="0"/>
+        </a:xfrm>
+      </p:grpSpPr>
+      <p:sp>
+        <p:nvSpPr>
+          <p:cNvPr id="2" name="Slide Image Placeholder 1"/>
+          <p:cNvSpPr>
+            <a:spLocks noGrp="1" noRot="1" noChangeAspect="1"/>
+          </p:cNvSpPr>
+          <p:nvPr>
+            <p:ph type="sldImg"/>
+          </p:nvPr>
+        </p:nvSpPr>
+        <p:spPr/>
+      </p:sp>
+      <p:sp>
+        <p:nvSpPr>
+          <p:cNvPr id="3" name="Notes Placeholder 2"/>
+          <p:cNvSpPr>
+            <a:spLocks noGrp="1"/>
+          </p:cNvSpPr>
+          <p:nvPr>
+            <p:ph type="body" idx="1"/>
+          </p:nvPr>
+        </p:nvSpPr>
+        <p:spPr/>
+        <p:txBody>
+          <a:bodyPr>
+            <a:normAutofit/>
+          </a:bodyPr>
+          <a:lstStyle/>
+          <a:p>
+            <a:r>
+              <a:rPr lang="en-US" dirty="0" smtClean="0"/>
+              <a:t>Go to</a:t>
+            </a:r>
+            <a:r>
+              <a:rPr lang="en-US" baseline="0" dirty="0" smtClean="0"/>
+              <a:t> simple working example</a:t>
+            </a:r>
+            <a:endParaRPr lang="en-US" dirty="0"/>
+          </a:p>
+        </p:txBody>
+      </p:sp>
+      <p:sp>
+        <p:nvSpPr>
+          <p:cNvPr id="4" name="Slide Number Placeholder 3"/>
+          <p:cNvSpPr>
+            <a:spLocks noGrp="1"/>
+          </p:cNvSpPr>
+          <p:nvPr>
+            <p:ph type="sldNum" sz="quarter" idx="10"/>
+          </p:nvPr>
+        </p:nvSpPr>
+        <p:spPr/>
+        <p:txBody>
+          <a:bodyPr/>
+          <a:lstStyle/>
+          <a:p>
+            <a:fld id="{4355A105-26B0-5043-A7EC-94C834C82E90}" type="slidenum">
+              <a:rPr lang="en-US" smtClean="0"/>
+              <a:t>4</a:t>
+            </a:fld>
+            <a:endParaRPr lang="en-US"/>
+          </a:p>
+        </p:txBody>
+      </p:sp>
+    </p:spTree>
+  </p:cSld>
+  <p:clrMapOvr>
+    <a:masterClrMapping/>
+  </p:clrMapOvr>
+</p:notes>
+</file>
+
+<file path=ppt/notesSlides/notesSlide2.xml><?xml version="1.0" encoding="utf-8"?>
+<p:notes xmlns:a="http://schemas.openxmlformats.org/drawingml/2006/main" xmlns:r="http://schemas.openxmlformats.org/officeDocument/2006/relationships" xmlns:mc="http://schemas.openxmlformats.org/markup-compatibility/2006" xmlns:mv="urn:schemas-microsoft-com:mac:vml" xmlns:p="http://schemas.openxmlformats.org/presentationml/2006/main" mc:Ignorable="mv" mc:PreserveAttributes="mv:*">
+  <p:cSld>
+    <p:spTree>
+      <p:nvGrpSpPr>
+        <p:cNvPr id="1" name=""/>
+        <p:cNvGrpSpPr/>
+        <p:nvPr/>
+      </p:nvGrpSpPr>
+      <p:grpSpPr>
+        <a:xfrm>
+          <a:off x="0" y="0"/>
+          <a:ext cx="0" cy="0"/>
+          <a:chOff x="0" y="0"/>
+          <a:chExt cx="0" cy="0"/>
+        </a:xfrm>
+      </p:grpSpPr>
+      <p:sp>
+        <p:nvSpPr>
+          <p:cNvPr id="2" name="Slide Image Placeholder 1"/>
+          <p:cNvSpPr>
+            <a:spLocks noGrp="1" noRot="1" noChangeAspect="1"/>
+          </p:cNvSpPr>
+          <p:nvPr>
+            <p:ph type="sldImg"/>
+          </p:nvPr>
+        </p:nvSpPr>
+        <p:spPr/>
+      </p:sp>
+      <p:sp>
+        <p:nvSpPr>
+          <p:cNvPr id="3" name="Notes Placeholder 2"/>
+          <p:cNvSpPr>
+            <a:spLocks noGrp="1"/>
+          </p:cNvSpPr>
+          <p:nvPr>
+            <p:ph type="body" idx="1"/>
+          </p:nvPr>
+        </p:nvSpPr>
+        <p:spPr/>
+        <p:txBody>
+          <a:bodyPr>
+            <a:normAutofit/>
+          </a:bodyPr>
+          <a:lstStyle/>
+          <a:p>
+            <a:r>
+              <a:rPr lang="en-US" dirty="0" smtClean="0"/>
+              <a:t>find *.</a:t>
+            </a:r>
+            <a:r>
+              <a:rPr lang="en-US" dirty="0" err="1" smtClean="0"/>
+              <a:t>rb</a:t>
+            </a:r>
+            <a:r>
+              <a:rPr lang="en-US" dirty="0" smtClean="0"/>
+              <a:t> -print0 | </a:t>
+            </a:r>
+            <a:r>
+              <a:rPr lang="en-US" dirty="0" err="1" smtClean="0"/>
+              <a:t>xargs</a:t>
+            </a:r>
+            <a:r>
+              <a:rPr lang="en-US" dirty="0" smtClean="0"/>
+              <a:t> -0 </a:t>
+            </a:r>
+            <a:r>
+              <a:rPr lang="en-US" dirty="0" err="1" smtClean="0"/>
+              <a:t>wc</a:t>
+            </a:r>
+            <a:r>
+              <a:rPr lang="en-US" dirty="0" smtClean="0"/>
+              <a:t> -</a:t>
+            </a:r>
+            <a:r>
+              <a:rPr lang="en-US" dirty="0" err="1" smtClean="0"/>
+              <a:t>l</a:t>
+            </a:r>
+            <a:endParaRPr lang="en-US" dirty="0"/>
+          </a:p>
+        </p:txBody>
+      </p:sp>
+      <p:sp>
+        <p:nvSpPr>
+          <p:cNvPr id="4" name="Slide Number Placeholder 3"/>
+          <p:cNvSpPr>
+            <a:spLocks noGrp="1"/>
+          </p:cNvSpPr>
+          <p:nvPr>
+            <p:ph type="sldNum" sz="quarter" idx="10"/>
+          </p:nvPr>
+        </p:nvSpPr>
+        <p:spPr/>
+        <p:txBody>
+          <a:bodyPr/>
+          <a:lstStyle/>
+          <a:p>
+            <a:fld id="{4355A105-26B0-5043-A7EC-94C834C82E90}" type="slidenum">
+              <a:rPr lang="en-US" smtClean="0"/>
+              <a:t>6</a:t>
+            </a:fld>
+            <a:endParaRPr lang="en-US"/>
+          </a:p>
+        </p:txBody>
+      </p:sp>
+    </p:spTree>
+  </p:cSld>
+  <p:clrMapOvr>
+    <a:masterClrMapping/>
+  </p:clrMapOvr>
+</p:notes>
 </file>
 
 <file path=ppt/slideLayouts/slideLayout1.xml><?xml version="1.0" encoding="utf-8"?>
@@ -4423,7 +4978,7 @@
         <p:spPr>
           <a:xfrm>
             <a:off x="396052" y="1492625"/>
-            <a:ext cx="8097088" cy="3046988"/>
+            <a:ext cx="7699544" cy="3416320"/>
           </a:xfrm>
           <a:prstGeom prst="rect">
             <a:avLst/>
@@ -4498,16 +5053,20 @@
             </a:pPr>
             <a:r>
               <a:rPr lang="en-US" sz="2400" dirty="0" smtClean="0"/>
-              <a:t>Uses a simple DSL approach for defining routes, </a:t>
-            </a:r>
+              <a:t>Slides and code  examples for this presentation:</a:t>
+            </a:r>
+          </a:p>
+          <a:p>
+            <a:pPr lvl="1">
+              <a:buBlip>
+                <a:blip r:embed="rId2"/>
+              </a:buBlip>
+            </a:pPr>
             <a:r>
               <a:rPr lang="en-US" sz="2400" dirty="0" err="1" smtClean="0"/>
-              <a:t>config</a:t>
-            </a:r>
-            <a:r>
-              <a:rPr lang="en-US" sz="2400" dirty="0" smtClean="0"/>
-              <a:t>, etc</a:t>
-            </a:r>
+              <a:t>git@github.com:techwhizbang/sinatra_slideshow.git</a:t>
+            </a:r>
+            <a:endParaRPr lang="en-US" sz="2400" dirty="0" smtClean="0"/>
           </a:p>
           <a:p>
             <a:pPr>
@@ -4584,7 +5143,7 @@
           <a:p>
             <a:r>
               <a:rPr lang="en-US" dirty="0" smtClean="0"/>
-              <a:t>Quick Intro</a:t>
+              <a:t>Overview</a:t>
             </a:r>
             <a:endParaRPr lang="en-US" dirty="0"/>
           </a:p>
@@ -4599,7 +5158,7 @@
         <p:spPr>
           <a:xfrm>
             <a:off x="396052" y="1492625"/>
-            <a:ext cx="8097088" cy="3046988"/>
+            <a:ext cx="7904728" cy="4524315"/>
           </a:xfrm>
           <a:prstGeom prst="rect">
             <a:avLst/>
@@ -4630,7 +5189,7 @@
             </a:r>
             <a:r>
               <a:rPr lang="en-US" sz="2400" dirty="0" smtClean="0"/>
-              <a:t> </a:t>
+              <a:t> “</a:t>
             </a:r>
             <a:r>
               <a:rPr lang="en-US" sz="2400" dirty="0" err="1" smtClean="0"/>
@@ -4638,7 +5197,15 @@
             </a:r>
             <a:r>
               <a:rPr lang="en-US" sz="2400" dirty="0" smtClean="0"/>
-              <a:t> built on Rack</a:t>
+              <a:t>” </a:t>
+            </a:r>
+            <a:r>
+              <a:rPr lang="en-US" sz="2400" dirty="0" smtClean="0"/>
+              <a:t>built on </a:t>
+            </a:r>
+            <a:r>
+              <a:rPr lang="en-US" sz="2400" dirty="0" smtClean="0"/>
+              <a:t>Rack</a:t>
             </a:r>
           </a:p>
           <a:p>
@@ -4649,8 +5216,9 @@
             </a:pPr>
             <a:r>
               <a:rPr lang="en-US" sz="2400" dirty="0" smtClean="0"/>
-              <a:t> Small memory footprint as compared to Rails</a:t>
-            </a:r>
+              <a:t> Easy and practical</a:t>
+            </a:r>
+            <a:endParaRPr lang="en-US" sz="2400" dirty="0" smtClean="0"/>
           </a:p>
           <a:p>
             <a:pPr>
@@ -4660,15 +5228,23 @@
             </a:pPr>
             <a:r>
               <a:rPr lang="en-US" sz="2400" dirty="0" smtClean="0"/>
-              <a:t>Less </a:t>
+              <a:t> Straightforward to test (</a:t>
             </a:r>
             <a:r>
               <a:rPr lang="en-US" sz="2400" dirty="0" err="1" smtClean="0"/>
-              <a:t>cruft</a:t>
+              <a:t>Rspec</a:t>
             </a:r>
             <a:r>
               <a:rPr lang="en-US" sz="2400" dirty="0" smtClean="0"/>
-              <a:t> and bloat of larger web frameworks</a:t>
+              <a:t> &amp; </a:t>
+            </a:r>
+            <a:r>
+              <a:rPr lang="en-US" sz="2400" dirty="0" err="1" smtClean="0"/>
+              <a:t>TestUnit</a:t>
+            </a:r>
+            <a:r>
+              <a:rPr lang="en-US" sz="2400" dirty="0" smtClean="0"/>
+              <a:t>)</a:t>
             </a:r>
           </a:p>
           <a:p>
@@ -4679,15 +5255,7 @@
             </a:pPr>
             <a:r>
               <a:rPr lang="en-US" sz="2400" dirty="0" smtClean="0"/>
-              <a:t>Uses a simple DSL approach for defining routes, </a:t>
-            </a:r>
-            <a:r>
-              <a:rPr lang="en-US" sz="2400" dirty="0" err="1" smtClean="0"/>
-              <a:t>config</a:t>
-            </a:r>
-            <a:r>
-              <a:rPr lang="en-US" sz="2400" dirty="0" smtClean="0"/>
-              <a:t>, etc</a:t>
+              <a:t> Made with extensibility in mind</a:t>
             </a:r>
           </a:p>
           <a:p>
@@ -4696,6 +5264,94 @@
                 <a:blip r:embed="rId2"/>
               </a:buBlip>
             </a:pPr>
+            <a:r>
+              <a:rPr lang="en-US" sz="2400" dirty="0" smtClean="0"/>
+              <a:t> Not </a:t>
+            </a:r>
+            <a:r>
+              <a:rPr lang="en-US" sz="2400" dirty="0" err="1" smtClean="0"/>
+              <a:t>crufty</a:t>
+            </a:r>
+            <a:r>
+              <a:rPr lang="en-US" sz="2400" dirty="0" smtClean="0"/>
+              <a:t> or bloated like larger web </a:t>
+            </a:r>
+            <a:r>
+              <a:rPr lang="en-US" sz="2400" dirty="0" smtClean="0"/>
+              <a:t>frameworks</a:t>
+            </a:r>
+          </a:p>
+          <a:p>
+            <a:pPr>
+              <a:buBlip>
+                <a:blip r:embed="rId2"/>
+              </a:buBlip>
+            </a:pPr>
+            <a:r>
+              <a:rPr lang="en-US" sz="2400" dirty="0" smtClean="0"/>
+              <a:t> Small </a:t>
+            </a:r>
+            <a:r>
+              <a:rPr lang="en-US" sz="2400" dirty="0" smtClean="0"/>
+              <a:t>memory footprint as compared </a:t>
+            </a:r>
+            <a:r>
+              <a:rPr lang="en-US" sz="2400" dirty="0" smtClean="0"/>
+              <a:t>to </a:t>
+            </a:r>
+            <a:r>
+              <a:rPr lang="en-US" sz="2400" i="1" dirty="0" smtClean="0"/>
+              <a:t>other</a:t>
+            </a:r>
+            <a:r>
+              <a:rPr lang="en-US" sz="2400" dirty="0" smtClean="0"/>
+              <a:t> frameworks</a:t>
+            </a:r>
+          </a:p>
+          <a:p>
+            <a:pPr>
+              <a:buBlip>
+                <a:blip r:embed="rId2"/>
+              </a:buBlip>
+            </a:pPr>
+            <a:r>
+              <a:rPr lang="en-US" sz="2400" dirty="0" smtClean="0"/>
+              <a:t> On par performance-wise to </a:t>
+            </a:r>
+            <a:r>
+              <a:rPr lang="en-US" sz="2400" i="1" dirty="0" smtClean="0"/>
+              <a:t>other </a:t>
+            </a:r>
+            <a:r>
+              <a:rPr lang="en-US" sz="2400" dirty="0" smtClean="0"/>
+              <a:t>frameworks</a:t>
+            </a:r>
+          </a:p>
+          <a:p>
+            <a:pPr>
+              <a:buBlip>
+                <a:blip r:embed="rId2"/>
+              </a:buBlip>
+            </a:pPr>
+            <a:r>
+              <a:rPr lang="en-US" sz="2400" dirty="0" smtClean="0"/>
+              <a:t> Works well with many web servers</a:t>
+            </a:r>
+          </a:p>
+          <a:p>
+            <a:pPr>
+              <a:buBlip>
+                <a:blip r:embed="rId2"/>
+              </a:buBlip>
+            </a:pPr>
+            <a:r>
+              <a:rPr lang="en-US" sz="2400" dirty="0" smtClean="0"/>
+              <a:t> Works great with </a:t>
+            </a:r>
+            <a:r>
+              <a:rPr lang="en-US" sz="2400" dirty="0" err="1" smtClean="0"/>
+              <a:t>JRuby</a:t>
+            </a:r>
             <a:endParaRPr lang="en-US" sz="2400" dirty="0" smtClean="0"/>
           </a:p>
           <a:p>
@@ -4727,6 +5383,686 @@
         <p:cTn id="1" dur="indefinite" restart="never" nodeType="tmRoot"/>
       </p:par>
     </p:tnLst>
+  </p:timing>
+</p:sld>
+</file>
+
+<file path=ppt/slides/slide4.xml><?xml version="1.0" encoding="utf-8"?>
+<p:sld xmlns:a="http://schemas.openxmlformats.org/drawingml/2006/main" xmlns:r="http://schemas.openxmlformats.org/officeDocument/2006/relationships" xmlns:mc="http://schemas.openxmlformats.org/markup-compatibility/2006" xmlns:mv="urn:schemas-microsoft-com:mac:vml" xmlns:p="http://schemas.openxmlformats.org/presentationml/2006/main" mc:Ignorable="mv" mc:PreserveAttributes="mv:*">
+  <p:cSld>
+    <p:spTree>
+      <p:nvGrpSpPr>
+        <p:cNvPr id="1" name=""/>
+        <p:cNvGrpSpPr/>
+        <p:nvPr/>
+      </p:nvGrpSpPr>
+      <p:grpSpPr>
+        <a:xfrm>
+          <a:off x="0" y="0"/>
+          <a:ext cx="0" cy="0"/>
+          <a:chOff x="0" y="0"/>
+          <a:chExt cx="0" cy="0"/>
+        </a:xfrm>
+      </p:grpSpPr>
+      <p:sp>
+        <p:nvSpPr>
+          <p:cNvPr id="2" name="Title 1"/>
+          <p:cNvSpPr>
+            <a:spLocks noGrp="1"/>
+          </p:cNvSpPr>
+          <p:nvPr>
+            <p:ph type="title"/>
+          </p:nvPr>
+        </p:nvSpPr>
+        <p:spPr/>
+        <p:txBody>
+          <a:bodyPr/>
+          <a:lstStyle/>
+          <a:p>
+            <a:r>
+              <a:rPr lang="en-US" dirty="0" smtClean="0"/>
+              <a:t>Sinatra 101</a:t>
+            </a:r>
+            <a:endParaRPr lang="en-US" dirty="0"/>
+          </a:p>
+        </p:txBody>
+      </p:sp>
+      <p:sp>
+        <p:nvSpPr>
+          <p:cNvPr id="3" name="TextBox 2"/>
+          <p:cNvSpPr txBox="1"/>
+          <p:nvPr/>
+        </p:nvSpPr>
+        <p:spPr>
+          <a:xfrm>
+            <a:off x="396052" y="1492625"/>
+            <a:ext cx="7738016" cy="4154983"/>
+          </a:xfrm>
+          <a:prstGeom prst="rect">
+            <a:avLst/>
+          </a:prstGeom>
+          <a:noFill/>
+        </p:spPr>
+        <p:txBody>
+          <a:bodyPr wrap="none" rtlCol="0">
+            <a:spAutoFit/>
+          </a:bodyPr>
+          <a:lstStyle/>
+          <a:p>
+            <a:endParaRPr lang="en-US" sz="2400" dirty="0" smtClean="0"/>
+          </a:p>
+          <a:p>
+            <a:pPr>
+              <a:buBlip>
+                <a:blip r:embed="rId3"/>
+              </a:buBlip>
+            </a:pPr>
+            <a:r>
+              <a:rPr lang="en-US" sz="2400" dirty="0" smtClean="0"/>
+              <a:t> Sinatra is mostly a DSL</a:t>
+            </a:r>
+          </a:p>
+          <a:p>
+            <a:pPr>
+              <a:buBlip>
+                <a:blip r:embed="rId3"/>
+              </a:buBlip>
+            </a:pPr>
+            <a:r>
+              <a:rPr lang="en-US" sz="2400" dirty="0" smtClean="0"/>
+              <a:t> The DSL routing conforms to GET, POST, PUT, DELETE</a:t>
+            </a:r>
+            <a:endParaRPr lang="en-US" sz="2400" dirty="0" smtClean="0"/>
+          </a:p>
+          <a:p>
+            <a:pPr>
+              <a:buBlip>
+                <a:blip r:embed="rId3"/>
+              </a:buBlip>
+            </a:pPr>
+            <a:r>
+              <a:rPr lang="en-US" sz="2400" dirty="0" smtClean="0"/>
+              <a:t> Works with all your favorite Ruby </a:t>
+            </a:r>
+            <a:r>
+              <a:rPr lang="en-US" sz="2400" dirty="0" err="1" smtClean="0"/>
+              <a:t>templating</a:t>
+            </a:r>
+            <a:r>
+              <a:rPr lang="en-US" sz="2400" dirty="0" smtClean="0"/>
+              <a:t> libraries</a:t>
+            </a:r>
+          </a:p>
+          <a:p>
+            <a:pPr lvl="1">
+              <a:buBlip>
+                <a:blip r:embed="rId3"/>
+              </a:buBlip>
+            </a:pPr>
+            <a:r>
+              <a:rPr lang="en-US" sz="2400" dirty="0" err="1" smtClean="0"/>
+              <a:t>Haml</a:t>
+            </a:r>
+            <a:r>
+              <a:rPr lang="en-US" sz="2400" dirty="0" smtClean="0"/>
+              <a:t>, Sass, </a:t>
+            </a:r>
+            <a:r>
+              <a:rPr lang="en-US" sz="2400" dirty="0" err="1" smtClean="0"/>
+              <a:t>Erb</a:t>
+            </a:r>
+            <a:r>
+              <a:rPr lang="en-US" sz="2400" dirty="0" smtClean="0"/>
+              <a:t>, </a:t>
+            </a:r>
+            <a:r>
+              <a:rPr lang="en-US" sz="2400" dirty="0" err="1" smtClean="0"/>
+              <a:t>Erubis</a:t>
+            </a:r>
+            <a:r>
+              <a:rPr lang="en-US" sz="2400" dirty="0" smtClean="0"/>
+              <a:t>, Builder</a:t>
+            </a:r>
+          </a:p>
+          <a:p>
+            <a:pPr>
+              <a:buBlip>
+                <a:blip r:embed="rId3"/>
+              </a:buBlip>
+            </a:pPr>
+            <a:r>
+              <a:rPr lang="en-US" sz="2400" dirty="0" smtClean="0"/>
+              <a:t> URI definition should look similar to Rails</a:t>
+            </a:r>
+          </a:p>
+          <a:p>
+            <a:pPr>
+              <a:buBlip>
+                <a:blip r:embed="rId3"/>
+              </a:buBlip>
+            </a:pPr>
+            <a:r>
+              <a:rPr lang="en-US" sz="2400" dirty="0" smtClean="0"/>
+              <a:t> Has </a:t>
+            </a:r>
+            <a:r>
+              <a:rPr lang="en-US" sz="2400" dirty="0" smtClean="0"/>
+              <a:t>before and after filters similar to Rails</a:t>
+            </a:r>
+          </a:p>
+          <a:p>
+            <a:pPr>
+              <a:buBlip>
+                <a:blip r:embed="rId3"/>
+              </a:buBlip>
+            </a:pPr>
+            <a:r>
+              <a:rPr lang="en-US" sz="2400" dirty="0" smtClean="0"/>
+              <a:t> DSL configuration</a:t>
+            </a:r>
+          </a:p>
+          <a:p>
+            <a:pPr>
+              <a:buBlip>
+                <a:blip r:embed="rId3"/>
+              </a:buBlip>
+            </a:pPr>
+            <a:r>
+              <a:rPr lang="en-US" sz="2400" dirty="0" smtClean="0"/>
+              <a:t> Handles all typical response codes and mime types nicely</a:t>
+            </a:r>
+          </a:p>
+          <a:p>
+            <a:pPr>
+              <a:buBlip>
+                <a:blip r:embed="rId3"/>
+              </a:buBlip>
+            </a:pPr>
+            <a:r>
+              <a:rPr lang="en-US" sz="2400" dirty="0" smtClean="0"/>
+              <a:t> Let’s take a look at a very basic standalone app</a:t>
+            </a:r>
+          </a:p>
+          <a:p>
+            <a:pPr>
+              <a:buBlip>
+                <a:blip r:embed="rId3"/>
+              </a:buBlip>
+            </a:pPr>
+            <a:endParaRPr lang="en-US" sz="2400" dirty="0"/>
+          </a:p>
+        </p:txBody>
+      </p:sp>
+    </p:spTree>
+  </p:cSld>
+  <p:clrMapOvr>
+    <a:masterClrMapping/>
+  </p:clrMapOvr>
+  <p:timing>
+    <p:tnLst>
+      <p:par>
+        <p:cTn id="1" dur="indefinite" restart="never" nodeType="tmRoot"/>
+      </p:par>
+    </p:tnLst>
+  </p:timing>
+</p:sld>
+</file>
+
+<file path=ppt/slides/slide5.xml><?xml version="1.0" encoding="utf-8"?>
+<p:sld xmlns:a="http://schemas.openxmlformats.org/drawingml/2006/main" xmlns:r="http://schemas.openxmlformats.org/officeDocument/2006/relationships" xmlns:mc="http://schemas.openxmlformats.org/markup-compatibility/2006" xmlns:mv="urn:schemas-microsoft-com:mac:vml" xmlns:p="http://schemas.openxmlformats.org/presentationml/2006/main" mc:Ignorable="mv" mc:PreserveAttributes="mv:*">
+  <p:cSld>
+    <p:spTree>
+      <p:nvGrpSpPr>
+        <p:cNvPr id="1" name=""/>
+        <p:cNvGrpSpPr/>
+        <p:nvPr/>
+      </p:nvGrpSpPr>
+      <p:grpSpPr>
+        <a:xfrm>
+          <a:off x="0" y="0"/>
+          <a:ext cx="0" cy="0"/>
+          <a:chOff x="0" y="0"/>
+          <a:chExt cx="0" cy="0"/>
+        </a:xfrm>
+      </p:grpSpPr>
+      <p:sp>
+        <p:nvSpPr>
+          <p:cNvPr id="2" name="Title 1"/>
+          <p:cNvSpPr>
+            <a:spLocks noGrp="1"/>
+          </p:cNvSpPr>
+          <p:nvPr>
+            <p:ph type="title"/>
+          </p:nvPr>
+        </p:nvSpPr>
+        <p:spPr/>
+        <p:txBody>
+          <a:bodyPr/>
+          <a:lstStyle/>
+          <a:p>
+            <a:r>
+              <a:rPr lang="en-US" dirty="0" smtClean="0"/>
+              <a:t>Ways to ‘start’ Sinatra</a:t>
+            </a:r>
+            <a:endParaRPr lang="en-US" dirty="0"/>
+          </a:p>
+        </p:txBody>
+      </p:sp>
+      <p:sp>
+        <p:nvSpPr>
+          <p:cNvPr id="3" name="TextBox 2"/>
+          <p:cNvSpPr txBox="1"/>
+          <p:nvPr/>
+        </p:nvSpPr>
+        <p:spPr>
+          <a:xfrm>
+            <a:off x="1392844" y="1492625"/>
+            <a:ext cx="6211957" cy="1200328"/>
+          </a:xfrm>
+          <a:prstGeom prst="rect">
+            <a:avLst/>
+          </a:prstGeom>
+          <a:noFill/>
+        </p:spPr>
+        <p:txBody>
+          <a:bodyPr wrap="none" rtlCol="0">
+            <a:spAutoFit/>
+          </a:bodyPr>
+          <a:lstStyle/>
+          <a:p>
+            <a:endParaRPr lang="en-US" sz="2400" dirty="0" smtClean="0"/>
+          </a:p>
+          <a:p>
+            <a:pPr>
+              <a:buBlip>
+                <a:blip r:embed="rId2"/>
+              </a:buBlip>
+            </a:pPr>
+            <a:r>
+              <a:rPr lang="en-US" sz="2400" dirty="0" smtClean="0"/>
+              <a:t> Use a </a:t>
+            </a:r>
+            <a:r>
+              <a:rPr lang="en-US" sz="2400" dirty="0" err="1" smtClean="0"/>
+              <a:t>Rackup</a:t>
+            </a:r>
+            <a:r>
+              <a:rPr lang="en-US" sz="2400" dirty="0" smtClean="0"/>
+              <a:t> file - </a:t>
+            </a:r>
+            <a:r>
+              <a:rPr lang="en-US" sz="2400" dirty="0" err="1" smtClean="0"/>
+              <a:t>config</a:t>
+            </a:r>
+            <a:r>
+              <a:rPr lang="en-US" sz="2400" err="1" smtClean="0"/>
+              <a:t>.</a:t>
+            </a:r>
+            <a:r>
+              <a:rPr lang="en-US" sz="2400" smtClean="0"/>
+              <a:t>ru</a:t>
+            </a:r>
+          </a:p>
+          <a:p>
+            <a:pPr>
+              <a:buBlip>
+                <a:blip r:embed="rId2"/>
+              </a:buBlip>
+            </a:pPr>
+            <a:r>
+              <a:rPr lang="en-US" sz="2400" dirty="0" smtClean="0"/>
+              <a:t> Standalone mode - ruby </a:t>
+            </a:r>
+            <a:r>
+              <a:rPr lang="en-US" sz="2400" dirty="0" err="1" smtClean="0"/>
+              <a:t>your_sinatra_app.rb</a:t>
+            </a:r>
+            <a:endParaRPr lang="en-US" sz="2400" dirty="0" smtClean="0"/>
+          </a:p>
+        </p:txBody>
+      </p:sp>
+    </p:spTree>
+  </p:cSld>
+  <p:clrMapOvr>
+    <a:masterClrMapping/>
+  </p:clrMapOvr>
+  <p:timing>
+    <p:tnLst>
+      <p:par>
+        <p:cTn id="1" dur="indefinite" restart="never" nodeType="tmRoot"/>
+      </p:par>
+    </p:tnLst>
+  </p:timing>
+</p:sld>
+</file>
+
+<file path=ppt/slides/slide6.xml><?xml version="1.0" encoding="utf-8"?>
+<p:sld xmlns:a="http://schemas.openxmlformats.org/drawingml/2006/main" xmlns:r="http://schemas.openxmlformats.org/officeDocument/2006/relationships" xmlns:mc="http://schemas.openxmlformats.org/markup-compatibility/2006" xmlns:mv="urn:schemas-microsoft-com:mac:vml" xmlns:p="http://schemas.openxmlformats.org/presentationml/2006/main" mc:Ignorable="mv" mc:PreserveAttributes="mv:*">
+  <p:cSld>
+    <p:spTree>
+      <p:nvGrpSpPr>
+        <p:cNvPr id="1" name=""/>
+        <p:cNvGrpSpPr/>
+        <p:nvPr/>
+      </p:nvGrpSpPr>
+      <p:grpSpPr>
+        <a:xfrm>
+          <a:off x="0" y="0"/>
+          <a:ext cx="0" cy="0"/>
+          <a:chOff x="0" y="0"/>
+          <a:chExt cx="0" cy="0"/>
+        </a:xfrm>
+      </p:grpSpPr>
+      <p:pic>
+        <p:nvPicPr>
+          <p:cNvPr id="10" name="Picture 9"/>
+          <p:cNvPicPr>
+            <a:picLocks noChangeAspect="1"/>
+          </p:cNvPicPr>
+          <p:nvPr/>
+        </p:nvPicPr>
+        <p:blipFill>
+          <a:blip r:embed="rId3">
+            <a:alphaModFix amt="17000"/>
+          </a:blip>
+          <a:stretch>
+            <a:fillRect/>
+          </a:stretch>
+        </p:blipFill>
+        <p:spPr>
+          <a:xfrm>
+            <a:off x="2349500" y="1439885"/>
+            <a:ext cx="4445000" cy="4445000"/>
+          </a:xfrm>
+          <a:prstGeom prst="rect">
+            <a:avLst/>
+          </a:prstGeom>
+        </p:spPr>
+      </p:pic>
+      <p:sp>
+        <p:nvSpPr>
+          <p:cNvPr id="2" name="Title 1"/>
+          <p:cNvSpPr>
+            <a:spLocks noGrp="1"/>
+          </p:cNvSpPr>
+          <p:nvPr>
+            <p:ph type="title"/>
+          </p:nvPr>
+        </p:nvSpPr>
+        <p:spPr/>
+        <p:txBody>
+          <a:bodyPr/>
+          <a:lstStyle/>
+          <a:p>
+            <a:r>
+              <a:rPr lang="en-US" dirty="0" err="1" smtClean="0"/>
+              <a:t>Cruft-o-Meter</a:t>
+            </a:r>
+            <a:endParaRPr lang="en-US" dirty="0"/>
+          </a:p>
+        </p:txBody>
+      </p:sp>
+      <p:sp>
+        <p:nvSpPr>
+          <p:cNvPr id="3" name="TextBox 2"/>
+          <p:cNvSpPr txBox="1"/>
+          <p:nvPr/>
+        </p:nvSpPr>
+        <p:spPr>
+          <a:xfrm>
+            <a:off x="3101806" y="1492625"/>
+            <a:ext cx="3093515" cy="1200328"/>
+          </a:xfrm>
+          <a:prstGeom prst="rect">
+            <a:avLst/>
+          </a:prstGeom>
+          <a:noFill/>
+        </p:spPr>
+        <p:txBody>
+          <a:bodyPr wrap="square" rtlCol="0">
+            <a:spAutoFit/>
+          </a:bodyPr>
+          <a:lstStyle/>
+          <a:p>
+            <a:endParaRPr lang="en-US" sz="2400" dirty="0" smtClean="0"/>
+          </a:p>
+          <a:p>
+            <a:r>
+              <a:rPr lang="en-US" sz="2400" dirty="0" smtClean="0"/>
+              <a:t>Lines of code for tests?</a:t>
+            </a:r>
+          </a:p>
+          <a:p>
+            <a:pPr>
+              <a:buBlip>
+                <a:blip r:embed="rId4"/>
+              </a:buBlip>
+            </a:pPr>
+            <a:endParaRPr lang="en-US" sz="2400" dirty="0"/>
+          </a:p>
+        </p:txBody>
+      </p:sp>
+      <p:sp>
+        <p:nvSpPr>
+          <p:cNvPr id="5" name="Rectangle 4"/>
+          <p:cNvSpPr/>
+          <p:nvPr/>
+        </p:nvSpPr>
+        <p:spPr>
+          <a:xfrm>
+            <a:off x="2349500" y="3062284"/>
+            <a:ext cx="4621352" cy="461665"/>
+          </a:xfrm>
+          <a:prstGeom prst="rect">
+            <a:avLst/>
+          </a:prstGeom>
+        </p:spPr>
+        <p:txBody>
+          <a:bodyPr wrap="square">
+            <a:spAutoFit/>
+          </a:bodyPr>
+          <a:lstStyle/>
+          <a:p>
+            <a:pPr lvl="1"/>
+            <a:r>
+              <a:rPr lang="en-US" sz="2400" dirty="0" smtClean="0"/>
+              <a:t>Actual </a:t>
+            </a:r>
+            <a:r>
+              <a:rPr lang="en-US" sz="2400" dirty="0" smtClean="0"/>
+              <a:t>lines of library code? </a:t>
+            </a:r>
+            <a:endParaRPr lang="en-US" sz="2400" dirty="0" smtClean="0"/>
+          </a:p>
+        </p:txBody>
+      </p:sp>
+      <p:sp>
+        <p:nvSpPr>
+          <p:cNvPr id="7" name="Rectangle 6"/>
+          <p:cNvSpPr/>
+          <p:nvPr/>
+        </p:nvSpPr>
+        <p:spPr>
+          <a:xfrm>
+            <a:off x="3778245" y="2462120"/>
+            <a:ext cx="1711538" cy="461665"/>
+          </a:xfrm>
+          <a:prstGeom prst="rect">
+            <a:avLst/>
+          </a:prstGeom>
+        </p:spPr>
+        <p:txBody>
+          <a:bodyPr wrap="square">
+            <a:spAutoFit/>
+          </a:bodyPr>
+          <a:lstStyle/>
+          <a:p>
+            <a:pPr lvl="1"/>
+            <a:r>
+              <a:rPr lang="en-US" sz="2400" b="1" dirty="0" smtClean="0"/>
+              <a:t>3685</a:t>
+            </a:r>
+            <a:endParaRPr lang="en-US" sz="2400" b="1" dirty="0" smtClean="0"/>
+          </a:p>
+        </p:txBody>
+      </p:sp>
+      <p:sp>
+        <p:nvSpPr>
+          <p:cNvPr id="9" name="Rectangle 8"/>
+          <p:cNvSpPr/>
+          <p:nvPr/>
+        </p:nvSpPr>
+        <p:spPr>
+          <a:xfrm>
+            <a:off x="3778245" y="3662385"/>
+            <a:ext cx="1711538" cy="461665"/>
+          </a:xfrm>
+          <a:prstGeom prst="rect">
+            <a:avLst/>
+          </a:prstGeom>
+        </p:spPr>
+        <p:txBody>
+          <a:bodyPr wrap="square">
+            <a:spAutoFit/>
+          </a:bodyPr>
+          <a:lstStyle/>
+          <a:p>
+            <a:pPr lvl="1"/>
+            <a:r>
+              <a:rPr lang="en-US" sz="2400" b="1" dirty="0" smtClean="0"/>
+              <a:t>2248</a:t>
+            </a:r>
+          </a:p>
+        </p:txBody>
+      </p:sp>
+    </p:spTree>
+  </p:cSld>
+  <p:clrMapOvr>
+    <a:masterClrMapping/>
+  </p:clrMapOvr>
+  <p:timing>
+    <p:tnLst>
+      <p:par>
+        <p:cTn id="1" dur="indefinite" restart="never" nodeType="tmRoot">
+          <p:childTnLst>
+            <p:seq concurrent="1" nextAc="seek">
+              <p:cTn id="2" dur="indefinite" nodeType="mainSeq">
+                <p:childTnLst>
+                  <p:par>
+                    <p:cTn id="3" fill="hold">
+                      <p:stCondLst>
+                        <p:cond delay="indefinite"/>
+                      </p:stCondLst>
+                      <p:childTnLst>
+                        <p:par>
+                          <p:cTn id="4" fill="hold">
+                            <p:stCondLst>
+                              <p:cond delay="0"/>
+                            </p:stCondLst>
+                            <p:childTnLst>
+                              <p:par>
+                                <p:cTn id="5" presetID="1" presetClass="entr" presetSubtype="0" fill="hold" grpId="0" nodeType="clickEffect">
+                                  <p:stCondLst>
+                                    <p:cond delay="0"/>
+                                  </p:stCondLst>
+                                  <p:childTnLst>
+                                    <p:set>
+                                      <p:cBhvr>
+                                        <p:cTn id="6" dur="1" fill="hold">
+                                          <p:stCondLst>
+                                            <p:cond delay="0"/>
+                                          </p:stCondLst>
+                                        </p:cTn>
+                                        <p:tgtEl>
+                                          <p:spTgt spid="7"/>
+                                        </p:tgtEl>
+                                        <p:attrNameLst>
+                                          <p:attrName>style.visibility</p:attrName>
+                                        </p:attrNameLst>
+                                      </p:cBhvr>
+                                      <p:to>
+                                        <p:strVal val="visible"/>
+                                      </p:to>
+                                    </p:set>
+                                  </p:childTnLst>
+                                </p:cTn>
+                              </p:par>
+                            </p:childTnLst>
+                          </p:cTn>
+                        </p:par>
+                      </p:childTnLst>
+                    </p:cTn>
+                  </p:par>
+                  <p:par>
+                    <p:cTn id="7" fill="hold">
+                      <p:stCondLst>
+                        <p:cond delay="indefinite"/>
+                      </p:stCondLst>
+                      <p:childTnLst>
+                        <p:par>
+                          <p:cTn id="8" fill="hold">
+                            <p:stCondLst>
+                              <p:cond delay="0"/>
+                            </p:stCondLst>
+                            <p:childTnLst>
+                              <p:par>
+                                <p:cTn id="9" presetID="1" presetClass="entr" presetSubtype="0" fill="hold" grpId="0" nodeType="clickEffect">
+                                  <p:stCondLst>
+                                    <p:cond delay="0"/>
+                                  </p:stCondLst>
+                                  <p:childTnLst>
+                                    <p:set>
+                                      <p:cBhvr>
+                                        <p:cTn id="10" dur="1" fill="hold">
+                                          <p:stCondLst>
+                                            <p:cond delay="0"/>
+                                          </p:stCondLst>
+                                        </p:cTn>
+                                        <p:tgtEl>
+                                          <p:spTgt spid="9"/>
+                                        </p:tgtEl>
+                                        <p:attrNameLst>
+                                          <p:attrName>style.visibility</p:attrName>
+                                        </p:attrNameLst>
+                                      </p:cBhvr>
+                                      <p:to>
+                                        <p:strVal val="visible"/>
+                                      </p:to>
+                                    </p:set>
+                                  </p:childTnLst>
+                                </p:cTn>
+                              </p:par>
+                            </p:childTnLst>
+                          </p:cTn>
+                        </p:par>
+                      </p:childTnLst>
+                    </p:cTn>
+                  </p:par>
+                </p:childTnLst>
+              </p:cTn>
+              <p:prevCondLst>
+                <p:cond evt="onPrev" delay="0">
+                  <p:tgtEl>
+                    <p:sldTgt/>
+                  </p:tgtEl>
+                </p:cond>
+              </p:prevCondLst>
+              <p:nextCondLst>
+                <p:cond evt="onNext" delay="0">
+                  <p:tgtEl>
+                    <p:sldTgt/>
+                  </p:tgtEl>
+                </p:cond>
+              </p:nextCondLst>
+            </p:seq>
+          </p:childTnLst>
+        </p:cTn>
+      </p:par>
+    </p:tnLst>
+    <p:bldLst>
+      <p:bldP spid="7" grpId="0"/>
+      <p:bldP spid="9" grpId="0"/>
+    </p:bldLst>
   </p:timing>
 </p:sld>
 </file>
@@ -4993,4 +6329,322 @@
   </a:objectDefaults>
   <a:extraClrSchemeLst/>
 </a:theme>
+</file>
+
+<file path=ppt/theme/theme2.xml><?xml version="1.0" encoding="utf-8"?>
+<a:theme xmlns:a="http://schemas.openxmlformats.org/drawingml/2006/main" name="Office Theme">
+  <a:themeElements>
+    <a:clrScheme name="Office">
+      <a:dk1>
+        <a:sysClr val="windowText" lastClr="000000"/>
+      </a:dk1>
+      <a:lt1>
+        <a:sysClr val="window" lastClr="FFFFFF"/>
+      </a:lt1>
+      <a:dk2>
+        <a:srgbClr val="1F497D"/>
+      </a:dk2>
+      <a:lt2>
+        <a:srgbClr val="EEECE1"/>
+      </a:lt2>
+      <a:accent1>
+        <a:srgbClr val="4F81BD"/>
+      </a:accent1>
+      <a:accent2>
+        <a:srgbClr val="C0504D"/>
+      </a:accent2>
+      <a:accent3>
+        <a:srgbClr val="9BBB59"/>
+      </a:accent3>
+      <a:accent4>
+        <a:srgbClr val="8064A2"/>
+      </a:accent4>
+      <a:accent5>
+        <a:srgbClr val="4BACC6"/>
+      </a:accent5>
+      <a:accent6>
+        <a:srgbClr val="F79646"/>
+      </a:accent6>
+      <a:hlink>
+        <a:srgbClr val="0000FF"/>
+      </a:hlink>
+      <a:folHlink>
+        <a:srgbClr val="800080"/>
+      </a:folHlink>
+    </a:clrScheme>
+    <a:fontScheme name="Office">
+      <a:majorFont>
+        <a:latin typeface="Calibri"/>
+        <a:ea typeface=""/>
+        <a:cs typeface=""/>
+        <a:font script="Jpan" typeface="ＭＳ Ｐゴシック"/>
+        <a:font script="Hang" typeface="맑은 고딕"/>
+        <a:font script="Hans" typeface="宋体"/>
+        <a:font script="Hant" typeface="新細明體"/>
+        <a:font script="Arab" typeface="Times New Roman"/>
+        <a:font script="Hebr" typeface="Times New Roman"/>
+        <a:font script="Thai" typeface="Angsana New"/>
+        <a:font script="Ethi" typeface="Nyala"/>
+        <a:font script="Beng" typeface="Vrinda"/>
+        <a:font script="Gujr" typeface="Shruti"/>
+        <a:font script="Khmr" typeface="MoolBoran"/>
+        <a:font script="Knda" typeface="Tunga"/>
+        <a:font script="Guru" typeface="Raavi"/>
+        <a:font script="Cans" typeface="Euphemia"/>
+        <a:font script="Cher" typeface="Plantagenet Cherokee"/>
+        <a:font script="Yiii" typeface="Microsoft Yi Baiti"/>
+        <a:font script="Tibt" typeface="Microsoft Himalaya"/>
+        <a:font script="Thaa" typeface="MV Boli"/>
+        <a:font script="Deva" typeface="Mangal"/>
+        <a:font script="Telu" typeface="Gautami"/>
+        <a:font script="Taml" typeface="Latha"/>
+        <a:font script="Syrc" typeface="Estrangelo Edessa"/>
+        <a:font script="Orya" typeface="Kalinga"/>
+        <a:font script="Mlym" typeface="Kartika"/>
+        <a:font script="Laoo" typeface="DokChampa"/>
+        <a:font script="Sinh" typeface="Iskoola Pota"/>
+        <a:font script="Mong" typeface="Mongolian Baiti"/>
+        <a:font script="Viet" typeface="Times New Roman"/>
+        <a:font script="Uigh" typeface="Microsoft Uighur"/>
+      </a:majorFont>
+      <a:minorFont>
+        <a:latin typeface="Calibri"/>
+        <a:ea typeface=""/>
+        <a:cs typeface=""/>
+        <a:font script="Jpan" typeface="ＭＳ Ｐゴシック"/>
+        <a:font script="Hang" typeface="맑은 고딕"/>
+        <a:font script="Hans" typeface="宋体"/>
+        <a:font script="Hant" typeface="新細明體"/>
+        <a:font script="Arab" typeface="Arial"/>
+        <a:font script="Hebr" typeface="Arial"/>
+        <a:font script="Thai" typeface="Cordia New"/>
+        <a:font script="Ethi" typeface="Nyala"/>
+        <a:font script="Beng" typeface="Vrinda"/>
+        <a:font script="Gujr" typeface="Shruti"/>
+        <a:font script="Khmr" typeface="DaunPenh"/>
+        <a:font script="Knda" typeface="Tunga"/>
+        <a:font script="Guru" typeface="Raavi"/>
+        <a:font script="Cans" typeface="Euphemia"/>
+        <a:font script="Cher" typeface="Plantagenet Cherokee"/>
+        <a:font script="Yiii" typeface="Microsoft Yi Baiti"/>
+        <a:font script="Tibt" typeface="Microsoft Himalaya"/>
+        <a:font script="Thaa" typeface="MV Boli"/>
+        <a:font script="Deva" typeface="Mangal"/>
+        <a:font script="Telu" typeface="Gautami"/>
+        <a:font script="Taml" typeface="Latha"/>
+        <a:font script="Syrc" typeface="Estrangelo Edessa"/>
+        <a:font script="Orya" typeface="Kalinga"/>
+        <a:font script="Mlym" typeface="Kartika"/>
+        <a:font script="Laoo" typeface="DokChampa"/>
+        <a:font script="Sinh" typeface="Iskoola Pota"/>
+        <a:font script="Mong" typeface="Mongolian Baiti"/>
+        <a:font script="Viet" typeface="Arial"/>
+        <a:font script="Uigh" typeface="Microsoft Uighur"/>
+      </a:minorFont>
+    </a:fontScheme>
+    <a:fmtScheme name="Office">
+      <a:fillStyleLst>
+        <a:solidFill>
+          <a:schemeClr val="phClr"/>
+        </a:solidFill>
+        <a:gradFill rotWithShape="1">
+          <a:gsLst>
+            <a:gs pos="0">
+              <a:schemeClr val="phClr">
+                <a:tint val="50000"/>
+                <a:satMod val="300000"/>
+              </a:schemeClr>
+            </a:gs>
+            <a:gs pos="35000">
+              <a:schemeClr val="phClr">
+                <a:tint val="37000"/>
+                <a:satMod val="300000"/>
+              </a:schemeClr>
+            </a:gs>
+            <a:gs pos="100000">
+              <a:schemeClr val="phClr">
+                <a:tint val="15000"/>
+                <a:satMod val="350000"/>
+              </a:schemeClr>
+            </a:gs>
+          </a:gsLst>
+          <a:lin ang="16200000" scaled="1"/>
+        </a:gradFill>
+        <a:gradFill rotWithShape="1">
+          <a:gsLst>
+            <a:gs pos="0">
+              <a:schemeClr val="phClr">
+                <a:tint val="100000"/>
+                <a:shade val="100000"/>
+                <a:satMod val="130000"/>
+              </a:schemeClr>
+            </a:gs>
+            <a:gs pos="100000">
+              <a:schemeClr val="phClr">
+                <a:tint val="50000"/>
+                <a:shade val="100000"/>
+                <a:satMod val="350000"/>
+              </a:schemeClr>
+            </a:gs>
+          </a:gsLst>
+          <a:lin ang="16200000" scaled="0"/>
+        </a:gradFill>
+      </a:fillStyleLst>
+      <a:lnStyleLst>
+        <a:ln w="9525" cap="flat" cmpd="sng" algn="ctr">
+          <a:solidFill>
+            <a:schemeClr val="phClr">
+              <a:shade val="95000"/>
+              <a:satMod val="105000"/>
+            </a:schemeClr>
+          </a:solidFill>
+          <a:prstDash val="solid"/>
+        </a:ln>
+        <a:ln w="25400" cap="flat" cmpd="sng" algn="ctr">
+          <a:solidFill>
+            <a:schemeClr val="phClr"/>
+          </a:solidFill>
+          <a:prstDash val="solid"/>
+        </a:ln>
+        <a:ln w="38100" cap="flat" cmpd="sng" algn="ctr">
+          <a:solidFill>
+            <a:schemeClr val="phClr"/>
+          </a:solidFill>
+          <a:prstDash val="solid"/>
+        </a:ln>
+      </a:lnStyleLst>
+      <a:effectStyleLst>
+        <a:effectStyle>
+          <a:effectLst>
+            <a:outerShdw blurRad="40000" dist="20000" dir="5400000" rotWithShape="0">
+              <a:srgbClr val="000000">
+                <a:alpha val="38000"/>
+              </a:srgbClr>
+            </a:outerShdw>
+          </a:effectLst>
+        </a:effectStyle>
+        <a:effectStyle>
+          <a:effectLst>
+            <a:outerShdw blurRad="40000" dist="23000" dir="5400000" rotWithShape="0">
+              <a:srgbClr val="000000">
+                <a:alpha val="35000"/>
+              </a:srgbClr>
+            </a:outerShdw>
+          </a:effectLst>
+        </a:effectStyle>
+        <a:effectStyle>
+          <a:effectLst>
+            <a:outerShdw blurRad="40000" dist="23000" dir="5400000" rotWithShape="0">
+              <a:srgbClr val="000000">
+                <a:alpha val="35000"/>
+              </a:srgbClr>
+            </a:outerShdw>
+          </a:effectLst>
+          <a:scene3d>
+            <a:camera prst="orthographicFront">
+              <a:rot lat="0" lon="0" rev="0"/>
+            </a:camera>
+            <a:lightRig rig="threePt" dir="t">
+              <a:rot lat="0" lon="0" rev="1200000"/>
+            </a:lightRig>
+          </a:scene3d>
+          <a:sp3d>
+            <a:bevelT w="63500" h="25400"/>
+          </a:sp3d>
+        </a:effectStyle>
+      </a:effectStyleLst>
+      <a:bgFillStyleLst>
+        <a:solidFill>
+          <a:schemeClr val="phClr"/>
+        </a:solidFill>
+        <a:gradFill rotWithShape="1">
+          <a:gsLst>
+            <a:gs pos="0">
+              <a:schemeClr val="phClr">
+                <a:tint val="40000"/>
+                <a:satMod val="350000"/>
+              </a:schemeClr>
+            </a:gs>
+            <a:gs pos="40000">
+              <a:schemeClr val="phClr">
+                <a:tint val="45000"/>
+                <a:shade val="99000"/>
+                <a:satMod val="350000"/>
+              </a:schemeClr>
+            </a:gs>
+            <a:gs pos="100000">
+              <a:schemeClr val="phClr">
+                <a:shade val="20000"/>
+                <a:satMod val="255000"/>
+              </a:schemeClr>
+            </a:gs>
+          </a:gsLst>
+          <a:path path="circle">
+            <a:fillToRect l="50000" t="-80000" r="50000" b="180000"/>
+          </a:path>
+        </a:gradFill>
+        <a:gradFill rotWithShape="1">
+          <a:gsLst>
+            <a:gs pos="0">
+              <a:schemeClr val="phClr">
+                <a:tint val="80000"/>
+                <a:satMod val="300000"/>
+              </a:schemeClr>
+            </a:gs>
+            <a:gs pos="100000">
+              <a:schemeClr val="phClr">
+                <a:shade val="30000"/>
+                <a:satMod val="200000"/>
+              </a:schemeClr>
+            </a:gs>
+          </a:gsLst>
+          <a:path path="circle">
+            <a:fillToRect l="50000" t="50000" r="50000" b="50000"/>
+          </a:path>
+        </a:gradFill>
+      </a:bgFillStyleLst>
+    </a:fmtScheme>
+  </a:themeElements>
+  <a:objectDefaults>
+    <a:spDef>
+      <a:spPr/>
+      <a:bodyPr/>
+      <a:lstStyle/>
+      <a:style>
+        <a:lnRef idx="1">
+          <a:schemeClr val="accent1"/>
+        </a:lnRef>
+        <a:fillRef idx="3">
+          <a:schemeClr val="accent1"/>
+        </a:fillRef>
+        <a:effectRef idx="2">
+          <a:schemeClr val="accent1"/>
+        </a:effectRef>
+        <a:fontRef idx="minor">
+          <a:schemeClr val="lt1"/>
+        </a:fontRef>
+      </a:style>
+    </a:spDef>
+    <a:lnDef>
+      <a:spPr/>
+      <a:bodyPr/>
+      <a:lstStyle/>
+      <a:style>
+        <a:lnRef idx="2">
+          <a:schemeClr val="accent1"/>
+        </a:lnRef>
+        <a:fillRef idx="0">
+          <a:schemeClr val="accent1"/>
+        </a:fillRef>
+        <a:effectRef idx="1">
+          <a:schemeClr val="accent1"/>
+        </a:effectRef>
+        <a:fontRef idx="minor">
+          <a:schemeClr val="tx1"/>
+        </a:fontRef>
+      </a:style>
+    </a:lnDef>
+  </a:objectDefaults>
+  <a:extraClrSchemeLst/>
+</a:theme>
 </file>
</xml_diff>

<commit_message>
jmeter,slides - added jmeter script, a few more slides with ideas
</commit_message>
<xml_diff>
--- a/sinatra.pptx
+++ b/sinatra.pptx
@@ -5,7 +5,7 @@
     <p:sldMasterId id="2147483660" r:id="rId1"/>
   </p:sldMasterIdLst>
   <p:notesMasterIdLst>
-    <p:notesMasterId r:id="rId8"/>
+    <p:notesMasterId r:id="rId15"/>
   </p:notesMasterIdLst>
   <p:sldIdLst>
     <p:sldId id="256" r:id="rId2"/>
@@ -13,7 +13,14 @@
     <p:sldId id="257" r:id="rId4"/>
     <p:sldId id="259" r:id="rId5"/>
     <p:sldId id="261" r:id="rId6"/>
-    <p:sldId id="260" r:id="rId7"/>
+    <p:sldId id="262" r:id="rId7"/>
+    <p:sldId id="265" r:id="rId8"/>
+    <p:sldId id="260" r:id="rId9"/>
+    <p:sldId id="263" r:id="rId10"/>
+    <p:sldId id="264" r:id="rId11"/>
+    <p:sldId id="266" r:id="rId12"/>
+    <p:sldId id="267" r:id="rId13"/>
+    <p:sldId id="268" r:id="rId14"/>
   </p:sldIdLst>
   <p:sldSz cx="9144000" cy="6858000" type="screen4x3"/>
   <p:notesSz cx="6858000" cy="9144000"/>
@@ -197,7 +204,8 @@
           <a:p>
             <a:fld id="{FEBA1754-3910-A94B-AF97-8DE201D32E78}" type="datetimeFigureOut">
               <a:rPr lang="en-US" smtClean="0"/>
-              <a:t>7/17/10</a:t>
+              <a:pPr/>
+              <a:t>8/7/10</a:t>
             </a:fld>
             <a:endParaRPr lang="en-US"/>
           </a:p>
@@ -358,6 +366,7 @@
           <a:p>
             <a:fld id="{4355A105-26B0-5043-A7EC-94C834C82E90}" type="slidenum">
               <a:rPr lang="en-US" smtClean="0"/>
+              <a:pPr/>
               <a:t>‹#›</a:t>
             </a:fld>
             <a:endParaRPr lang="en-US"/>
@@ -537,6 +546,7 @@
           <a:p>
             <a:fld id="{4355A105-26B0-5043-A7EC-94C834C82E90}" type="slidenum">
               <a:rPr lang="en-US" smtClean="0"/>
+              <a:pPr/>
               <a:t>4</a:t>
             </a:fld>
             <a:endParaRPr lang="en-US"/>
@@ -597,6 +607,88 @@
           </a:bodyPr>
           <a:lstStyle/>
           <a:p>
+            <a:endParaRPr lang="en-US" dirty="0"/>
+          </a:p>
+        </p:txBody>
+      </p:sp>
+      <p:sp>
+        <p:nvSpPr>
+          <p:cNvPr id="4" name="Slide Number Placeholder 3"/>
+          <p:cNvSpPr>
+            <a:spLocks noGrp="1"/>
+          </p:cNvSpPr>
+          <p:nvPr>
+            <p:ph type="sldNum" sz="quarter" idx="10"/>
+          </p:nvPr>
+        </p:nvSpPr>
+        <p:spPr/>
+        <p:txBody>
+          <a:bodyPr/>
+          <a:lstStyle/>
+          <a:p>
+            <a:fld id="{4355A105-26B0-5043-A7EC-94C834C82E90}" type="slidenum">
+              <a:rPr lang="en-US" smtClean="0"/>
+              <a:pPr/>
+              <a:t>6</a:t>
+            </a:fld>
+            <a:endParaRPr lang="en-US"/>
+          </a:p>
+        </p:txBody>
+      </p:sp>
+    </p:spTree>
+  </p:cSld>
+  <p:clrMapOvr>
+    <a:masterClrMapping/>
+  </p:clrMapOvr>
+</p:notes>
+</file>
+
+<file path=ppt/notesSlides/notesSlide3.xml><?xml version="1.0" encoding="utf-8"?>
+<p:notes xmlns:a="http://schemas.openxmlformats.org/drawingml/2006/main" xmlns:r="http://schemas.openxmlformats.org/officeDocument/2006/relationships" xmlns:mc="http://schemas.openxmlformats.org/markup-compatibility/2006" xmlns:mv="urn:schemas-microsoft-com:mac:vml" xmlns:p="http://schemas.openxmlformats.org/presentationml/2006/main" mc:Ignorable="mv" mc:PreserveAttributes="mv:*">
+  <p:cSld>
+    <p:spTree>
+      <p:nvGrpSpPr>
+        <p:cNvPr id="1" name=""/>
+        <p:cNvGrpSpPr/>
+        <p:nvPr/>
+      </p:nvGrpSpPr>
+      <p:grpSpPr>
+        <a:xfrm>
+          <a:off x="0" y="0"/>
+          <a:ext cx="0" cy="0"/>
+          <a:chOff x="0" y="0"/>
+          <a:chExt cx="0" cy="0"/>
+        </a:xfrm>
+      </p:grpSpPr>
+      <p:sp>
+        <p:nvSpPr>
+          <p:cNvPr id="2" name="Slide Image Placeholder 1"/>
+          <p:cNvSpPr>
+            <a:spLocks noGrp="1" noRot="1" noChangeAspect="1"/>
+          </p:cNvSpPr>
+          <p:nvPr>
+            <p:ph type="sldImg"/>
+          </p:nvPr>
+        </p:nvSpPr>
+        <p:spPr/>
+      </p:sp>
+      <p:sp>
+        <p:nvSpPr>
+          <p:cNvPr id="3" name="Notes Placeholder 2"/>
+          <p:cNvSpPr>
+            <a:spLocks noGrp="1"/>
+          </p:cNvSpPr>
+          <p:nvPr>
+            <p:ph type="body" idx="1"/>
+          </p:nvPr>
+        </p:nvSpPr>
+        <p:spPr/>
+        <p:txBody>
+          <a:bodyPr>
+            <a:normAutofit/>
+          </a:bodyPr>
+          <a:lstStyle/>
+          <a:p>
             <a:r>
               <a:rPr lang="en-US" dirty="0" smtClean="0"/>
               <a:t>find *.</a:t>
@@ -650,7 +742,90 @@
           <a:p>
             <a:fld id="{4355A105-26B0-5043-A7EC-94C834C82E90}" type="slidenum">
               <a:rPr lang="en-US" smtClean="0"/>
-              <a:t>6</a:t>
+              <a:pPr/>
+              <a:t>8</a:t>
+            </a:fld>
+            <a:endParaRPr lang="en-US"/>
+          </a:p>
+        </p:txBody>
+      </p:sp>
+    </p:spTree>
+  </p:cSld>
+  <p:clrMapOvr>
+    <a:masterClrMapping/>
+  </p:clrMapOvr>
+</p:notes>
+</file>
+
+<file path=ppt/notesSlides/notesSlide4.xml><?xml version="1.0" encoding="utf-8"?>
+<p:notes xmlns:a="http://schemas.openxmlformats.org/drawingml/2006/main" xmlns:r="http://schemas.openxmlformats.org/officeDocument/2006/relationships" xmlns:mc="http://schemas.openxmlformats.org/markup-compatibility/2006" xmlns:mv="urn:schemas-microsoft-com:mac:vml" xmlns:p="http://schemas.openxmlformats.org/presentationml/2006/main" mc:Ignorable="mv" mc:PreserveAttributes="mv:*">
+  <p:cSld>
+    <p:spTree>
+      <p:nvGrpSpPr>
+        <p:cNvPr id="1" name=""/>
+        <p:cNvGrpSpPr/>
+        <p:nvPr/>
+      </p:nvGrpSpPr>
+      <p:grpSpPr>
+        <a:xfrm>
+          <a:off x="0" y="0"/>
+          <a:ext cx="0" cy="0"/>
+          <a:chOff x="0" y="0"/>
+          <a:chExt cx="0" cy="0"/>
+        </a:xfrm>
+      </p:grpSpPr>
+      <p:sp>
+        <p:nvSpPr>
+          <p:cNvPr id="2" name="Slide Image Placeholder 1"/>
+          <p:cNvSpPr>
+            <a:spLocks noGrp="1" noRot="1" noChangeAspect="1"/>
+          </p:cNvSpPr>
+          <p:nvPr>
+            <p:ph type="sldImg"/>
+          </p:nvPr>
+        </p:nvSpPr>
+        <p:spPr/>
+      </p:sp>
+      <p:sp>
+        <p:nvSpPr>
+          <p:cNvPr id="3" name="Notes Placeholder 2"/>
+          <p:cNvSpPr>
+            <a:spLocks noGrp="1"/>
+          </p:cNvSpPr>
+          <p:nvPr>
+            <p:ph type="body" idx="1"/>
+          </p:nvPr>
+        </p:nvSpPr>
+        <p:spPr/>
+        <p:txBody>
+          <a:bodyPr>
+            <a:normAutofit/>
+          </a:bodyPr>
+          <a:lstStyle/>
+          <a:p>
+            <a:endParaRPr lang="en-US" dirty="0"/>
+          </a:p>
+        </p:txBody>
+      </p:sp>
+      <p:sp>
+        <p:nvSpPr>
+          <p:cNvPr id="4" name="Slide Number Placeholder 3"/>
+          <p:cNvSpPr>
+            <a:spLocks noGrp="1"/>
+          </p:cNvSpPr>
+          <p:nvPr>
+            <p:ph type="sldNum" sz="quarter" idx="10"/>
+          </p:nvPr>
+        </p:nvSpPr>
+        <p:spPr/>
+        <p:txBody>
+          <a:bodyPr/>
+          <a:lstStyle/>
+          <a:p>
+            <a:fld id="{4355A105-26B0-5043-A7EC-94C834C82E90}" type="slidenum">
+              <a:rPr lang="en-US" smtClean="0"/>
+              <a:pPr/>
+              <a:t>12</a:t>
             </a:fld>
             <a:endParaRPr lang="en-US"/>
           </a:p>
@@ -943,7 +1118,7 @@
             <a:fld id="{72AB9F51-C26B-4644-AC7E-A618488A626A}" type="datetimeFigureOut">
               <a:rPr lang="en-US"/>
               <a:pPr/>
-              <a:t>7/17/10</a:t>
+              <a:t>8/7/10</a:t>
             </a:fld>
             <a:endParaRPr/>
           </a:p>
@@ -1035,7 +1210,7 @@
             <a:fld id="{36BD7A5A-4508-41A3-A542-021284F44FD2}" type="datetime1">
               <a:rPr lang="en-US"/>
               <a:pPr/>
-              <a:t>7/17/10</a:t>
+              <a:t>8/7/10</a:t>
             </a:fld>
             <a:endParaRPr/>
           </a:p>
@@ -1619,7 +1794,7 @@
             <a:fld id="{5D6049BC-90DD-4F53-902A-0D72503E5497}" type="datetime1">
               <a:rPr lang="en-US"/>
               <a:pPr/>
-              <a:t>7/17/10</a:t>
+              <a:t>8/7/10</a:t>
             </a:fld>
             <a:endParaRPr/>
           </a:p>
@@ -1931,7 +2106,7 @@
             <a:fld id="{42D58EEC-9731-49DD-91E8-494A93B2DEC9}" type="datetime1">
               <a:rPr lang="en-US"/>
               <a:pPr/>
-              <a:t>7/17/10</a:t>
+              <a:t>8/7/10</a:t>
             </a:fld>
             <a:endParaRPr/>
           </a:p>
@@ -2104,7 +2279,7 @@
             <a:fld id="{7500C05C-B3EA-49FC-922A-1D3FFA7FF7F2}" type="datetime1">
               <a:rPr lang="en-US"/>
               <a:pPr/>
-              <a:t>7/17/10</a:t>
+              <a:t>8/7/10</a:t>
             </a:fld>
             <a:endParaRPr/>
           </a:p>
@@ -2462,7 +2637,7 @@
             <a:fld id="{6690622F-2886-4428-9227-475DC6DA1737}" type="datetime1">
               <a:rPr lang="en-US"/>
               <a:pPr/>
-              <a:t>7/17/10</a:t>
+              <a:t>8/7/10</a:t>
             </a:fld>
             <a:endParaRPr/>
           </a:p>
@@ -2762,7 +2937,7 @@
             <a:fld id="{72AAB499-F5DE-4BE5-BB26-90CC428051F7}" type="datetime1">
               <a:rPr lang="en-US"/>
               <a:pPr/>
-              <a:t>7/17/10</a:t>
+              <a:t>8/7/10</a:t>
             </a:fld>
             <a:endParaRPr/>
           </a:p>
@@ -3054,7 +3229,7 @@
             <a:fld id="{EFE21C87-FA30-4C7E-9CC2-3E29C7E6D70C}" type="datetime1">
               <a:rPr lang="en-US"/>
               <a:pPr/>
-              <a:t>7/17/10</a:t>
+              <a:t>8/7/10</a:t>
             </a:fld>
             <a:endParaRPr/>
           </a:p>
@@ -3484,7 +3659,7 @@
             <a:fld id="{FE61A93B-C135-4A78-A62B-B7D890B1D77D}" type="datetime1">
               <a:rPr lang="en-US"/>
               <a:pPr/>
-              <a:t>7/17/10</a:t>
+              <a:t>8/7/10</a:t>
             </a:fld>
             <a:endParaRPr/>
           </a:p>
@@ -3598,7 +3773,7 @@
             <a:fld id="{C5D7800F-ED33-4A55-872C-F1E2CF63B167}" type="datetime1">
               <a:rPr lang="en-US"/>
               <a:pPr/>
-              <a:t>7/17/10</a:t>
+              <a:t>8/7/10</a:t>
             </a:fld>
             <a:endParaRPr/>
           </a:p>
@@ -3694,7 +3869,7 @@
             <a:fld id="{CF789F90-FBE0-40FF-ACC1-F9FEE7C4DE13}" type="datetime1">
               <a:rPr lang="en-US"/>
               <a:pPr/>
-              <a:t>7/17/10</a:t>
+              <a:t>8/7/10</a:t>
             </a:fld>
             <a:endParaRPr/>
           </a:p>
@@ -4007,7 +4182,7 @@
             <a:fld id="{244C6E4D-6501-4890-AD5C-63A441F7EFF6}" type="datetime1">
               <a:rPr lang="en-US"/>
               <a:pPr/>
-              <a:t>7/17/10</a:t>
+              <a:t>8/7/10</a:t>
             </a:fld>
             <a:endParaRPr/>
           </a:p>
@@ -4247,7 +4422,7 @@
             <a:fld id="{6690622F-2886-4428-9227-475DC6DA1737}" type="datetime1">
               <a:rPr lang="en-US"/>
               <a:pPr/>
-              <a:t>7/17/10</a:t>
+              <a:t>8/7/10</a:t>
             </a:fld>
             <a:endParaRPr/>
           </a:p>
@@ -4836,6 +5011,497 @@
 </p:sld>
 </file>
 
+<file path=ppt/slides/slide10.xml><?xml version="1.0" encoding="utf-8"?>
+<p:sld xmlns:a="http://schemas.openxmlformats.org/drawingml/2006/main" xmlns:r="http://schemas.openxmlformats.org/officeDocument/2006/relationships" xmlns:mc="http://schemas.openxmlformats.org/markup-compatibility/2006" xmlns:mv="urn:schemas-microsoft-com:mac:vml" xmlns:p="http://schemas.openxmlformats.org/presentationml/2006/main" mc:Ignorable="mv" mc:PreserveAttributes="mv:*">
+  <p:cSld>
+    <p:spTree>
+      <p:nvGrpSpPr>
+        <p:cNvPr id="1" name=""/>
+        <p:cNvGrpSpPr/>
+        <p:nvPr/>
+      </p:nvGrpSpPr>
+      <p:grpSpPr>
+        <a:xfrm>
+          <a:off x="0" y="0"/>
+          <a:ext cx="0" cy="0"/>
+          <a:chOff x="0" y="0"/>
+          <a:chExt cx="0" cy="0"/>
+        </a:xfrm>
+      </p:grpSpPr>
+      <p:sp>
+        <p:nvSpPr>
+          <p:cNvPr id="2" name="Title 1"/>
+          <p:cNvSpPr>
+            <a:spLocks noGrp="1"/>
+          </p:cNvSpPr>
+          <p:nvPr>
+            <p:ph type="title"/>
+          </p:nvPr>
+        </p:nvSpPr>
+        <p:spPr/>
+        <p:txBody>
+          <a:bodyPr/>
+          <a:lstStyle/>
+          <a:p>
+            <a:r>
+              <a:rPr lang="en-US" dirty="0" smtClean="0"/>
+              <a:t>Memory Footprint VS.</a:t>
+            </a:r>
+            <a:endParaRPr lang="en-US" dirty="0"/>
+          </a:p>
+        </p:txBody>
+      </p:sp>
+      <p:sp>
+        <p:nvSpPr>
+          <p:cNvPr id="3" name="TextBox 2"/>
+          <p:cNvSpPr txBox="1"/>
+          <p:nvPr/>
+        </p:nvSpPr>
+        <p:spPr>
+          <a:xfrm>
+            <a:off x="1392844" y="1492625"/>
+            <a:ext cx="6420754" cy="1200328"/>
+          </a:xfrm>
+          <a:prstGeom prst="rect">
+            <a:avLst/>
+          </a:prstGeom>
+          <a:noFill/>
+        </p:spPr>
+        <p:txBody>
+          <a:bodyPr wrap="square" rtlCol="0">
+            <a:spAutoFit/>
+          </a:bodyPr>
+          <a:lstStyle/>
+          <a:p>
+            <a:endParaRPr lang="en-US" sz="2400" dirty="0" smtClean="0"/>
+          </a:p>
+          <a:p>
+            <a:pPr>
+              <a:buBlip>
+                <a:blip r:embed="rId2"/>
+              </a:buBlip>
+            </a:pPr>
+            <a:r>
+              <a:rPr lang="en-US" sz="2400" dirty="0" smtClean="0"/>
+              <a:t> Under load using ‘top’</a:t>
+            </a:r>
+          </a:p>
+          <a:p>
+            <a:pPr>
+              <a:buBlip>
+                <a:blip r:embed="rId2"/>
+              </a:buBlip>
+            </a:pPr>
+            <a:endParaRPr lang="en-US" sz="2400" dirty="0" smtClean="0"/>
+          </a:p>
+        </p:txBody>
+      </p:sp>
+    </p:spTree>
+  </p:cSld>
+  <p:clrMapOvr>
+    <a:masterClrMapping/>
+  </p:clrMapOvr>
+  <p:timing>
+    <p:tnLst>
+      <p:par>
+        <p:cTn id="1" dur="indefinite" restart="never" nodeType="tmRoot"/>
+      </p:par>
+    </p:tnLst>
+  </p:timing>
+</p:sld>
+</file>
+
+<file path=ppt/slides/slide11.xml><?xml version="1.0" encoding="utf-8"?>
+<p:sld xmlns:a="http://schemas.openxmlformats.org/drawingml/2006/main" xmlns:r="http://schemas.openxmlformats.org/officeDocument/2006/relationships" xmlns:mc="http://schemas.openxmlformats.org/markup-compatibility/2006" xmlns:mv="urn:schemas-microsoft-com:mac:vml" xmlns:p="http://schemas.openxmlformats.org/presentationml/2006/main" mc:Ignorable="mv" mc:PreserveAttributes="mv:*">
+  <p:cSld>
+    <p:spTree>
+      <p:nvGrpSpPr>
+        <p:cNvPr id="1" name=""/>
+        <p:cNvGrpSpPr/>
+        <p:nvPr/>
+      </p:nvGrpSpPr>
+      <p:grpSpPr>
+        <a:xfrm>
+          <a:off x="0" y="0"/>
+          <a:ext cx="0" cy="0"/>
+          <a:chOff x="0" y="0"/>
+          <a:chExt cx="0" cy="0"/>
+        </a:xfrm>
+      </p:grpSpPr>
+      <p:sp>
+        <p:nvSpPr>
+          <p:cNvPr id="2" name="Title 1"/>
+          <p:cNvSpPr>
+            <a:spLocks noGrp="1"/>
+          </p:cNvSpPr>
+          <p:nvPr>
+            <p:ph type="title"/>
+          </p:nvPr>
+        </p:nvSpPr>
+        <p:spPr/>
+        <p:txBody>
+          <a:bodyPr/>
+          <a:lstStyle/>
+          <a:p>
+            <a:r>
+              <a:rPr lang="en-US" dirty="0" smtClean="0"/>
+              <a:t>Sinatra + </a:t>
+            </a:r>
+            <a:r>
+              <a:rPr lang="en-US" dirty="0" err="1" smtClean="0"/>
+              <a:t>JRuby</a:t>
+            </a:r>
+            <a:endParaRPr lang="en-US" dirty="0"/>
+          </a:p>
+        </p:txBody>
+      </p:sp>
+      <p:sp>
+        <p:nvSpPr>
+          <p:cNvPr id="3" name="TextBox 2"/>
+          <p:cNvSpPr txBox="1"/>
+          <p:nvPr/>
+        </p:nvSpPr>
+        <p:spPr>
+          <a:xfrm>
+            <a:off x="1392844" y="1492625"/>
+            <a:ext cx="6420754" cy="830997"/>
+          </a:xfrm>
+          <a:prstGeom prst="rect">
+            <a:avLst/>
+          </a:prstGeom>
+          <a:noFill/>
+        </p:spPr>
+        <p:txBody>
+          <a:bodyPr wrap="square" rtlCol="0">
+            <a:spAutoFit/>
+          </a:bodyPr>
+          <a:lstStyle/>
+          <a:p>
+            <a:endParaRPr lang="en-US" sz="2400" dirty="0" smtClean="0"/>
+          </a:p>
+          <a:p>
+            <a:pPr>
+              <a:buBlip>
+                <a:blip r:embed="rId2"/>
+              </a:buBlip>
+            </a:pPr>
+            <a:r>
+              <a:rPr lang="en-US" sz="2400" dirty="0" smtClean="0"/>
+              <a:t> Under load using ‘top’</a:t>
+            </a:r>
+          </a:p>
+        </p:txBody>
+      </p:sp>
+    </p:spTree>
+  </p:cSld>
+  <p:clrMapOvr>
+    <a:masterClrMapping/>
+  </p:clrMapOvr>
+  <p:timing>
+    <p:tnLst>
+      <p:par>
+        <p:cTn id="1" dur="indefinite" restart="never" nodeType="tmRoot"/>
+      </p:par>
+    </p:tnLst>
+  </p:timing>
+</p:sld>
+</file>
+
+<file path=ppt/slides/slide12.xml><?xml version="1.0" encoding="utf-8"?>
+<p:sld xmlns:a="http://schemas.openxmlformats.org/drawingml/2006/main" xmlns:r="http://schemas.openxmlformats.org/officeDocument/2006/relationships" xmlns:mc="http://schemas.openxmlformats.org/markup-compatibility/2006" xmlns:mv="urn:schemas-microsoft-com:mac:vml" xmlns:p="http://schemas.openxmlformats.org/presentationml/2006/main" mc:Ignorable="mv" mc:PreserveAttributes="mv:*">
+  <p:cSld>
+    <p:spTree>
+      <p:nvGrpSpPr>
+        <p:cNvPr id="1" name=""/>
+        <p:cNvGrpSpPr/>
+        <p:nvPr/>
+      </p:nvGrpSpPr>
+      <p:grpSpPr>
+        <a:xfrm>
+          <a:off x="0" y="0"/>
+          <a:ext cx="0" cy="0"/>
+          <a:chOff x="0" y="0"/>
+          <a:chExt cx="0" cy="0"/>
+        </a:xfrm>
+      </p:grpSpPr>
+      <p:pic>
+        <p:nvPicPr>
+          <p:cNvPr id="4" name="Picture 3"/>
+          <p:cNvPicPr>
+            <a:picLocks noChangeAspect="1"/>
+          </p:cNvPicPr>
+          <p:nvPr/>
+        </p:nvPicPr>
+        <p:blipFill>
+          <a:blip r:embed="rId3">
+            <a:alphaModFix amt="30000"/>
+          </a:blip>
+          <a:stretch>
+            <a:fillRect/>
+          </a:stretch>
+        </p:blipFill>
+        <p:spPr>
+          <a:xfrm>
+            <a:off x="-508000" y="1492625"/>
+            <a:ext cx="10160000" cy="3505200"/>
+          </a:xfrm>
+          <a:prstGeom prst="rect">
+            <a:avLst/>
+          </a:prstGeom>
+        </p:spPr>
+      </p:pic>
+      <p:sp>
+        <p:nvSpPr>
+          <p:cNvPr id="2" name="Title 1"/>
+          <p:cNvSpPr>
+            <a:spLocks noGrp="1"/>
+          </p:cNvSpPr>
+          <p:nvPr>
+            <p:ph type="title"/>
+          </p:nvPr>
+        </p:nvSpPr>
+        <p:spPr/>
+        <p:txBody>
+          <a:bodyPr/>
+          <a:lstStyle/>
+          <a:p>
+            <a:r>
+              <a:rPr lang="en-US" dirty="0" err="1" smtClean="0"/>
+              <a:t>JRuby</a:t>
+            </a:r>
+            <a:r>
+              <a:rPr lang="en-US" dirty="0" smtClean="0"/>
+              <a:t>+ Warbler + Bundler</a:t>
+            </a:r>
+            <a:endParaRPr lang="en-US" dirty="0"/>
+          </a:p>
+        </p:txBody>
+      </p:sp>
+      <p:sp>
+        <p:nvSpPr>
+          <p:cNvPr id="3" name="TextBox 2"/>
+          <p:cNvSpPr txBox="1"/>
+          <p:nvPr/>
+        </p:nvSpPr>
+        <p:spPr>
+          <a:xfrm>
+            <a:off x="1392844" y="1492625"/>
+            <a:ext cx="6420754" cy="1200328"/>
+          </a:xfrm>
+          <a:prstGeom prst="rect">
+            <a:avLst/>
+          </a:prstGeom>
+          <a:noFill/>
+        </p:spPr>
+        <p:txBody>
+          <a:bodyPr wrap="square" rtlCol="0">
+            <a:spAutoFit/>
+          </a:bodyPr>
+          <a:lstStyle/>
+          <a:p>
+            <a:endParaRPr lang="en-US" sz="2400" dirty="0" smtClean="0"/>
+          </a:p>
+          <a:p>
+            <a:pPr>
+              <a:buBlip>
+                <a:blip r:embed="rId4"/>
+              </a:buBlip>
+            </a:pPr>
+            <a:r>
+              <a:rPr lang="en-US" sz="2400" dirty="0" smtClean="0"/>
+              <a:t> </a:t>
+            </a:r>
+            <a:r>
+              <a:rPr lang="en-US" sz="2400" dirty="0" err="1" smtClean="0"/>
+              <a:t>Gemfile</a:t>
+            </a:r>
+            <a:endParaRPr lang="en-US" sz="2400" dirty="0" smtClean="0"/>
+          </a:p>
+          <a:p>
+            <a:pPr>
+              <a:buBlip>
+                <a:blip r:embed="rId4"/>
+              </a:buBlip>
+            </a:pPr>
+            <a:r>
+              <a:rPr lang="en-US" sz="2400" dirty="0" err="1" smtClean="0"/>
+              <a:t>Bundler.require_env</a:t>
+            </a:r>
+            <a:endParaRPr lang="en-US" sz="2400" dirty="0" smtClean="0"/>
+          </a:p>
+        </p:txBody>
+      </p:sp>
+    </p:spTree>
+  </p:cSld>
+  <p:clrMapOvr>
+    <a:masterClrMapping/>
+  </p:clrMapOvr>
+  <p:timing>
+    <p:tnLst>
+      <p:par>
+        <p:cTn id="1" dur="indefinite" restart="never" nodeType="tmRoot"/>
+      </p:par>
+    </p:tnLst>
+  </p:timing>
+</p:sld>
+</file>
+
+<file path=ppt/slides/slide13.xml><?xml version="1.0" encoding="utf-8"?>
+<p:sld xmlns:a="http://schemas.openxmlformats.org/drawingml/2006/main" xmlns:r="http://schemas.openxmlformats.org/officeDocument/2006/relationships" xmlns:mc="http://schemas.openxmlformats.org/markup-compatibility/2006" xmlns:mv="urn:schemas-microsoft-com:mac:vml" xmlns:p="http://schemas.openxmlformats.org/presentationml/2006/main" mc:Ignorable="mv" mc:PreserveAttributes="mv:*">
+  <p:cSld>
+    <p:spTree>
+      <p:nvGrpSpPr>
+        <p:cNvPr id="1" name=""/>
+        <p:cNvGrpSpPr/>
+        <p:nvPr/>
+      </p:nvGrpSpPr>
+      <p:grpSpPr>
+        <a:xfrm>
+          <a:off x="0" y="0"/>
+          <a:ext cx="0" cy="0"/>
+          <a:chOff x="0" y="0"/>
+          <a:chExt cx="0" cy="0"/>
+        </a:xfrm>
+      </p:grpSpPr>
+      <p:sp>
+        <p:nvSpPr>
+          <p:cNvPr id="2" name="Title 1"/>
+          <p:cNvSpPr>
+            <a:spLocks noGrp="1"/>
+          </p:cNvSpPr>
+          <p:nvPr>
+            <p:ph type="title"/>
+          </p:nvPr>
+        </p:nvSpPr>
+        <p:spPr/>
+        <p:txBody>
+          <a:bodyPr/>
+          <a:lstStyle/>
+          <a:p>
+            <a:r>
+              <a:rPr lang="en-US" dirty="0" smtClean="0"/>
+              <a:t>Sinatra on </a:t>
+            </a:r>
+            <a:r>
+              <a:rPr lang="en-US" dirty="0" err="1" smtClean="0"/>
+              <a:t>Heroku</a:t>
+            </a:r>
+            <a:endParaRPr lang="en-US" dirty="0"/>
+          </a:p>
+        </p:txBody>
+      </p:sp>
+      <p:sp>
+        <p:nvSpPr>
+          <p:cNvPr id="3" name="TextBox 2"/>
+          <p:cNvSpPr txBox="1"/>
+          <p:nvPr/>
+        </p:nvSpPr>
+        <p:spPr>
+          <a:xfrm>
+            <a:off x="1392844" y="1492625"/>
+            <a:ext cx="6420754" cy="1938992"/>
+          </a:xfrm>
+          <a:prstGeom prst="rect">
+            <a:avLst/>
+          </a:prstGeom>
+          <a:noFill/>
+        </p:spPr>
+        <p:txBody>
+          <a:bodyPr wrap="square" rtlCol="0">
+            <a:spAutoFit/>
+          </a:bodyPr>
+          <a:lstStyle/>
+          <a:p>
+            <a:endParaRPr lang="en-US" sz="2400" dirty="0" smtClean="0"/>
+          </a:p>
+          <a:p>
+            <a:pPr>
+              <a:buBlip>
+                <a:blip r:embed="rId2"/>
+              </a:buBlip>
+            </a:pPr>
+            <a:r>
+              <a:rPr lang="en-US" sz="2400" dirty="0" smtClean="0"/>
+              <a:t> Version your app </a:t>
+            </a:r>
+            <a:r>
+              <a:rPr lang="en-US" sz="2400" dirty="0" smtClean="0"/>
+              <a:t>with</a:t>
+            </a:r>
+            <a:r>
+              <a:rPr lang="en-US" sz="2400" dirty="0" smtClean="0"/>
+              <a:t> </a:t>
+            </a:r>
+            <a:r>
+              <a:rPr lang="en-US" sz="2400" dirty="0" err="1" smtClean="0"/>
+              <a:t>Git(hub</a:t>
+            </a:r>
+            <a:r>
+              <a:rPr lang="en-US" sz="2400" dirty="0" smtClean="0"/>
+              <a:t>)</a:t>
+            </a:r>
+          </a:p>
+          <a:p>
+            <a:pPr>
+              <a:buBlip>
+                <a:blip r:embed="rId2"/>
+              </a:buBlip>
+            </a:pPr>
+            <a:r>
+              <a:rPr lang="en-US" sz="2400" dirty="0" smtClean="0"/>
+              <a:t> </a:t>
+            </a:r>
+            <a:r>
+              <a:rPr lang="en-US" sz="2400" dirty="0" err="1" smtClean="0"/>
+              <a:t>sudo</a:t>
+            </a:r>
+            <a:r>
+              <a:rPr lang="en-US" sz="2400" dirty="0" smtClean="0"/>
+              <a:t> gem install </a:t>
+            </a:r>
+            <a:r>
+              <a:rPr lang="en-US" sz="2400" dirty="0" err="1" smtClean="0"/>
+              <a:t>heroku</a:t>
+            </a:r>
+            <a:endParaRPr lang="en-US" sz="2400" dirty="0" smtClean="0"/>
+          </a:p>
+          <a:p>
+            <a:pPr>
+              <a:buBlip>
+                <a:blip r:embed="rId2"/>
+              </a:buBlip>
+            </a:pPr>
+            <a:r>
+              <a:rPr lang="en-US" sz="2400" dirty="0" smtClean="0"/>
+              <a:t> </a:t>
+            </a:r>
+            <a:endParaRPr lang="en-US" sz="2400" dirty="0" smtClean="0"/>
+          </a:p>
+          <a:p>
+            <a:pPr>
+              <a:buBlip>
+                <a:blip r:embed="rId2"/>
+              </a:buBlip>
+            </a:pPr>
+            <a:endParaRPr lang="en-US" sz="2400" dirty="0" smtClean="0"/>
+          </a:p>
+        </p:txBody>
+      </p:sp>
+    </p:spTree>
+  </p:cSld>
+  <p:clrMapOvr>
+    <a:masterClrMapping/>
+  </p:clrMapOvr>
+  <p:timing>
+    <p:tnLst>
+      <p:par>
+        <p:cTn id="1" dur="indefinite" restart="never" nodeType="tmRoot"/>
+      </p:par>
+    </p:tnLst>
+  </p:timing>
+</p:sld>
+</file>
+
 <file path=ppt/slides/slide2.xml><?xml version="1.0" encoding="utf-8"?>
 <p:sld xmlns:a="http://schemas.openxmlformats.org/drawingml/2006/main" xmlns:r="http://schemas.openxmlformats.org/officeDocument/2006/relationships" xmlns:mc="http://schemas.openxmlformats.org/markup-compatibility/2006" xmlns:mv="urn:schemas-microsoft-com:mac:vml" xmlns:p="http://schemas.openxmlformats.org/presentationml/2006/main" mc:Ignorable="mv" mc:PreserveAttributes="mv:*">
   <p:cSld>
@@ -5017,11 +5683,7 @@
             </a:pPr>
             <a:r>
               <a:rPr lang="en-US" sz="2400" dirty="0" smtClean="0"/>
-              <a:t> My Blog: </a:t>
-            </a:r>
-            <a:r>
-              <a:rPr lang="en-US" sz="2400" dirty="0" smtClean="0"/>
-              <a:t>http://</a:t>
+              <a:t> My Blog: http://</a:t>
             </a:r>
             <a:r>
               <a:rPr lang="en-US" sz="2400" dirty="0" err="1" smtClean="0"/>
@@ -5197,15 +5859,7 @@
             </a:r>
             <a:r>
               <a:rPr lang="en-US" sz="2400" dirty="0" smtClean="0"/>
-              <a:t>” </a:t>
-            </a:r>
-            <a:r>
-              <a:rPr lang="en-US" sz="2400" dirty="0" smtClean="0"/>
-              <a:t>built on </a:t>
-            </a:r>
-            <a:r>
-              <a:rPr lang="en-US" sz="2400" dirty="0" smtClean="0"/>
-              <a:t>Rack</a:t>
+              <a:t>” built on Rack</a:t>
             </a:r>
           </a:p>
           <a:p>
@@ -5218,7 +5872,6 @@
               <a:rPr lang="en-US" sz="2400" dirty="0" smtClean="0"/>
               <a:t> Easy and practical</a:t>
             </a:r>
-            <a:endParaRPr lang="en-US" sz="2400" dirty="0" smtClean="0"/>
           </a:p>
           <a:p>
             <a:pPr>
@@ -5274,11 +5927,7 @@
             </a:r>
             <a:r>
               <a:rPr lang="en-US" sz="2400" dirty="0" smtClean="0"/>
-              <a:t> or bloated like larger web </a:t>
-            </a:r>
-            <a:r>
-              <a:rPr lang="en-US" sz="2400" dirty="0" smtClean="0"/>
-              <a:t>frameworks</a:t>
+              <a:t> or bloated like larger web frameworks</a:t>
             </a:r>
           </a:p>
           <a:p>
@@ -5289,15 +5938,7 @@
             </a:pPr>
             <a:r>
               <a:rPr lang="en-US" sz="2400" dirty="0" smtClean="0"/>
-              <a:t> Small </a:t>
-            </a:r>
-            <a:r>
-              <a:rPr lang="en-US" sz="2400" dirty="0" smtClean="0"/>
-              <a:t>memory footprint as compared </a:t>
-            </a:r>
-            <a:r>
-              <a:rPr lang="en-US" sz="2400" dirty="0" smtClean="0"/>
-              <a:t>to </a:t>
+              <a:t> Small memory footprint as compared to </a:t>
             </a:r>
             <a:r>
               <a:rPr lang="en-US" sz="2400" i="1" dirty="0" smtClean="0"/>
@@ -5472,7 +6113,6 @@
               <a:rPr lang="en-US" sz="2400" dirty="0" smtClean="0"/>
               <a:t> The DSL routing conforms to GET, POST, PUT, DELETE</a:t>
             </a:r>
-            <a:endParaRPr lang="en-US" sz="2400" dirty="0" smtClean="0"/>
           </a:p>
           <a:p>
             <a:pPr>
@@ -5543,11 +6183,7 @@
             </a:pPr>
             <a:r>
               <a:rPr lang="en-US" sz="2400" dirty="0" smtClean="0"/>
-              <a:t> Has </a:t>
-            </a:r>
-            <a:r>
-              <a:rPr lang="en-US" sz="2400" dirty="0" smtClean="0"/>
-              <a:t>before and after filters similar to Rails</a:t>
+              <a:t> Has before and after filters similar to Rails</a:t>
             </a:r>
           </a:p>
           <a:p>
@@ -5657,7 +6293,7 @@
         <p:spPr>
           <a:xfrm>
             <a:off x="1392844" y="1492625"/>
-            <a:ext cx="6211957" cy="1200328"/>
+            <a:ext cx="6420754" cy="1200328"/>
           </a:xfrm>
           <a:prstGeom prst="rect">
             <a:avLst/>
@@ -5665,7 +6301,7 @@
           <a:noFill/>
         </p:spPr>
         <p:txBody>
-          <a:bodyPr wrap="none" rtlCol="0">
+          <a:bodyPr wrap="square" rtlCol="0">
             <a:spAutoFit/>
           </a:bodyPr>
           <a:lstStyle/>
@@ -5692,16 +6328,9 @@
             </a:r>
             <a:r>
               <a:rPr lang="en-US" sz="2400" dirty="0" err="1" smtClean="0"/>
-              <a:t>config</a:t>
-            </a:r>
-            <a:r>
-              <a:rPr lang="en-US" sz="2400" err="1" smtClean="0"/>
-              <a:t>.</a:t>
-            </a:r>
-            <a:r>
-              <a:rPr lang="en-US" sz="2400" smtClean="0"/>
-              <a:t>ru</a:t>
-            </a:r>
+              <a:t>config.ru</a:t>
+            </a:r>
+            <a:endParaRPr lang="en-US" sz="2400" dirty="0" smtClean="0"/>
           </a:p>
           <a:p>
             <a:pPr>
@@ -5737,6 +6366,196 @@
 </file>
 
 <file path=ppt/slides/slide6.xml><?xml version="1.0" encoding="utf-8"?>
+<p:sld xmlns:a="http://schemas.openxmlformats.org/drawingml/2006/main" xmlns:r="http://schemas.openxmlformats.org/officeDocument/2006/relationships" xmlns:mc="http://schemas.openxmlformats.org/markup-compatibility/2006" xmlns:mv="urn:schemas-microsoft-com:mac:vml" xmlns:p="http://schemas.openxmlformats.org/presentationml/2006/main" mc:Ignorable="mv" mc:PreserveAttributes="mv:*">
+  <p:cSld>
+    <p:spTree>
+      <p:nvGrpSpPr>
+        <p:cNvPr id="1" name=""/>
+        <p:cNvGrpSpPr/>
+        <p:nvPr/>
+      </p:nvGrpSpPr>
+      <p:grpSpPr>
+        <a:xfrm>
+          <a:off x="0" y="0"/>
+          <a:ext cx="0" cy="0"/>
+          <a:chOff x="0" y="0"/>
+          <a:chExt cx="0" cy="0"/>
+        </a:xfrm>
+      </p:grpSpPr>
+      <p:pic>
+        <p:nvPicPr>
+          <p:cNvPr id="4" name="Picture 3"/>
+          <p:cNvPicPr>
+            <a:picLocks noChangeAspect="1"/>
+          </p:cNvPicPr>
+          <p:nvPr/>
+        </p:nvPicPr>
+        <p:blipFill>
+          <a:blip r:embed="rId3">
+            <a:alphaModFix amt="30000"/>
+          </a:blip>
+          <a:stretch>
+            <a:fillRect/>
+          </a:stretch>
+        </p:blipFill>
+        <p:spPr>
+          <a:xfrm>
+            <a:off x="-508000" y="1492625"/>
+            <a:ext cx="10160000" cy="3505200"/>
+          </a:xfrm>
+          <a:prstGeom prst="rect">
+            <a:avLst/>
+          </a:prstGeom>
+        </p:spPr>
+      </p:pic>
+      <p:sp>
+        <p:nvSpPr>
+          <p:cNvPr id="2" name="Title 1"/>
+          <p:cNvSpPr>
+            <a:spLocks noGrp="1"/>
+          </p:cNvSpPr>
+          <p:nvPr>
+            <p:ph type="title"/>
+          </p:nvPr>
+        </p:nvSpPr>
+        <p:spPr/>
+        <p:txBody>
+          <a:bodyPr/>
+          <a:lstStyle/>
+          <a:p>
+            <a:r>
+              <a:rPr lang="en-US" dirty="0" smtClean="0"/>
+              <a:t>Sinatra + Bundler</a:t>
+            </a:r>
+            <a:endParaRPr lang="en-US" dirty="0"/>
+          </a:p>
+        </p:txBody>
+      </p:sp>
+      <p:sp>
+        <p:nvSpPr>
+          <p:cNvPr id="3" name="TextBox 2"/>
+          <p:cNvSpPr txBox="1"/>
+          <p:nvPr/>
+        </p:nvSpPr>
+        <p:spPr>
+          <a:xfrm>
+            <a:off x="1392844" y="1492625"/>
+            <a:ext cx="6420754" cy="1200328"/>
+          </a:xfrm>
+          <a:prstGeom prst="rect">
+            <a:avLst/>
+          </a:prstGeom>
+          <a:noFill/>
+        </p:spPr>
+        <p:txBody>
+          <a:bodyPr wrap="square" rtlCol="0">
+            <a:spAutoFit/>
+          </a:bodyPr>
+          <a:lstStyle/>
+          <a:p>
+            <a:endParaRPr lang="en-US" sz="2400" dirty="0" smtClean="0"/>
+          </a:p>
+          <a:p>
+            <a:pPr>
+              <a:buBlip>
+                <a:blip r:embed="rId4"/>
+              </a:buBlip>
+            </a:pPr>
+            <a:r>
+              <a:rPr lang="en-US" sz="2400" dirty="0" smtClean="0"/>
+              <a:t> </a:t>
+            </a:r>
+            <a:r>
+              <a:rPr lang="en-US" sz="2400" dirty="0" err="1" smtClean="0"/>
+              <a:t>Gemfile</a:t>
+            </a:r>
+            <a:endParaRPr lang="en-US" sz="2400" dirty="0" smtClean="0"/>
+          </a:p>
+          <a:p>
+            <a:pPr>
+              <a:buBlip>
+                <a:blip r:embed="rId4"/>
+              </a:buBlip>
+            </a:pPr>
+            <a:r>
+              <a:rPr lang="en-US" sz="2400" dirty="0" err="1" smtClean="0"/>
+              <a:t>Bundler.require_env</a:t>
+            </a:r>
+            <a:endParaRPr lang="en-US" sz="2400" dirty="0" smtClean="0"/>
+          </a:p>
+        </p:txBody>
+      </p:sp>
+    </p:spTree>
+  </p:cSld>
+  <p:clrMapOvr>
+    <a:masterClrMapping/>
+  </p:clrMapOvr>
+  <p:timing>
+    <p:tnLst>
+      <p:par>
+        <p:cTn id="1" dur="indefinite" restart="never" nodeType="tmRoot"/>
+      </p:par>
+    </p:tnLst>
+  </p:timing>
+</p:sld>
+</file>
+
+<file path=ppt/slides/slide7.xml><?xml version="1.0" encoding="utf-8"?>
+<p:sld xmlns:a="http://schemas.openxmlformats.org/drawingml/2006/main" xmlns:r="http://schemas.openxmlformats.org/officeDocument/2006/relationships" xmlns:mc="http://schemas.openxmlformats.org/markup-compatibility/2006" xmlns:mv="urn:schemas-microsoft-com:mac:vml" xmlns:p="http://schemas.openxmlformats.org/presentationml/2006/main" mc:Ignorable="mv" mc:PreserveAttributes="mv:*">
+  <p:cSld>
+    <p:spTree>
+      <p:nvGrpSpPr>
+        <p:cNvPr id="1" name=""/>
+        <p:cNvGrpSpPr/>
+        <p:nvPr/>
+      </p:nvGrpSpPr>
+      <p:grpSpPr>
+        <a:xfrm>
+          <a:off x="0" y="0"/>
+          <a:ext cx="0" cy="0"/>
+          <a:chOff x="0" y="0"/>
+          <a:chExt cx="0" cy="0"/>
+        </a:xfrm>
+      </p:grpSpPr>
+      <p:sp>
+        <p:nvSpPr>
+          <p:cNvPr id="2" name="Title 1"/>
+          <p:cNvSpPr>
+            <a:spLocks noGrp="1"/>
+          </p:cNvSpPr>
+          <p:nvPr>
+            <p:ph type="title"/>
+          </p:nvPr>
+        </p:nvSpPr>
+        <p:spPr/>
+        <p:txBody>
+          <a:bodyPr/>
+          <a:lstStyle/>
+          <a:p>
+            <a:r>
+              <a:rPr lang="en-US" dirty="0" smtClean="0"/>
+              <a:t>Sinatra Extensions</a:t>
+            </a:r>
+            <a:endParaRPr lang="en-US" dirty="0"/>
+          </a:p>
+        </p:txBody>
+      </p:sp>
+    </p:spTree>
+  </p:cSld>
+  <p:clrMapOvr>
+    <a:masterClrMapping/>
+  </p:clrMapOvr>
+  <p:timing>
+    <p:tnLst>
+      <p:par>
+        <p:cTn id="1" dur="indefinite" restart="never" nodeType="tmRoot"/>
+      </p:par>
+    </p:tnLst>
+  </p:timing>
+</p:sld>
+</file>
+
+<file path=ppt/slides/slide8.xml><?xml version="1.0" encoding="utf-8"?>
 <p:sld xmlns:a="http://schemas.openxmlformats.org/drawingml/2006/main" xmlns:r="http://schemas.openxmlformats.org/officeDocument/2006/relationships" xmlns:mc="http://schemas.openxmlformats.org/markup-compatibility/2006" xmlns:mv="urn:schemas-microsoft-com:mac:vml" xmlns:p="http://schemas.openxmlformats.org/presentationml/2006/main" mc:Ignorable="mv" mc:PreserveAttributes="mv:*">
   <p:cSld>
     <p:spTree>
@@ -5866,13 +6685,8 @@
             <a:pPr lvl="1"/>
             <a:r>
               <a:rPr lang="en-US" sz="2400" dirty="0" smtClean="0"/>
-              <a:t>Actual </a:t>
-            </a:r>
-            <a:r>
-              <a:rPr lang="en-US" sz="2400" dirty="0" smtClean="0"/>
-              <a:t>lines of library code? </a:t>
-            </a:r>
-            <a:endParaRPr lang="en-US" sz="2400" dirty="0" smtClean="0"/>
+              <a:t>Actual lines of library code? </a:t>
+            </a:r>
           </a:p>
         </p:txBody>
       </p:sp>
@@ -5902,7 +6716,6 @@
               <a:rPr lang="en-US" sz="2400" b="1" dirty="0" smtClean="0"/>
               <a:t>3685</a:t>
             </a:r>
-            <a:endParaRPr lang="en-US" sz="2400" b="1" dirty="0" smtClean="0"/>
           </a:p>
         </p:txBody>
       </p:sp>
@@ -6063,6 +6876,128 @@
       <p:bldP spid="7" grpId="0"/>
       <p:bldP spid="9" grpId="0"/>
     </p:bldLst>
+  </p:timing>
+</p:sld>
+</file>
+
+<file path=ppt/slides/slide9.xml><?xml version="1.0" encoding="utf-8"?>
+<p:sld xmlns:a="http://schemas.openxmlformats.org/drawingml/2006/main" xmlns:r="http://schemas.openxmlformats.org/officeDocument/2006/relationships" xmlns:mc="http://schemas.openxmlformats.org/markup-compatibility/2006" xmlns:mv="urn:schemas-microsoft-com:mac:vml" xmlns:p="http://schemas.openxmlformats.org/presentationml/2006/main" mc:Ignorable="mv" mc:PreserveAttributes="mv:*">
+  <p:cSld>
+    <p:spTree>
+      <p:nvGrpSpPr>
+        <p:cNvPr id="1" name=""/>
+        <p:cNvGrpSpPr/>
+        <p:nvPr/>
+      </p:nvGrpSpPr>
+      <p:grpSpPr>
+        <a:xfrm>
+          <a:off x="0" y="0"/>
+          <a:ext cx="0" cy="0"/>
+          <a:chOff x="0" y="0"/>
+          <a:chExt cx="0" cy="0"/>
+        </a:xfrm>
+      </p:grpSpPr>
+      <p:sp>
+        <p:nvSpPr>
+          <p:cNvPr id="2" name="Title 1"/>
+          <p:cNvSpPr>
+            <a:spLocks noGrp="1"/>
+          </p:cNvSpPr>
+          <p:nvPr>
+            <p:ph type="title"/>
+          </p:nvPr>
+        </p:nvSpPr>
+        <p:spPr/>
+        <p:txBody>
+          <a:bodyPr/>
+          <a:lstStyle/>
+          <a:p>
+            <a:r>
+              <a:rPr lang="en-US" dirty="0" smtClean="0"/>
+              <a:t>Load testing Sinatra</a:t>
+            </a:r>
+            <a:endParaRPr lang="en-US" dirty="0"/>
+          </a:p>
+        </p:txBody>
+      </p:sp>
+      <p:sp>
+        <p:nvSpPr>
+          <p:cNvPr id="3" name="TextBox 2"/>
+          <p:cNvSpPr txBox="1"/>
+          <p:nvPr/>
+        </p:nvSpPr>
+        <p:spPr>
+          <a:xfrm>
+            <a:off x="1392844" y="1492625"/>
+            <a:ext cx="6420754" cy="1938992"/>
+          </a:xfrm>
+          <a:prstGeom prst="rect">
+            <a:avLst/>
+          </a:prstGeom>
+          <a:noFill/>
+        </p:spPr>
+        <p:txBody>
+          <a:bodyPr wrap="square" rtlCol="0">
+            <a:spAutoFit/>
+          </a:bodyPr>
+          <a:lstStyle/>
+          <a:p>
+            <a:endParaRPr lang="en-US" sz="2400" dirty="0" smtClean="0"/>
+          </a:p>
+          <a:p>
+            <a:pPr>
+              <a:buBlip>
+                <a:blip r:embed="rId2"/>
+              </a:buBlip>
+            </a:pPr>
+            <a:r>
+              <a:rPr lang="en-US" sz="2400" dirty="0" smtClean="0"/>
+              <a:t> How does it perform under load?</a:t>
+            </a:r>
+          </a:p>
+          <a:p>
+            <a:pPr>
+              <a:buBlip>
+                <a:blip r:embed="rId2"/>
+              </a:buBlip>
+            </a:pPr>
+            <a:r>
+              <a:rPr lang="en-US" sz="2400" dirty="0" smtClean="0"/>
+              <a:t>Sinatra supports multithreading (works well with </a:t>
+            </a:r>
+            <a:r>
+              <a:rPr lang="en-US" sz="2400" dirty="0" err="1" smtClean="0"/>
+              <a:t>Jruby</a:t>
+            </a:r>
+            <a:r>
+              <a:rPr lang="en-US" sz="2400" dirty="0" smtClean="0"/>
+              <a:t>)</a:t>
+            </a:r>
+          </a:p>
+          <a:p>
+            <a:pPr>
+              <a:buBlip>
+                <a:blip r:embed="rId2"/>
+              </a:buBlip>
+            </a:pPr>
+            <a:r>
+              <a:rPr lang="en-US" sz="2400" dirty="0" smtClean="0"/>
+              <a:t> </a:t>
+            </a:r>
+          </a:p>
+        </p:txBody>
+      </p:sp>
+    </p:spTree>
+  </p:cSld>
+  <p:clrMapOvr>
+    <a:masterClrMapping/>
+  </p:clrMapOvr>
+  <p:timing>
+    <p:tnLst>
+      <p:par>
+        <p:cTn id="1" dur="indefinite" restart="never" nodeType="tmRoot"/>
+      </p:par>
+    </p:tnLst>
   </p:timing>
 </p:sld>
 </file>

</xml_diff>

<commit_message>
nz: more base slides on testing + heroku
</commit_message>
<xml_diff>
--- a/sinatra.pptx
+++ b/sinatra.pptx
@@ -5,7 +5,7 @@
     <p:sldMasterId id="2147483660" r:id="rId1"/>
   </p:sldMasterIdLst>
   <p:notesMasterIdLst>
-    <p:notesMasterId r:id="rId15"/>
+    <p:notesMasterId r:id="rId17"/>
   </p:notesMasterIdLst>
   <p:sldIdLst>
     <p:sldId id="256" r:id="rId2"/>
@@ -13,14 +13,16 @@
     <p:sldId id="257" r:id="rId4"/>
     <p:sldId id="259" r:id="rId5"/>
     <p:sldId id="261" r:id="rId6"/>
-    <p:sldId id="262" r:id="rId7"/>
-    <p:sldId id="265" r:id="rId8"/>
-    <p:sldId id="260" r:id="rId9"/>
-    <p:sldId id="263" r:id="rId10"/>
-    <p:sldId id="264" r:id="rId11"/>
-    <p:sldId id="266" r:id="rId12"/>
-    <p:sldId id="267" r:id="rId13"/>
-    <p:sldId id="268" r:id="rId14"/>
+    <p:sldId id="269" r:id="rId7"/>
+    <p:sldId id="270" r:id="rId8"/>
+    <p:sldId id="262" r:id="rId9"/>
+    <p:sldId id="265" r:id="rId10"/>
+    <p:sldId id="260" r:id="rId11"/>
+    <p:sldId id="263" r:id="rId12"/>
+    <p:sldId id="264" r:id="rId13"/>
+    <p:sldId id="266" r:id="rId14"/>
+    <p:sldId id="267" r:id="rId15"/>
+    <p:sldId id="268" r:id="rId16"/>
   </p:sldIdLst>
   <p:sldSz cx="9144000" cy="6858000" type="screen4x3"/>
   <p:notesSz cx="6858000" cy="9144000"/>
@@ -629,7 +631,7 @@
             <a:fld id="{4355A105-26B0-5043-A7EC-94C834C82E90}" type="slidenum">
               <a:rPr lang="en-US" smtClean="0"/>
               <a:pPr/>
-              <a:t>6</a:t>
+              <a:t>8</a:t>
             </a:fld>
             <a:endParaRPr lang="en-US"/>
           </a:p>
@@ -743,7 +745,7 @@
             <a:fld id="{4355A105-26B0-5043-A7EC-94C834C82E90}" type="slidenum">
               <a:rPr lang="en-US" smtClean="0"/>
               <a:pPr/>
-              <a:t>8</a:t>
+              <a:t>10</a:t>
             </a:fld>
             <a:endParaRPr lang="en-US"/>
           </a:p>
@@ -825,7 +827,7 @@
             <a:fld id="{4355A105-26B0-5043-A7EC-94C834C82E90}" type="slidenum">
               <a:rPr lang="en-US" smtClean="0"/>
               <a:pPr/>
-              <a:t>12</a:t>
+              <a:t>14</a:t>
             </a:fld>
             <a:endParaRPr lang="en-US"/>
           </a:p>
@@ -5028,1550 +5030,6 @@
           <a:chExt cx="0" cy="0"/>
         </a:xfrm>
       </p:grpSpPr>
-      <p:sp>
-        <p:nvSpPr>
-          <p:cNvPr id="2" name="Title 1"/>
-          <p:cNvSpPr>
-            <a:spLocks noGrp="1"/>
-          </p:cNvSpPr>
-          <p:nvPr>
-            <p:ph type="title"/>
-          </p:nvPr>
-        </p:nvSpPr>
-        <p:spPr/>
-        <p:txBody>
-          <a:bodyPr/>
-          <a:lstStyle/>
-          <a:p>
-            <a:r>
-              <a:rPr lang="en-US" dirty="0" smtClean="0"/>
-              <a:t>Memory Footprint VS.</a:t>
-            </a:r>
-            <a:endParaRPr lang="en-US" dirty="0"/>
-          </a:p>
-        </p:txBody>
-      </p:sp>
-      <p:sp>
-        <p:nvSpPr>
-          <p:cNvPr id="3" name="TextBox 2"/>
-          <p:cNvSpPr txBox="1"/>
-          <p:nvPr/>
-        </p:nvSpPr>
-        <p:spPr>
-          <a:xfrm>
-            <a:off x="1392844" y="1492625"/>
-            <a:ext cx="6420754" cy="1200328"/>
-          </a:xfrm>
-          <a:prstGeom prst="rect">
-            <a:avLst/>
-          </a:prstGeom>
-          <a:noFill/>
-        </p:spPr>
-        <p:txBody>
-          <a:bodyPr wrap="square" rtlCol="0">
-            <a:spAutoFit/>
-          </a:bodyPr>
-          <a:lstStyle/>
-          <a:p>
-            <a:endParaRPr lang="en-US" sz="2400" dirty="0" smtClean="0"/>
-          </a:p>
-          <a:p>
-            <a:pPr>
-              <a:buBlip>
-                <a:blip r:embed="rId2"/>
-              </a:buBlip>
-            </a:pPr>
-            <a:r>
-              <a:rPr lang="en-US" sz="2400" dirty="0" smtClean="0"/>
-              <a:t> Under load using ‘top’</a:t>
-            </a:r>
-          </a:p>
-          <a:p>
-            <a:pPr>
-              <a:buBlip>
-                <a:blip r:embed="rId2"/>
-              </a:buBlip>
-            </a:pPr>
-            <a:endParaRPr lang="en-US" sz="2400" dirty="0" smtClean="0"/>
-          </a:p>
-        </p:txBody>
-      </p:sp>
-    </p:spTree>
-  </p:cSld>
-  <p:clrMapOvr>
-    <a:masterClrMapping/>
-  </p:clrMapOvr>
-  <p:timing>
-    <p:tnLst>
-      <p:par>
-        <p:cTn id="1" dur="indefinite" restart="never" nodeType="tmRoot"/>
-      </p:par>
-    </p:tnLst>
-  </p:timing>
-</p:sld>
-</file>
-
-<file path=ppt/slides/slide11.xml><?xml version="1.0" encoding="utf-8"?>
-<p:sld xmlns:a="http://schemas.openxmlformats.org/drawingml/2006/main" xmlns:r="http://schemas.openxmlformats.org/officeDocument/2006/relationships" xmlns:mc="http://schemas.openxmlformats.org/markup-compatibility/2006" xmlns:mv="urn:schemas-microsoft-com:mac:vml" xmlns:p="http://schemas.openxmlformats.org/presentationml/2006/main" mc:Ignorable="mv" mc:PreserveAttributes="mv:*">
-  <p:cSld>
-    <p:spTree>
-      <p:nvGrpSpPr>
-        <p:cNvPr id="1" name=""/>
-        <p:cNvGrpSpPr/>
-        <p:nvPr/>
-      </p:nvGrpSpPr>
-      <p:grpSpPr>
-        <a:xfrm>
-          <a:off x="0" y="0"/>
-          <a:ext cx="0" cy="0"/>
-          <a:chOff x="0" y="0"/>
-          <a:chExt cx="0" cy="0"/>
-        </a:xfrm>
-      </p:grpSpPr>
-      <p:sp>
-        <p:nvSpPr>
-          <p:cNvPr id="2" name="Title 1"/>
-          <p:cNvSpPr>
-            <a:spLocks noGrp="1"/>
-          </p:cNvSpPr>
-          <p:nvPr>
-            <p:ph type="title"/>
-          </p:nvPr>
-        </p:nvSpPr>
-        <p:spPr/>
-        <p:txBody>
-          <a:bodyPr/>
-          <a:lstStyle/>
-          <a:p>
-            <a:r>
-              <a:rPr lang="en-US" dirty="0" smtClean="0"/>
-              <a:t>Sinatra + </a:t>
-            </a:r>
-            <a:r>
-              <a:rPr lang="en-US" dirty="0" err="1" smtClean="0"/>
-              <a:t>JRuby</a:t>
-            </a:r>
-            <a:endParaRPr lang="en-US" dirty="0"/>
-          </a:p>
-        </p:txBody>
-      </p:sp>
-      <p:sp>
-        <p:nvSpPr>
-          <p:cNvPr id="3" name="TextBox 2"/>
-          <p:cNvSpPr txBox="1"/>
-          <p:nvPr/>
-        </p:nvSpPr>
-        <p:spPr>
-          <a:xfrm>
-            <a:off x="1392844" y="1492625"/>
-            <a:ext cx="6420754" cy="830997"/>
-          </a:xfrm>
-          <a:prstGeom prst="rect">
-            <a:avLst/>
-          </a:prstGeom>
-          <a:noFill/>
-        </p:spPr>
-        <p:txBody>
-          <a:bodyPr wrap="square" rtlCol="0">
-            <a:spAutoFit/>
-          </a:bodyPr>
-          <a:lstStyle/>
-          <a:p>
-            <a:endParaRPr lang="en-US" sz="2400" dirty="0" smtClean="0"/>
-          </a:p>
-          <a:p>
-            <a:pPr>
-              <a:buBlip>
-                <a:blip r:embed="rId2"/>
-              </a:buBlip>
-            </a:pPr>
-            <a:r>
-              <a:rPr lang="en-US" sz="2400" dirty="0" smtClean="0"/>
-              <a:t> Under load using ‘top’</a:t>
-            </a:r>
-          </a:p>
-        </p:txBody>
-      </p:sp>
-    </p:spTree>
-  </p:cSld>
-  <p:clrMapOvr>
-    <a:masterClrMapping/>
-  </p:clrMapOvr>
-  <p:timing>
-    <p:tnLst>
-      <p:par>
-        <p:cTn id="1" dur="indefinite" restart="never" nodeType="tmRoot"/>
-      </p:par>
-    </p:tnLst>
-  </p:timing>
-</p:sld>
-</file>
-
-<file path=ppt/slides/slide12.xml><?xml version="1.0" encoding="utf-8"?>
-<p:sld xmlns:a="http://schemas.openxmlformats.org/drawingml/2006/main" xmlns:r="http://schemas.openxmlformats.org/officeDocument/2006/relationships" xmlns:mc="http://schemas.openxmlformats.org/markup-compatibility/2006" xmlns:mv="urn:schemas-microsoft-com:mac:vml" xmlns:p="http://schemas.openxmlformats.org/presentationml/2006/main" mc:Ignorable="mv" mc:PreserveAttributes="mv:*">
-  <p:cSld>
-    <p:spTree>
-      <p:nvGrpSpPr>
-        <p:cNvPr id="1" name=""/>
-        <p:cNvGrpSpPr/>
-        <p:nvPr/>
-      </p:nvGrpSpPr>
-      <p:grpSpPr>
-        <a:xfrm>
-          <a:off x="0" y="0"/>
-          <a:ext cx="0" cy="0"/>
-          <a:chOff x="0" y="0"/>
-          <a:chExt cx="0" cy="0"/>
-        </a:xfrm>
-      </p:grpSpPr>
-      <p:pic>
-        <p:nvPicPr>
-          <p:cNvPr id="4" name="Picture 3"/>
-          <p:cNvPicPr>
-            <a:picLocks noChangeAspect="1"/>
-          </p:cNvPicPr>
-          <p:nvPr/>
-        </p:nvPicPr>
-        <p:blipFill>
-          <a:blip r:embed="rId3">
-            <a:alphaModFix amt="30000"/>
-          </a:blip>
-          <a:stretch>
-            <a:fillRect/>
-          </a:stretch>
-        </p:blipFill>
-        <p:spPr>
-          <a:xfrm>
-            <a:off x="-508000" y="1492625"/>
-            <a:ext cx="10160000" cy="3505200"/>
-          </a:xfrm>
-          <a:prstGeom prst="rect">
-            <a:avLst/>
-          </a:prstGeom>
-        </p:spPr>
-      </p:pic>
-      <p:sp>
-        <p:nvSpPr>
-          <p:cNvPr id="2" name="Title 1"/>
-          <p:cNvSpPr>
-            <a:spLocks noGrp="1"/>
-          </p:cNvSpPr>
-          <p:nvPr>
-            <p:ph type="title"/>
-          </p:nvPr>
-        </p:nvSpPr>
-        <p:spPr/>
-        <p:txBody>
-          <a:bodyPr/>
-          <a:lstStyle/>
-          <a:p>
-            <a:r>
-              <a:rPr lang="en-US" dirty="0" err="1" smtClean="0"/>
-              <a:t>JRuby</a:t>
-            </a:r>
-            <a:r>
-              <a:rPr lang="en-US" dirty="0" smtClean="0"/>
-              <a:t>+ Warbler + Bundler</a:t>
-            </a:r>
-            <a:endParaRPr lang="en-US" dirty="0"/>
-          </a:p>
-        </p:txBody>
-      </p:sp>
-      <p:sp>
-        <p:nvSpPr>
-          <p:cNvPr id="3" name="TextBox 2"/>
-          <p:cNvSpPr txBox="1"/>
-          <p:nvPr/>
-        </p:nvSpPr>
-        <p:spPr>
-          <a:xfrm>
-            <a:off x="1392844" y="1492625"/>
-            <a:ext cx="6420754" cy="1200328"/>
-          </a:xfrm>
-          <a:prstGeom prst="rect">
-            <a:avLst/>
-          </a:prstGeom>
-          <a:noFill/>
-        </p:spPr>
-        <p:txBody>
-          <a:bodyPr wrap="square" rtlCol="0">
-            <a:spAutoFit/>
-          </a:bodyPr>
-          <a:lstStyle/>
-          <a:p>
-            <a:endParaRPr lang="en-US" sz="2400" dirty="0" smtClean="0"/>
-          </a:p>
-          <a:p>
-            <a:pPr>
-              <a:buBlip>
-                <a:blip r:embed="rId4"/>
-              </a:buBlip>
-            </a:pPr>
-            <a:r>
-              <a:rPr lang="en-US" sz="2400" dirty="0" smtClean="0"/>
-              <a:t> </a:t>
-            </a:r>
-            <a:r>
-              <a:rPr lang="en-US" sz="2400" dirty="0" err="1" smtClean="0"/>
-              <a:t>Gemfile</a:t>
-            </a:r>
-            <a:endParaRPr lang="en-US" sz="2400" dirty="0" smtClean="0"/>
-          </a:p>
-          <a:p>
-            <a:pPr>
-              <a:buBlip>
-                <a:blip r:embed="rId4"/>
-              </a:buBlip>
-            </a:pPr>
-            <a:r>
-              <a:rPr lang="en-US" sz="2400" dirty="0" err="1" smtClean="0"/>
-              <a:t>Bundler.require_env</a:t>
-            </a:r>
-            <a:endParaRPr lang="en-US" sz="2400" dirty="0" smtClean="0"/>
-          </a:p>
-        </p:txBody>
-      </p:sp>
-    </p:spTree>
-  </p:cSld>
-  <p:clrMapOvr>
-    <a:masterClrMapping/>
-  </p:clrMapOvr>
-  <p:timing>
-    <p:tnLst>
-      <p:par>
-        <p:cTn id="1" dur="indefinite" restart="never" nodeType="tmRoot"/>
-      </p:par>
-    </p:tnLst>
-  </p:timing>
-</p:sld>
-</file>
-
-<file path=ppt/slides/slide13.xml><?xml version="1.0" encoding="utf-8"?>
-<p:sld xmlns:a="http://schemas.openxmlformats.org/drawingml/2006/main" xmlns:r="http://schemas.openxmlformats.org/officeDocument/2006/relationships" xmlns:mc="http://schemas.openxmlformats.org/markup-compatibility/2006" xmlns:mv="urn:schemas-microsoft-com:mac:vml" xmlns:p="http://schemas.openxmlformats.org/presentationml/2006/main" mc:Ignorable="mv" mc:PreserveAttributes="mv:*">
-  <p:cSld>
-    <p:spTree>
-      <p:nvGrpSpPr>
-        <p:cNvPr id="1" name=""/>
-        <p:cNvGrpSpPr/>
-        <p:nvPr/>
-      </p:nvGrpSpPr>
-      <p:grpSpPr>
-        <a:xfrm>
-          <a:off x="0" y="0"/>
-          <a:ext cx="0" cy="0"/>
-          <a:chOff x="0" y="0"/>
-          <a:chExt cx="0" cy="0"/>
-        </a:xfrm>
-      </p:grpSpPr>
-      <p:sp>
-        <p:nvSpPr>
-          <p:cNvPr id="2" name="Title 1"/>
-          <p:cNvSpPr>
-            <a:spLocks noGrp="1"/>
-          </p:cNvSpPr>
-          <p:nvPr>
-            <p:ph type="title"/>
-          </p:nvPr>
-        </p:nvSpPr>
-        <p:spPr/>
-        <p:txBody>
-          <a:bodyPr/>
-          <a:lstStyle/>
-          <a:p>
-            <a:r>
-              <a:rPr lang="en-US" dirty="0" smtClean="0"/>
-              <a:t>Sinatra on </a:t>
-            </a:r>
-            <a:r>
-              <a:rPr lang="en-US" dirty="0" err="1" smtClean="0"/>
-              <a:t>Heroku</a:t>
-            </a:r>
-            <a:endParaRPr lang="en-US" dirty="0"/>
-          </a:p>
-        </p:txBody>
-      </p:sp>
-      <p:sp>
-        <p:nvSpPr>
-          <p:cNvPr id="3" name="TextBox 2"/>
-          <p:cNvSpPr txBox="1"/>
-          <p:nvPr/>
-        </p:nvSpPr>
-        <p:spPr>
-          <a:xfrm>
-            <a:off x="1392844" y="1492625"/>
-            <a:ext cx="6420754" cy="1938992"/>
-          </a:xfrm>
-          <a:prstGeom prst="rect">
-            <a:avLst/>
-          </a:prstGeom>
-          <a:noFill/>
-        </p:spPr>
-        <p:txBody>
-          <a:bodyPr wrap="square" rtlCol="0">
-            <a:spAutoFit/>
-          </a:bodyPr>
-          <a:lstStyle/>
-          <a:p>
-            <a:endParaRPr lang="en-US" sz="2400" dirty="0" smtClean="0"/>
-          </a:p>
-          <a:p>
-            <a:pPr>
-              <a:buBlip>
-                <a:blip r:embed="rId2"/>
-              </a:buBlip>
-            </a:pPr>
-            <a:r>
-              <a:rPr lang="en-US" sz="2400" dirty="0" smtClean="0"/>
-              <a:t> Version your app </a:t>
-            </a:r>
-            <a:r>
-              <a:rPr lang="en-US" sz="2400" dirty="0" smtClean="0"/>
-              <a:t>with</a:t>
-            </a:r>
-            <a:r>
-              <a:rPr lang="en-US" sz="2400" dirty="0" smtClean="0"/>
-              <a:t> </a:t>
-            </a:r>
-            <a:r>
-              <a:rPr lang="en-US" sz="2400" dirty="0" err="1" smtClean="0"/>
-              <a:t>Git(hub</a:t>
-            </a:r>
-            <a:r>
-              <a:rPr lang="en-US" sz="2400" dirty="0" smtClean="0"/>
-              <a:t>)</a:t>
-            </a:r>
-          </a:p>
-          <a:p>
-            <a:pPr>
-              <a:buBlip>
-                <a:blip r:embed="rId2"/>
-              </a:buBlip>
-            </a:pPr>
-            <a:r>
-              <a:rPr lang="en-US" sz="2400" dirty="0" smtClean="0"/>
-              <a:t> </a:t>
-            </a:r>
-            <a:r>
-              <a:rPr lang="en-US" sz="2400" dirty="0" err="1" smtClean="0"/>
-              <a:t>sudo</a:t>
-            </a:r>
-            <a:r>
-              <a:rPr lang="en-US" sz="2400" dirty="0" smtClean="0"/>
-              <a:t> gem install </a:t>
-            </a:r>
-            <a:r>
-              <a:rPr lang="en-US" sz="2400" dirty="0" err="1" smtClean="0"/>
-              <a:t>heroku</a:t>
-            </a:r>
-            <a:endParaRPr lang="en-US" sz="2400" dirty="0" smtClean="0"/>
-          </a:p>
-          <a:p>
-            <a:pPr>
-              <a:buBlip>
-                <a:blip r:embed="rId2"/>
-              </a:buBlip>
-            </a:pPr>
-            <a:r>
-              <a:rPr lang="en-US" sz="2400" dirty="0" smtClean="0"/>
-              <a:t> </a:t>
-            </a:r>
-            <a:endParaRPr lang="en-US" sz="2400" dirty="0" smtClean="0"/>
-          </a:p>
-          <a:p>
-            <a:pPr>
-              <a:buBlip>
-                <a:blip r:embed="rId2"/>
-              </a:buBlip>
-            </a:pPr>
-            <a:endParaRPr lang="en-US" sz="2400" dirty="0" smtClean="0"/>
-          </a:p>
-        </p:txBody>
-      </p:sp>
-    </p:spTree>
-  </p:cSld>
-  <p:clrMapOvr>
-    <a:masterClrMapping/>
-  </p:clrMapOvr>
-  <p:timing>
-    <p:tnLst>
-      <p:par>
-        <p:cTn id="1" dur="indefinite" restart="never" nodeType="tmRoot"/>
-      </p:par>
-    </p:tnLst>
-  </p:timing>
-</p:sld>
-</file>
-
-<file path=ppt/slides/slide2.xml><?xml version="1.0" encoding="utf-8"?>
-<p:sld xmlns:a="http://schemas.openxmlformats.org/drawingml/2006/main" xmlns:r="http://schemas.openxmlformats.org/officeDocument/2006/relationships" xmlns:mc="http://schemas.openxmlformats.org/markup-compatibility/2006" xmlns:mv="urn:schemas-microsoft-com:mac:vml" xmlns:p="http://schemas.openxmlformats.org/presentationml/2006/main" mc:Ignorable="mv" mc:PreserveAttributes="mv:*">
-  <p:cSld>
-    <p:spTree>
-      <p:nvGrpSpPr>
-        <p:cNvPr id="1" name=""/>
-        <p:cNvGrpSpPr/>
-        <p:nvPr/>
-      </p:nvGrpSpPr>
-      <p:grpSpPr>
-        <a:xfrm>
-          <a:off x="0" y="0"/>
-          <a:ext cx="0" cy="0"/>
-          <a:chOff x="0" y="0"/>
-          <a:chExt cx="0" cy="0"/>
-        </a:xfrm>
-      </p:grpSpPr>
-      <p:sp>
-        <p:nvSpPr>
-          <p:cNvPr id="4" name="Title 1"/>
-          <p:cNvSpPr txBox="1">
-            <a:spLocks/>
-          </p:cNvSpPr>
-          <p:nvPr/>
-        </p:nvSpPr>
-        <p:spPr>
-          <a:xfrm>
-            <a:off x="914400" y="228601"/>
-            <a:ext cx="7313613" cy="1264024"/>
-          </a:xfrm>
-          <a:prstGeom prst="rect">
-            <a:avLst/>
-          </a:prstGeom>
-          <a:scene3d>
-            <a:camera prst="orthographicFront"/>
-            <a:lightRig rig="chilly" dir="t"/>
-          </a:scene3d>
-          <a:sp3d extrusionH="12700">
-            <a:extrusionClr>
-              <a:schemeClr val="bg1"/>
-            </a:extrusionClr>
-          </a:sp3d>
-        </p:spPr>
-        <p:txBody>
-          <a:bodyPr vert="horz" lIns="91440" tIns="45720" rIns="91440" bIns="45720" rtlCol="0" anchor="ctr">
-            <a:noAutofit/>
-            <a:sp3d extrusionH="12700">
-              <a:extrusionClr>
-                <a:schemeClr val="bg1"/>
-              </a:extrusionClr>
-            </a:sp3d>
-          </a:bodyPr>
-          <a:lstStyle/>
-          <a:p>
-            <a:pPr marL="0" marR="0" lvl="0" indent="0" algn="ctr" defTabSz="914400" rtl="0" eaLnBrk="1" fontAlgn="auto" latinLnBrk="0" hangingPunct="1">
-              <a:lnSpc>
-                <a:spcPts val="5600"/>
-              </a:lnSpc>
-              <a:spcBef>
-                <a:spcPct val="0"/>
-              </a:spcBef>
-              <a:spcAft>
-                <a:spcPts val="0"/>
-              </a:spcAft>
-              <a:buClrTx/>
-              <a:buSzTx/>
-              <a:buFontTx/>
-              <a:buNone/>
-              <a:tabLst/>
-              <a:defRPr/>
-            </a:pPr>
-            <a:r>
-              <a:rPr kumimoji="0" lang="en-US" sz="5400" b="1" i="0" u="none" strike="noStrike" kern="1200" cap="none" spc="0" normalizeH="0" baseline="0" noProof="0" dirty="0" smtClean="0">
-                <a:ln>
-                  <a:noFill/>
-                </a:ln>
-                <a:gradFill>
-                  <a:gsLst>
-                    <a:gs pos="50000">
-                      <a:schemeClr val="tx1">
-                        <a:lumMod val="65000"/>
-                        <a:lumOff val="35000"/>
-                      </a:schemeClr>
-                    </a:gs>
-                    <a:gs pos="100000">
-                      <a:schemeClr val="tx1">
-                        <a:lumMod val="85000"/>
-                        <a:lumOff val="15000"/>
-                      </a:schemeClr>
-                    </a:gs>
-                  </a:gsLst>
-                  <a:lin ang="5400000" scaled="0"/>
-                </a:gradFill>
-                <a:effectLst/>
-                <a:uLnTx/>
-                <a:uFillTx/>
-                <a:latin typeface="+mj-lt"/>
-                <a:ea typeface="+mj-ea"/>
-                <a:cs typeface="+mj-cs"/>
-              </a:rPr>
-              <a:t>About Me</a:t>
-            </a:r>
-            <a:endParaRPr kumimoji="0" lang="en-US" sz="5400" b="1" i="0" u="none" strike="noStrike" kern="1200" cap="none" spc="0" normalizeH="0" baseline="0" noProof="0" dirty="0">
-              <a:ln>
-                <a:noFill/>
-              </a:ln>
-              <a:gradFill>
-                <a:gsLst>
-                  <a:gs pos="50000">
-                    <a:schemeClr val="tx1">
-                      <a:lumMod val="65000"/>
-                      <a:lumOff val="35000"/>
-                    </a:schemeClr>
-                  </a:gs>
-                  <a:gs pos="100000">
-                    <a:schemeClr val="tx1">
-                      <a:lumMod val="85000"/>
-                      <a:lumOff val="15000"/>
-                    </a:schemeClr>
-                  </a:gs>
-                </a:gsLst>
-                <a:lin ang="5400000" scaled="0"/>
-              </a:gradFill>
-              <a:effectLst/>
-              <a:uLnTx/>
-              <a:uFillTx/>
-              <a:latin typeface="+mj-lt"/>
-              <a:ea typeface="+mj-ea"/>
-              <a:cs typeface="+mj-cs"/>
-            </a:endParaRPr>
-          </a:p>
-        </p:txBody>
-      </p:sp>
-      <p:sp>
-        <p:nvSpPr>
-          <p:cNvPr id="5" name="TextBox 4"/>
-          <p:cNvSpPr txBox="1"/>
-          <p:nvPr/>
-        </p:nvSpPr>
-        <p:spPr>
-          <a:xfrm>
-            <a:off x="396052" y="1492625"/>
-            <a:ext cx="7699544" cy="3416320"/>
-          </a:xfrm>
-          <a:prstGeom prst="rect">
-            <a:avLst/>
-          </a:prstGeom>
-          <a:noFill/>
-        </p:spPr>
-        <p:txBody>
-          <a:bodyPr wrap="none" rtlCol="0">
-            <a:spAutoFit/>
-          </a:bodyPr>
-          <a:lstStyle/>
-          <a:p>
-            <a:endParaRPr lang="en-US" sz="2400" dirty="0" smtClean="0"/>
-          </a:p>
-          <a:p>
-            <a:pPr>
-              <a:buBlip>
-                <a:blip r:embed="rId2"/>
-              </a:buBlip>
-            </a:pPr>
-            <a:r>
-              <a:rPr lang="en-US" sz="2400" dirty="0" smtClean="0"/>
-              <a:t> Nick </a:t>
-            </a:r>
-            <a:r>
-              <a:rPr lang="en-US" sz="2400" dirty="0" err="1" smtClean="0"/>
-              <a:t>Zalabak</a:t>
-            </a:r>
-            <a:endParaRPr lang="en-US" sz="2400" dirty="0" smtClean="0"/>
-          </a:p>
-          <a:p>
-            <a:pPr>
-              <a:buBlip>
-                <a:blip r:embed="rId2"/>
-              </a:buBlip>
-            </a:pPr>
-            <a:r>
-              <a:rPr lang="en-US" sz="2400" dirty="0" smtClean="0"/>
-              <a:t> My Blog: http://</a:t>
-            </a:r>
-            <a:r>
-              <a:rPr lang="en-US" sz="2400" dirty="0" err="1" smtClean="0"/>
-              <a:t>techwhizbang.com</a:t>
-            </a:r>
-            <a:endParaRPr lang="en-US" sz="2400" dirty="0" smtClean="0"/>
-          </a:p>
-          <a:p>
-            <a:pPr>
-              <a:buBlip>
-                <a:blip r:embed="rId2"/>
-              </a:buBlip>
-            </a:pPr>
-            <a:r>
-              <a:rPr lang="en-US" sz="2400" dirty="0" smtClean="0"/>
-              <a:t>Twitter: @</a:t>
-            </a:r>
-            <a:r>
-              <a:rPr lang="en-US" sz="2400" dirty="0" err="1" smtClean="0"/>
-              <a:t>techwhizbang</a:t>
-            </a:r>
-            <a:endParaRPr lang="en-US" sz="2400" dirty="0" smtClean="0"/>
-          </a:p>
-          <a:p>
-            <a:pPr>
-              <a:buBlip>
-                <a:blip r:embed="rId2"/>
-              </a:buBlip>
-            </a:pPr>
-            <a:r>
-              <a:rPr lang="en-US" sz="2400" dirty="0" smtClean="0"/>
-              <a:t>Slides and code  examples for this presentation:</a:t>
-            </a:r>
-          </a:p>
-          <a:p>
-            <a:pPr lvl="1">
-              <a:buBlip>
-                <a:blip r:embed="rId2"/>
-              </a:buBlip>
-            </a:pPr>
-            <a:r>
-              <a:rPr lang="en-US" sz="2400" dirty="0" err="1" smtClean="0"/>
-              <a:t>git@github.com:techwhizbang/sinatra_slideshow.git</a:t>
-            </a:r>
-            <a:endParaRPr lang="en-US" sz="2400" dirty="0" smtClean="0"/>
-          </a:p>
-          <a:p>
-            <a:pPr>
-              <a:buBlip>
-                <a:blip r:embed="rId2"/>
-              </a:buBlip>
-            </a:pPr>
-            <a:endParaRPr lang="en-US" sz="2400" dirty="0" smtClean="0"/>
-          </a:p>
-          <a:p>
-            <a:pPr>
-              <a:buBlip>
-                <a:blip r:embed="rId2"/>
-              </a:buBlip>
-            </a:pPr>
-            <a:endParaRPr lang="en-US" sz="2400" dirty="0" smtClean="0"/>
-          </a:p>
-          <a:p>
-            <a:pPr>
-              <a:buBlip>
-                <a:blip r:embed="rId2"/>
-              </a:buBlip>
-            </a:pPr>
-            <a:endParaRPr lang="en-US" sz="2400" dirty="0"/>
-          </a:p>
-        </p:txBody>
-      </p:sp>
-    </p:spTree>
-  </p:cSld>
-  <p:clrMapOvr>
-    <a:masterClrMapping/>
-  </p:clrMapOvr>
-  <p:timing>
-    <p:tnLst>
-      <p:par>
-        <p:cTn id="1" dur="indefinite" restart="never" nodeType="tmRoot"/>
-      </p:par>
-    </p:tnLst>
-  </p:timing>
-</p:sld>
-</file>
-
-<file path=ppt/slides/slide3.xml><?xml version="1.0" encoding="utf-8"?>
-<p:sld xmlns:a="http://schemas.openxmlformats.org/drawingml/2006/main" xmlns:r="http://schemas.openxmlformats.org/officeDocument/2006/relationships" xmlns:mc="http://schemas.openxmlformats.org/markup-compatibility/2006" xmlns:mv="urn:schemas-microsoft-com:mac:vml" xmlns:p="http://schemas.openxmlformats.org/presentationml/2006/main" mc:Ignorable="mv" mc:PreserveAttributes="mv:*">
-  <p:cSld>
-    <p:spTree>
-      <p:nvGrpSpPr>
-        <p:cNvPr id="1" name=""/>
-        <p:cNvGrpSpPr/>
-        <p:nvPr/>
-      </p:nvGrpSpPr>
-      <p:grpSpPr>
-        <a:xfrm>
-          <a:off x="0" y="0"/>
-          <a:ext cx="0" cy="0"/>
-          <a:chOff x="0" y="0"/>
-          <a:chExt cx="0" cy="0"/>
-        </a:xfrm>
-      </p:grpSpPr>
-      <p:sp>
-        <p:nvSpPr>
-          <p:cNvPr id="2" name="Title 1"/>
-          <p:cNvSpPr>
-            <a:spLocks noGrp="1"/>
-          </p:cNvSpPr>
-          <p:nvPr>
-            <p:ph type="title"/>
-          </p:nvPr>
-        </p:nvSpPr>
-        <p:spPr/>
-        <p:txBody>
-          <a:bodyPr/>
-          <a:lstStyle/>
-          <a:p>
-            <a:r>
-              <a:rPr lang="en-US" dirty="0" smtClean="0"/>
-              <a:t>Overview</a:t>
-            </a:r>
-            <a:endParaRPr lang="en-US" dirty="0"/>
-          </a:p>
-        </p:txBody>
-      </p:sp>
-      <p:sp>
-        <p:nvSpPr>
-          <p:cNvPr id="5" name="TextBox 4"/>
-          <p:cNvSpPr txBox="1"/>
-          <p:nvPr/>
-        </p:nvSpPr>
-        <p:spPr>
-          <a:xfrm>
-            <a:off x="396052" y="1492625"/>
-            <a:ext cx="7904728" cy="4524315"/>
-          </a:xfrm>
-          <a:prstGeom prst="rect">
-            <a:avLst/>
-          </a:prstGeom>
-          <a:noFill/>
-        </p:spPr>
-        <p:txBody>
-          <a:bodyPr wrap="none" rtlCol="0">
-            <a:spAutoFit/>
-          </a:bodyPr>
-          <a:lstStyle/>
-          <a:p>
-            <a:endParaRPr lang="en-US" sz="2400" dirty="0" smtClean="0"/>
-          </a:p>
-          <a:p>
-            <a:pPr>
-              <a:buBlip>
-                <a:blip r:embed="rId2"/>
-              </a:buBlip>
-            </a:pPr>
-            <a:r>
-              <a:rPr lang="en-US" sz="2400" dirty="0" smtClean="0"/>
-              <a:t> Sinatra is a </a:t>
-            </a:r>
-            <a:r>
-              <a:rPr lang="en-US" sz="2400" dirty="0" err="1" smtClean="0"/>
-              <a:t>RESTful</a:t>
-            </a:r>
-            <a:r>
-              <a:rPr lang="en-US" sz="2400" dirty="0" smtClean="0"/>
-              <a:t> “</a:t>
-            </a:r>
-            <a:r>
-              <a:rPr lang="en-US" sz="2400" dirty="0" err="1" smtClean="0"/>
-              <a:t>microframework</a:t>
-            </a:r>
-            <a:r>
-              <a:rPr lang="en-US" sz="2400" dirty="0" smtClean="0"/>
-              <a:t>” built on Rack</a:t>
-            </a:r>
-          </a:p>
-          <a:p>
-            <a:pPr>
-              <a:buBlip>
-                <a:blip r:embed="rId2"/>
-              </a:buBlip>
-            </a:pPr>
-            <a:r>
-              <a:rPr lang="en-US" sz="2400" dirty="0" smtClean="0"/>
-              <a:t> Easy and practical</a:t>
-            </a:r>
-          </a:p>
-          <a:p>
-            <a:pPr>
-              <a:buBlip>
-                <a:blip r:embed="rId2"/>
-              </a:buBlip>
-            </a:pPr>
-            <a:r>
-              <a:rPr lang="en-US" sz="2400" dirty="0" smtClean="0"/>
-              <a:t> Straightforward to test (</a:t>
-            </a:r>
-            <a:r>
-              <a:rPr lang="en-US" sz="2400" dirty="0" err="1" smtClean="0"/>
-              <a:t>Rspec</a:t>
-            </a:r>
-            <a:r>
-              <a:rPr lang="en-US" sz="2400" dirty="0" smtClean="0"/>
-              <a:t> &amp; </a:t>
-            </a:r>
-            <a:r>
-              <a:rPr lang="en-US" sz="2400" dirty="0" err="1" smtClean="0"/>
-              <a:t>TestUnit</a:t>
-            </a:r>
-            <a:r>
-              <a:rPr lang="en-US" sz="2400" dirty="0" smtClean="0"/>
-              <a:t>)</a:t>
-            </a:r>
-          </a:p>
-          <a:p>
-            <a:pPr>
-              <a:buBlip>
-                <a:blip r:embed="rId2"/>
-              </a:buBlip>
-            </a:pPr>
-            <a:r>
-              <a:rPr lang="en-US" sz="2400" dirty="0" smtClean="0"/>
-              <a:t> Made with extensibility in mind</a:t>
-            </a:r>
-          </a:p>
-          <a:p>
-            <a:pPr>
-              <a:buBlip>
-                <a:blip r:embed="rId2"/>
-              </a:buBlip>
-            </a:pPr>
-            <a:r>
-              <a:rPr lang="en-US" sz="2400" dirty="0" smtClean="0"/>
-              <a:t> Not </a:t>
-            </a:r>
-            <a:r>
-              <a:rPr lang="en-US" sz="2400" dirty="0" err="1" smtClean="0"/>
-              <a:t>crufty</a:t>
-            </a:r>
-            <a:r>
-              <a:rPr lang="en-US" sz="2400" dirty="0" smtClean="0"/>
-              <a:t> or bloated like larger web frameworks</a:t>
-            </a:r>
-          </a:p>
-          <a:p>
-            <a:pPr>
-              <a:buBlip>
-                <a:blip r:embed="rId2"/>
-              </a:buBlip>
-            </a:pPr>
-            <a:r>
-              <a:rPr lang="en-US" sz="2400" dirty="0" smtClean="0"/>
-              <a:t> Small memory footprint as compared to </a:t>
-            </a:r>
-            <a:r>
-              <a:rPr lang="en-US" sz="2400" i="1" dirty="0" smtClean="0"/>
-              <a:t>other</a:t>
-            </a:r>
-            <a:r>
-              <a:rPr lang="en-US" sz="2400" dirty="0" smtClean="0"/>
-              <a:t> frameworks</a:t>
-            </a:r>
-          </a:p>
-          <a:p>
-            <a:pPr>
-              <a:buBlip>
-                <a:blip r:embed="rId2"/>
-              </a:buBlip>
-            </a:pPr>
-            <a:r>
-              <a:rPr lang="en-US" sz="2400" dirty="0" smtClean="0"/>
-              <a:t> On par performance-wise to </a:t>
-            </a:r>
-            <a:r>
-              <a:rPr lang="en-US" sz="2400" i="1" dirty="0" smtClean="0"/>
-              <a:t>other </a:t>
-            </a:r>
-            <a:r>
-              <a:rPr lang="en-US" sz="2400" dirty="0" smtClean="0"/>
-              <a:t>frameworks</a:t>
-            </a:r>
-          </a:p>
-          <a:p>
-            <a:pPr>
-              <a:buBlip>
-                <a:blip r:embed="rId2"/>
-              </a:buBlip>
-            </a:pPr>
-            <a:r>
-              <a:rPr lang="en-US" sz="2400" dirty="0" smtClean="0"/>
-              <a:t> Works well with many web servers</a:t>
-            </a:r>
-          </a:p>
-          <a:p>
-            <a:pPr>
-              <a:buBlip>
-                <a:blip r:embed="rId2"/>
-              </a:buBlip>
-            </a:pPr>
-            <a:r>
-              <a:rPr lang="en-US" sz="2400" dirty="0" smtClean="0"/>
-              <a:t> Works great with </a:t>
-            </a:r>
-            <a:r>
-              <a:rPr lang="en-US" sz="2400" dirty="0" err="1" smtClean="0"/>
-              <a:t>JRuby</a:t>
-            </a:r>
-            <a:endParaRPr lang="en-US" sz="2400" dirty="0" smtClean="0"/>
-          </a:p>
-          <a:p>
-            <a:pPr>
-              <a:buBlip>
-                <a:blip r:embed="rId2"/>
-              </a:buBlip>
-            </a:pPr>
-            <a:endParaRPr lang="en-US" sz="2400" dirty="0" smtClean="0"/>
-          </a:p>
-          <a:p>
-            <a:pPr>
-              <a:buBlip>
-                <a:blip r:embed="rId2"/>
-              </a:buBlip>
-            </a:pPr>
-            <a:endParaRPr lang="en-US" sz="2400" dirty="0"/>
-          </a:p>
-        </p:txBody>
-      </p:sp>
-    </p:spTree>
-  </p:cSld>
-  <p:clrMapOvr>
-    <a:masterClrMapping/>
-  </p:clrMapOvr>
-  <p:timing>
-    <p:tnLst>
-      <p:par>
-        <p:cTn id="1" dur="indefinite" restart="never" nodeType="tmRoot"/>
-      </p:par>
-    </p:tnLst>
-  </p:timing>
-</p:sld>
-</file>
-
-<file path=ppt/slides/slide4.xml><?xml version="1.0" encoding="utf-8"?>
-<p:sld xmlns:a="http://schemas.openxmlformats.org/drawingml/2006/main" xmlns:r="http://schemas.openxmlformats.org/officeDocument/2006/relationships" xmlns:mc="http://schemas.openxmlformats.org/markup-compatibility/2006" xmlns:mv="urn:schemas-microsoft-com:mac:vml" xmlns:p="http://schemas.openxmlformats.org/presentationml/2006/main" mc:Ignorable="mv" mc:PreserveAttributes="mv:*">
-  <p:cSld>
-    <p:spTree>
-      <p:nvGrpSpPr>
-        <p:cNvPr id="1" name=""/>
-        <p:cNvGrpSpPr/>
-        <p:nvPr/>
-      </p:nvGrpSpPr>
-      <p:grpSpPr>
-        <a:xfrm>
-          <a:off x="0" y="0"/>
-          <a:ext cx="0" cy="0"/>
-          <a:chOff x="0" y="0"/>
-          <a:chExt cx="0" cy="0"/>
-        </a:xfrm>
-      </p:grpSpPr>
-      <p:sp>
-        <p:nvSpPr>
-          <p:cNvPr id="2" name="Title 1"/>
-          <p:cNvSpPr>
-            <a:spLocks noGrp="1"/>
-          </p:cNvSpPr>
-          <p:nvPr>
-            <p:ph type="title"/>
-          </p:nvPr>
-        </p:nvSpPr>
-        <p:spPr/>
-        <p:txBody>
-          <a:bodyPr/>
-          <a:lstStyle/>
-          <a:p>
-            <a:r>
-              <a:rPr lang="en-US" dirty="0" smtClean="0"/>
-              <a:t>Sinatra 101</a:t>
-            </a:r>
-            <a:endParaRPr lang="en-US" dirty="0"/>
-          </a:p>
-        </p:txBody>
-      </p:sp>
-      <p:sp>
-        <p:nvSpPr>
-          <p:cNvPr id="3" name="TextBox 2"/>
-          <p:cNvSpPr txBox="1"/>
-          <p:nvPr/>
-        </p:nvSpPr>
-        <p:spPr>
-          <a:xfrm>
-            <a:off x="396052" y="1492625"/>
-            <a:ext cx="7738016" cy="4154983"/>
-          </a:xfrm>
-          <a:prstGeom prst="rect">
-            <a:avLst/>
-          </a:prstGeom>
-          <a:noFill/>
-        </p:spPr>
-        <p:txBody>
-          <a:bodyPr wrap="none" rtlCol="0">
-            <a:spAutoFit/>
-          </a:bodyPr>
-          <a:lstStyle/>
-          <a:p>
-            <a:endParaRPr lang="en-US" sz="2400" dirty="0" smtClean="0"/>
-          </a:p>
-          <a:p>
-            <a:pPr>
-              <a:buBlip>
-                <a:blip r:embed="rId3"/>
-              </a:buBlip>
-            </a:pPr>
-            <a:r>
-              <a:rPr lang="en-US" sz="2400" dirty="0" smtClean="0"/>
-              <a:t> Sinatra is mostly a DSL</a:t>
-            </a:r>
-          </a:p>
-          <a:p>
-            <a:pPr>
-              <a:buBlip>
-                <a:blip r:embed="rId3"/>
-              </a:buBlip>
-            </a:pPr>
-            <a:r>
-              <a:rPr lang="en-US" sz="2400" dirty="0" smtClean="0"/>
-              <a:t> The DSL routing conforms to GET, POST, PUT, DELETE</a:t>
-            </a:r>
-          </a:p>
-          <a:p>
-            <a:pPr>
-              <a:buBlip>
-                <a:blip r:embed="rId3"/>
-              </a:buBlip>
-            </a:pPr>
-            <a:r>
-              <a:rPr lang="en-US" sz="2400" dirty="0" smtClean="0"/>
-              <a:t> Works with all your favorite Ruby </a:t>
-            </a:r>
-            <a:r>
-              <a:rPr lang="en-US" sz="2400" dirty="0" err="1" smtClean="0"/>
-              <a:t>templating</a:t>
-            </a:r>
-            <a:r>
-              <a:rPr lang="en-US" sz="2400" dirty="0" smtClean="0"/>
-              <a:t> libraries</a:t>
-            </a:r>
-          </a:p>
-          <a:p>
-            <a:pPr lvl="1">
-              <a:buBlip>
-                <a:blip r:embed="rId3"/>
-              </a:buBlip>
-            </a:pPr>
-            <a:r>
-              <a:rPr lang="en-US" sz="2400" dirty="0" err="1" smtClean="0"/>
-              <a:t>Haml</a:t>
-            </a:r>
-            <a:r>
-              <a:rPr lang="en-US" sz="2400" dirty="0" smtClean="0"/>
-              <a:t>, Sass, </a:t>
-            </a:r>
-            <a:r>
-              <a:rPr lang="en-US" sz="2400" dirty="0" err="1" smtClean="0"/>
-              <a:t>Erb</a:t>
-            </a:r>
-            <a:r>
-              <a:rPr lang="en-US" sz="2400" dirty="0" smtClean="0"/>
-              <a:t>, </a:t>
-            </a:r>
-            <a:r>
-              <a:rPr lang="en-US" sz="2400" dirty="0" err="1" smtClean="0"/>
-              <a:t>Erubis</a:t>
-            </a:r>
-            <a:r>
-              <a:rPr lang="en-US" sz="2400" dirty="0" smtClean="0"/>
-              <a:t>, Builder</a:t>
-            </a:r>
-          </a:p>
-          <a:p>
-            <a:pPr>
-              <a:buBlip>
-                <a:blip r:embed="rId3"/>
-              </a:buBlip>
-            </a:pPr>
-            <a:r>
-              <a:rPr lang="en-US" sz="2400" dirty="0" smtClean="0"/>
-              <a:t> URI definition should look similar to Rails</a:t>
-            </a:r>
-          </a:p>
-          <a:p>
-            <a:pPr>
-              <a:buBlip>
-                <a:blip r:embed="rId3"/>
-              </a:buBlip>
-            </a:pPr>
-            <a:r>
-              <a:rPr lang="en-US" sz="2400" dirty="0" smtClean="0"/>
-              <a:t> Has before and after filters similar to Rails</a:t>
-            </a:r>
-          </a:p>
-          <a:p>
-            <a:pPr>
-              <a:buBlip>
-                <a:blip r:embed="rId3"/>
-              </a:buBlip>
-            </a:pPr>
-            <a:r>
-              <a:rPr lang="en-US" sz="2400" dirty="0" smtClean="0"/>
-              <a:t> DSL configuration</a:t>
-            </a:r>
-          </a:p>
-          <a:p>
-            <a:pPr>
-              <a:buBlip>
-                <a:blip r:embed="rId3"/>
-              </a:buBlip>
-            </a:pPr>
-            <a:r>
-              <a:rPr lang="en-US" sz="2400" dirty="0" smtClean="0"/>
-              <a:t> Handles all typical response codes and mime types nicely</a:t>
-            </a:r>
-          </a:p>
-          <a:p>
-            <a:pPr>
-              <a:buBlip>
-                <a:blip r:embed="rId3"/>
-              </a:buBlip>
-            </a:pPr>
-            <a:r>
-              <a:rPr lang="en-US" sz="2400" dirty="0" smtClean="0"/>
-              <a:t> Let’s take a look at a very basic standalone app</a:t>
-            </a:r>
-          </a:p>
-          <a:p>
-            <a:pPr>
-              <a:buBlip>
-                <a:blip r:embed="rId3"/>
-              </a:buBlip>
-            </a:pPr>
-            <a:endParaRPr lang="en-US" sz="2400" dirty="0"/>
-          </a:p>
-        </p:txBody>
-      </p:sp>
-    </p:spTree>
-  </p:cSld>
-  <p:clrMapOvr>
-    <a:masterClrMapping/>
-  </p:clrMapOvr>
-  <p:timing>
-    <p:tnLst>
-      <p:par>
-        <p:cTn id="1" dur="indefinite" restart="never" nodeType="tmRoot"/>
-      </p:par>
-    </p:tnLst>
-  </p:timing>
-</p:sld>
-</file>
-
-<file path=ppt/slides/slide5.xml><?xml version="1.0" encoding="utf-8"?>
-<p:sld xmlns:a="http://schemas.openxmlformats.org/drawingml/2006/main" xmlns:r="http://schemas.openxmlformats.org/officeDocument/2006/relationships" xmlns:mc="http://schemas.openxmlformats.org/markup-compatibility/2006" xmlns:mv="urn:schemas-microsoft-com:mac:vml" xmlns:p="http://schemas.openxmlformats.org/presentationml/2006/main" mc:Ignorable="mv" mc:PreserveAttributes="mv:*">
-  <p:cSld>
-    <p:spTree>
-      <p:nvGrpSpPr>
-        <p:cNvPr id="1" name=""/>
-        <p:cNvGrpSpPr/>
-        <p:nvPr/>
-      </p:nvGrpSpPr>
-      <p:grpSpPr>
-        <a:xfrm>
-          <a:off x="0" y="0"/>
-          <a:ext cx="0" cy="0"/>
-          <a:chOff x="0" y="0"/>
-          <a:chExt cx="0" cy="0"/>
-        </a:xfrm>
-      </p:grpSpPr>
-      <p:sp>
-        <p:nvSpPr>
-          <p:cNvPr id="2" name="Title 1"/>
-          <p:cNvSpPr>
-            <a:spLocks noGrp="1"/>
-          </p:cNvSpPr>
-          <p:nvPr>
-            <p:ph type="title"/>
-          </p:nvPr>
-        </p:nvSpPr>
-        <p:spPr/>
-        <p:txBody>
-          <a:bodyPr/>
-          <a:lstStyle/>
-          <a:p>
-            <a:r>
-              <a:rPr lang="en-US" dirty="0" smtClean="0"/>
-              <a:t>Ways to ‘start’ Sinatra</a:t>
-            </a:r>
-            <a:endParaRPr lang="en-US" dirty="0"/>
-          </a:p>
-        </p:txBody>
-      </p:sp>
-      <p:sp>
-        <p:nvSpPr>
-          <p:cNvPr id="3" name="TextBox 2"/>
-          <p:cNvSpPr txBox="1"/>
-          <p:nvPr/>
-        </p:nvSpPr>
-        <p:spPr>
-          <a:xfrm>
-            <a:off x="1392844" y="1492625"/>
-            <a:ext cx="6420754" cy="1200328"/>
-          </a:xfrm>
-          <a:prstGeom prst="rect">
-            <a:avLst/>
-          </a:prstGeom>
-          <a:noFill/>
-        </p:spPr>
-        <p:txBody>
-          <a:bodyPr wrap="square" rtlCol="0">
-            <a:spAutoFit/>
-          </a:bodyPr>
-          <a:lstStyle/>
-          <a:p>
-            <a:endParaRPr lang="en-US" sz="2400" dirty="0" smtClean="0"/>
-          </a:p>
-          <a:p>
-            <a:pPr>
-              <a:buBlip>
-                <a:blip r:embed="rId2"/>
-              </a:buBlip>
-            </a:pPr>
-            <a:r>
-              <a:rPr lang="en-US" sz="2400" dirty="0" smtClean="0"/>
-              <a:t> Use a </a:t>
-            </a:r>
-            <a:r>
-              <a:rPr lang="en-US" sz="2400" dirty="0" err="1" smtClean="0"/>
-              <a:t>Rackup</a:t>
-            </a:r>
-            <a:r>
-              <a:rPr lang="en-US" sz="2400" dirty="0" smtClean="0"/>
-              <a:t> file - </a:t>
-            </a:r>
-            <a:r>
-              <a:rPr lang="en-US" sz="2400" dirty="0" err="1" smtClean="0"/>
-              <a:t>config.ru</a:t>
-            </a:r>
-            <a:endParaRPr lang="en-US" sz="2400" dirty="0" smtClean="0"/>
-          </a:p>
-          <a:p>
-            <a:pPr>
-              <a:buBlip>
-                <a:blip r:embed="rId2"/>
-              </a:buBlip>
-            </a:pPr>
-            <a:r>
-              <a:rPr lang="en-US" sz="2400" dirty="0" smtClean="0"/>
-              <a:t> Standalone mode - ruby </a:t>
-            </a:r>
-            <a:r>
-              <a:rPr lang="en-US" sz="2400" dirty="0" err="1" smtClean="0"/>
-              <a:t>your_sinatra_app.rb</a:t>
-            </a:r>
-            <a:endParaRPr lang="en-US" sz="2400" dirty="0" smtClean="0"/>
-          </a:p>
-        </p:txBody>
-      </p:sp>
-    </p:spTree>
-  </p:cSld>
-  <p:clrMapOvr>
-    <a:masterClrMapping/>
-  </p:clrMapOvr>
-  <p:timing>
-    <p:tnLst>
-      <p:par>
-        <p:cTn id="1" dur="indefinite" restart="never" nodeType="tmRoot"/>
-      </p:par>
-    </p:tnLst>
-  </p:timing>
-</p:sld>
-</file>
-
-<file path=ppt/slides/slide6.xml><?xml version="1.0" encoding="utf-8"?>
-<p:sld xmlns:a="http://schemas.openxmlformats.org/drawingml/2006/main" xmlns:r="http://schemas.openxmlformats.org/officeDocument/2006/relationships" xmlns:mc="http://schemas.openxmlformats.org/markup-compatibility/2006" xmlns:mv="urn:schemas-microsoft-com:mac:vml" xmlns:p="http://schemas.openxmlformats.org/presentationml/2006/main" mc:Ignorable="mv" mc:PreserveAttributes="mv:*">
-  <p:cSld>
-    <p:spTree>
-      <p:nvGrpSpPr>
-        <p:cNvPr id="1" name=""/>
-        <p:cNvGrpSpPr/>
-        <p:nvPr/>
-      </p:nvGrpSpPr>
-      <p:grpSpPr>
-        <a:xfrm>
-          <a:off x="0" y="0"/>
-          <a:ext cx="0" cy="0"/>
-          <a:chOff x="0" y="0"/>
-          <a:chExt cx="0" cy="0"/>
-        </a:xfrm>
-      </p:grpSpPr>
-      <p:pic>
-        <p:nvPicPr>
-          <p:cNvPr id="4" name="Picture 3"/>
-          <p:cNvPicPr>
-            <a:picLocks noChangeAspect="1"/>
-          </p:cNvPicPr>
-          <p:nvPr/>
-        </p:nvPicPr>
-        <p:blipFill>
-          <a:blip r:embed="rId3">
-            <a:alphaModFix amt="30000"/>
-          </a:blip>
-          <a:stretch>
-            <a:fillRect/>
-          </a:stretch>
-        </p:blipFill>
-        <p:spPr>
-          <a:xfrm>
-            <a:off x="-508000" y="1492625"/>
-            <a:ext cx="10160000" cy="3505200"/>
-          </a:xfrm>
-          <a:prstGeom prst="rect">
-            <a:avLst/>
-          </a:prstGeom>
-        </p:spPr>
-      </p:pic>
-      <p:sp>
-        <p:nvSpPr>
-          <p:cNvPr id="2" name="Title 1"/>
-          <p:cNvSpPr>
-            <a:spLocks noGrp="1"/>
-          </p:cNvSpPr>
-          <p:nvPr>
-            <p:ph type="title"/>
-          </p:nvPr>
-        </p:nvSpPr>
-        <p:spPr/>
-        <p:txBody>
-          <a:bodyPr/>
-          <a:lstStyle/>
-          <a:p>
-            <a:r>
-              <a:rPr lang="en-US" dirty="0" smtClean="0"/>
-              <a:t>Sinatra + Bundler</a:t>
-            </a:r>
-            <a:endParaRPr lang="en-US" dirty="0"/>
-          </a:p>
-        </p:txBody>
-      </p:sp>
-      <p:sp>
-        <p:nvSpPr>
-          <p:cNvPr id="3" name="TextBox 2"/>
-          <p:cNvSpPr txBox="1"/>
-          <p:nvPr/>
-        </p:nvSpPr>
-        <p:spPr>
-          <a:xfrm>
-            <a:off x="1392844" y="1492625"/>
-            <a:ext cx="6420754" cy="1200328"/>
-          </a:xfrm>
-          <a:prstGeom prst="rect">
-            <a:avLst/>
-          </a:prstGeom>
-          <a:noFill/>
-        </p:spPr>
-        <p:txBody>
-          <a:bodyPr wrap="square" rtlCol="0">
-            <a:spAutoFit/>
-          </a:bodyPr>
-          <a:lstStyle/>
-          <a:p>
-            <a:endParaRPr lang="en-US" sz="2400" dirty="0" smtClean="0"/>
-          </a:p>
-          <a:p>
-            <a:pPr>
-              <a:buBlip>
-                <a:blip r:embed="rId4"/>
-              </a:buBlip>
-            </a:pPr>
-            <a:r>
-              <a:rPr lang="en-US" sz="2400" dirty="0" smtClean="0"/>
-              <a:t> </a:t>
-            </a:r>
-            <a:r>
-              <a:rPr lang="en-US" sz="2400" dirty="0" err="1" smtClean="0"/>
-              <a:t>Gemfile</a:t>
-            </a:r>
-            <a:endParaRPr lang="en-US" sz="2400" dirty="0" smtClean="0"/>
-          </a:p>
-          <a:p>
-            <a:pPr>
-              <a:buBlip>
-                <a:blip r:embed="rId4"/>
-              </a:buBlip>
-            </a:pPr>
-            <a:r>
-              <a:rPr lang="en-US" sz="2400" dirty="0" err="1" smtClean="0"/>
-              <a:t>Bundler.require_env</a:t>
-            </a:r>
-            <a:endParaRPr lang="en-US" sz="2400" dirty="0" smtClean="0"/>
-          </a:p>
-        </p:txBody>
-      </p:sp>
-    </p:spTree>
-  </p:cSld>
-  <p:clrMapOvr>
-    <a:masterClrMapping/>
-  </p:clrMapOvr>
-  <p:timing>
-    <p:tnLst>
-      <p:par>
-        <p:cTn id="1" dur="indefinite" restart="never" nodeType="tmRoot"/>
-      </p:par>
-    </p:tnLst>
-  </p:timing>
-</p:sld>
-</file>
-
-<file path=ppt/slides/slide7.xml><?xml version="1.0" encoding="utf-8"?>
-<p:sld xmlns:a="http://schemas.openxmlformats.org/drawingml/2006/main" xmlns:r="http://schemas.openxmlformats.org/officeDocument/2006/relationships" xmlns:mc="http://schemas.openxmlformats.org/markup-compatibility/2006" xmlns:mv="urn:schemas-microsoft-com:mac:vml" xmlns:p="http://schemas.openxmlformats.org/presentationml/2006/main" mc:Ignorable="mv" mc:PreserveAttributes="mv:*">
-  <p:cSld>
-    <p:spTree>
-      <p:nvGrpSpPr>
-        <p:cNvPr id="1" name=""/>
-        <p:cNvGrpSpPr/>
-        <p:nvPr/>
-      </p:nvGrpSpPr>
-      <p:grpSpPr>
-        <a:xfrm>
-          <a:off x="0" y="0"/>
-          <a:ext cx="0" cy="0"/>
-          <a:chOff x="0" y="0"/>
-          <a:chExt cx="0" cy="0"/>
-        </a:xfrm>
-      </p:grpSpPr>
-      <p:sp>
-        <p:nvSpPr>
-          <p:cNvPr id="2" name="Title 1"/>
-          <p:cNvSpPr>
-            <a:spLocks noGrp="1"/>
-          </p:cNvSpPr>
-          <p:nvPr>
-            <p:ph type="title"/>
-          </p:nvPr>
-        </p:nvSpPr>
-        <p:spPr/>
-        <p:txBody>
-          <a:bodyPr/>
-          <a:lstStyle/>
-          <a:p>
-            <a:r>
-              <a:rPr lang="en-US" dirty="0" smtClean="0"/>
-              <a:t>Sinatra Extensions</a:t>
-            </a:r>
-            <a:endParaRPr lang="en-US" dirty="0"/>
-          </a:p>
-        </p:txBody>
-      </p:sp>
-    </p:spTree>
-  </p:cSld>
-  <p:clrMapOvr>
-    <a:masterClrMapping/>
-  </p:clrMapOvr>
-  <p:timing>
-    <p:tnLst>
-      <p:par>
-        <p:cTn id="1" dur="indefinite" restart="never" nodeType="tmRoot"/>
-      </p:par>
-    </p:tnLst>
-  </p:timing>
-</p:sld>
-</file>
-
-<file path=ppt/slides/slide8.xml><?xml version="1.0" encoding="utf-8"?>
-<p:sld xmlns:a="http://schemas.openxmlformats.org/drawingml/2006/main" xmlns:r="http://schemas.openxmlformats.org/officeDocument/2006/relationships" xmlns:mc="http://schemas.openxmlformats.org/markup-compatibility/2006" xmlns:mv="urn:schemas-microsoft-com:mac:vml" xmlns:p="http://schemas.openxmlformats.org/presentationml/2006/main" mc:Ignorable="mv" mc:PreserveAttributes="mv:*">
-  <p:cSld>
-    <p:spTree>
-      <p:nvGrpSpPr>
-        <p:cNvPr id="1" name=""/>
-        <p:cNvGrpSpPr/>
-        <p:nvPr/>
-      </p:nvGrpSpPr>
-      <p:grpSpPr>
-        <a:xfrm>
-          <a:off x="0" y="0"/>
-          <a:ext cx="0" cy="0"/>
-          <a:chOff x="0" y="0"/>
-          <a:chExt cx="0" cy="0"/>
-        </a:xfrm>
-      </p:grpSpPr>
       <p:pic>
         <p:nvPicPr>
           <p:cNvPr id="10" name="Picture 9"/>
@@ -6880,6 +5338,1931 @@
 </p:sld>
 </file>
 
+<file path=ppt/slides/slide11.xml><?xml version="1.0" encoding="utf-8"?>
+<p:sld xmlns:a="http://schemas.openxmlformats.org/drawingml/2006/main" xmlns:r="http://schemas.openxmlformats.org/officeDocument/2006/relationships" xmlns:mc="http://schemas.openxmlformats.org/markup-compatibility/2006" xmlns:mv="urn:schemas-microsoft-com:mac:vml" xmlns:p="http://schemas.openxmlformats.org/presentationml/2006/main" mc:Ignorable="mv" mc:PreserveAttributes="mv:*">
+  <p:cSld>
+    <p:spTree>
+      <p:nvGrpSpPr>
+        <p:cNvPr id="1" name=""/>
+        <p:cNvGrpSpPr/>
+        <p:nvPr/>
+      </p:nvGrpSpPr>
+      <p:grpSpPr>
+        <a:xfrm>
+          <a:off x="0" y="0"/>
+          <a:ext cx="0" cy="0"/>
+          <a:chOff x="0" y="0"/>
+          <a:chExt cx="0" cy="0"/>
+        </a:xfrm>
+      </p:grpSpPr>
+      <p:sp>
+        <p:nvSpPr>
+          <p:cNvPr id="2" name="Title 1"/>
+          <p:cNvSpPr>
+            <a:spLocks noGrp="1"/>
+          </p:cNvSpPr>
+          <p:nvPr>
+            <p:ph type="title"/>
+          </p:nvPr>
+        </p:nvSpPr>
+        <p:spPr/>
+        <p:txBody>
+          <a:bodyPr/>
+          <a:lstStyle/>
+          <a:p>
+            <a:r>
+              <a:rPr lang="en-US" dirty="0" smtClean="0"/>
+              <a:t>Load testing Sinatra</a:t>
+            </a:r>
+            <a:endParaRPr lang="en-US" dirty="0"/>
+          </a:p>
+        </p:txBody>
+      </p:sp>
+      <p:sp>
+        <p:nvSpPr>
+          <p:cNvPr id="3" name="TextBox 2"/>
+          <p:cNvSpPr txBox="1"/>
+          <p:nvPr/>
+        </p:nvSpPr>
+        <p:spPr>
+          <a:xfrm>
+            <a:off x="1392844" y="1492625"/>
+            <a:ext cx="6420754" cy="1938992"/>
+          </a:xfrm>
+          <a:prstGeom prst="rect">
+            <a:avLst/>
+          </a:prstGeom>
+          <a:noFill/>
+        </p:spPr>
+        <p:txBody>
+          <a:bodyPr wrap="square" rtlCol="0">
+            <a:spAutoFit/>
+          </a:bodyPr>
+          <a:lstStyle/>
+          <a:p>
+            <a:endParaRPr lang="en-US" sz="2400" dirty="0" smtClean="0"/>
+          </a:p>
+          <a:p>
+            <a:pPr>
+              <a:buBlip>
+                <a:blip r:embed="rId2"/>
+              </a:buBlip>
+            </a:pPr>
+            <a:r>
+              <a:rPr lang="en-US" sz="2400" dirty="0" smtClean="0"/>
+              <a:t> How does it perform under load?</a:t>
+            </a:r>
+          </a:p>
+          <a:p>
+            <a:pPr>
+              <a:buBlip>
+                <a:blip r:embed="rId2"/>
+              </a:buBlip>
+            </a:pPr>
+            <a:r>
+              <a:rPr lang="en-US" sz="2400" dirty="0" smtClean="0"/>
+              <a:t>Sinatra supports multithreading (works well with </a:t>
+            </a:r>
+            <a:r>
+              <a:rPr lang="en-US" sz="2400" dirty="0" err="1" smtClean="0"/>
+              <a:t>Jruby</a:t>
+            </a:r>
+            <a:r>
+              <a:rPr lang="en-US" sz="2400" dirty="0" smtClean="0"/>
+              <a:t>)</a:t>
+            </a:r>
+          </a:p>
+          <a:p>
+            <a:pPr>
+              <a:buBlip>
+                <a:blip r:embed="rId2"/>
+              </a:buBlip>
+            </a:pPr>
+            <a:r>
+              <a:rPr lang="en-US" sz="2400" dirty="0" smtClean="0"/>
+              <a:t> </a:t>
+            </a:r>
+          </a:p>
+        </p:txBody>
+      </p:sp>
+    </p:spTree>
+  </p:cSld>
+  <p:clrMapOvr>
+    <a:masterClrMapping/>
+  </p:clrMapOvr>
+  <p:timing>
+    <p:tnLst>
+      <p:par>
+        <p:cTn id="1" dur="indefinite" restart="never" nodeType="tmRoot"/>
+      </p:par>
+    </p:tnLst>
+  </p:timing>
+</p:sld>
+</file>
+
+<file path=ppt/slides/slide12.xml><?xml version="1.0" encoding="utf-8"?>
+<p:sld xmlns:a="http://schemas.openxmlformats.org/drawingml/2006/main" xmlns:r="http://schemas.openxmlformats.org/officeDocument/2006/relationships" xmlns:mc="http://schemas.openxmlformats.org/markup-compatibility/2006" xmlns:mv="urn:schemas-microsoft-com:mac:vml" xmlns:p="http://schemas.openxmlformats.org/presentationml/2006/main" mc:Ignorable="mv" mc:PreserveAttributes="mv:*">
+  <p:cSld>
+    <p:spTree>
+      <p:nvGrpSpPr>
+        <p:cNvPr id="1" name=""/>
+        <p:cNvGrpSpPr/>
+        <p:nvPr/>
+      </p:nvGrpSpPr>
+      <p:grpSpPr>
+        <a:xfrm>
+          <a:off x="0" y="0"/>
+          <a:ext cx="0" cy="0"/>
+          <a:chOff x="0" y="0"/>
+          <a:chExt cx="0" cy="0"/>
+        </a:xfrm>
+      </p:grpSpPr>
+      <p:sp>
+        <p:nvSpPr>
+          <p:cNvPr id="2" name="Title 1"/>
+          <p:cNvSpPr>
+            <a:spLocks noGrp="1"/>
+          </p:cNvSpPr>
+          <p:nvPr>
+            <p:ph type="title"/>
+          </p:nvPr>
+        </p:nvSpPr>
+        <p:spPr/>
+        <p:txBody>
+          <a:bodyPr/>
+          <a:lstStyle/>
+          <a:p>
+            <a:r>
+              <a:rPr lang="en-US" dirty="0" smtClean="0"/>
+              <a:t>Memory Footprint VS.</a:t>
+            </a:r>
+            <a:endParaRPr lang="en-US" dirty="0"/>
+          </a:p>
+        </p:txBody>
+      </p:sp>
+      <p:sp>
+        <p:nvSpPr>
+          <p:cNvPr id="3" name="TextBox 2"/>
+          <p:cNvSpPr txBox="1"/>
+          <p:nvPr/>
+        </p:nvSpPr>
+        <p:spPr>
+          <a:xfrm>
+            <a:off x="1392844" y="1492625"/>
+            <a:ext cx="6420754" cy="1200328"/>
+          </a:xfrm>
+          <a:prstGeom prst="rect">
+            <a:avLst/>
+          </a:prstGeom>
+          <a:noFill/>
+        </p:spPr>
+        <p:txBody>
+          <a:bodyPr wrap="square" rtlCol="0">
+            <a:spAutoFit/>
+          </a:bodyPr>
+          <a:lstStyle/>
+          <a:p>
+            <a:endParaRPr lang="en-US" sz="2400" dirty="0" smtClean="0"/>
+          </a:p>
+          <a:p>
+            <a:pPr>
+              <a:buBlip>
+                <a:blip r:embed="rId2"/>
+              </a:buBlip>
+            </a:pPr>
+            <a:r>
+              <a:rPr lang="en-US" sz="2400" dirty="0" smtClean="0"/>
+              <a:t> Under load using ‘top’</a:t>
+            </a:r>
+          </a:p>
+          <a:p>
+            <a:pPr>
+              <a:buBlip>
+                <a:blip r:embed="rId2"/>
+              </a:buBlip>
+            </a:pPr>
+            <a:endParaRPr lang="en-US" sz="2400" dirty="0" smtClean="0"/>
+          </a:p>
+        </p:txBody>
+      </p:sp>
+    </p:spTree>
+  </p:cSld>
+  <p:clrMapOvr>
+    <a:masterClrMapping/>
+  </p:clrMapOvr>
+  <p:timing>
+    <p:tnLst>
+      <p:par>
+        <p:cTn id="1" dur="indefinite" restart="never" nodeType="tmRoot"/>
+      </p:par>
+    </p:tnLst>
+  </p:timing>
+</p:sld>
+</file>
+
+<file path=ppt/slides/slide13.xml><?xml version="1.0" encoding="utf-8"?>
+<p:sld xmlns:a="http://schemas.openxmlformats.org/drawingml/2006/main" xmlns:r="http://schemas.openxmlformats.org/officeDocument/2006/relationships" xmlns:mc="http://schemas.openxmlformats.org/markup-compatibility/2006" xmlns:mv="urn:schemas-microsoft-com:mac:vml" xmlns:p="http://schemas.openxmlformats.org/presentationml/2006/main" mc:Ignorable="mv" mc:PreserveAttributes="mv:*">
+  <p:cSld>
+    <p:spTree>
+      <p:nvGrpSpPr>
+        <p:cNvPr id="1" name=""/>
+        <p:cNvGrpSpPr/>
+        <p:nvPr/>
+      </p:nvGrpSpPr>
+      <p:grpSpPr>
+        <a:xfrm>
+          <a:off x="0" y="0"/>
+          <a:ext cx="0" cy="0"/>
+          <a:chOff x="0" y="0"/>
+          <a:chExt cx="0" cy="0"/>
+        </a:xfrm>
+      </p:grpSpPr>
+      <p:sp>
+        <p:nvSpPr>
+          <p:cNvPr id="2" name="Title 1"/>
+          <p:cNvSpPr>
+            <a:spLocks noGrp="1"/>
+          </p:cNvSpPr>
+          <p:nvPr>
+            <p:ph type="title"/>
+          </p:nvPr>
+        </p:nvSpPr>
+        <p:spPr/>
+        <p:txBody>
+          <a:bodyPr/>
+          <a:lstStyle/>
+          <a:p>
+            <a:r>
+              <a:rPr lang="en-US" dirty="0" smtClean="0"/>
+              <a:t>Sinatra + </a:t>
+            </a:r>
+            <a:r>
+              <a:rPr lang="en-US" dirty="0" err="1" smtClean="0"/>
+              <a:t>JRuby</a:t>
+            </a:r>
+            <a:endParaRPr lang="en-US" dirty="0"/>
+          </a:p>
+        </p:txBody>
+      </p:sp>
+      <p:sp>
+        <p:nvSpPr>
+          <p:cNvPr id="3" name="TextBox 2"/>
+          <p:cNvSpPr txBox="1"/>
+          <p:nvPr/>
+        </p:nvSpPr>
+        <p:spPr>
+          <a:xfrm>
+            <a:off x="1392844" y="1492625"/>
+            <a:ext cx="6420754" cy="830997"/>
+          </a:xfrm>
+          <a:prstGeom prst="rect">
+            <a:avLst/>
+          </a:prstGeom>
+          <a:noFill/>
+        </p:spPr>
+        <p:txBody>
+          <a:bodyPr wrap="square" rtlCol="0">
+            <a:spAutoFit/>
+          </a:bodyPr>
+          <a:lstStyle/>
+          <a:p>
+            <a:endParaRPr lang="en-US" sz="2400" dirty="0" smtClean="0"/>
+          </a:p>
+          <a:p>
+            <a:pPr>
+              <a:buBlip>
+                <a:blip r:embed="rId2"/>
+              </a:buBlip>
+            </a:pPr>
+            <a:r>
+              <a:rPr lang="en-US" sz="2400" dirty="0" smtClean="0"/>
+              <a:t> Under load using ‘top’</a:t>
+            </a:r>
+          </a:p>
+        </p:txBody>
+      </p:sp>
+    </p:spTree>
+  </p:cSld>
+  <p:clrMapOvr>
+    <a:masterClrMapping/>
+  </p:clrMapOvr>
+  <p:timing>
+    <p:tnLst>
+      <p:par>
+        <p:cTn id="1" dur="indefinite" restart="never" nodeType="tmRoot"/>
+      </p:par>
+    </p:tnLst>
+  </p:timing>
+</p:sld>
+</file>
+
+<file path=ppt/slides/slide14.xml><?xml version="1.0" encoding="utf-8"?>
+<p:sld xmlns:a="http://schemas.openxmlformats.org/drawingml/2006/main" xmlns:r="http://schemas.openxmlformats.org/officeDocument/2006/relationships" xmlns:mc="http://schemas.openxmlformats.org/markup-compatibility/2006" xmlns:mv="urn:schemas-microsoft-com:mac:vml" xmlns:p="http://schemas.openxmlformats.org/presentationml/2006/main" mc:Ignorable="mv" mc:PreserveAttributes="mv:*">
+  <p:cSld>
+    <p:spTree>
+      <p:nvGrpSpPr>
+        <p:cNvPr id="1" name=""/>
+        <p:cNvGrpSpPr/>
+        <p:nvPr/>
+      </p:nvGrpSpPr>
+      <p:grpSpPr>
+        <a:xfrm>
+          <a:off x="0" y="0"/>
+          <a:ext cx="0" cy="0"/>
+          <a:chOff x="0" y="0"/>
+          <a:chExt cx="0" cy="0"/>
+        </a:xfrm>
+      </p:grpSpPr>
+      <p:pic>
+        <p:nvPicPr>
+          <p:cNvPr id="4" name="Picture 3"/>
+          <p:cNvPicPr>
+            <a:picLocks noChangeAspect="1"/>
+          </p:cNvPicPr>
+          <p:nvPr/>
+        </p:nvPicPr>
+        <p:blipFill>
+          <a:blip r:embed="rId3">
+            <a:alphaModFix amt="30000"/>
+          </a:blip>
+          <a:stretch>
+            <a:fillRect/>
+          </a:stretch>
+        </p:blipFill>
+        <p:spPr>
+          <a:xfrm>
+            <a:off x="-508000" y="1492625"/>
+            <a:ext cx="10160000" cy="3505200"/>
+          </a:xfrm>
+          <a:prstGeom prst="rect">
+            <a:avLst/>
+          </a:prstGeom>
+        </p:spPr>
+      </p:pic>
+      <p:sp>
+        <p:nvSpPr>
+          <p:cNvPr id="2" name="Title 1"/>
+          <p:cNvSpPr>
+            <a:spLocks noGrp="1"/>
+          </p:cNvSpPr>
+          <p:nvPr>
+            <p:ph type="title"/>
+          </p:nvPr>
+        </p:nvSpPr>
+        <p:spPr/>
+        <p:txBody>
+          <a:bodyPr/>
+          <a:lstStyle/>
+          <a:p>
+            <a:r>
+              <a:rPr lang="en-US" dirty="0" err="1" smtClean="0"/>
+              <a:t>JRuby</a:t>
+            </a:r>
+            <a:r>
+              <a:rPr lang="en-US" dirty="0" smtClean="0"/>
+              <a:t>+ Warbler + Bundler</a:t>
+            </a:r>
+            <a:endParaRPr lang="en-US" dirty="0"/>
+          </a:p>
+        </p:txBody>
+      </p:sp>
+      <p:sp>
+        <p:nvSpPr>
+          <p:cNvPr id="3" name="TextBox 2"/>
+          <p:cNvSpPr txBox="1"/>
+          <p:nvPr/>
+        </p:nvSpPr>
+        <p:spPr>
+          <a:xfrm>
+            <a:off x="1392844" y="1492625"/>
+            <a:ext cx="6420754" cy="1200328"/>
+          </a:xfrm>
+          <a:prstGeom prst="rect">
+            <a:avLst/>
+          </a:prstGeom>
+          <a:noFill/>
+        </p:spPr>
+        <p:txBody>
+          <a:bodyPr wrap="square" rtlCol="0">
+            <a:spAutoFit/>
+          </a:bodyPr>
+          <a:lstStyle/>
+          <a:p>
+            <a:endParaRPr lang="en-US" sz="2400" dirty="0" smtClean="0"/>
+          </a:p>
+          <a:p>
+            <a:pPr>
+              <a:buBlip>
+                <a:blip r:embed="rId4"/>
+              </a:buBlip>
+            </a:pPr>
+            <a:r>
+              <a:rPr lang="en-US" sz="2400" dirty="0" smtClean="0"/>
+              <a:t> </a:t>
+            </a:r>
+            <a:r>
+              <a:rPr lang="en-US" sz="2400" dirty="0" err="1" smtClean="0"/>
+              <a:t>Gemfile</a:t>
+            </a:r>
+            <a:endParaRPr lang="en-US" sz="2400" dirty="0" smtClean="0"/>
+          </a:p>
+          <a:p>
+            <a:pPr>
+              <a:buBlip>
+                <a:blip r:embed="rId4"/>
+              </a:buBlip>
+            </a:pPr>
+            <a:r>
+              <a:rPr lang="en-US" sz="2400" dirty="0" err="1" smtClean="0"/>
+              <a:t>Bundler.require_env</a:t>
+            </a:r>
+            <a:endParaRPr lang="en-US" sz="2400" dirty="0" smtClean="0"/>
+          </a:p>
+        </p:txBody>
+      </p:sp>
+    </p:spTree>
+  </p:cSld>
+  <p:clrMapOvr>
+    <a:masterClrMapping/>
+  </p:clrMapOvr>
+  <p:timing>
+    <p:tnLst>
+      <p:par>
+        <p:cTn id="1" dur="indefinite" restart="never" nodeType="tmRoot"/>
+      </p:par>
+    </p:tnLst>
+  </p:timing>
+</p:sld>
+</file>
+
+<file path=ppt/slides/slide15.xml><?xml version="1.0" encoding="utf-8"?>
+<p:sld xmlns:a="http://schemas.openxmlformats.org/drawingml/2006/main" xmlns:r="http://schemas.openxmlformats.org/officeDocument/2006/relationships" xmlns:mc="http://schemas.openxmlformats.org/markup-compatibility/2006" xmlns:mv="urn:schemas-microsoft-com:mac:vml" xmlns:p="http://schemas.openxmlformats.org/presentationml/2006/main" mc:Ignorable="mv" mc:PreserveAttributes="mv:*">
+  <p:cSld>
+    <p:spTree>
+      <p:nvGrpSpPr>
+        <p:cNvPr id="1" name=""/>
+        <p:cNvGrpSpPr/>
+        <p:nvPr/>
+      </p:nvGrpSpPr>
+      <p:grpSpPr>
+        <a:xfrm>
+          <a:off x="0" y="0"/>
+          <a:ext cx="0" cy="0"/>
+          <a:chOff x="0" y="0"/>
+          <a:chExt cx="0" cy="0"/>
+        </a:xfrm>
+      </p:grpSpPr>
+      <p:sp>
+        <p:nvSpPr>
+          <p:cNvPr id="2" name="Title 1"/>
+          <p:cNvSpPr>
+            <a:spLocks noGrp="1"/>
+          </p:cNvSpPr>
+          <p:nvPr>
+            <p:ph type="title"/>
+          </p:nvPr>
+        </p:nvSpPr>
+        <p:spPr/>
+        <p:txBody>
+          <a:bodyPr/>
+          <a:lstStyle/>
+          <a:p>
+            <a:r>
+              <a:rPr lang="en-US" dirty="0" smtClean="0"/>
+              <a:t>Sinatra on </a:t>
+            </a:r>
+            <a:r>
+              <a:rPr lang="en-US" dirty="0" err="1" smtClean="0"/>
+              <a:t>Heroku</a:t>
+            </a:r>
+            <a:endParaRPr lang="en-US" dirty="0"/>
+          </a:p>
+        </p:txBody>
+      </p:sp>
+      <p:sp>
+        <p:nvSpPr>
+          <p:cNvPr id="3" name="TextBox 2"/>
+          <p:cNvSpPr txBox="1"/>
+          <p:nvPr/>
+        </p:nvSpPr>
+        <p:spPr>
+          <a:xfrm>
+            <a:off x="1392844" y="1492625"/>
+            <a:ext cx="6420754" cy="3046988"/>
+          </a:xfrm>
+          <a:prstGeom prst="rect">
+            <a:avLst/>
+          </a:prstGeom>
+          <a:noFill/>
+        </p:spPr>
+        <p:txBody>
+          <a:bodyPr wrap="square" rtlCol="0">
+            <a:spAutoFit/>
+          </a:bodyPr>
+          <a:lstStyle/>
+          <a:p>
+            <a:endParaRPr lang="en-US" sz="2400" dirty="0" smtClean="0"/>
+          </a:p>
+          <a:p>
+            <a:pPr>
+              <a:buBlip>
+                <a:blip r:embed="rId2"/>
+              </a:buBlip>
+            </a:pPr>
+            <a:r>
+              <a:rPr lang="en-US" sz="2400" dirty="0" smtClean="0"/>
+              <a:t> Version your app </a:t>
+            </a:r>
+            <a:r>
+              <a:rPr lang="en-US" sz="2400" dirty="0" smtClean="0"/>
+              <a:t>with</a:t>
+            </a:r>
+            <a:r>
+              <a:rPr lang="en-US" sz="2400" dirty="0" smtClean="0"/>
+              <a:t> </a:t>
+            </a:r>
+            <a:r>
+              <a:rPr lang="en-US" sz="2400" dirty="0" err="1" smtClean="0"/>
+              <a:t>Git(hub</a:t>
+            </a:r>
+            <a:r>
+              <a:rPr lang="en-US" sz="2400" dirty="0" smtClean="0"/>
+              <a:t>)</a:t>
+            </a:r>
+          </a:p>
+          <a:p>
+            <a:pPr>
+              <a:buBlip>
+                <a:blip r:embed="rId2"/>
+              </a:buBlip>
+            </a:pPr>
+            <a:r>
+              <a:rPr lang="en-US" sz="2400" dirty="0" smtClean="0"/>
+              <a:t> Use Bundler or .gems file to manage Gems</a:t>
+            </a:r>
+          </a:p>
+          <a:p>
+            <a:pPr>
+              <a:buBlip>
+                <a:blip r:embed="rId2"/>
+              </a:buBlip>
+            </a:pPr>
+            <a:r>
+              <a:rPr lang="en-US" sz="2400" dirty="0" smtClean="0"/>
+              <a:t> </a:t>
+            </a:r>
+            <a:r>
+              <a:rPr lang="en-US" sz="2400" dirty="0" err="1" smtClean="0"/>
+              <a:t>sudo</a:t>
+            </a:r>
+            <a:r>
+              <a:rPr lang="en-US" sz="2400" dirty="0" smtClean="0"/>
+              <a:t> gem install </a:t>
+            </a:r>
+            <a:r>
+              <a:rPr lang="en-US" sz="2400" dirty="0" err="1" smtClean="0"/>
+              <a:t>heroku</a:t>
+            </a:r>
+            <a:endParaRPr lang="en-US" sz="2400" dirty="0" smtClean="0"/>
+          </a:p>
+          <a:p>
+            <a:pPr>
+              <a:buBlip>
+                <a:blip r:embed="rId2"/>
+              </a:buBlip>
+            </a:pPr>
+            <a:r>
+              <a:rPr lang="en-US" sz="2400" dirty="0" smtClean="0"/>
+              <a:t> </a:t>
+            </a:r>
+            <a:r>
+              <a:rPr lang="en-US" sz="2400" dirty="0" err="1" smtClean="0"/>
+              <a:t>heroku</a:t>
+            </a:r>
+            <a:r>
+              <a:rPr lang="en-US" sz="2400" dirty="0" smtClean="0"/>
+              <a:t> create</a:t>
+            </a:r>
+          </a:p>
+          <a:p>
+            <a:pPr>
+              <a:buBlip>
+                <a:blip r:embed="rId2"/>
+              </a:buBlip>
+            </a:pPr>
+            <a:r>
+              <a:rPr lang="en-US" sz="2400" dirty="0" smtClean="0"/>
+              <a:t> </a:t>
+            </a:r>
+            <a:r>
+              <a:rPr lang="en-US" sz="2400" dirty="0" err="1" smtClean="0"/>
+              <a:t>git</a:t>
+            </a:r>
+            <a:r>
+              <a:rPr lang="en-US" sz="2400" dirty="0" smtClean="0"/>
+              <a:t> push </a:t>
+            </a:r>
+            <a:r>
+              <a:rPr lang="en-US" sz="2400" dirty="0" err="1" smtClean="0"/>
+              <a:t>heroku</a:t>
+            </a:r>
+            <a:r>
+              <a:rPr lang="en-US" sz="2400" dirty="0" smtClean="0"/>
+              <a:t> </a:t>
+            </a:r>
+            <a:r>
+              <a:rPr lang="en-US" sz="2400" dirty="0" smtClean="0"/>
+              <a:t>master</a:t>
+            </a:r>
+          </a:p>
+          <a:p>
+            <a:pPr>
+              <a:buBlip>
+                <a:blip r:embed="rId2"/>
+              </a:buBlip>
+            </a:pPr>
+            <a:r>
+              <a:rPr lang="en-US" sz="2400" dirty="0" smtClean="0"/>
+              <a:t> See your gems installed in the terminal</a:t>
+            </a:r>
+          </a:p>
+          <a:p>
+            <a:pPr>
+              <a:buBlip>
+                <a:blip r:embed="rId2"/>
+              </a:buBlip>
+            </a:pPr>
+            <a:r>
+              <a:rPr lang="en-US" sz="2400" dirty="0" smtClean="0"/>
+              <a:t> It really is that easy!</a:t>
+            </a:r>
+            <a:endParaRPr lang="en-US" sz="2400" dirty="0" smtClean="0"/>
+          </a:p>
+        </p:txBody>
+      </p:sp>
+    </p:spTree>
+  </p:cSld>
+  <p:clrMapOvr>
+    <a:masterClrMapping/>
+  </p:clrMapOvr>
+  <p:timing>
+    <p:tnLst>
+      <p:par>
+        <p:cTn id="1" dur="indefinite" restart="never" nodeType="tmRoot"/>
+      </p:par>
+    </p:tnLst>
+  </p:timing>
+</p:sld>
+</file>
+
+<file path=ppt/slides/slide2.xml><?xml version="1.0" encoding="utf-8"?>
+<p:sld xmlns:a="http://schemas.openxmlformats.org/drawingml/2006/main" xmlns:r="http://schemas.openxmlformats.org/officeDocument/2006/relationships" xmlns:mc="http://schemas.openxmlformats.org/markup-compatibility/2006" xmlns:mv="urn:schemas-microsoft-com:mac:vml" xmlns:p="http://schemas.openxmlformats.org/presentationml/2006/main" mc:Ignorable="mv" mc:PreserveAttributes="mv:*">
+  <p:cSld>
+    <p:spTree>
+      <p:nvGrpSpPr>
+        <p:cNvPr id="1" name=""/>
+        <p:cNvGrpSpPr/>
+        <p:nvPr/>
+      </p:nvGrpSpPr>
+      <p:grpSpPr>
+        <a:xfrm>
+          <a:off x="0" y="0"/>
+          <a:ext cx="0" cy="0"/>
+          <a:chOff x="0" y="0"/>
+          <a:chExt cx="0" cy="0"/>
+        </a:xfrm>
+      </p:grpSpPr>
+      <p:sp>
+        <p:nvSpPr>
+          <p:cNvPr id="4" name="Title 1"/>
+          <p:cNvSpPr txBox="1">
+            <a:spLocks/>
+          </p:cNvSpPr>
+          <p:nvPr/>
+        </p:nvSpPr>
+        <p:spPr>
+          <a:xfrm>
+            <a:off x="914400" y="228601"/>
+            <a:ext cx="7313613" cy="1264024"/>
+          </a:xfrm>
+          <a:prstGeom prst="rect">
+            <a:avLst/>
+          </a:prstGeom>
+          <a:scene3d>
+            <a:camera prst="orthographicFront"/>
+            <a:lightRig rig="chilly" dir="t"/>
+          </a:scene3d>
+          <a:sp3d extrusionH="12700">
+            <a:extrusionClr>
+              <a:schemeClr val="bg1"/>
+            </a:extrusionClr>
+          </a:sp3d>
+        </p:spPr>
+        <p:txBody>
+          <a:bodyPr vert="horz" lIns="91440" tIns="45720" rIns="91440" bIns="45720" rtlCol="0" anchor="ctr">
+            <a:noAutofit/>
+            <a:sp3d extrusionH="12700">
+              <a:extrusionClr>
+                <a:schemeClr val="bg1"/>
+              </a:extrusionClr>
+            </a:sp3d>
+          </a:bodyPr>
+          <a:lstStyle/>
+          <a:p>
+            <a:pPr marL="0" marR="0" lvl="0" indent="0" algn="ctr" defTabSz="914400" rtl="0" eaLnBrk="1" fontAlgn="auto" latinLnBrk="0" hangingPunct="1">
+              <a:lnSpc>
+                <a:spcPts val="5600"/>
+              </a:lnSpc>
+              <a:spcBef>
+                <a:spcPct val="0"/>
+              </a:spcBef>
+              <a:spcAft>
+                <a:spcPts val="0"/>
+              </a:spcAft>
+              <a:buClrTx/>
+              <a:buSzTx/>
+              <a:buFontTx/>
+              <a:buNone/>
+              <a:tabLst/>
+              <a:defRPr/>
+            </a:pPr>
+            <a:r>
+              <a:rPr kumimoji="0" lang="en-US" sz="5400" b="1" i="0" u="none" strike="noStrike" kern="1200" cap="none" spc="0" normalizeH="0" baseline="0" noProof="0" dirty="0" smtClean="0">
+                <a:ln>
+                  <a:noFill/>
+                </a:ln>
+                <a:gradFill>
+                  <a:gsLst>
+                    <a:gs pos="50000">
+                      <a:schemeClr val="tx1">
+                        <a:lumMod val="65000"/>
+                        <a:lumOff val="35000"/>
+                      </a:schemeClr>
+                    </a:gs>
+                    <a:gs pos="100000">
+                      <a:schemeClr val="tx1">
+                        <a:lumMod val="85000"/>
+                        <a:lumOff val="15000"/>
+                      </a:schemeClr>
+                    </a:gs>
+                  </a:gsLst>
+                  <a:lin ang="5400000" scaled="0"/>
+                </a:gradFill>
+                <a:effectLst/>
+                <a:uLnTx/>
+                <a:uFillTx/>
+                <a:latin typeface="+mj-lt"/>
+                <a:ea typeface="+mj-ea"/>
+                <a:cs typeface="+mj-cs"/>
+              </a:rPr>
+              <a:t>About Me</a:t>
+            </a:r>
+            <a:endParaRPr kumimoji="0" lang="en-US" sz="5400" b="1" i="0" u="none" strike="noStrike" kern="1200" cap="none" spc="0" normalizeH="0" baseline="0" noProof="0" dirty="0">
+              <a:ln>
+                <a:noFill/>
+              </a:ln>
+              <a:gradFill>
+                <a:gsLst>
+                  <a:gs pos="50000">
+                    <a:schemeClr val="tx1">
+                      <a:lumMod val="65000"/>
+                      <a:lumOff val="35000"/>
+                    </a:schemeClr>
+                  </a:gs>
+                  <a:gs pos="100000">
+                    <a:schemeClr val="tx1">
+                      <a:lumMod val="85000"/>
+                      <a:lumOff val="15000"/>
+                    </a:schemeClr>
+                  </a:gs>
+                </a:gsLst>
+                <a:lin ang="5400000" scaled="0"/>
+              </a:gradFill>
+              <a:effectLst/>
+              <a:uLnTx/>
+              <a:uFillTx/>
+              <a:latin typeface="+mj-lt"/>
+              <a:ea typeface="+mj-ea"/>
+              <a:cs typeface="+mj-cs"/>
+            </a:endParaRPr>
+          </a:p>
+        </p:txBody>
+      </p:sp>
+      <p:sp>
+        <p:nvSpPr>
+          <p:cNvPr id="5" name="TextBox 4"/>
+          <p:cNvSpPr txBox="1"/>
+          <p:nvPr/>
+        </p:nvSpPr>
+        <p:spPr>
+          <a:xfrm>
+            <a:off x="396052" y="1492625"/>
+            <a:ext cx="7699544" cy="3416320"/>
+          </a:xfrm>
+          <a:prstGeom prst="rect">
+            <a:avLst/>
+          </a:prstGeom>
+          <a:noFill/>
+        </p:spPr>
+        <p:txBody>
+          <a:bodyPr wrap="none" rtlCol="0">
+            <a:spAutoFit/>
+          </a:bodyPr>
+          <a:lstStyle/>
+          <a:p>
+            <a:endParaRPr lang="en-US" sz="2400" dirty="0" smtClean="0"/>
+          </a:p>
+          <a:p>
+            <a:pPr>
+              <a:buBlip>
+                <a:blip r:embed="rId2"/>
+              </a:buBlip>
+            </a:pPr>
+            <a:r>
+              <a:rPr lang="en-US" sz="2400" dirty="0" smtClean="0"/>
+              <a:t> Nick </a:t>
+            </a:r>
+            <a:r>
+              <a:rPr lang="en-US" sz="2400" dirty="0" err="1" smtClean="0"/>
+              <a:t>Zalabak</a:t>
+            </a:r>
+            <a:endParaRPr lang="en-US" sz="2400" dirty="0" smtClean="0"/>
+          </a:p>
+          <a:p>
+            <a:pPr>
+              <a:buBlip>
+                <a:blip r:embed="rId2"/>
+              </a:buBlip>
+            </a:pPr>
+            <a:r>
+              <a:rPr lang="en-US" sz="2400" dirty="0" smtClean="0"/>
+              <a:t> My Blog: http://</a:t>
+            </a:r>
+            <a:r>
+              <a:rPr lang="en-US" sz="2400" dirty="0" err="1" smtClean="0"/>
+              <a:t>techwhizbang.com</a:t>
+            </a:r>
+            <a:endParaRPr lang="en-US" sz="2400" dirty="0" smtClean="0"/>
+          </a:p>
+          <a:p>
+            <a:pPr>
+              <a:buBlip>
+                <a:blip r:embed="rId2"/>
+              </a:buBlip>
+            </a:pPr>
+            <a:r>
+              <a:rPr lang="en-US" sz="2400" dirty="0" smtClean="0"/>
+              <a:t>Twitter: @</a:t>
+            </a:r>
+            <a:r>
+              <a:rPr lang="en-US" sz="2400" dirty="0" err="1" smtClean="0"/>
+              <a:t>techwhizbang</a:t>
+            </a:r>
+            <a:endParaRPr lang="en-US" sz="2400" dirty="0" smtClean="0"/>
+          </a:p>
+          <a:p>
+            <a:pPr>
+              <a:buBlip>
+                <a:blip r:embed="rId2"/>
+              </a:buBlip>
+            </a:pPr>
+            <a:r>
+              <a:rPr lang="en-US" sz="2400" dirty="0" smtClean="0"/>
+              <a:t>Slides and code  examples for this presentation:</a:t>
+            </a:r>
+          </a:p>
+          <a:p>
+            <a:pPr lvl="1">
+              <a:buBlip>
+                <a:blip r:embed="rId2"/>
+              </a:buBlip>
+            </a:pPr>
+            <a:r>
+              <a:rPr lang="en-US" sz="2400" dirty="0" err="1" smtClean="0"/>
+              <a:t>git@github.com:techwhizbang/sinatra_slideshow.git</a:t>
+            </a:r>
+            <a:endParaRPr lang="en-US" sz="2400" dirty="0" smtClean="0"/>
+          </a:p>
+          <a:p>
+            <a:pPr>
+              <a:buBlip>
+                <a:blip r:embed="rId2"/>
+              </a:buBlip>
+            </a:pPr>
+            <a:endParaRPr lang="en-US" sz="2400" dirty="0" smtClean="0"/>
+          </a:p>
+          <a:p>
+            <a:pPr>
+              <a:buBlip>
+                <a:blip r:embed="rId2"/>
+              </a:buBlip>
+            </a:pPr>
+            <a:endParaRPr lang="en-US" sz="2400" dirty="0" smtClean="0"/>
+          </a:p>
+          <a:p>
+            <a:pPr>
+              <a:buBlip>
+                <a:blip r:embed="rId2"/>
+              </a:buBlip>
+            </a:pPr>
+            <a:endParaRPr lang="en-US" sz="2400" dirty="0"/>
+          </a:p>
+        </p:txBody>
+      </p:sp>
+    </p:spTree>
+  </p:cSld>
+  <p:clrMapOvr>
+    <a:masterClrMapping/>
+  </p:clrMapOvr>
+  <p:timing>
+    <p:tnLst>
+      <p:par>
+        <p:cTn id="1" dur="indefinite" restart="never" nodeType="tmRoot"/>
+      </p:par>
+    </p:tnLst>
+  </p:timing>
+</p:sld>
+</file>
+
+<file path=ppt/slides/slide3.xml><?xml version="1.0" encoding="utf-8"?>
+<p:sld xmlns:a="http://schemas.openxmlformats.org/drawingml/2006/main" xmlns:r="http://schemas.openxmlformats.org/officeDocument/2006/relationships" xmlns:mc="http://schemas.openxmlformats.org/markup-compatibility/2006" xmlns:mv="urn:schemas-microsoft-com:mac:vml" xmlns:p="http://schemas.openxmlformats.org/presentationml/2006/main" mc:Ignorable="mv" mc:PreserveAttributes="mv:*">
+  <p:cSld>
+    <p:spTree>
+      <p:nvGrpSpPr>
+        <p:cNvPr id="1" name=""/>
+        <p:cNvGrpSpPr/>
+        <p:nvPr/>
+      </p:nvGrpSpPr>
+      <p:grpSpPr>
+        <a:xfrm>
+          <a:off x="0" y="0"/>
+          <a:ext cx="0" cy="0"/>
+          <a:chOff x="0" y="0"/>
+          <a:chExt cx="0" cy="0"/>
+        </a:xfrm>
+      </p:grpSpPr>
+      <p:sp>
+        <p:nvSpPr>
+          <p:cNvPr id="2" name="Title 1"/>
+          <p:cNvSpPr>
+            <a:spLocks noGrp="1"/>
+          </p:cNvSpPr>
+          <p:nvPr>
+            <p:ph type="title"/>
+          </p:nvPr>
+        </p:nvSpPr>
+        <p:spPr/>
+        <p:txBody>
+          <a:bodyPr/>
+          <a:lstStyle/>
+          <a:p>
+            <a:r>
+              <a:rPr lang="en-US" dirty="0" smtClean="0"/>
+              <a:t>Overview</a:t>
+            </a:r>
+            <a:endParaRPr lang="en-US" dirty="0"/>
+          </a:p>
+        </p:txBody>
+      </p:sp>
+      <p:sp>
+        <p:nvSpPr>
+          <p:cNvPr id="5" name="TextBox 4"/>
+          <p:cNvSpPr txBox="1"/>
+          <p:nvPr/>
+        </p:nvSpPr>
+        <p:spPr>
+          <a:xfrm>
+            <a:off x="396052" y="1492625"/>
+            <a:ext cx="7904728" cy="4524315"/>
+          </a:xfrm>
+          <a:prstGeom prst="rect">
+            <a:avLst/>
+          </a:prstGeom>
+          <a:noFill/>
+        </p:spPr>
+        <p:txBody>
+          <a:bodyPr wrap="none" rtlCol="0">
+            <a:spAutoFit/>
+          </a:bodyPr>
+          <a:lstStyle/>
+          <a:p>
+            <a:endParaRPr lang="en-US" sz="2400" dirty="0" smtClean="0"/>
+          </a:p>
+          <a:p>
+            <a:pPr>
+              <a:buBlip>
+                <a:blip r:embed="rId2"/>
+              </a:buBlip>
+            </a:pPr>
+            <a:r>
+              <a:rPr lang="en-US" sz="2400" dirty="0" smtClean="0"/>
+              <a:t> Sinatra is a </a:t>
+            </a:r>
+            <a:r>
+              <a:rPr lang="en-US" sz="2400" dirty="0" err="1" smtClean="0"/>
+              <a:t>RESTful</a:t>
+            </a:r>
+            <a:r>
+              <a:rPr lang="en-US" sz="2400" dirty="0" smtClean="0"/>
+              <a:t> “</a:t>
+            </a:r>
+            <a:r>
+              <a:rPr lang="en-US" sz="2400" dirty="0" err="1" smtClean="0"/>
+              <a:t>microframework</a:t>
+            </a:r>
+            <a:r>
+              <a:rPr lang="en-US" sz="2400" dirty="0" smtClean="0"/>
+              <a:t>” built on Rack</a:t>
+            </a:r>
+          </a:p>
+          <a:p>
+            <a:pPr>
+              <a:buBlip>
+                <a:blip r:embed="rId2"/>
+              </a:buBlip>
+            </a:pPr>
+            <a:r>
+              <a:rPr lang="en-US" sz="2400" dirty="0" smtClean="0"/>
+              <a:t> Easy and practical</a:t>
+            </a:r>
+          </a:p>
+          <a:p>
+            <a:pPr>
+              <a:buBlip>
+                <a:blip r:embed="rId2"/>
+              </a:buBlip>
+            </a:pPr>
+            <a:r>
+              <a:rPr lang="en-US" sz="2400" dirty="0" smtClean="0"/>
+              <a:t> Straightforward to test (</a:t>
+            </a:r>
+            <a:r>
+              <a:rPr lang="en-US" sz="2400" dirty="0" err="1" smtClean="0"/>
+              <a:t>Rspec</a:t>
+            </a:r>
+            <a:r>
+              <a:rPr lang="en-US" sz="2400" dirty="0" smtClean="0"/>
+              <a:t> &amp; </a:t>
+            </a:r>
+            <a:r>
+              <a:rPr lang="en-US" sz="2400" dirty="0" err="1" smtClean="0"/>
+              <a:t>TestUnit</a:t>
+            </a:r>
+            <a:r>
+              <a:rPr lang="en-US" sz="2400" dirty="0" smtClean="0"/>
+              <a:t>)</a:t>
+            </a:r>
+          </a:p>
+          <a:p>
+            <a:pPr>
+              <a:buBlip>
+                <a:blip r:embed="rId2"/>
+              </a:buBlip>
+            </a:pPr>
+            <a:r>
+              <a:rPr lang="en-US" sz="2400" dirty="0" smtClean="0"/>
+              <a:t> Made with extensibility in mind</a:t>
+            </a:r>
+          </a:p>
+          <a:p>
+            <a:pPr>
+              <a:buBlip>
+                <a:blip r:embed="rId2"/>
+              </a:buBlip>
+            </a:pPr>
+            <a:r>
+              <a:rPr lang="en-US" sz="2400" dirty="0" smtClean="0"/>
+              <a:t> Not </a:t>
+            </a:r>
+            <a:r>
+              <a:rPr lang="en-US" sz="2400" dirty="0" err="1" smtClean="0"/>
+              <a:t>crufty</a:t>
+            </a:r>
+            <a:r>
+              <a:rPr lang="en-US" sz="2400" dirty="0" smtClean="0"/>
+              <a:t> or bloated like larger web frameworks</a:t>
+            </a:r>
+          </a:p>
+          <a:p>
+            <a:pPr>
+              <a:buBlip>
+                <a:blip r:embed="rId2"/>
+              </a:buBlip>
+            </a:pPr>
+            <a:r>
+              <a:rPr lang="en-US" sz="2400" dirty="0" smtClean="0"/>
+              <a:t> Small memory footprint as compared to </a:t>
+            </a:r>
+            <a:r>
+              <a:rPr lang="en-US" sz="2400" i="1" dirty="0" smtClean="0"/>
+              <a:t>other</a:t>
+            </a:r>
+            <a:r>
+              <a:rPr lang="en-US" sz="2400" dirty="0" smtClean="0"/>
+              <a:t> frameworks</a:t>
+            </a:r>
+          </a:p>
+          <a:p>
+            <a:pPr>
+              <a:buBlip>
+                <a:blip r:embed="rId2"/>
+              </a:buBlip>
+            </a:pPr>
+            <a:r>
+              <a:rPr lang="en-US" sz="2400" dirty="0" smtClean="0"/>
+              <a:t> On par performance-wise to </a:t>
+            </a:r>
+            <a:r>
+              <a:rPr lang="en-US" sz="2400" i="1" dirty="0" smtClean="0"/>
+              <a:t>other </a:t>
+            </a:r>
+            <a:r>
+              <a:rPr lang="en-US" sz="2400" dirty="0" smtClean="0"/>
+              <a:t>frameworks</a:t>
+            </a:r>
+          </a:p>
+          <a:p>
+            <a:pPr>
+              <a:buBlip>
+                <a:blip r:embed="rId2"/>
+              </a:buBlip>
+            </a:pPr>
+            <a:r>
+              <a:rPr lang="en-US" sz="2400" dirty="0" smtClean="0"/>
+              <a:t> Works well with many web servers</a:t>
+            </a:r>
+          </a:p>
+          <a:p>
+            <a:pPr>
+              <a:buBlip>
+                <a:blip r:embed="rId2"/>
+              </a:buBlip>
+            </a:pPr>
+            <a:r>
+              <a:rPr lang="en-US" sz="2400" dirty="0" smtClean="0"/>
+              <a:t> Works great with </a:t>
+            </a:r>
+            <a:r>
+              <a:rPr lang="en-US" sz="2400" dirty="0" err="1" smtClean="0"/>
+              <a:t>JRuby</a:t>
+            </a:r>
+            <a:endParaRPr lang="en-US" sz="2400" dirty="0" smtClean="0"/>
+          </a:p>
+          <a:p>
+            <a:pPr>
+              <a:buBlip>
+                <a:blip r:embed="rId2"/>
+              </a:buBlip>
+            </a:pPr>
+            <a:endParaRPr lang="en-US" sz="2400" dirty="0" smtClean="0"/>
+          </a:p>
+          <a:p>
+            <a:pPr>
+              <a:buBlip>
+                <a:blip r:embed="rId2"/>
+              </a:buBlip>
+            </a:pPr>
+            <a:endParaRPr lang="en-US" sz="2400" dirty="0"/>
+          </a:p>
+        </p:txBody>
+      </p:sp>
+    </p:spTree>
+  </p:cSld>
+  <p:clrMapOvr>
+    <a:masterClrMapping/>
+  </p:clrMapOvr>
+  <p:timing>
+    <p:tnLst>
+      <p:par>
+        <p:cTn id="1" dur="indefinite" restart="never" nodeType="tmRoot"/>
+      </p:par>
+    </p:tnLst>
+  </p:timing>
+</p:sld>
+</file>
+
+<file path=ppt/slides/slide4.xml><?xml version="1.0" encoding="utf-8"?>
+<p:sld xmlns:a="http://schemas.openxmlformats.org/drawingml/2006/main" xmlns:r="http://schemas.openxmlformats.org/officeDocument/2006/relationships" xmlns:mc="http://schemas.openxmlformats.org/markup-compatibility/2006" xmlns:mv="urn:schemas-microsoft-com:mac:vml" xmlns:p="http://schemas.openxmlformats.org/presentationml/2006/main" mc:Ignorable="mv" mc:PreserveAttributes="mv:*">
+  <p:cSld>
+    <p:spTree>
+      <p:nvGrpSpPr>
+        <p:cNvPr id="1" name=""/>
+        <p:cNvGrpSpPr/>
+        <p:nvPr/>
+      </p:nvGrpSpPr>
+      <p:grpSpPr>
+        <a:xfrm>
+          <a:off x="0" y="0"/>
+          <a:ext cx="0" cy="0"/>
+          <a:chOff x="0" y="0"/>
+          <a:chExt cx="0" cy="0"/>
+        </a:xfrm>
+      </p:grpSpPr>
+      <p:sp>
+        <p:nvSpPr>
+          <p:cNvPr id="2" name="Title 1"/>
+          <p:cNvSpPr>
+            <a:spLocks noGrp="1"/>
+          </p:cNvSpPr>
+          <p:nvPr>
+            <p:ph type="title"/>
+          </p:nvPr>
+        </p:nvSpPr>
+        <p:spPr/>
+        <p:txBody>
+          <a:bodyPr/>
+          <a:lstStyle/>
+          <a:p>
+            <a:r>
+              <a:rPr lang="en-US" dirty="0" smtClean="0"/>
+              <a:t>Sinatra 101</a:t>
+            </a:r>
+            <a:endParaRPr lang="en-US" dirty="0"/>
+          </a:p>
+        </p:txBody>
+      </p:sp>
+      <p:sp>
+        <p:nvSpPr>
+          <p:cNvPr id="3" name="TextBox 2"/>
+          <p:cNvSpPr txBox="1"/>
+          <p:nvPr/>
+        </p:nvSpPr>
+        <p:spPr>
+          <a:xfrm>
+            <a:off x="396052" y="1492625"/>
+            <a:ext cx="7738016" cy="4154983"/>
+          </a:xfrm>
+          <a:prstGeom prst="rect">
+            <a:avLst/>
+          </a:prstGeom>
+          <a:noFill/>
+        </p:spPr>
+        <p:txBody>
+          <a:bodyPr wrap="none" rtlCol="0">
+            <a:spAutoFit/>
+          </a:bodyPr>
+          <a:lstStyle/>
+          <a:p>
+            <a:endParaRPr lang="en-US" sz="2400" dirty="0" smtClean="0"/>
+          </a:p>
+          <a:p>
+            <a:pPr>
+              <a:buBlip>
+                <a:blip r:embed="rId3"/>
+              </a:buBlip>
+            </a:pPr>
+            <a:r>
+              <a:rPr lang="en-US" sz="2400" dirty="0" smtClean="0"/>
+              <a:t> Sinatra is mostly a DSL</a:t>
+            </a:r>
+          </a:p>
+          <a:p>
+            <a:pPr>
+              <a:buBlip>
+                <a:blip r:embed="rId3"/>
+              </a:buBlip>
+            </a:pPr>
+            <a:r>
+              <a:rPr lang="en-US" sz="2400" dirty="0" smtClean="0"/>
+              <a:t> The DSL routing conforms to GET, POST, PUT, DELETE</a:t>
+            </a:r>
+          </a:p>
+          <a:p>
+            <a:pPr>
+              <a:buBlip>
+                <a:blip r:embed="rId3"/>
+              </a:buBlip>
+            </a:pPr>
+            <a:r>
+              <a:rPr lang="en-US" sz="2400" dirty="0" smtClean="0"/>
+              <a:t> Works with all your favorite Ruby </a:t>
+            </a:r>
+            <a:r>
+              <a:rPr lang="en-US" sz="2400" dirty="0" err="1" smtClean="0"/>
+              <a:t>templating</a:t>
+            </a:r>
+            <a:r>
+              <a:rPr lang="en-US" sz="2400" dirty="0" smtClean="0"/>
+              <a:t> libraries</a:t>
+            </a:r>
+          </a:p>
+          <a:p>
+            <a:pPr lvl="1">
+              <a:buBlip>
+                <a:blip r:embed="rId3"/>
+              </a:buBlip>
+            </a:pPr>
+            <a:r>
+              <a:rPr lang="en-US" sz="2400" dirty="0" err="1" smtClean="0"/>
+              <a:t>Haml</a:t>
+            </a:r>
+            <a:r>
+              <a:rPr lang="en-US" sz="2400" dirty="0" smtClean="0"/>
+              <a:t>, Sass, </a:t>
+            </a:r>
+            <a:r>
+              <a:rPr lang="en-US" sz="2400" dirty="0" err="1" smtClean="0"/>
+              <a:t>Erb</a:t>
+            </a:r>
+            <a:r>
+              <a:rPr lang="en-US" sz="2400" dirty="0" smtClean="0"/>
+              <a:t>, </a:t>
+            </a:r>
+            <a:r>
+              <a:rPr lang="en-US" sz="2400" dirty="0" err="1" smtClean="0"/>
+              <a:t>Erubis</a:t>
+            </a:r>
+            <a:r>
+              <a:rPr lang="en-US" sz="2400" dirty="0" smtClean="0"/>
+              <a:t>, Builder</a:t>
+            </a:r>
+          </a:p>
+          <a:p>
+            <a:pPr>
+              <a:buBlip>
+                <a:blip r:embed="rId3"/>
+              </a:buBlip>
+            </a:pPr>
+            <a:r>
+              <a:rPr lang="en-US" sz="2400" dirty="0" smtClean="0"/>
+              <a:t> URI definition should look similar to Rails</a:t>
+            </a:r>
+          </a:p>
+          <a:p>
+            <a:pPr>
+              <a:buBlip>
+                <a:blip r:embed="rId3"/>
+              </a:buBlip>
+            </a:pPr>
+            <a:r>
+              <a:rPr lang="en-US" sz="2400" dirty="0" smtClean="0"/>
+              <a:t> Has before and after filters similar to Rails</a:t>
+            </a:r>
+          </a:p>
+          <a:p>
+            <a:pPr>
+              <a:buBlip>
+                <a:blip r:embed="rId3"/>
+              </a:buBlip>
+            </a:pPr>
+            <a:r>
+              <a:rPr lang="en-US" sz="2400" dirty="0" smtClean="0"/>
+              <a:t> DSL configuration</a:t>
+            </a:r>
+          </a:p>
+          <a:p>
+            <a:pPr>
+              <a:buBlip>
+                <a:blip r:embed="rId3"/>
+              </a:buBlip>
+            </a:pPr>
+            <a:r>
+              <a:rPr lang="en-US" sz="2400" dirty="0" smtClean="0"/>
+              <a:t> Handles all typical response codes and mime types nicely</a:t>
+            </a:r>
+          </a:p>
+          <a:p>
+            <a:pPr>
+              <a:buBlip>
+                <a:blip r:embed="rId3"/>
+              </a:buBlip>
+            </a:pPr>
+            <a:r>
+              <a:rPr lang="en-US" sz="2400" dirty="0" smtClean="0"/>
+              <a:t> Let’s take a look at a very basic standalone app</a:t>
+            </a:r>
+          </a:p>
+          <a:p>
+            <a:pPr>
+              <a:buBlip>
+                <a:blip r:embed="rId3"/>
+              </a:buBlip>
+            </a:pPr>
+            <a:endParaRPr lang="en-US" sz="2400" dirty="0"/>
+          </a:p>
+        </p:txBody>
+      </p:sp>
+    </p:spTree>
+  </p:cSld>
+  <p:clrMapOvr>
+    <a:masterClrMapping/>
+  </p:clrMapOvr>
+  <p:timing>
+    <p:tnLst>
+      <p:par>
+        <p:cTn id="1" dur="indefinite" restart="never" nodeType="tmRoot"/>
+      </p:par>
+    </p:tnLst>
+  </p:timing>
+</p:sld>
+</file>
+
+<file path=ppt/slides/slide5.xml><?xml version="1.0" encoding="utf-8"?>
+<p:sld xmlns:a="http://schemas.openxmlformats.org/drawingml/2006/main" xmlns:r="http://schemas.openxmlformats.org/officeDocument/2006/relationships" xmlns:mc="http://schemas.openxmlformats.org/markup-compatibility/2006" xmlns:mv="urn:schemas-microsoft-com:mac:vml" xmlns:p="http://schemas.openxmlformats.org/presentationml/2006/main" mc:Ignorable="mv" mc:PreserveAttributes="mv:*">
+  <p:cSld>
+    <p:spTree>
+      <p:nvGrpSpPr>
+        <p:cNvPr id="1" name=""/>
+        <p:cNvGrpSpPr/>
+        <p:nvPr/>
+      </p:nvGrpSpPr>
+      <p:grpSpPr>
+        <a:xfrm>
+          <a:off x="0" y="0"/>
+          <a:ext cx="0" cy="0"/>
+          <a:chOff x="0" y="0"/>
+          <a:chExt cx="0" cy="0"/>
+        </a:xfrm>
+      </p:grpSpPr>
+      <p:sp>
+        <p:nvSpPr>
+          <p:cNvPr id="2" name="Title 1"/>
+          <p:cNvSpPr>
+            <a:spLocks noGrp="1"/>
+          </p:cNvSpPr>
+          <p:nvPr>
+            <p:ph type="title"/>
+          </p:nvPr>
+        </p:nvSpPr>
+        <p:spPr/>
+        <p:txBody>
+          <a:bodyPr/>
+          <a:lstStyle/>
+          <a:p>
+            <a:r>
+              <a:rPr lang="en-US" dirty="0" smtClean="0"/>
+              <a:t>Ways to ‘start’ Sinatra</a:t>
+            </a:r>
+            <a:endParaRPr lang="en-US" dirty="0"/>
+          </a:p>
+        </p:txBody>
+      </p:sp>
+      <p:sp>
+        <p:nvSpPr>
+          <p:cNvPr id="3" name="TextBox 2"/>
+          <p:cNvSpPr txBox="1"/>
+          <p:nvPr/>
+        </p:nvSpPr>
+        <p:spPr>
+          <a:xfrm>
+            <a:off x="1392844" y="1492625"/>
+            <a:ext cx="6420754" cy="1200328"/>
+          </a:xfrm>
+          <a:prstGeom prst="rect">
+            <a:avLst/>
+          </a:prstGeom>
+          <a:noFill/>
+        </p:spPr>
+        <p:txBody>
+          <a:bodyPr wrap="square" rtlCol="0">
+            <a:spAutoFit/>
+          </a:bodyPr>
+          <a:lstStyle/>
+          <a:p>
+            <a:endParaRPr lang="en-US" sz="2400" dirty="0" smtClean="0"/>
+          </a:p>
+          <a:p>
+            <a:pPr>
+              <a:buBlip>
+                <a:blip r:embed="rId2"/>
+              </a:buBlip>
+            </a:pPr>
+            <a:r>
+              <a:rPr lang="en-US" sz="2400" dirty="0" smtClean="0"/>
+              <a:t> Use a </a:t>
+            </a:r>
+            <a:r>
+              <a:rPr lang="en-US" sz="2400" dirty="0" err="1" smtClean="0"/>
+              <a:t>Rackup</a:t>
+            </a:r>
+            <a:r>
+              <a:rPr lang="en-US" sz="2400" dirty="0" smtClean="0"/>
+              <a:t> file - </a:t>
+            </a:r>
+            <a:r>
+              <a:rPr lang="en-US" sz="2400" dirty="0" err="1" smtClean="0"/>
+              <a:t>config.ru</a:t>
+            </a:r>
+            <a:endParaRPr lang="en-US" sz="2400" dirty="0" smtClean="0"/>
+          </a:p>
+          <a:p>
+            <a:pPr>
+              <a:buBlip>
+                <a:blip r:embed="rId2"/>
+              </a:buBlip>
+            </a:pPr>
+            <a:r>
+              <a:rPr lang="en-US" sz="2400" dirty="0" smtClean="0"/>
+              <a:t> Standalone mode - ruby </a:t>
+            </a:r>
+            <a:r>
+              <a:rPr lang="en-US" sz="2400" dirty="0" err="1" smtClean="0"/>
+              <a:t>your_sinatra_app.rb</a:t>
+            </a:r>
+            <a:endParaRPr lang="en-US" sz="2400" dirty="0" smtClean="0"/>
+          </a:p>
+        </p:txBody>
+      </p:sp>
+    </p:spTree>
+  </p:cSld>
+  <p:clrMapOvr>
+    <a:masterClrMapping/>
+  </p:clrMapOvr>
+  <p:timing>
+    <p:tnLst>
+      <p:par>
+        <p:cTn id="1" dur="indefinite" restart="never" nodeType="tmRoot"/>
+      </p:par>
+    </p:tnLst>
+  </p:timing>
+</p:sld>
+</file>
+
+<file path=ppt/slides/slide6.xml><?xml version="1.0" encoding="utf-8"?>
+<p:sld xmlns:a="http://schemas.openxmlformats.org/drawingml/2006/main" xmlns:r="http://schemas.openxmlformats.org/officeDocument/2006/relationships" xmlns:mc="http://schemas.openxmlformats.org/markup-compatibility/2006" xmlns:mv="urn:schemas-microsoft-com:mac:vml" xmlns:p="http://schemas.openxmlformats.org/presentationml/2006/main" mc:Ignorable="mv" mc:PreserveAttributes="mv:*">
+  <p:cSld>
+    <p:spTree>
+      <p:nvGrpSpPr>
+        <p:cNvPr id="1" name=""/>
+        <p:cNvGrpSpPr/>
+        <p:nvPr/>
+      </p:nvGrpSpPr>
+      <p:grpSpPr>
+        <a:xfrm>
+          <a:off x="0" y="0"/>
+          <a:ext cx="0" cy="0"/>
+          <a:chOff x="0" y="0"/>
+          <a:chExt cx="0" cy="0"/>
+        </a:xfrm>
+      </p:grpSpPr>
+      <p:sp>
+        <p:nvSpPr>
+          <p:cNvPr id="2" name="Title 1"/>
+          <p:cNvSpPr>
+            <a:spLocks noGrp="1"/>
+          </p:cNvSpPr>
+          <p:nvPr>
+            <p:ph type="title"/>
+          </p:nvPr>
+        </p:nvSpPr>
+        <p:spPr/>
+        <p:txBody>
+          <a:bodyPr/>
+          <a:lstStyle/>
+          <a:p>
+            <a:r>
+              <a:rPr lang="en-US" dirty="0" err="1" smtClean="0"/>
+              <a:t>Rspec</a:t>
+            </a:r>
+            <a:r>
+              <a:rPr lang="en-US" dirty="0" smtClean="0"/>
+              <a:t> and Sinatra</a:t>
+            </a:r>
+            <a:endParaRPr lang="en-US" dirty="0"/>
+          </a:p>
+        </p:txBody>
+      </p:sp>
+      <p:sp>
+        <p:nvSpPr>
+          <p:cNvPr id="3" name="TextBox 2"/>
+          <p:cNvSpPr txBox="1"/>
+          <p:nvPr/>
+        </p:nvSpPr>
+        <p:spPr>
+          <a:xfrm>
+            <a:off x="1392844" y="1492625"/>
+            <a:ext cx="6420754" cy="1200328"/>
+          </a:xfrm>
+          <a:prstGeom prst="rect">
+            <a:avLst/>
+          </a:prstGeom>
+          <a:noFill/>
+        </p:spPr>
+        <p:txBody>
+          <a:bodyPr wrap="square" rtlCol="0">
+            <a:spAutoFit/>
+          </a:bodyPr>
+          <a:lstStyle/>
+          <a:p>
+            <a:endParaRPr lang="en-US" sz="2400" dirty="0" smtClean="0"/>
+          </a:p>
+          <a:p>
+            <a:pPr>
+              <a:buBlip>
+                <a:blip r:embed="rId2"/>
+              </a:buBlip>
+            </a:pPr>
+            <a:r>
+              <a:rPr lang="en-US" sz="2400" dirty="0" smtClean="0"/>
+              <a:t> Use a </a:t>
+            </a:r>
+            <a:r>
+              <a:rPr lang="en-US" sz="2400" dirty="0" err="1" smtClean="0"/>
+              <a:t>Rackup</a:t>
+            </a:r>
+            <a:r>
+              <a:rPr lang="en-US" sz="2400" dirty="0" smtClean="0"/>
+              <a:t> file - </a:t>
+            </a:r>
+            <a:r>
+              <a:rPr lang="en-US" sz="2400" dirty="0" err="1" smtClean="0"/>
+              <a:t>config.ru</a:t>
+            </a:r>
+            <a:endParaRPr lang="en-US" sz="2400" dirty="0" smtClean="0"/>
+          </a:p>
+          <a:p>
+            <a:pPr>
+              <a:buBlip>
+                <a:blip r:embed="rId2"/>
+              </a:buBlip>
+            </a:pPr>
+            <a:r>
+              <a:rPr lang="en-US" sz="2400" dirty="0" smtClean="0"/>
+              <a:t> Standalone mode - ruby </a:t>
+            </a:r>
+            <a:r>
+              <a:rPr lang="en-US" sz="2400" dirty="0" err="1" smtClean="0"/>
+              <a:t>your_sinatra_app.rb</a:t>
+            </a:r>
+            <a:endParaRPr lang="en-US" sz="2400" dirty="0" smtClean="0"/>
+          </a:p>
+        </p:txBody>
+      </p:sp>
+    </p:spTree>
+  </p:cSld>
+  <p:clrMapOvr>
+    <a:masterClrMapping/>
+  </p:clrMapOvr>
+  <p:timing>
+    <p:tnLst>
+      <p:par>
+        <p:cTn id="1" dur="indefinite" restart="never" nodeType="tmRoot"/>
+      </p:par>
+    </p:tnLst>
+  </p:timing>
+</p:sld>
+</file>
+
+<file path=ppt/slides/slide7.xml><?xml version="1.0" encoding="utf-8"?>
+<p:sld xmlns:a="http://schemas.openxmlformats.org/drawingml/2006/main" xmlns:r="http://schemas.openxmlformats.org/officeDocument/2006/relationships" xmlns:mc="http://schemas.openxmlformats.org/markup-compatibility/2006" xmlns:mv="urn:schemas-microsoft-com:mac:vml" xmlns:p="http://schemas.openxmlformats.org/presentationml/2006/main" mc:Ignorable="mv" mc:PreserveAttributes="mv:*">
+  <p:cSld>
+    <p:spTree>
+      <p:nvGrpSpPr>
+        <p:cNvPr id="1" name=""/>
+        <p:cNvGrpSpPr/>
+        <p:nvPr/>
+      </p:nvGrpSpPr>
+      <p:grpSpPr>
+        <a:xfrm>
+          <a:off x="0" y="0"/>
+          <a:ext cx="0" cy="0"/>
+          <a:chOff x="0" y="0"/>
+          <a:chExt cx="0" cy="0"/>
+        </a:xfrm>
+      </p:grpSpPr>
+      <p:sp>
+        <p:nvSpPr>
+          <p:cNvPr id="2" name="Title 1"/>
+          <p:cNvSpPr>
+            <a:spLocks noGrp="1"/>
+          </p:cNvSpPr>
+          <p:nvPr>
+            <p:ph type="title"/>
+          </p:nvPr>
+        </p:nvSpPr>
+        <p:spPr/>
+        <p:txBody>
+          <a:bodyPr/>
+          <a:lstStyle/>
+          <a:p>
+            <a:r>
+              <a:rPr lang="en-US" dirty="0" err="1" smtClean="0"/>
+              <a:t>TestUnit</a:t>
+            </a:r>
+            <a:r>
+              <a:rPr lang="en-US" dirty="0" smtClean="0"/>
+              <a:t> and Sinatra</a:t>
+            </a:r>
+            <a:endParaRPr lang="en-US" dirty="0"/>
+          </a:p>
+        </p:txBody>
+      </p:sp>
+      <p:sp>
+        <p:nvSpPr>
+          <p:cNvPr id="3" name="TextBox 2"/>
+          <p:cNvSpPr txBox="1"/>
+          <p:nvPr/>
+        </p:nvSpPr>
+        <p:spPr>
+          <a:xfrm>
+            <a:off x="1392844" y="1492625"/>
+            <a:ext cx="6420754" cy="1200328"/>
+          </a:xfrm>
+          <a:prstGeom prst="rect">
+            <a:avLst/>
+          </a:prstGeom>
+          <a:noFill/>
+        </p:spPr>
+        <p:txBody>
+          <a:bodyPr wrap="square" rtlCol="0">
+            <a:spAutoFit/>
+          </a:bodyPr>
+          <a:lstStyle/>
+          <a:p>
+            <a:endParaRPr lang="en-US" sz="2400" dirty="0" smtClean="0"/>
+          </a:p>
+          <a:p>
+            <a:pPr>
+              <a:buBlip>
+                <a:blip r:embed="rId2"/>
+              </a:buBlip>
+            </a:pPr>
+            <a:r>
+              <a:rPr lang="en-US" sz="2400" dirty="0" smtClean="0"/>
+              <a:t> Use a </a:t>
+            </a:r>
+            <a:r>
+              <a:rPr lang="en-US" sz="2400" dirty="0" err="1" smtClean="0"/>
+              <a:t>Rackup</a:t>
+            </a:r>
+            <a:r>
+              <a:rPr lang="en-US" sz="2400" dirty="0" smtClean="0"/>
+              <a:t> file - </a:t>
+            </a:r>
+            <a:r>
+              <a:rPr lang="en-US" sz="2400" dirty="0" err="1" smtClean="0"/>
+              <a:t>config.ru</a:t>
+            </a:r>
+            <a:endParaRPr lang="en-US" sz="2400" dirty="0" smtClean="0"/>
+          </a:p>
+          <a:p>
+            <a:pPr>
+              <a:buBlip>
+                <a:blip r:embed="rId2"/>
+              </a:buBlip>
+            </a:pPr>
+            <a:r>
+              <a:rPr lang="en-US" sz="2400" dirty="0" smtClean="0"/>
+              <a:t> Standalone mode - ruby </a:t>
+            </a:r>
+            <a:r>
+              <a:rPr lang="en-US" sz="2400" dirty="0" err="1" smtClean="0"/>
+              <a:t>your_sinatra_app.rb</a:t>
+            </a:r>
+            <a:endParaRPr lang="en-US" sz="2400" dirty="0" smtClean="0"/>
+          </a:p>
+        </p:txBody>
+      </p:sp>
+    </p:spTree>
+  </p:cSld>
+  <p:clrMapOvr>
+    <a:masterClrMapping/>
+  </p:clrMapOvr>
+  <p:timing>
+    <p:tnLst>
+      <p:par>
+        <p:cTn id="1" dur="indefinite" restart="never" nodeType="tmRoot"/>
+      </p:par>
+    </p:tnLst>
+  </p:timing>
+</p:sld>
+</file>
+
+<file path=ppt/slides/slide8.xml><?xml version="1.0" encoding="utf-8"?>
+<p:sld xmlns:a="http://schemas.openxmlformats.org/drawingml/2006/main" xmlns:r="http://schemas.openxmlformats.org/officeDocument/2006/relationships" xmlns:mc="http://schemas.openxmlformats.org/markup-compatibility/2006" xmlns:mv="urn:schemas-microsoft-com:mac:vml" xmlns:p="http://schemas.openxmlformats.org/presentationml/2006/main" mc:Ignorable="mv" mc:PreserveAttributes="mv:*">
+  <p:cSld>
+    <p:spTree>
+      <p:nvGrpSpPr>
+        <p:cNvPr id="1" name=""/>
+        <p:cNvGrpSpPr/>
+        <p:nvPr/>
+      </p:nvGrpSpPr>
+      <p:grpSpPr>
+        <a:xfrm>
+          <a:off x="0" y="0"/>
+          <a:ext cx="0" cy="0"/>
+          <a:chOff x="0" y="0"/>
+          <a:chExt cx="0" cy="0"/>
+        </a:xfrm>
+      </p:grpSpPr>
+      <p:pic>
+        <p:nvPicPr>
+          <p:cNvPr id="4" name="Picture 3"/>
+          <p:cNvPicPr>
+            <a:picLocks noChangeAspect="1"/>
+          </p:cNvPicPr>
+          <p:nvPr/>
+        </p:nvPicPr>
+        <p:blipFill>
+          <a:blip r:embed="rId3">
+            <a:alphaModFix amt="30000"/>
+          </a:blip>
+          <a:stretch>
+            <a:fillRect/>
+          </a:stretch>
+        </p:blipFill>
+        <p:spPr>
+          <a:xfrm>
+            <a:off x="-508000" y="1492625"/>
+            <a:ext cx="10160000" cy="3505200"/>
+          </a:xfrm>
+          <a:prstGeom prst="rect">
+            <a:avLst/>
+          </a:prstGeom>
+        </p:spPr>
+      </p:pic>
+      <p:sp>
+        <p:nvSpPr>
+          <p:cNvPr id="2" name="Title 1"/>
+          <p:cNvSpPr>
+            <a:spLocks noGrp="1"/>
+          </p:cNvSpPr>
+          <p:nvPr>
+            <p:ph type="title"/>
+          </p:nvPr>
+        </p:nvSpPr>
+        <p:spPr/>
+        <p:txBody>
+          <a:bodyPr/>
+          <a:lstStyle/>
+          <a:p>
+            <a:r>
+              <a:rPr lang="en-US" dirty="0" smtClean="0"/>
+              <a:t>Sinatra + Bundler</a:t>
+            </a:r>
+            <a:endParaRPr lang="en-US" dirty="0"/>
+          </a:p>
+        </p:txBody>
+      </p:sp>
+      <p:sp>
+        <p:nvSpPr>
+          <p:cNvPr id="3" name="TextBox 2"/>
+          <p:cNvSpPr txBox="1"/>
+          <p:nvPr/>
+        </p:nvSpPr>
+        <p:spPr>
+          <a:xfrm>
+            <a:off x="1392844" y="1492625"/>
+            <a:ext cx="6420754" cy="1200328"/>
+          </a:xfrm>
+          <a:prstGeom prst="rect">
+            <a:avLst/>
+          </a:prstGeom>
+          <a:noFill/>
+        </p:spPr>
+        <p:txBody>
+          <a:bodyPr wrap="square" rtlCol="0">
+            <a:spAutoFit/>
+          </a:bodyPr>
+          <a:lstStyle/>
+          <a:p>
+            <a:endParaRPr lang="en-US" sz="2400" dirty="0" smtClean="0"/>
+          </a:p>
+          <a:p>
+            <a:pPr>
+              <a:buBlip>
+                <a:blip r:embed="rId4"/>
+              </a:buBlip>
+            </a:pPr>
+            <a:r>
+              <a:rPr lang="en-US" sz="2400" dirty="0" smtClean="0"/>
+              <a:t> </a:t>
+            </a:r>
+            <a:r>
+              <a:rPr lang="en-US" sz="2400" dirty="0" err="1" smtClean="0"/>
+              <a:t>Gemfile</a:t>
+            </a:r>
+            <a:endParaRPr lang="en-US" sz="2400" dirty="0" smtClean="0"/>
+          </a:p>
+          <a:p>
+            <a:pPr>
+              <a:buBlip>
+                <a:blip r:embed="rId4"/>
+              </a:buBlip>
+            </a:pPr>
+            <a:r>
+              <a:rPr lang="en-US" sz="2400" dirty="0" err="1" smtClean="0"/>
+              <a:t>Bundler.require_env</a:t>
+            </a:r>
+            <a:endParaRPr lang="en-US" sz="2400" dirty="0" smtClean="0"/>
+          </a:p>
+        </p:txBody>
+      </p:sp>
+    </p:spTree>
+  </p:cSld>
+  <p:clrMapOvr>
+    <a:masterClrMapping/>
+  </p:clrMapOvr>
+  <p:timing>
+    <p:tnLst>
+      <p:par>
+        <p:cTn id="1" dur="indefinite" restart="never" nodeType="tmRoot"/>
+      </p:par>
+    </p:tnLst>
+  </p:timing>
+</p:sld>
+</file>
+
 <file path=ppt/slides/slide9.xml><?xml version="1.0" encoding="utf-8"?>
 <p:sld xmlns:a="http://schemas.openxmlformats.org/drawingml/2006/main" xmlns:r="http://schemas.openxmlformats.org/officeDocument/2006/relationships" xmlns:mc="http://schemas.openxmlformats.org/markup-compatibility/2006" xmlns:mv="urn:schemas-microsoft-com:mac:vml" xmlns:p="http://schemas.openxmlformats.org/presentationml/2006/main" mc:Ignorable="mv" mc:PreserveAttributes="mv:*">
   <p:cSld>
@@ -6914,76 +7297,9 @@
           <a:p>
             <a:r>
               <a:rPr lang="en-US" dirty="0" smtClean="0"/>
-              <a:t>Load testing Sinatra</a:t>
+              <a:t>Sinatra Extensions</a:t>
             </a:r>
             <a:endParaRPr lang="en-US" dirty="0"/>
-          </a:p>
-        </p:txBody>
-      </p:sp>
-      <p:sp>
-        <p:nvSpPr>
-          <p:cNvPr id="3" name="TextBox 2"/>
-          <p:cNvSpPr txBox="1"/>
-          <p:nvPr/>
-        </p:nvSpPr>
-        <p:spPr>
-          <a:xfrm>
-            <a:off x="1392844" y="1492625"/>
-            <a:ext cx="6420754" cy="1938992"/>
-          </a:xfrm>
-          <a:prstGeom prst="rect">
-            <a:avLst/>
-          </a:prstGeom>
-          <a:noFill/>
-        </p:spPr>
-        <p:txBody>
-          <a:bodyPr wrap="square" rtlCol="0">
-            <a:spAutoFit/>
-          </a:bodyPr>
-          <a:lstStyle/>
-          <a:p>
-            <a:endParaRPr lang="en-US" sz="2400" dirty="0" smtClean="0"/>
-          </a:p>
-          <a:p>
-            <a:pPr>
-              <a:buBlip>
-                <a:blip r:embed="rId2"/>
-              </a:buBlip>
-            </a:pPr>
-            <a:r>
-              <a:rPr lang="en-US" sz="2400" dirty="0" smtClean="0"/>
-              <a:t> How does it perform under load?</a:t>
-            </a:r>
-          </a:p>
-          <a:p>
-            <a:pPr>
-              <a:buBlip>
-                <a:blip r:embed="rId2"/>
-              </a:buBlip>
-            </a:pPr>
-            <a:r>
-              <a:rPr lang="en-US" sz="2400" dirty="0" smtClean="0"/>
-              <a:t>Sinatra supports multithreading (works well with </a:t>
-            </a:r>
-            <a:r>
-              <a:rPr lang="en-US" sz="2400" dirty="0" err="1" smtClean="0"/>
-              <a:t>Jruby</a:t>
-            </a:r>
-            <a:r>
-              <a:rPr lang="en-US" sz="2400" dirty="0" smtClean="0"/>
-              <a:t>)</a:t>
-            </a:r>
-          </a:p>
-          <a:p>
-            <a:pPr>
-              <a:buBlip>
-                <a:blip r:embed="rId2"/>
-              </a:buBlip>
-            </a:pPr>
-            <a:r>
-              <a:rPr lang="en-US" sz="2400" dirty="0" smtClean="0"/>
-              <a:t> </a:t>
-            </a:r>
           </a:p>
         </p:txBody>
       </p:sp>

</xml_diff>

<commit_message>
nz: some db conn slides
</commit_message>
<xml_diff>
--- a/sinatra.pptx
+++ b/sinatra.pptx
@@ -5,24 +5,28 @@
     <p:sldMasterId id="2147483660" r:id="rId1"/>
   </p:sldMasterIdLst>
   <p:notesMasterIdLst>
-    <p:notesMasterId r:id="rId17"/>
+    <p:notesMasterId r:id="rId21"/>
   </p:notesMasterIdLst>
   <p:sldIdLst>
     <p:sldId id="256" r:id="rId2"/>
     <p:sldId id="258" r:id="rId3"/>
     <p:sldId id="257" r:id="rId4"/>
     <p:sldId id="259" r:id="rId5"/>
-    <p:sldId id="261" r:id="rId6"/>
-    <p:sldId id="269" r:id="rId7"/>
-    <p:sldId id="270" r:id="rId8"/>
-    <p:sldId id="262" r:id="rId9"/>
+    <p:sldId id="269" r:id="rId6"/>
+    <p:sldId id="275" r:id="rId7"/>
+    <p:sldId id="274" r:id="rId8"/>
+    <p:sldId id="261" r:id="rId9"/>
     <p:sldId id="265" r:id="rId10"/>
-    <p:sldId id="260" r:id="rId11"/>
-    <p:sldId id="263" r:id="rId12"/>
-    <p:sldId id="264" r:id="rId13"/>
-    <p:sldId id="266" r:id="rId14"/>
-    <p:sldId id="267" r:id="rId15"/>
-    <p:sldId id="268" r:id="rId16"/>
+    <p:sldId id="273" r:id="rId11"/>
+    <p:sldId id="262" r:id="rId12"/>
+    <p:sldId id="260" r:id="rId13"/>
+    <p:sldId id="263" r:id="rId14"/>
+    <p:sldId id="264" r:id="rId15"/>
+    <p:sldId id="266" r:id="rId16"/>
+    <p:sldId id="271" r:id="rId17"/>
+    <p:sldId id="267" r:id="rId18"/>
+    <p:sldId id="268" r:id="rId19"/>
+    <p:sldId id="272" r:id="rId20"/>
   </p:sldIdLst>
   <p:sldSz cx="9144000" cy="6858000" type="screen4x3"/>
   <p:notesSz cx="6858000" cy="9144000"/>
@@ -207,7 +211,7 @@
             <a:fld id="{FEBA1754-3910-A94B-AF97-8DE201D32E78}" type="datetimeFigureOut">
               <a:rPr lang="en-US" smtClean="0"/>
               <a:pPr/>
-              <a:t>8/7/10</a:t>
+              <a:t>8/11/10</a:t>
             </a:fld>
             <a:endParaRPr lang="en-US"/>
           </a:p>
@@ -631,7 +635,7 @@
             <a:fld id="{4355A105-26B0-5043-A7EC-94C834C82E90}" type="slidenum">
               <a:rPr lang="en-US" smtClean="0"/>
               <a:pPr/>
-              <a:t>8</a:t>
+              <a:t>6</a:t>
             </a:fld>
             <a:endParaRPr lang="en-US"/>
           </a:p>
@@ -691,38 +695,6 @@
           </a:bodyPr>
           <a:lstStyle/>
           <a:p>
-            <a:r>
-              <a:rPr lang="en-US" dirty="0" smtClean="0"/>
-              <a:t>find *.</a:t>
-            </a:r>
-            <a:r>
-              <a:rPr lang="en-US" dirty="0" err="1" smtClean="0"/>
-              <a:t>rb</a:t>
-            </a:r>
-            <a:r>
-              <a:rPr lang="en-US" dirty="0" smtClean="0"/>
-              <a:t> -print0 | </a:t>
-            </a:r>
-            <a:r>
-              <a:rPr lang="en-US" dirty="0" err="1" smtClean="0"/>
-              <a:t>xargs</a:t>
-            </a:r>
-            <a:r>
-              <a:rPr lang="en-US" dirty="0" smtClean="0"/>
-              <a:t> -0 </a:t>
-            </a:r>
-            <a:r>
-              <a:rPr lang="en-US" dirty="0" err="1" smtClean="0"/>
-              <a:t>wc</a:t>
-            </a:r>
-            <a:r>
-              <a:rPr lang="en-US" dirty="0" smtClean="0"/>
-              <a:t> -</a:t>
-            </a:r>
-            <a:r>
-              <a:rPr lang="en-US" dirty="0" err="1" smtClean="0"/>
-              <a:t>l</a:t>
-            </a:r>
             <a:endParaRPr lang="en-US" dirty="0"/>
           </a:p>
         </p:txBody>
@@ -745,7 +717,7 @@
             <a:fld id="{4355A105-26B0-5043-A7EC-94C834C82E90}" type="slidenum">
               <a:rPr lang="en-US" smtClean="0"/>
               <a:pPr/>
-              <a:t>10</a:t>
+              <a:t>11</a:t>
             </a:fld>
             <a:endParaRPr lang="en-US"/>
           </a:p>
@@ -805,6 +777,38 @@
           </a:bodyPr>
           <a:lstStyle/>
           <a:p>
+            <a:r>
+              <a:rPr lang="en-US" dirty="0" smtClean="0"/>
+              <a:t>find *.</a:t>
+            </a:r>
+            <a:r>
+              <a:rPr lang="en-US" dirty="0" err="1" smtClean="0"/>
+              <a:t>rb</a:t>
+            </a:r>
+            <a:r>
+              <a:rPr lang="en-US" dirty="0" smtClean="0"/>
+              <a:t> -print0 | </a:t>
+            </a:r>
+            <a:r>
+              <a:rPr lang="en-US" dirty="0" err="1" smtClean="0"/>
+              <a:t>xargs</a:t>
+            </a:r>
+            <a:r>
+              <a:rPr lang="en-US" dirty="0" smtClean="0"/>
+              <a:t> -0 </a:t>
+            </a:r>
+            <a:r>
+              <a:rPr lang="en-US" dirty="0" err="1" smtClean="0"/>
+              <a:t>wc</a:t>
+            </a:r>
+            <a:r>
+              <a:rPr lang="en-US" dirty="0" smtClean="0"/>
+              <a:t> -</a:t>
+            </a:r>
+            <a:r>
+              <a:rPr lang="en-US" dirty="0" err="1" smtClean="0"/>
+              <a:t>l</a:t>
+            </a:r>
             <a:endParaRPr lang="en-US" dirty="0"/>
           </a:p>
         </p:txBody>
@@ -827,7 +831,89 @@
             <a:fld id="{4355A105-26B0-5043-A7EC-94C834C82E90}" type="slidenum">
               <a:rPr lang="en-US" smtClean="0"/>
               <a:pPr/>
-              <a:t>14</a:t>
+              <a:t>12</a:t>
+            </a:fld>
+            <a:endParaRPr lang="en-US"/>
+          </a:p>
+        </p:txBody>
+      </p:sp>
+    </p:spTree>
+  </p:cSld>
+  <p:clrMapOvr>
+    <a:masterClrMapping/>
+  </p:clrMapOvr>
+</p:notes>
+</file>
+
+<file path=ppt/notesSlides/notesSlide5.xml><?xml version="1.0" encoding="utf-8"?>
+<p:notes xmlns:a="http://schemas.openxmlformats.org/drawingml/2006/main" xmlns:r="http://schemas.openxmlformats.org/officeDocument/2006/relationships" xmlns:mc="http://schemas.openxmlformats.org/markup-compatibility/2006" xmlns:mv="urn:schemas-microsoft-com:mac:vml" xmlns:p="http://schemas.openxmlformats.org/presentationml/2006/main" mc:Ignorable="mv" mc:PreserveAttributes="mv:*">
+  <p:cSld>
+    <p:spTree>
+      <p:nvGrpSpPr>
+        <p:cNvPr id="1" name=""/>
+        <p:cNvGrpSpPr/>
+        <p:nvPr/>
+      </p:nvGrpSpPr>
+      <p:grpSpPr>
+        <a:xfrm>
+          <a:off x="0" y="0"/>
+          <a:ext cx="0" cy="0"/>
+          <a:chOff x="0" y="0"/>
+          <a:chExt cx="0" cy="0"/>
+        </a:xfrm>
+      </p:grpSpPr>
+      <p:sp>
+        <p:nvSpPr>
+          <p:cNvPr id="2" name="Slide Image Placeholder 1"/>
+          <p:cNvSpPr>
+            <a:spLocks noGrp="1" noRot="1" noChangeAspect="1"/>
+          </p:cNvSpPr>
+          <p:nvPr>
+            <p:ph type="sldImg"/>
+          </p:nvPr>
+        </p:nvSpPr>
+        <p:spPr/>
+      </p:sp>
+      <p:sp>
+        <p:nvSpPr>
+          <p:cNvPr id="3" name="Notes Placeholder 2"/>
+          <p:cNvSpPr>
+            <a:spLocks noGrp="1"/>
+          </p:cNvSpPr>
+          <p:nvPr>
+            <p:ph type="body" idx="1"/>
+          </p:nvPr>
+        </p:nvSpPr>
+        <p:spPr/>
+        <p:txBody>
+          <a:bodyPr>
+            <a:normAutofit/>
+          </a:bodyPr>
+          <a:lstStyle/>
+          <a:p>
+            <a:endParaRPr lang="en-US" dirty="0"/>
+          </a:p>
+        </p:txBody>
+      </p:sp>
+      <p:sp>
+        <p:nvSpPr>
+          <p:cNvPr id="4" name="Slide Number Placeholder 3"/>
+          <p:cNvSpPr>
+            <a:spLocks noGrp="1"/>
+          </p:cNvSpPr>
+          <p:nvPr>
+            <p:ph type="sldNum" sz="quarter" idx="10"/>
+          </p:nvPr>
+        </p:nvSpPr>
+        <p:spPr/>
+        <p:txBody>
+          <a:bodyPr/>
+          <a:lstStyle/>
+          <a:p>
+            <a:fld id="{4355A105-26B0-5043-A7EC-94C834C82E90}" type="slidenum">
+              <a:rPr lang="en-US" smtClean="0"/>
+              <a:pPr/>
+              <a:t>17</a:t>
             </a:fld>
             <a:endParaRPr lang="en-US"/>
           </a:p>
@@ -1120,7 +1206,7 @@
             <a:fld id="{72AB9F51-C26B-4644-AC7E-A618488A626A}" type="datetimeFigureOut">
               <a:rPr lang="en-US"/>
               <a:pPr/>
-              <a:t>8/7/10</a:t>
+              <a:t>8/11/10</a:t>
             </a:fld>
             <a:endParaRPr/>
           </a:p>
@@ -1212,7 +1298,7 @@
             <a:fld id="{36BD7A5A-4508-41A3-A542-021284F44FD2}" type="datetime1">
               <a:rPr lang="en-US"/>
               <a:pPr/>
-              <a:t>8/7/10</a:t>
+              <a:t>8/11/10</a:t>
             </a:fld>
             <a:endParaRPr/>
           </a:p>
@@ -1796,7 +1882,7 @@
             <a:fld id="{5D6049BC-90DD-4F53-902A-0D72503E5497}" type="datetime1">
               <a:rPr lang="en-US"/>
               <a:pPr/>
-              <a:t>8/7/10</a:t>
+              <a:t>8/11/10</a:t>
             </a:fld>
             <a:endParaRPr/>
           </a:p>
@@ -2108,7 +2194,7 @@
             <a:fld id="{42D58EEC-9731-49DD-91E8-494A93B2DEC9}" type="datetime1">
               <a:rPr lang="en-US"/>
               <a:pPr/>
-              <a:t>8/7/10</a:t>
+              <a:t>8/11/10</a:t>
             </a:fld>
             <a:endParaRPr/>
           </a:p>
@@ -2281,7 +2367,7 @@
             <a:fld id="{7500C05C-B3EA-49FC-922A-1D3FFA7FF7F2}" type="datetime1">
               <a:rPr lang="en-US"/>
               <a:pPr/>
-              <a:t>8/7/10</a:t>
+              <a:t>8/11/10</a:t>
             </a:fld>
             <a:endParaRPr/>
           </a:p>
@@ -2639,7 +2725,7 @@
             <a:fld id="{6690622F-2886-4428-9227-475DC6DA1737}" type="datetime1">
               <a:rPr lang="en-US"/>
               <a:pPr/>
-              <a:t>8/7/10</a:t>
+              <a:t>8/11/10</a:t>
             </a:fld>
             <a:endParaRPr/>
           </a:p>
@@ -2939,7 +3025,7 @@
             <a:fld id="{72AAB499-F5DE-4BE5-BB26-90CC428051F7}" type="datetime1">
               <a:rPr lang="en-US"/>
               <a:pPr/>
-              <a:t>8/7/10</a:t>
+              <a:t>8/11/10</a:t>
             </a:fld>
             <a:endParaRPr/>
           </a:p>
@@ -3231,7 +3317,7 @@
             <a:fld id="{EFE21C87-FA30-4C7E-9CC2-3E29C7E6D70C}" type="datetime1">
               <a:rPr lang="en-US"/>
               <a:pPr/>
-              <a:t>8/7/10</a:t>
+              <a:t>8/11/10</a:t>
             </a:fld>
             <a:endParaRPr/>
           </a:p>
@@ -3661,7 +3747,7 @@
             <a:fld id="{FE61A93B-C135-4A78-A62B-B7D890B1D77D}" type="datetime1">
               <a:rPr lang="en-US"/>
               <a:pPr/>
-              <a:t>8/7/10</a:t>
+              <a:t>8/11/10</a:t>
             </a:fld>
             <a:endParaRPr/>
           </a:p>
@@ -3775,7 +3861,7 @@
             <a:fld id="{C5D7800F-ED33-4A55-872C-F1E2CF63B167}" type="datetime1">
               <a:rPr lang="en-US"/>
               <a:pPr/>
-              <a:t>8/7/10</a:t>
+              <a:t>8/11/10</a:t>
             </a:fld>
             <a:endParaRPr/>
           </a:p>
@@ -3871,7 +3957,7 @@
             <a:fld id="{CF789F90-FBE0-40FF-ACC1-F9FEE7C4DE13}" type="datetime1">
               <a:rPr lang="en-US"/>
               <a:pPr/>
-              <a:t>8/7/10</a:t>
+              <a:t>8/11/10</a:t>
             </a:fld>
             <a:endParaRPr/>
           </a:p>
@@ -4184,7 +4270,7 @@
             <a:fld id="{244C6E4D-6501-4890-AD5C-63A441F7EFF6}" type="datetime1">
               <a:rPr lang="en-US"/>
               <a:pPr/>
-              <a:t>8/7/10</a:t>
+              <a:t>8/11/10</a:t>
             </a:fld>
             <a:endParaRPr/>
           </a:p>
@@ -4424,7 +4510,7 @@
             <a:fld id="{6690622F-2886-4428-9227-475DC6DA1737}" type="datetime1">
               <a:rPr lang="en-US"/>
               <a:pPr/>
-              <a:t>8/7/10</a:t>
+              <a:t>8/11/10</a:t>
             </a:fld>
             <a:endParaRPr/>
           </a:p>
@@ -5030,6 +5116,267 @@
           <a:chExt cx="0" cy="0"/>
         </a:xfrm>
       </p:grpSpPr>
+      <p:sp>
+        <p:nvSpPr>
+          <p:cNvPr id="2" name="Title 1"/>
+          <p:cNvSpPr>
+            <a:spLocks noGrp="1"/>
+          </p:cNvSpPr>
+          <p:nvPr>
+            <p:ph type="title"/>
+          </p:nvPr>
+        </p:nvSpPr>
+        <p:spPr/>
+        <p:txBody>
+          <a:bodyPr/>
+          <a:lstStyle/>
+          <a:p>
+            <a:r>
+              <a:rPr lang="en-US" dirty="0" smtClean="0"/>
+              <a:t>Handy Rack </a:t>
+            </a:r>
+            <a:r>
+              <a:rPr lang="en-US" dirty="0" err="1" smtClean="0"/>
+              <a:t>Middlewarez</a:t>
+            </a:r>
+            <a:endParaRPr lang="en-US" dirty="0"/>
+          </a:p>
+        </p:txBody>
+      </p:sp>
+      <p:sp>
+        <p:nvSpPr>
+          <p:cNvPr id="3" name="TextBox 2"/>
+          <p:cNvSpPr txBox="1"/>
+          <p:nvPr/>
+        </p:nvSpPr>
+        <p:spPr>
+          <a:xfrm>
+            <a:off x="1392844" y="1492625"/>
+            <a:ext cx="6420754" cy="1938992"/>
+          </a:xfrm>
+          <a:prstGeom prst="rect">
+            <a:avLst/>
+          </a:prstGeom>
+          <a:noFill/>
+        </p:spPr>
+        <p:txBody>
+          <a:bodyPr wrap="square" rtlCol="0">
+            <a:spAutoFit/>
+          </a:bodyPr>
+          <a:lstStyle/>
+          <a:p>
+            <a:endParaRPr lang="en-US" sz="2400" dirty="0" smtClean="0"/>
+          </a:p>
+          <a:p>
+            <a:pPr>
+              <a:buBlip>
+                <a:blip r:embed="rId2"/>
+              </a:buBlip>
+            </a:pPr>
+            <a:r>
+              <a:rPr lang="en-US" sz="2400" dirty="0" smtClean="0"/>
+              <a:t> rack-cache</a:t>
+            </a:r>
+          </a:p>
+          <a:p>
+            <a:pPr>
+              <a:buBlip>
+                <a:blip r:embed="rId2"/>
+              </a:buBlip>
+            </a:pPr>
+            <a:r>
+              <a:rPr lang="en-US" sz="2400" dirty="0" smtClean="0"/>
+              <a:t> basic-auth</a:t>
+            </a:r>
+          </a:p>
+          <a:p>
+            <a:pPr>
+              <a:buBlip>
+                <a:blip r:embed="rId2"/>
+              </a:buBlip>
+            </a:pPr>
+            <a:r>
+              <a:rPr lang="en-US" sz="2400" dirty="0" smtClean="0"/>
+              <a:t> rack-throttle</a:t>
+            </a:r>
+          </a:p>
+          <a:p>
+            <a:pPr>
+              <a:buBlip>
+                <a:blip r:embed="rId2"/>
+              </a:buBlip>
+            </a:pPr>
+            <a:endParaRPr lang="en-US" sz="2400" dirty="0" smtClean="0"/>
+          </a:p>
+        </p:txBody>
+      </p:sp>
+    </p:spTree>
+  </p:cSld>
+  <p:clrMapOvr>
+    <a:masterClrMapping/>
+  </p:clrMapOvr>
+  <p:timing>
+    <p:tnLst>
+      <p:par>
+        <p:cTn id="1" dur="indefinite" restart="never" nodeType="tmRoot"/>
+      </p:par>
+    </p:tnLst>
+  </p:timing>
+</p:sld>
+</file>
+
+<file path=ppt/slides/slide11.xml><?xml version="1.0" encoding="utf-8"?>
+<p:sld xmlns:a="http://schemas.openxmlformats.org/drawingml/2006/main" xmlns:r="http://schemas.openxmlformats.org/officeDocument/2006/relationships" xmlns:mc="http://schemas.openxmlformats.org/markup-compatibility/2006" xmlns:mv="urn:schemas-microsoft-com:mac:vml" xmlns:p="http://schemas.openxmlformats.org/presentationml/2006/main" mc:Ignorable="mv" mc:PreserveAttributes="mv:*">
+  <p:cSld>
+    <p:spTree>
+      <p:nvGrpSpPr>
+        <p:cNvPr id="1" name=""/>
+        <p:cNvGrpSpPr/>
+        <p:nvPr/>
+      </p:nvGrpSpPr>
+      <p:grpSpPr>
+        <a:xfrm>
+          <a:off x="0" y="0"/>
+          <a:ext cx="0" cy="0"/>
+          <a:chOff x="0" y="0"/>
+          <a:chExt cx="0" cy="0"/>
+        </a:xfrm>
+      </p:grpSpPr>
+      <p:pic>
+        <p:nvPicPr>
+          <p:cNvPr id="4" name="Picture 3"/>
+          <p:cNvPicPr>
+            <a:picLocks noChangeAspect="1"/>
+          </p:cNvPicPr>
+          <p:nvPr/>
+        </p:nvPicPr>
+        <p:blipFill>
+          <a:blip r:embed="rId3">
+            <a:alphaModFix amt="30000"/>
+          </a:blip>
+          <a:stretch>
+            <a:fillRect/>
+          </a:stretch>
+        </p:blipFill>
+        <p:spPr>
+          <a:xfrm>
+            <a:off x="-508000" y="1492625"/>
+            <a:ext cx="10160000" cy="3505200"/>
+          </a:xfrm>
+          <a:prstGeom prst="rect">
+            <a:avLst/>
+          </a:prstGeom>
+        </p:spPr>
+      </p:pic>
+      <p:sp>
+        <p:nvSpPr>
+          <p:cNvPr id="2" name="Title 1"/>
+          <p:cNvSpPr>
+            <a:spLocks noGrp="1"/>
+          </p:cNvSpPr>
+          <p:nvPr>
+            <p:ph type="title"/>
+          </p:nvPr>
+        </p:nvSpPr>
+        <p:spPr/>
+        <p:txBody>
+          <a:bodyPr/>
+          <a:lstStyle/>
+          <a:p>
+            <a:r>
+              <a:rPr lang="en-US" dirty="0" smtClean="0"/>
+              <a:t>Sinatra + Bundler</a:t>
+            </a:r>
+            <a:endParaRPr lang="en-US" dirty="0"/>
+          </a:p>
+        </p:txBody>
+      </p:sp>
+      <p:sp>
+        <p:nvSpPr>
+          <p:cNvPr id="3" name="TextBox 2"/>
+          <p:cNvSpPr txBox="1"/>
+          <p:nvPr/>
+        </p:nvSpPr>
+        <p:spPr>
+          <a:xfrm>
+            <a:off x="1392844" y="1492625"/>
+            <a:ext cx="6420754" cy="1200328"/>
+          </a:xfrm>
+          <a:prstGeom prst="rect">
+            <a:avLst/>
+          </a:prstGeom>
+          <a:noFill/>
+        </p:spPr>
+        <p:txBody>
+          <a:bodyPr wrap="square" rtlCol="0">
+            <a:spAutoFit/>
+          </a:bodyPr>
+          <a:lstStyle/>
+          <a:p>
+            <a:endParaRPr lang="en-US" sz="2400" dirty="0" smtClean="0"/>
+          </a:p>
+          <a:p>
+            <a:pPr>
+              <a:buBlip>
+                <a:blip r:embed="rId4"/>
+              </a:buBlip>
+            </a:pPr>
+            <a:r>
+              <a:rPr lang="en-US" sz="2400" dirty="0" smtClean="0"/>
+              <a:t> </a:t>
+            </a:r>
+            <a:r>
+              <a:rPr lang="en-US" sz="2400" dirty="0" err="1" smtClean="0"/>
+              <a:t>Gemfile</a:t>
+            </a:r>
+            <a:endParaRPr lang="en-US" sz="2400" dirty="0" smtClean="0"/>
+          </a:p>
+          <a:p>
+            <a:pPr>
+              <a:buBlip>
+                <a:blip r:embed="rId4"/>
+              </a:buBlip>
+            </a:pPr>
+            <a:r>
+              <a:rPr lang="en-US" sz="2400" dirty="0" err="1" smtClean="0"/>
+              <a:t>Bundler.require_env</a:t>
+            </a:r>
+            <a:endParaRPr lang="en-US" sz="2400" dirty="0" smtClean="0"/>
+          </a:p>
+        </p:txBody>
+      </p:sp>
+    </p:spTree>
+  </p:cSld>
+  <p:clrMapOvr>
+    <a:masterClrMapping/>
+  </p:clrMapOvr>
+  <p:timing>
+    <p:tnLst>
+      <p:par>
+        <p:cTn id="1" dur="indefinite" restart="never" nodeType="tmRoot"/>
+      </p:par>
+    </p:tnLst>
+  </p:timing>
+</p:sld>
+</file>
+
+<file path=ppt/slides/slide12.xml><?xml version="1.0" encoding="utf-8"?>
+<p:sld xmlns:a="http://schemas.openxmlformats.org/drawingml/2006/main" xmlns:r="http://schemas.openxmlformats.org/officeDocument/2006/relationships" xmlns:mc="http://schemas.openxmlformats.org/markup-compatibility/2006" xmlns:mv="urn:schemas-microsoft-com:mac:vml" xmlns:p="http://schemas.openxmlformats.org/presentationml/2006/main" mc:Ignorable="mv" mc:PreserveAttributes="mv:*">
+  <p:cSld>
+    <p:spTree>
+      <p:nvGrpSpPr>
+        <p:cNvPr id="1" name=""/>
+        <p:cNvGrpSpPr/>
+        <p:nvPr/>
+      </p:nvGrpSpPr>
+      <p:grpSpPr>
+        <a:xfrm>
+          <a:off x="0" y="0"/>
+          <a:ext cx="0" cy="0"/>
+          <a:chOff x="0" y="0"/>
+          <a:chExt cx="0" cy="0"/>
+        </a:xfrm>
+      </p:grpSpPr>
       <p:pic>
         <p:nvPicPr>
           <p:cNvPr id="10" name="Picture 9"/>
@@ -5338,228 +5685,6 @@
 </p:sld>
 </file>
 
-<file path=ppt/slides/slide11.xml><?xml version="1.0" encoding="utf-8"?>
-<p:sld xmlns:a="http://schemas.openxmlformats.org/drawingml/2006/main" xmlns:r="http://schemas.openxmlformats.org/officeDocument/2006/relationships" xmlns:mc="http://schemas.openxmlformats.org/markup-compatibility/2006" xmlns:mv="urn:schemas-microsoft-com:mac:vml" xmlns:p="http://schemas.openxmlformats.org/presentationml/2006/main" mc:Ignorable="mv" mc:PreserveAttributes="mv:*">
-  <p:cSld>
-    <p:spTree>
-      <p:nvGrpSpPr>
-        <p:cNvPr id="1" name=""/>
-        <p:cNvGrpSpPr/>
-        <p:nvPr/>
-      </p:nvGrpSpPr>
-      <p:grpSpPr>
-        <a:xfrm>
-          <a:off x="0" y="0"/>
-          <a:ext cx="0" cy="0"/>
-          <a:chOff x="0" y="0"/>
-          <a:chExt cx="0" cy="0"/>
-        </a:xfrm>
-      </p:grpSpPr>
-      <p:sp>
-        <p:nvSpPr>
-          <p:cNvPr id="2" name="Title 1"/>
-          <p:cNvSpPr>
-            <a:spLocks noGrp="1"/>
-          </p:cNvSpPr>
-          <p:nvPr>
-            <p:ph type="title"/>
-          </p:nvPr>
-        </p:nvSpPr>
-        <p:spPr/>
-        <p:txBody>
-          <a:bodyPr/>
-          <a:lstStyle/>
-          <a:p>
-            <a:r>
-              <a:rPr lang="en-US" dirty="0" smtClean="0"/>
-              <a:t>Load testing Sinatra</a:t>
-            </a:r>
-            <a:endParaRPr lang="en-US" dirty="0"/>
-          </a:p>
-        </p:txBody>
-      </p:sp>
-      <p:sp>
-        <p:nvSpPr>
-          <p:cNvPr id="3" name="TextBox 2"/>
-          <p:cNvSpPr txBox="1"/>
-          <p:nvPr/>
-        </p:nvSpPr>
-        <p:spPr>
-          <a:xfrm>
-            <a:off x="1392844" y="1492625"/>
-            <a:ext cx="6420754" cy="1938992"/>
-          </a:xfrm>
-          <a:prstGeom prst="rect">
-            <a:avLst/>
-          </a:prstGeom>
-          <a:noFill/>
-        </p:spPr>
-        <p:txBody>
-          <a:bodyPr wrap="square" rtlCol="0">
-            <a:spAutoFit/>
-          </a:bodyPr>
-          <a:lstStyle/>
-          <a:p>
-            <a:endParaRPr lang="en-US" sz="2400" dirty="0" smtClean="0"/>
-          </a:p>
-          <a:p>
-            <a:pPr>
-              <a:buBlip>
-                <a:blip r:embed="rId2"/>
-              </a:buBlip>
-            </a:pPr>
-            <a:r>
-              <a:rPr lang="en-US" sz="2400" dirty="0" smtClean="0"/>
-              <a:t> How does it perform under load?</a:t>
-            </a:r>
-          </a:p>
-          <a:p>
-            <a:pPr>
-              <a:buBlip>
-                <a:blip r:embed="rId2"/>
-              </a:buBlip>
-            </a:pPr>
-            <a:r>
-              <a:rPr lang="en-US" sz="2400" dirty="0" smtClean="0"/>
-              <a:t>Sinatra supports multithreading (works well with </a:t>
-            </a:r>
-            <a:r>
-              <a:rPr lang="en-US" sz="2400" dirty="0" err="1" smtClean="0"/>
-              <a:t>Jruby</a:t>
-            </a:r>
-            <a:r>
-              <a:rPr lang="en-US" sz="2400" dirty="0" smtClean="0"/>
-              <a:t>)</a:t>
-            </a:r>
-          </a:p>
-          <a:p>
-            <a:pPr>
-              <a:buBlip>
-                <a:blip r:embed="rId2"/>
-              </a:buBlip>
-            </a:pPr>
-            <a:r>
-              <a:rPr lang="en-US" sz="2400" dirty="0" smtClean="0"/>
-              <a:t> </a:t>
-            </a:r>
-          </a:p>
-        </p:txBody>
-      </p:sp>
-    </p:spTree>
-  </p:cSld>
-  <p:clrMapOvr>
-    <a:masterClrMapping/>
-  </p:clrMapOvr>
-  <p:timing>
-    <p:tnLst>
-      <p:par>
-        <p:cTn id="1" dur="indefinite" restart="never" nodeType="tmRoot"/>
-      </p:par>
-    </p:tnLst>
-  </p:timing>
-</p:sld>
-</file>
-
-<file path=ppt/slides/slide12.xml><?xml version="1.0" encoding="utf-8"?>
-<p:sld xmlns:a="http://schemas.openxmlformats.org/drawingml/2006/main" xmlns:r="http://schemas.openxmlformats.org/officeDocument/2006/relationships" xmlns:mc="http://schemas.openxmlformats.org/markup-compatibility/2006" xmlns:mv="urn:schemas-microsoft-com:mac:vml" xmlns:p="http://schemas.openxmlformats.org/presentationml/2006/main" mc:Ignorable="mv" mc:PreserveAttributes="mv:*">
-  <p:cSld>
-    <p:spTree>
-      <p:nvGrpSpPr>
-        <p:cNvPr id="1" name=""/>
-        <p:cNvGrpSpPr/>
-        <p:nvPr/>
-      </p:nvGrpSpPr>
-      <p:grpSpPr>
-        <a:xfrm>
-          <a:off x="0" y="0"/>
-          <a:ext cx="0" cy="0"/>
-          <a:chOff x="0" y="0"/>
-          <a:chExt cx="0" cy="0"/>
-        </a:xfrm>
-      </p:grpSpPr>
-      <p:sp>
-        <p:nvSpPr>
-          <p:cNvPr id="2" name="Title 1"/>
-          <p:cNvSpPr>
-            <a:spLocks noGrp="1"/>
-          </p:cNvSpPr>
-          <p:nvPr>
-            <p:ph type="title"/>
-          </p:nvPr>
-        </p:nvSpPr>
-        <p:spPr/>
-        <p:txBody>
-          <a:bodyPr/>
-          <a:lstStyle/>
-          <a:p>
-            <a:r>
-              <a:rPr lang="en-US" dirty="0" smtClean="0"/>
-              <a:t>Memory Footprint VS.</a:t>
-            </a:r>
-            <a:endParaRPr lang="en-US" dirty="0"/>
-          </a:p>
-        </p:txBody>
-      </p:sp>
-      <p:sp>
-        <p:nvSpPr>
-          <p:cNvPr id="3" name="TextBox 2"/>
-          <p:cNvSpPr txBox="1"/>
-          <p:nvPr/>
-        </p:nvSpPr>
-        <p:spPr>
-          <a:xfrm>
-            <a:off x="1392844" y="1492625"/>
-            <a:ext cx="6420754" cy="1200328"/>
-          </a:xfrm>
-          <a:prstGeom prst="rect">
-            <a:avLst/>
-          </a:prstGeom>
-          <a:noFill/>
-        </p:spPr>
-        <p:txBody>
-          <a:bodyPr wrap="square" rtlCol="0">
-            <a:spAutoFit/>
-          </a:bodyPr>
-          <a:lstStyle/>
-          <a:p>
-            <a:endParaRPr lang="en-US" sz="2400" dirty="0" smtClean="0"/>
-          </a:p>
-          <a:p>
-            <a:pPr>
-              <a:buBlip>
-                <a:blip r:embed="rId2"/>
-              </a:buBlip>
-            </a:pPr>
-            <a:r>
-              <a:rPr lang="en-US" sz="2400" dirty="0" smtClean="0"/>
-              <a:t> Under load using ‘top’</a:t>
-            </a:r>
-          </a:p>
-          <a:p>
-            <a:pPr>
-              <a:buBlip>
-                <a:blip r:embed="rId2"/>
-              </a:buBlip>
-            </a:pPr>
-            <a:endParaRPr lang="en-US" sz="2400" dirty="0" smtClean="0"/>
-          </a:p>
-        </p:txBody>
-      </p:sp>
-    </p:spTree>
-  </p:cSld>
-  <p:clrMapOvr>
-    <a:masterClrMapping/>
-  </p:clrMapOvr>
-  <p:timing>
-    <p:tnLst>
-      <p:par>
-        <p:cTn id="1" dur="indefinite" restart="never" nodeType="tmRoot"/>
-      </p:par>
-    </p:tnLst>
-  </p:timing>
-</p:sld>
-</file>
-
 <file path=ppt/slides/slide13.xml><?xml version="1.0" encoding="utf-8"?>
 <p:sld xmlns:a="http://schemas.openxmlformats.org/drawingml/2006/main" xmlns:r="http://schemas.openxmlformats.org/officeDocument/2006/relationships" xmlns:mc="http://schemas.openxmlformats.org/markup-compatibility/2006" xmlns:mv="urn:schemas-microsoft-com:mac:vml" xmlns:p="http://schemas.openxmlformats.org/presentationml/2006/main" mc:Ignorable="mv" mc:PreserveAttributes="mv:*">
   <p:cSld>
@@ -5594,11 +5719,7 @@
           <a:p>
             <a:r>
               <a:rPr lang="en-US" dirty="0" smtClean="0"/>
-              <a:t>Sinatra + </a:t>
-            </a:r>
-            <a:r>
-              <a:rPr lang="en-US" dirty="0" err="1" smtClean="0"/>
-              <a:t>JRuby</a:t>
+              <a:t>Load testing Sinatra</a:t>
             </a:r>
             <a:endParaRPr lang="en-US" dirty="0"/>
           </a:p>
@@ -5613,7 +5734,7 @@
         <p:spPr>
           <a:xfrm>
             <a:off x="1392844" y="1492625"/>
-            <a:ext cx="6420754" cy="830997"/>
+            <a:ext cx="6420754" cy="1938992"/>
           </a:xfrm>
           <a:prstGeom prst="rect">
             <a:avLst/>
@@ -5636,7 +5757,37 @@
             </a:pPr>
             <a:r>
               <a:rPr lang="en-US" sz="2400" dirty="0" smtClean="0"/>
-              <a:t> Under load using ‘top’</a:t>
+              <a:t> How does it perform under load?</a:t>
+            </a:r>
+          </a:p>
+          <a:p>
+            <a:pPr>
+              <a:buBlip>
+                <a:blip r:embed="rId2"/>
+              </a:buBlip>
+            </a:pPr>
+            <a:r>
+              <a:rPr lang="en-US" sz="2400" dirty="0" smtClean="0"/>
+              <a:t>Sinatra supports multithreading (works well with </a:t>
+            </a:r>
+            <a:r>
+              <a:rPr lang="en-US" sz="2400" dirty="0" err="1" smtClean="0"/>
+              <a:t>Jruby</a:t>
+            </a:r>
+            <a:r>
+              <a:rPr lang="en-US" sz="2400" dirty="0" smtClean="0"/>
+              <a:t>)</a:t>
+            </a:r>
+          </a:p>
+          <a:p>
+            <a:pPr>
+              <a:buBlip>
+                <a:blip r:embed="rId2"/>
+              </a:buBlip>
+            </a:pPr>
+            <a:r>
+              <a:rPr lang="en-US" sz="2400" dirty="0" smtClean="0"/>
+              <a:t> </a:t>
             </a:r>
           </a:p>
         </p:txBody>
@@ -5657,6 +5808,298 @@
 </file>
 
 <file path=ppt/slides/slide14.xml><?xml version="1.0" encoding="utf-8"?>
+<p:sld xmlns:a="http://schemas.openxmlformats.org/drawingml/2006/main" xmlns:r="http://schemas.openxmlformats.org/officeDocument/2006/relationships" xmlns:mc="http://schemas.openxmlformats.org/markup-compatibility/2006" xmlns:mv="urn:schemas-microsoft-com:mac:vml" xmlns:p="http://schemas.openxmlformats.org/presentationml/2006/main" mc:Ignorable="mv" mc:PreserveAttributes="mv:*">
+  <p:cSld>
+    <p:spTree>
+      <p:nvGrpSpPr>
+        <p:cNvPr id="1" name=""/>
+        <p:cNvGrpSpPr/>
+        <p:nvPr/>
+      </p:nvGrpSpPr>
+      <p:grpSpPr>
+        <a:xfrm>
+          <a:off x="0" y="0"/>
+          <a:ext cx="0" cy="0"/>
+          <a:chOff x="0" y="0"/>
+          <a:chExt cx="0" cy="0"/>
+        </a:xfrm>
+      </p:grpSpPr>
+      <p:sp>
+        <p:nvSpPr>
+          <p:cNvPr id="2" name="Title 1"/>
+          <p:cNvSpPr>
+            <a:spLocks noGrp="1"/>
+          </p:cNvSpPr>
+          <p:nvPr>
+            <p:ph type="title"/>
+          </p:nvPr>
+        </p:nvSpPr>
+        <p:spPr/>
+        <p:txBody>
+          <a:bodyPr/>
+          <a:lstStyle/>
+          <a:p>
+            <a:r>
+              <a:rPr lang="en-US" dirty="0" smtClean="0"/>
+              <a:t>Memory Footprint VS.</a:t>
+            </a:r>
+            <a:endParaRPr lang="en-US" dirty="0"/>
+          </a:p>
+        </p:txBody>
+      </p:sp>
+      <p:sp>
+        <p:nvSpPr>
+          <p:cNvPr id="3" name="TextBox 2"/>
+          <p:cNvSpPr txBox="1"/>
+          <p:nvPr/>
+        </p:nvSpPr>
+        <p:spPr>
+          <a:xfrm>
+            <a:off x="1392844" y="1492625"/>
+            <a:ext cx="6420754" cy="1200328"/>
+          </a:xfrm>
+          <a:prstGeom prst="rect">
+            <a:avLst/>
+          </a:prstGeom>
+          <a:noFill/>
+        </p:spPr>
+        <p:txBody>
+          <a:bodyPr wrap="square" rtlCol="0">
+            <a:spAutoFit/>
+          </a:bodyPr>
+          <a:lstStyle/>
+          <a:p>
+            <a:endParaRPr lang="en-US" sz="2400" dirty="0" smtClean="0"/>
+          </a:p>
+          <a:p>
+            <a:pPr>
+              <a:buBlip>
+                <a:blip r:embed="rId2"/>
+              </a:buBlip>
+            </a:pPr>
+            <a:r>
+              <a:rPr lang="en-US" sz="2400" dirty="0" smtClean="0"/>
+              <a:t> Under load using ‘top’</a:t>
+            </a:r>
+          </a:p>
+          <a:p>
+            <a:pPr>
+              <a:buBlip>
+                <a:blip r:embed="rId2"/>
+              </a:buBlip>
+            </a:pPr>
+            <a:endParaRPr lang="en-US" sz="2400" dirty="0" smtClean="0"/>
+          </a:p>
+        </p:txBody>
+      </p:sp>
+    </p:spTree>
+  </p:cSld>
+  <p:clrMapOvr>
+    <a:masterClrMapping/>
+  </p:clrMapOvr>
+  <p:timing>
+    <p:tnLst>
+      <p:par>
+        <p:cTn id="1" dur="indefinite" restart="never" nodeType="tmRoot"/>
+      </p:par>
+    </p:tnLst>
+  </p:timing>
+</p:sld>
+</file>
+
+<file path=ppt/slides/slide15.xml><?xml version="1.0" encoding="utf-8"?>
+<p:sld xmlns:a="http://schemas.openxmlformats.org/drawingml/2006/main" xmlns:r="http://schemas.openxmlformats.org/officeDocument/2006/relationships" xmlns:mc="http://schemas.openxmlformats.org/markup-compatibility/2006" xmlns:mv="urn:schemas-microsoft-com:mac:vml" xmlns:p="http://schemas.openxmlformats.org/presentationml/2006/main" mc:Ignorable="mv" mc:PreserveAttributes="mv:*">
+  <p:cSld>
+    <p:spTree>
+      <p:nvGrpSpPr>
+        <p:cNvPr id="1" name=""/>
+        <p:cNvGrpSpPr/>
+        <p:nvPr/>
+      </p:nvGrpSpPr>
+      <p:grpSpPr>
+        <a:xfrm>
+          <a:off x="0" y="0"/>
+          <a:ext cx="0" cy="0"/>
+          <a:chOff x="0" y="0"/>
+          <a:chExt cx="0" cy="0"/>
+        </a:xfrm>
+      </p:grpSpPr>
+      <p:sp>
+        <p:nvSpPr>
+          <p:cNvPr id="2" name="Title 1"/>
+          <p:cNvSpPr>
+            <a:spLocks noGrp="1"/>
+          </p:cNvSpPr>
+          <p:nvPr>
+            <p:ph type="title"/>
+          </p:nvPr>
+        </p:nvSpPr>
+        <p:spPr/>
+        <p:txBody>
+          <a:bodyPr/>
+          <a:lstStyle/>
+          <a:p>
+            <a:r>
+              <a:rPr lang="en-US" dirty="0" smtClean="0"/>
+              <a:t>Sinatra + </a:t>
+            </a:r>
+            <a:r>
+              <a:rPr lang="en-US" dirty="0" err="1" smtClean="0"/>
+              <a:t>JRuby</a:t>
+            </a:r>
+            <a:endParaRPr lang="en-US" dirty="0"/>
+          </a:p>
+        </p:txBody>
+      </p:sp>
+      <p:sp>
+        <p:nvSpPr>
+          <p:cNvPr id="3" name="TextBox 2"/>
+          <p:cNvSpPr txBox="1"/>
+          <p:nvPr/>
+        </p:nvSpPr>
+        <p:spPr>
+          <a:xfrm>
+            <a:off x="1392844" y="1492625"/>
+            <a:ext cx="6420754" cy="830997"/>
+          </a:xfrm>
+          <a:prstGeom prst="rect">
+            <a:avLst/>
+          </a:prstGeom>
+          <a:noFill/>
+        </p:spPr>
+        <p:txBody>
+          <a:bodyPr wrap="square" rtlCol="0">
+            <a:spAutoFit/>
+          </a:bodyPr>
+          <a:lstStyle/>
+          <a:p>
+            <a:endParaRPr lang="en-US" sz="2400" dirty="0" smtClean="0"/>
+          </a:p>
+          <a:p>
+            <a:pPr>
+              <a:buBlip>
+                <a:blip r:embed="rId2"/>
+              </a:buBlip>
+            </a:pPr>
+            <a:r>
+              <a:rPr lang="en-US" sz="2400" dirty="0" smtClean="0"/>
+              <a:t> Under load using ‘top’</a:t>
+            </a:r>
+          </a:p>
+        </p:txBody>
+      </p:sp>
+    </p:spTree>
+  </p:cSld>
+  <p:clrMapOvr>
+    <a:masterClrMapping/>
+  </p:clrMapOvr>
+  <p:timing>
+    <p:tnLst>
+      <p:par>
+        <p:cTn id="1" dur="indefinite" restart="never" nodeType="tmRoot"/>
+      </p:par>
+    </p:tnLst>
+  </p:timing>
+</p:sld>
+</file>
+
+<file path=ppt/slides/slide16.xml><?xml version="1.0" encoding="utf-8"?>
+<p:sld xmlns:a="http://schemas.openxmlformats.org/drawingml/2006/main" xmlns:r="http://schemas.openxmlformats.org/officeDocument/2006/relationships" xmlns:mc="http://schemas.openxmlformats.org/markup-compatibility/2006" xmlns:mv="urn:schemas-microsoft-com:mac:vml" xmlns:p="http://schemas.openxmlformats.org/presentationml/2006/main" mc:Ignorable="mv" mc:PreserveAttributes="mv:*">
+  <p:cSld>
+    <p:spTree>
+      <p:nvGrpSpPr>
+        <p:cNvPr id="1" name=""/>
+        <p:cNvGrpSpPr/>
+        <p:nvPr/>
+      </p:nvGrpSpPr>
+      <p:grpSpPr>
+        <a:xfrm>
+          <a:off x="0" y="0"/>
+          <a:ext cx="0" cy="0"/>
+          <a:chOff x="0" y="0"/>
+          <a:chExt cx="0" cy="0"/>
+        </a:xfrm>
+      </p:grpSpPr>
+      <p:sp>
+        <p:nvSpPr>
+          <p:cNvPr id="2" name="Title 1"/>
+          <p:cNvSpPr>
+            <a:spLocks noGrp="1"/>
+          </p:cNvSpPr>
+          <p:nvPr>
+            <p:ph type="title"/>
+          </p:nvPr>
+        </p:nvSpPr>
+        <p:spPr/>
+        <p:txBody>
+          <a:bodyPr/>
+          <a:lstStyle/>
+          <a:p>
+            <a:r>
+              <a:rPr lang="en-US" dirty="0" smtClean="0"/>
+              <a:t>Sinatra + </a:t>
+            </a:r>
+            <a:r>
+              <a:rPr lang="en-US" dirty="0" err="1" smtClean="0"/>
+              <a:t>JRuby</a:t>
+            </a:r>
+            <a:endParaRPr lang="en-US" dirty="0"/>
+          </a:p>
+        </p:txBody>
+      </p:sp>
+      <p:sp>
+        <p:nvSpPr>
+          <p:cNvPr id="3" name="TextBox 2"/>
+          <p:cNvSpPr txBox="1"/>
+          <p:nvPr/>
+        </p:nvSpPr>
+        <p:spPr>
+          <a:xfrm>
+            <a:off x="1392844" y="1492625"/>
+            <a:ext cx="6420754" cy="830997"/>
+          </a:xfrm>
+          <a:prstGeom prst="rect">
+            <a:avLst/>
+          </a:prstGeom>
+          <a:noFill/>
+        </p:spPr>
+        <p:txBody>
+          <a:bodyPr wrap="square" rtlCol="0">
+            <a:spAutoFit/>
+          </a:bodyPr>
+          <a:lstStyle/>
+          <a:p>
+            <a:endParaRPr lang="en-US" sz="2400" dirty="0" smtClean="0"/>
+          </a:p>
+          <a:p>
+            <a:pPr>
+              <a:buBlip>
+                <a:blip r:embed="rId2"/>
+              </a:buBlip>
+            </a:pPr>
+            <a:r>
+              <a:rPr lang="en-US" sz="2400" dirty="0" smtClean="0"/>
+              <a:t> Under load using ‘top’</a:t>
+            </a:r>
+          </a:p>
+        </p:txBody>
+      </p:sp>
+    </p:spTree>
+  </p:cSld>
+  <p:clrMapOvr>
+    <a:masterClrMapping/>
+  </p:clrMapOvr>
+  <p:timing>
+    <p:tnLst>
+      <p:par>
+        <p:cTn id="1" dur="indefinite" restart="never" nodeType="tmRoot"/>
+      </p:par>
+    </p:tnLst>
+  </p:timing>
+</p:sld>
+</file>
+
+<file path=ppt/slides/slide17.xml><?xml version="1.0" encoding="utf-8"?>
 <p:sld xmlns:a="http://schemas.openxmlformats.org/drawingml/2006/main" xmlns:r="http://schemas.openxmlformats.org/officeDocument/2006/relationships" xmlns:mc="http://schemas.openxmlformats.org/markup-compatibility/2006" xmlns:mv="urn:schemas-microsoft-com:mac:vml" xmlns:p="http://schemas.openxmlformats.org/presentationml/2006/main" mc:Ignorable="mv" mc:PreserveAttributes="mv:*">
   <p:cSld>
     <p:spTree>
@@ -5795,7 +6238,7 @@
 </p:sld>
 </file>
 
-<file path=ppt/slides/slide15.xml><?xml version="1.0" encoding="utf-8"?>
+<file path=ppt/slides/slide18.xml><?xml version="1.0" encoding="utf-8"?>
 <p:sld xmlns:a="http://schemas.openxmlformats.org/drawingml/2006/main" xmlns:r="http://schemas.openxmlformats.org/officeDocument/2006/relationships" xmlns:mc="http://schemas.openxmlformats.org/markup-compatibility/2006" xmlns:mv="urn:schemas-microsoft-com:mac:vml" xmlns:p="http://schemas.openxmlformats.org/presentationml/2006/main" mc:Ignorable="mv" mc:PreserveAttributes="mv:*">
   <p:cSld>
     <p:spTree>
@@ -5848,7 +6291,7 @@
         <p:spPr>
           <a:xfrm>
             <a:off x="1392844" y="1492625"/>
-            <a:ext cx="6420754" cy="3046988"/>
+            <a:ext cx="6420754" cy="3785652"/>
           </a:xfrm>
           <a:prstGeom prst="rect">
             <a:avLst/>
@@ -5871,15 +6314,7 @@
             </a:pPr>
             <a:r>
               <a:rPr lang="en-US" sz="2400" dirty="0" smtClean="0"/>
-              <a:t> Version your app </a:t>
-            </a:r>
-            <a:r>
-              <a:rPr lang="en-US" sz="2400" dirty="0" smtClean="0"/>
-              <a:t>with</a:t>
-            </a:r>
-            <a:r>
-              <a:rPr lang="en-US" sz="2400" dirty="0" smtClean="0"/>
-              <a:t> </a:t>
+              <a:t> Version your app with </a:t>
             </a:r>
             <a:r>
               <a:rPr lang="en-US" sz="2400" dirty="0" err="1" smtClean="0"/>
@@ -5968,11 +6403,7 @@
             </a:r>
             <a:r>
               <a:rPr lang="en-US" sz="2400" dirty="0" smtClean="0"/>
-              <a:t> </a:t>
-            </a:r>
-            <a:r>
-              <a:rPr lang="en-US" sz="2400" dirty="0" smtClean="0"/>
-              <a:t>master</a:t>
+              <a:t> master</a:t>
             </a:r>
           </a:p>
           <a:p>
@@ -5996,7 +6427,117 @@
               <a:rPr lang="en-US" sz="2400" dirty="0" smtClean="0"/>
               <a:t> It really is that easy!</a:t>
             </a:r>
+          </a:p>
+          <a:p>
+            <a:pPr>
+              <a:buBlip>
+                <a:blip r:embed="rId2"/>
+              </a:buBlip>
+            </a:pPr>
+            <a:r>
+              <a:rPr lang="en-US" sz="2400" dirty="0" smtClean="0"/>
+              <a:t> http://simple-</a:t>
+            </a:r>
+            <a:r>
+              <a:rPr lang="en-US" sz="2400" dirty="0" err="1" smtClean="0"/>
+              <a:t>sinatra-meetup.heroku.com/standalone</a:t>
+            </a:r>
+            <a:r>
+              <a:rPr lang="en-US" sz="2400" dirty="0" smtClean="0"/>
+              <a:t>/</a:t>
+            </a:r>
+          </a:p>
+        </p:txBody>
+      </p:sp>
+    </p:spTree>
+  </p:cSld>
+  <p:clrMapOvr>
+    <a:masterClrMapping/>
+  </p:clrMapOvr>
+  <p:timing>
+    <p:tnLst>
+      <p:par>
+        <p:cTn id="1" dur="indefinite" restart="never" nodeType="tmRoot"/>
+      </p:par>
+    </p:tnLst>
+  </p:timing>
+</p:sld>
+</file>
+
+<file path=ppt/slides/slide19.xml><?xml version="1.0" encoding="utf-8"?>
+<p:sld xmlns:a="http://schemas.openxmlformats.org/drawingml/2006/main" xmlns:r="http://schemas.openxmlformats.org/officeDocument/2006/relationships" xmlns:mc="http://schemas.openxmlformats.org/markup-compatibility/2006" xmlns:mv="urn:schemas-microsoft-com:mac:vml" xmlns:p="http://schemas.openxmlformats.org/presentationml/2006/main" mc:Ignorable="mv" mc:PreserveAttributes="mv:*">
+  <p:cSld>
+    <p:spTree>
+      <p:nvGrpSpPr>
+        <p:cNvPr id="1" name=""/>
+        <p:cNvGrpSpPr/>
+        <p:nvPr/>
+      </p:nvGrpSpPr>
+      <p:grpSpPr>
+        <a:xfrm>
+          <a:off x="0" y="0"/>
+          <a:ext cx="0" cy="0"/>
+          <a:chOff x="0" y="0"/>
+          <a:chExt cx="0" cy="0"/>
+        </a:xfrm>
+      </p:grpSpPr>
+      <p:sp>
+        <p:nvSpPr>
+          <p:cNvPr id="2" name="Title 1"/>
+          <p:cNvSpPr>
+            <a:spLocks noGrp="1"/>
+          </p:cNvSpPr>
+          <p:nvPr>
+            <p:ph type="title"/>
+          </p:nvPr>
+        </p:nvSpPr>
+        <p:spPr/>
+        <p:txBody>
+          <a:bodyPr/>
+          <a:lstStyle/>
+          <a:p>
+            <a:r>
+              <a:rPr lang="en-US" dirty="0" smtClean="0"/>
+              <a:t>Sinatra Ideas</a:t>
+            </a:r>
+            <a:endParaRPr lang="en-US" dirty="0"/>
+          </a:p>
+        </p:txBody>
+      </p:sp>
+      <p:sp>
+        <p:nvSpPr>
+          <p:cNvPr id="3" name="TextBox 2"/>
+          <p:cNvSpPr txBox="1"/>
+          <p:nvPr/>
+        </p:nvSpPr>
+        <p:spPr>
+          <a:xfrm>
+            <a:off x="1392844" y="1492625"/>
+            <a:ext cx="6420754" cy="830997"/>
+          </a:xfrm>
+          <a:prstGeom prst="rect">
+            <a:avLst/>
+          </a:prstGeom>
+          <a:noFill/>
+        </p:spPr>
+        <p:txBody>
+          <a:bodyPr wrap="square" rtlCol="0">
+            <a:spAutoFit/>
+          </a:bodyPr>
+          <a:lstStyle/>
+          <a:p>
             <a:endParaRPr lang="en-US" sz="2400" dirty="0" smtClean="0"/>
+          </a:p>
+          <a:p>
+            <a:pPr>
+              <a:buBlip>
+                <a:blip r:embed="rId2"/>
+              </a:buBlip>
+            </a:pPr>
+            <a:r>
+              <a:rPr lang="en-US" sz="2400" dirty="0" smtClean="0"/>
+              <a:t> Under load using ‘top’</a:t>
+            </a:r>
           </a:p>
         </p:txBody>
       </p:sp>
@@ -6440,7 +6981,7 @@
             </a:r>
             <a:r>
               <a:rPr lang="en-US" sz="2400" dirty="0" smtClean="0"/>
-              <a:t> or bloated like larger web frameworks</a:t>
+              <a:t> or bloat like larger web frameworks</a:t>
             </a:r>
           </a:p>
           <a:p>
@@ -6590,7 +7131,7 @@
         <p:spPr>
           <a:xfrm>
             <a:off x="396052" y="1492625"/>
-            <a:ext cx="7738016" cy="4154983"/>
+            <a:ext cx="7738016" cy="4524315"/>
           </a:xfrm>
           <a:prstGeom prst="rect">
             <a:avLst/>
@@ -6730,6 +7271,17 @@
             <a:r>
               <a:rPr lang="en-US" sz="2400" dirty="0" smtClean="0"/>
               <a:t> Let’s take a look at a very basic standalone app</a:t>
+            </a:r>
+          </a:p>
+          <a:p>
+            <a:pPr>
+              <a:buBlip>
+                <a:blip r:embed="rId3"/>
+              </a:buBlip>
+            </a:pPr>
+            <a:r>
+              <a:rPr lang="en-US" sz="2400" dirty="0" smtClean="0"/>
+              <a:t> Testing is easy</a:t>
             </a:r>
           </a:p>
           <a:p>
@@ -6791,7 +7343,7 @@
           <a:p>
             <a:r>
               <a:rPr lang="en-US" dirty="0" smtClean="0"/>
-              <a:t>Ways to ‘start’ Sinatra</a:t>
+              <a:t>Sinatra DSL</a:t>
             </a:r>
             <a:endParaRPr lang="en-US" dirty="0"/>
           </a:p>
@@ -6806,7 +7358,7 @@
         <p:spPr>
           <a:xfrm>
             <a:off x="1392844" y="1492625"/>
-            <a:ext cx="6420754" cy="1200328"/>
+            <a:ext cx="6420754" cy="830997"/>
           </a:xfrm>
           <a:prstGeom prst="rect">
             <a:avLst/>
@@ -6829,35 +7381,11 @@
             </a:pPr>
             <a:r>
               <a:rPr lang="en-US" sz="2400" dirty="0" smtClean="0"/>
-              <a:t> Use a </a:t>
+              <a:t> Have a look at the </a:t>
             </a:r>
             <a:r>
               <a:rPr lang="en-US" sz="2400" dirty="0" err="1" smtClean="0"/>
-              <a:t>Rackup</a:t>
-            </a:r>
-            <a:r>
-              <a:rPr lang="en-US" sz="2400" dirty="0" smtClean="0"/>
-              <a:t> file - </a:t>
-            </a:r>
-            <a:r>
-              <a:rPr lang="en-US" sz="2400" dirty="0" err="1" smtClean="0"/>
-              <a:t>config.ru</a:t>
-            </a:r>
-            <a:endParaRPr lang="en-US" sz="2400" dirty="0" smtClean="0"/>
-          </a:p>
-          <a:p>
-            <a:pPr>
-              <a:buBlip>
-                <a:blip r:embed="rId2"/>
-              </a:buBlip>
-            </a:pPr>
-            <a:r>
-              <a:rPr lang="en-US" sz="2400" dirty="0" smtClean="0"/>
-              <a:t> Standalone mode - ruby </a:t>
-            </a:r>
-            <a:r>
-              <a:rPr lang="en-US" sz="2400" dirty="0" err="1" smtClean="0"/>
-              <a:t>your_sinatra_app.rb</a:t>
+              <a:t>cart_controller.rb</a:t>
             </a:r>
             <a:endParaRPr lang="en-US" sz="2400" dirty="0" smtClean="0"/>
           </a:p>
@@ -6911,12 +7439,8 @@
           <a:lstStyle/>
           <a:p>
             <a:r>
-              <a:rPr lang="en-US" dirty="0" err="1" smtClean="0"/>
-              <a:t>Rspec</a:t>
-            </a:r>
-            <a:r>
               <a:rPr lang="en-US" dirty="0" smtClean="0"/>
-              <a:t> and Sinatra</a:t>
+              <a:t>Database Connectivity</a:t>
             </a:r>
             <a:endParaRPr lang="en-US" dirty="0"/>
           </a:p>
@@ -6931,7 +7455,7 @@
         <p:spPr>
           <a:xfrm>
             <a:off x="1392844" y="1492625"/>
-            <a:ext cx="6420754" cy="1200328"/>
+            <a:ext cx="6420754" cy="1938992"/>
           </a:xfrm>
           <a:prstGeom prst="rect">
             <a:avLst/>
@@ -6949,40 +7473,45 @@
           <a:p>
             <a:pPr>
               <a:buBlip>
-                <a:blip r:embed="rId2"/>
+                <a:blip r:embed="rId3"/>
               </a:buBlip>
             </a:pPr>
             <a:r>
               <a:rPr lang="en-US" sz="2400" dirty="0" smtClean="0"/>
-              <a:t> Use a </a:t>
-            </a:r>
-            <a:r>
-              <a:rPr lang="en-US" sz="2400" dirty="0" err="1" smtClean="0"/>
-              <a:t>Rackup</a:t>
-            </a:r>
-            <a:r>
-              <a:rPr lang="en-US" sz="2400" dirty="0" smtClean="0"/>
-              <a:t> file - </a:t>
-            </a:r>
-            <a:r>
-              <a:rPr lang="en-US" sz="2400" dirty="0" err="1" smtClean="0"/>
-              <a:t>config.ru</a:t>
-            </a:r>
-            <a:endParaRPr lang="en-US" sz="2400" dirty="0" smtClean="0"/>
-          </a:p>
-          <a:p>
-            <a:pPr>
+              <a:t> “Roll your own” strategy</a:t>
+            </a:r>
+          </a:p>
+          <a:p>
+            <a:pPr lvl="1">
               <a:buBlip>
-                <a:blip r:embed="rId2"/>
+                <a:blip r:embed="rId3"/>
               </a:buBlip>
             </a:pPr>
             <a:r>
               <a:rPr lang="en-US" sz="2400" dirty="0" smtClean="0"/>
-              <a:t> Standalone mode - ruby </a:t>
-            </a:r>
-            <a:r>
-              <a:rPr lang="en-US" sz="2400" dirty="0" err="1" smtClean="0"/>
-              <a:t>your_sinatra_app.rb</a:t>
+              <a:t> Connections</a:t>
+            </a:r>
+          </a:p>
+          <a:p>
+            <a:pPr lvl="1">
+              <a:buBlip>
+                <a:blip r:embed="rId3"/>
+              </a:buBlip>
+            </a:pPr>
+            <a:r>
+              <a:rPr lang="en-US" sz="2400" dirty="0" smtClean="0"/>
+              <a:t> Migrations</a:t>
+            </a:r>
+          </a:p>
+          <a:p>
+            <a:pPr lvl="1">
+              <a:buBlip>
+                <a:blip r:embed="rId3"/>
+              </a:buBlip>
+            </a:pPr>
+            <a:r>
+              <a:rPr lang="en-US" sz="2400" dirty="0" smtClean="0"/>
+              <a:t> Rake tasks</a:t>
             </a:r>
             <a:endParaRPr lang="en-US" sz="2400" dirty="0" smtClean="0"/>
           </a:p>
@@ -7036,12 +7565,8 @@
           <a:lstStyle/>
           <a:p>
             <a:r>
-              <a:rPr lang="en-US" dirty="0" err="1" smtClean="0"/>
-              <a:t>TestUnit</a:t>
-            </a:r>
-            <a:r>
               <a:rPr lang="en-US" dirty="0" smtClean="0"/>
-              <a:t> and Sinatra</a:t>
+              <a:t>Testing Sinatra</a:t>
             </a:r>
             <a:endParaRPr lang="en-US" dirty="0"/>
           </a:p>
@@ -7056,7 +7581,7 @@
         <p:spPr>
           <a:xfrm>
             <a:off x="1392844" y="1492625"/>
-            <a:ext cx="6420754" cy="1200328"/>
+            <a:ext cx="6420754" cy="1938992"/>
           </a:xfrm>
           <a:prstGeom prst="rect">
             <a:avLst/>
@@ -7079,21 +7604,8 @@
             </a:pPr>
             <a:r>
               <a:rPr lang="en-US" sz="2400" dirty="0" smtClean="0"/>
-              <a:t> Use a </a:t>
-            </a:r>
-            <a:r>
-              <a:rPr lang="en-US" sz="2400" dirty="0" err="1" smtClean="0"/>
-              <a:t>Rackup</a:t>
-            </a:r>
-            <a:r>
-              <a:rPr lang="en-US" sz="2400" dirty="0" smtClean="0"/>
-              <a:t> file - </a:t>
-            </a:r>
-            <a:r>
-              <a:rPr lang="en-US" sz="2400" dirty="0" err="1" smtClean="0"/>
-              <a:t>config.ru</a:t>
-            </a:r>
-            <a:endParaRPr lang="en-US" sz="2400" dirty="0" smtClean="0"/>
+              <a:t> gem rack-test</a:t>
+            </a:r>
           </a:p>
           <a:p>
             <a:pPr>
@@ -7103,13 +7615,32 @@
             </a:pPr>
             <a:r>
               <a:rPr lang="en-US" sz="2400" dirty="0" smtClean="0"/>
-              <a:t> Standalone mode - ruby </a:t>
+              <a:t> include </a:t>
             </a:r>
             <a:r>
               <a:rPr lang="en-US" sz="2400" dirty="0" err="1" smtClean="0"/>
-              <a:t>your_sinatra_app.rb</a:t>
+              <a:t>Rack::Test::Methods</a:t>
             </a:r>
             <a:endParaRPr lang="en-US" sz="2400" dirty="0" smtClean="0"/>
+          </a:p>
+          <a:p>
+            <a:pPr>
+              <a:buBlip>
+                <a:blip r:embed="rId2"/>
+              </a:buBlip>
+            </a:pPr>
+            <a:r>
+              <a:rPr lang="en-US" sz="2400" dirty="0" smtClean="0"/>
+              <a:t> </a:t>
+            </a:r>
+            <a:r>
+              <a:rPr lang="en-US" sz="2400" dirty="0" err="1" smtClean="0"/>
+              <a:t>last_response</a:t>
+            </a:r>
+            <a:r>
+              <a:rPr lang="en-US" sz="2400" dirty="0" smtClean="0"/>
+              <a:t> variable provides access to        response body, headers, and status codes</a:t>
+            </a:r>
           </a:p>
         </p:txBody>
       </p:sp>
@@ -7145,32 +7676,6 @@
           <a:chExt cx="0" cy="0"/>
         </a:xfrm>
       </p:grpSpPr>
-      <p:pic>
-        <p:nvPicPr>
-          <p:cNvPr id="4" name="Picture 3"/>
-          <p:cNvPicPr>
-            <a:picLocks noChangeAspect="1"/>
-          </p:cNvPicPr>
-          <p:nvPr/>
-        </p:nvPicPr>
-        <p:blipFill>
-          <a:blip r:embed="rId3">
-            <a:alphaModFix amt="30000"/>
-          </a:blip>
-          <a:stretch>
-            <a:fillRect/>
-          </a:stretch>
-        </p:blipFill>
-        <p:spPr>
-          <a:xfrm>
-            <a:off x="-508000" y="1492625"/>
-            <a:ext cx="10160000" cy="3505200"/>
-          </a:xfrm>
-          <a:prstGeom prst="rect">
-            <a:avLst/>
-          </a:prstGeom>
-        </p:spPr>
-      </p:pic>
       <p:sp>
         <p:nvSpPr>
           <p:cNvPr id="2" name="Title 1"/>
@@ -7188,7 +7693,7 @@
           <a:p>
             <a:r>
               <a:rPr lang="en-US" dirty="0" smtClean="0"/>
-              <a:t>Sinatra + Bundler</a:t>
+              <a:t>Ways to ‘start’ Sinatra</a:t>
             </a:r>
             <a:endParaRPr lang="en-US" dirty="0"/>
           </a:p>
@@ -7203,7 +7708,7 @@
         <p:spPr>
           <a:xfrm>
             <a:off x="1392844" y="1492625"/>
-            <a:ext cx="6420754" cy="1200328"/>
+            <a:ext cx="6420754" cy="1938992"/>
           </a:xfrm>
           <a:prstGeom prst="rect">
             <a:avLst/>
@@ -7221,30 +7726,111 @@
           <a:p>
             <a:pPr>
               <a:buBlip>
-                <a:blip r:embed="rId4"/>
+                <a:blip r:embed="rId2"/>
               </a:buBlip>
             </a:pPr>
             <a:r>
               <a:rPr lang="en-US" sz="2400" dirty="0" smtClean="0"/>
+              <a:t> Basic standalone mode</a:t>
+            </a:r>
+          </a:p>
+          <a:p>
+            <a:pPr lvl="1">
+              <a:buBlip>
+                <a:blip r:embed="rId2"/>
+              </a:buBlip>
+            </a:pPr>
+            <a:r>
+              <a:rPr lang="en-US" sz="2400" dirty="0" smtClean="0"/>
+              <a:t> ruby </a:t>
+            </a:r>
+            <a:r>
+              <a:rPr lang="en-US" sz="2400" dirty="0" err="1" smtClean="0"/>
+              <a:t>basic_startup.rb</a:t>
+            </a:r>
+            <a:r>
+              <a:rPr lang="en-US" sz="2400" dirty="0" smtClean="0"/>
               <a:t> </a:t>
             </a:r>
-            <a:r>
-              <a:rPr lang="en-US" sz="2400" dirty="0" err="1" smtClean="0"/>
-              <a:t>Gemfile</a:t>
-            </a:r>
-            <a:endParaRPr lang="en-US" sz="2400" dirty="0" smtClean="0"/>
           </a:p>
           <a:p>
             <a:pPr>
               <a:buBlip>
-                <a:blip r:embed="rId4"/>
+                <a:blip r:embed="rId2"/>
               </a:buBlip>
             </a:pPr>
             <a:r>
+              <a:rPr lang="en-US" sz="2400" dirty="0" smtClean="0"/>
+              <a:t>Use a </a:t>
+            </a:r>
+            <a:r>
               <a:rPr lang="en-US" sz="2400" dirty="0" err="1" smtClean="0"/>
-              <a:t>Bundler.require_env</a:t>
+              <a:t>Rackup</a:t>
+            </a:r>
+            <a:r>
+              <a:rPr lang="en-US" sz="2400" dirty="0" smtClean="0"/>
+              <a:t> file - </a:t>
+            </a:r>
+            <a:r>
+              <a:rPr lang="en-US" sz="2400" dirty="0" err="1" smtClean="0"/>
+              <a:t>config.ru</a:t>
             </a:r>
             <a:endParaRPr lang="en-US" sz="2400" dirty="0" smtClean="0"/>
+          </a:p>
+          <a:p>
+            <a:pPr lvl="1">
+              <a:buBlip>
+                <a:blip r:embed="rId2"/>
+              </a:buBlip>
+            </a:pPr>
+            <a:r>
+              <a:rPr lang="en-US" sz="2400" dirty="0" smtClean="0"/>
+              <a:t>thin </a:t>
+            </a:r>
+            <a:r>
+              <a:rPr lang="en-US" sz="2400" b="1" dirty="0" smtClean="0"/>
+              <a:t>-</a:t>
+            </a:r>
+            <a:r>
+              <a:rPr lang="en-US" sz="2400" dirty="0" err="1" smtClean="0"/>
+              <a:t>s</a:t>
+            </a:r>
+            <a:r>
+              <a:rPr lang="en-US" sz="2400" dirty="0" smtClean="0"/>
+              <a:t> 2 </a:t>
+            </a:r>
+            <a:r>
+              <a:rPr lang="en-US" sz="2400" b="1" dirty="0" smtClean="0"/>
+              <a:t>-</a:t>
+            </a:r>
+            <a:r>
+              <a:rPr lang="en-US" sz="2400" dirty="0" smtClean="0"/>
+              <a:t>C </a:t>
+            </a:r>
+            <a:r>
+              <a:rPr lang="en-US" sz="2400" dirty="0" err="1" smtClean="0"/>
+              <a:t>config.yml</a:t>
+            </a:r>
+            <a:r>
+              <a:rPr lang="en-US" sz="2400" dirty="0" smtClean="0"/>
+              <a:t> </a:t>
+            </a:r>
+            <a:r>
+              <a:rPr lang="en-US" sz="2400" b="1" dirty="0" smtClean="0"/>
+              <a:t>-</a:t>
+            </a:r>
+            <a:r>
+              <a:rPr lang="en-US" sz="2400" dirty="0" smtClean="0"/>
+              <a:t>R </a:t>
+            </a:r>
+            <a:r>
+              <a:rPr lang="en-US" sz="2400" dirty="0" err="1" smtClean="0"/>
+              <a:t>config.ru</a:t>
+            </a:r>
+            <a:r>
+              <a:rPr lang="en-US" sz="2400" dirty="0" smtClean="0"/>
+              <a:t> start</a:t>
+            </a:r>
           </a:p>
         </p:txBody>
       </p:sp>
@@ -7300,6 +7886,43 @@
               <a:t>Sinatra Extensions</a:t>
             </a:r>
             <a:endParaRPr lang="en-US" dirty="0"/>
+          </a:p>
+        </p:txBody>
+      </p:sp>
+      <p:sp>
+        <p:nvSpPr>
+          <p:cNvPr id="3" name="TextBox 2"/>
+          <p:cNvSpPr txBox="1"/>
+          <p:nvPr/>
+        </p:nvSpPr>
+        <p:spPr>
+          <a:xfrm>
+            <a:off x="1392844" y="1492625"/>
+            <a:ext cx="6420754" cy="1200328"/>
+          </a:xfrm>
+          <a:prstGeom prst="rect">
+            <a:avLst/>
+          </a:prstGeom>
+          <a:noFill/>
+        </p:spPr>
+        <p:txBody>
+          <a:bodyPr wrap="square" rtlCol="0">
+            <a:spAutoFit/>
+          </a:bodyPr>
+          <a:lstStyle/>
+          <a:p>
+            <a:endParaRPr lang="en-US" sz="2400" dirty="0" smtClean="0"/>
+          </a:p>
+          <a:p>
+            <a:pPr>
+              <a:buBlip>
+                <a:blip r:embed="rId2"/>
+              </a:buBlip>
+            </a:pPr>
+            <a:r>
+              <a:rPr lang="en-US" sz="2400" dirty="0" smtClean="0"/>
+              <a:t> Before you get carried away check for rack middleware </a:t>
+            </a:r>
           </a:p>
         </p:txBody>
       </p:sp>

</xml_diff>

<commit_message>
nz: adding more slides, details, jmeter scripts
</commit_message>
<xml_diff>
--- a/sinatra.pptx
+++ b/sinatra.pptx
@@ -5,7 +5,7 @@
     <p:sldMasterId id="2147483660" r:id="rId1"/>
   </p:sldMasterIdLst>
   <p:notesMasterIdLst>
-    <p:notesMasterId r:id="rId33"/>
+    <p:notesMasterId r:id="rId30"/>
   </p:notesMasterIdLst>
   <p:sldIdLst>
     <p:sldId id="256" r:id="rId2"/>
@@ -32,13 +32,10 @@
     <p:sldId id="262" r:id="rId23"/>
     <p:sldId id="260" r:id="rId24"/>
     <p:sldId id="263" r:id="rId25"/>
-    <p:sldId id="264" r:id="rId26"/>
-    <p:sldId id="266" r:id="rId27"/>
-    <p:sldId id="271" r:id="rId28"/>
-    <p:sldId id="267" r:id="rId29"/>
-    <p:sldId id="268" r:id="rId30"/>
-    <p:sldId id="283" r:id="rId31"/>
-    <p:sldId id="272" r:id="rId32"/>
+    <p:sldId id="271" r:id="rId26"/>
+    <p:sldId id="268" r:id="rId27"/>
+    <p:sldId id="283" r:id="rId28"/>
+    <p:sldId id="272" r:id="rId29"/>
   </p:sldIdLst>
   <p:sldSz cx="9144000" cy="6858000" type="screen4x3"/>
   <p:notesSz cx="6858000" cy="9144000"/>
@@ -223,7 +220,7 @@
             <a:fld id="{FEBA1754-3910-A94B-AF97-8DE201D32E78}" type="datetimeFigureOut">
               <a:rPr lang="en-US" smtClean="0"/>
               <a:pPr/>
-              <a:t>8/23/10</a:t>
+              <a:t>8/26/10</a:t>
             </a:fld>
             <a:endParaRPr lang="en-US"/>
           </a:p>
@@ -535,18 +532,6 @@
           </a:bodyPr>
           <a:lstStyle/>
           <a:p>
-            <a:r>
-              <a:rPr lang="en-US" dirty="0" smtClean="0"/>
-              <a:t>These are just some compelling reasons to give Sinatra a strong</a:t>
-            </a:r>
-            <a:r>
-              <a:rPr lang="en-US" baseline="0" dirty="0" smtClean="0"/>
-              <a:t> consideration </a:t>
-            </a:r>
-            <a:r>
-              <a:rPr lang="en-US" dirty="0" smtClean="0"/>
-              <a:t>the next time you start a new project</a:t>
-            </a:r>
             <a:endParaRPr lang="en-US" dirty="0"/>
           </a:p>
         </p:txBody>
@@ -569,7 +554,7 @@
             <a:fld id="{4355A105-26B0-5043-A7EC-94C834C82E90}" type="slidenum">
               <a:rPr lang="en-US" smtClean="0"/>
               <a:pPr/>
-              <a:t>3</a:t>
+              <a:t>1</a:t>
             </a:fld>
             <a:endParaRPr lang="en-US"/>
           </a:p>
@@ -629,6 +614,29 @@
           </a:bodyPr>
           <a:lstStyle/>
           <a:p>
+            <a:r>
+              <a:rPr lang="en-US" dirty="0" smtClean="0"/>
+              <a:t>Refer to the </a:t>
+            </a:r>
+            <a:r>
+              <a:rPr lang="en-US" dirty="0" err="1" smtClean="0"/>
+              <a:t>standalone_controller.rb</a:t>
+            </a:r>
+            <a:endParaRPr lang="en-US" dirty="0" smtClean="0"/>
+          </a:p>
+          <a:p>
+            <a:r>
+              <a:rPr lang="en-US" dirty="0" smtClean="0"/>
+              <a:t>Mention</a:t>
+            </a:r>
+            <a:r>
+              <a:rPr lang="en-US" baseline="0" dirty="0" smtClean="0"/>
+              <a:t> </a:t>
+            </a:r>
+            <a:r>
+              <a:rPr lang="en-US" baseline="0" dirty="0" smtClean="0"/>
+              <a:t>the gotcha with the XML builder templates, the xml variable in the template is automatically initialized for you</a:t>
+            </a:r>
             <a:endParaRPr lang="en-US" dirty="0"/>
           </a:p>
         </p:txBody>
@@ -651,7 +659,7 @@
             <a:fld id="{4355A105-26B0-5043-A7EC-94C834C82E90}" type="slidenum">
               <a:rPr lang="en-US" smtClean="0"/>
               <a:pPr/>
-              <a:t>12</a:t>
+              <a:t>11</a:t>
             </a:fld>
             <a:endParaRPr lang="en-US"/>
           </a:p>
@@ -733,7 +741,7 @@
             <a:fld id="{4355A105-26B0-5043-A7EC-94C834C82E90}" type="slidenum">
               <a:rPr lang="en-US" smtClean="0"/>
               <a:pPr/>
-              <a:t>13</a:t>
+              <a:t>12</a:t>
             </a:fld>
             <a:endParaRPr lang="en-US"/>
           </a:p>
@@ -795,11 +803,15 @@
           <a:p>
             <a:r>
               <a:rPr lang="en-US" dirty="0" smtClean="0"/>
-              <a:t>Discuss later</a:t>
+              <a:t>Refer to</a:t>
             </a:r>
             <a:r>
               <a:rPr lang="en-US" baseline="0" dirty="0" smtClean="0"/>
-              <a:t> how this was made into an extension</a:t>
+              <a:t> the </a:t>
+            </a:r>
+            <a:r>
+              <a:rPr lang="en-US" baseline="0" dirty="0" err="1" smtClean="0"/>
+              <a:t>search_controller.rb</a:t>
             </a:r>
             <a:endParaRPr lang="en-US" dirty="0"/>
           </a:p>
@@ -823,7 +835,7 @@
             <a:fld id="{4355A105-26B0-5043-A7EC-94C834C82E90}" type="slidenum">
               <a:rPr lang="en-US" smtClean="0"/>
               <a:pPr/>
-              <a:t>14</a:t>
+              <a:t>13</a:t>
             </a:fld>
             <a:endParaRPr lang="en-US"/>
           </a:p>
@@ -885,27 +897,11 @@
           <a:p>
             <a:r>
               <a:rPr lang="en-US" dirty="0" smtClean="0"/>
-              <a:t>Go back to the </a:t>
+              <a:t>Refer to the </a:t>
             </a:r>
             <a:r>
               <a:rPr lang="en-US" dirty="0" err="1" smtClean="0"/>
-              <a:t>db_migrate</a:t>
-            </a:r>
-            <a:r>
-              <a:rPr lang="en-US" dirty="0" smtClean="0"/>
-              <a:t> task to show how</a:t>
-            </a:r>
-            <a:r>
-              <a:rPr lang="en-US" baseline="0" dirty="0" smtClean="0"/>
-              <a:t> easy </a:t>
-            </a:r>
-            <a:r>
-              <a:rPr lang="en-US" baseline="0" dirty="0" err="1" smtClean="0"/>
-              <a:t>db:migrate</a:t>
-            </a:r>
-            <a:r>
-              <a:rPr lang="en-US" baseline="0" dirty="0" smtClean="0"/>
-              <a:t> can be done yourself</a:t>
+              <a:t>products_controller.rb</a:t>
             </a:r>
             <a:endParaRPr lang="en-US" dirty="0"/>
           </a:p>
@@ -929,7 +925,7 @@
             <a:fld id="{4355A105-26B0-5043-A7EC-94C834C82E90}" type="slidenum">
               <a:rPr lang="en-US" smtClean="0"/>
               <a:pPr/>
-              <a:t>15</a:t>
+              <a:t>14</a:t>
             </a:fld>
             <a:endParaRPr lang="en-US"/>
           </a:p>
@@ -990,101 +986,28 @@
           <a:lstStyle/>
           <a:p>
             <a:r>
+              <a:rPr lang="en-US" dirty="0" smtClean="0"/>
+              <a:t>Go back to the </a:t>
+            </a:r>
+            <a:r>
               <a:rPr lang="en-US" dirty="0" err="1" smtClean="0"/>
-              <a:t>sinatra</a:t>
+              <a:t>db_migrate</a:t>
             </a:r>
             <a:r>
               <a:rPr lang="en-US" dirty="0" smtClean="0"/>
-              <a:t>-cache extension does</a:t>
+              <a:t> task to show how</a:t>
             </a:r>
             <a:r>
               <a:rPr lang="en-US" baseline="0" dirty="0" smtClean="0"/>
-              <a:t> file based page and fragment </a:t>
+              <a:t> easy </a:t>
+            </a:r>
+            <a:r>
+              <a:rPr lang="en-US" baseline="0" dirty="0" err="1" smtClean="0"/>
+              <a:t>db:migrate</a:t>
             </a:r>
             <a:r>
               <a:rPr lang="en-US" baseline="0" dirty="0" smtClean="0"/>
-              <a:t>caching, this is completely file based</a:t>
-            </a:r>
-          </a:p>
-          <a:p>
-            <a:endParaRPr lang="en-US" baseline="0" dirty="0" smtClean="0"/>
-          </a:p>
-          <a:p>
-            <a:r>
-              <a:rPr lang="en-US" baseline="0" dirty="0" err="1" smtClean="0"/>
-              <a:t>sinatra</a:t>
-            </a:r>
-            <a:r>
-              <a:rPr lang="en-US" baseline="0" dirty="0" smtClean="0"/>
-              <a:t>-cache is implemented in the search controller and views within the examples</a:t>
-            </a:r>
-          </a:p>
-          <a:p>
-            <a:endParaRPr lang="en-US" baseline="0" dirty="0" smtClean="0"/>
-          </a:p>
-          <a:p>
-            <a:r>
-              <a:rPr lang="en-US" baseline="0" dirty="0" smtClean="0"/>
-              <a:t>rack-cache is HTTP based caching based on </a:t>
-            </a:r>
-            <a:r>
-              <a:rPr lang="en-US" baseline="0" dirty="0" err="1" smtClean="0"/>
-              <a:t>Etag</a:t>
-            </a:r>
-            <a:r>
-              <a:rPr lang="en-US" baseline="0" dirty="0" smtClean="0"/>
-              <a:t> and Last modified headers that supports memory, disk, and </a:t>
-            </a:r>
-            <a:r>
-              <a:rPr lang="en-US" baseline="0" dirty="0" err="1" smtClean="0"/>
-              <a:t>memcache</a:t>
-            </a:r>
-            <a:r>
-              <a:rPr lang="en-US" baseline="0" dirty="0" smtClean="0"/>
-              <a:t> stores</a:t>
-            </a:r>
-          </a:p>
-          <a:p>
-            <a:r>
-              <a:rPr lang="en-US" baseline="0" dirty="0" smtClean="0"/>
-              <a:t>	</a:t>
-            </a:r>
-            <a:r>
-              <a:rPr lang="en-US" dirty="0" smtClean="0"/>
-              <a:t>Entity stores are used to cache response bodies across requests.</a:t>
-            </a:r>
-          </a:p>
-          <a:p>
-            <a:r>
-              <a:rPr lang="en-US" dirty="0" smtClean="0"/>
-              <a:t>	Meta stores</a:t>
-            </a:r>
-            <a:r>
-              <a:rPr lang="en-US" baseline="0" dirty="0" smtClean="0"/>
-              <a:t> are used for </a:t>
-            </a:r>
-            <a:r>
-              <a:rPr lang="en-US" dirty="0" smtClean="0"/>
-              <a:t>request/response pair keyed by the request's URL</a:t>
-            </a:r>
-          </a:p>
-          <a:p>
-            <a:r>
-              <a:rPr lang="en-US" dirty="0" smtClean="0"/>
-              <a:t>rack-cache</a:t>
-            </a:r>
-            <a:r>
-              <a:rPr lang="en-US" baseline="0" dirty="0" smtClean="0"/>
-              <a:t> is a lightweight alternative to squid or other high throughput proxy servers</a:t>
-            </a:r>
-          </a:p>
-          <a:p>
-            <a:endParaRPr lang="en-US" baseline="0" dirty="0" smtClean="0"/>
-          </a:p>
-          <a:p>
-            <a:r>
-              <a:rPr lang="en-US" baseline="0" dirty="0" smtClean="0"/>
-              <a:t>rack-cache is implemented in the products controller within the examples</a:t>
+              <a:t> can be done yourself</a:t>
             </a:r>
             <a:endParaRPr lang="en-US" dirty="0"/>
           </a:p>
@@ -1108,7 +1031,7 @@
             <a:fld id="{4355A105-26B0-5043-A7EC-94C834C82E90}" type="slidenum">
               <a:rPr lang="en-US" smtClean="0"/>
               <a:pPr/>
-              <a:t>16</a:t>
+              <a:t>15</a:t>
             </a:fld>
             <a:endParaRPr lang="en-US"/>
           </a:p>
@@ -1168,6 +1091,114 @@
           </a:bodyPr>
           <a:lstStyle/>
           <a:p>
+            <a:r>
+              <a:rPr lang="en-US" dirty="0" err="1" smtClean="0"/>
+              <a:t>sinatra</a:t>
+            </a:r>
+            <a:r>
+              <a:rPr lang="en-US" dirty="0" smtClean="0"/>
+              <a:t>-cache extension does</a:t>
+            </a:r>
+            <a:r>
+              <a:rPr lang="en-US" baseline="0" dirty="0" smtClean="0"/>
+              <a:t> file based page and fragment caching, this is completely file based</a:t>
+            </a:r>
+          </a:p>
+          <a:p>
+            <a:endParaRPr lang="en-US" baseline="0" dirty="0" smtClean="0"/>
+          </a:p>
+          <a:p>
+            <a:r>
+              <a:rPr lang="en-US" baseline="0" dirty="0" err="1" smtClean="0"/>
+              <a:t>sinatra</a:t>
+            </a:r>
+            <a:r>
+              <a:rPr lang="en-US" baseline="0" dirty="0" smtClean="0"/>
+              <a:t>-cache is implemented in the search controller and views within the examples</a:t>
+            </a:r>
+            <a:endParaRPr lang="en-US" baseline="0" dirty="0" smtClean="0"/>
+          </a:p>
+          <a:p>
+            <a:endParaRPr lang="en-US" baseline="0" dirty="0" smtClean="0"/>
+          </a:p>
+          <a:p>
+            <a:r>
+              <a:rPr lang="en-US" baseline="0" dirty="0" smtClean="0"/>
+              <a:t>For rack-cache refer to </a:t>
+            </a:r>
+            <a:r>
+              <a:rPr lang="en-US" baseline="0" dirty="0" err="1" smtClean="0"/>
+              <a:t>products_controller.rb</a:t>
+            </a:r>
+            <a:r>
+              <a:rPr lang="en-US" baseline="0" dirty="0" smtClean="0"/>
+              <a:t> </a:t>
+            </a:r>
+          </a:p>
+          <a:p>
+            <a:r>
+              <a:rPr lang="en-US" baseline="0" dirty="0" smtClean="0"/>
+              <a:t>rack-cache is HTTP based caching based on </a:t>
+            </a:r>
+            <a:r>
+              <a:rPr lang="en-US" baseline="0" dirty="0" err="1" smtClean="0"/>
+              <a:t>Etag</a:t>
+            </a:r>
+            <a:r>
+              <a:rPr lang="en-US" baseline="0" dirty="0" smtClean="0"/>
+              <a:t> and Last modified headers that supports memory, disk, and </a:t>
+            </a:r>
+            <a:r>
+              <a:rPr lang="en-US" baseline="0" dirty="0" err="1" smtClean="0"/>
+              <a:t>memcache</a:t>
+            </a:r>
+            <a:r>
+              <a:rPr lang="en-US" baseline="0" dirty="0" smtClean="0"/>
+              <a:t> stores</a:t>
+            </a:r>
+          </a:p>
+          <a:p>
+            <a:r>
+              <a:rPr lang="en-US" baseline="0" dirty="0" smtClean="0"/>
+              <a:t>	</a:t>
+            </a:r>
+            <a:r>
+              <a:rPr lang="en-US" dirty="0" smtClean="0"/>
+              <a:t>Entity stores are used to cache response bodies across requests.</a:t>
+            </a:r>
+          </a:p>
+          <a:p>
+            <a:r>
+              <a:rPr lang="en-US" dirty="0" smtClean="0"/>
+              <a:t>	Meta stores</a:t>
+            </a:r>
+            <a:r>
+              <a:rPr lang="en-US" baseline="0" dirty="0" smtClean="0"/>
+              <a:t> are used for </a:t>
+            </a:r>
+            <a:r>
+              <a:rPr lang="en-US" dirty="0" smtClean="0"/>
+              <a:t>request/response pair keyed by the request's URL</a:t>
+            </a:r>
+          </a:p>
+          <a:p>
+            <a:r>
+              <a:rPr lang="en-US" dirty="0" smtClean="0"/>
+              <a:t>rack-cache</a:t>
+            </a:r>
+            <a:r>
+              <a:rPr lang="en-US" baseline="0" dirty="0" smtClean="0"/>
+              <a:t> is a lightweight alternative to squid or other high throughput proxy servers</a:t>
+            </a:r>
+          </a:p>
+          <a:p>
+            <a:endParaRPr lang="en-US" baseline="0" dirty="0" smtClean="0"/>
+          </a:p>
+          <a:p>
+            <a:r>
+              <a:rPr lang="en-US" baseline="0" dirty="0" smtClean="0"/>
+              <a:t>rack-cache is implemented in the products controller within the examples</a:t>
+            </a:r>
             <a:endParaRPr lang="en-US" dirty="0"/>
           </a:p>
         </p:txBody>
@@ -1190,7 +1221,7 @@
             <a:fld id="{4355A105-26B0-5043-A7EC-94C834C82E90}" type="slidenum">
               <a:rPr lang="en-US" smtClean="0"/>
               <a:pPr/>
-              <a:t>17</a:t>
+              <a:t>16</a:t>
             </a:fld>
             <a:endParaRPr lang="en-US"/>
           </a:p>
@@ -1250,24 +1281,6 @@
           </a:bodyPr>
           <a:lstStyle/>
           <a:p>
-            <a:r>
-              <a:rPr lang="en-US" dirty="0" smtClean="0"/>
-              <a:t>Bundler</a:t>
-            </a:r>
-            <a:r>
-              <a:rPr lang="en-US" baseline="0" dirty="0" smtClean="0"/>
-              <a:t> is great since it makes your application completely portable without worrying about gems on the deploy server</a:t>
-            </a:r>
-          </a:p>
-          <a:p>
-            <a:r>
-              <a:rPr lang="en-US" baseline="0" dirty="0" smtClean="0"/>
-              <a:t>It is also keeps </a:t>
-            </a:r>
-            <a:r>
-              <a:rPr lang="en-US" baseline="0" smtClean="0"/>
-              <a:t>you honest</a:t>
-            </a:r>
             <a:endParaRPr lang="en-US" dirty="0"/>
           </a:p>
         </p:txBody>
@@ -1290,7 +1303,7 @@
             <a:fld id="{4355A105-26B0-5043-A7EC-94C834C82E90}" type="slidenum">
               <a:rPr lang="en-US" smtClean="0"/>
               <a:pPr/>
-              <a:t>22</a:t>
+              <a:t>17</a:t>
             </a:fld>
             <a:endParaRPr lang="en-US"/>
           </a:p>
@@ -1352,35 +1365,21 @@
           <a:p>
             <a:r>
               <a:rPr lang="en-US" dirty="0" smtClean="0"/>
-              <a:t>find *.</a:t>
-            </a:r>
-            <a:r>
-              <a:rPr lang="en-US" dirty="0" err="1" smtClean="0"/>
-              <a:t>rb</a:t>
-            </a:r>
-            <a:r>
-              <a:rPr lang="en-US" dirty="0" smtClean="0"/>
-              <a:t> -print0 | </a:t>
-            </a:r>
-            <a:r>
-              <a:rPr lang="en-US" dirty="0" err="1" smtClean="0"/>
-              <a:t>xargs</a:t>
-            </a:r>
-            <a:r>
-              <a:rPr lang="en-US" dirty="0" smtClean="0"/>
-              <a:t> -0 </a:t>
-            </a:r>
-            <a:r>
-              <a:rPr lang="en-US" dirty="0" err="1" smtClean="0"/>
-              <a:t>wc</a:t>
-            </a:r>
-            <a:r>
-              <a:rPr lang="en-US" dirty="0" smtClean="0"/>
-              <a:t> -</a:t>
-            </a:r>
-            <a:r>
-              <a:rPr lang="en-US" dirty="0" err="1" smtClean="0"/>
-              <a:t>l</a:t>
+              <a:t>Bundler</a:t>
+            </a:r>
+            <a:r>
+              <a:rPr lang="en-US" baseline="0" dirty="0" smtClean="0"/>
+              <a:t> is great since it makes your application completely portable without worrying about gems on the deploy server</a:t>
+            </a:r>
+          </a:p>
+          <a:p>
+            <a:r>
+              <a:rPr lang="en-US" baseline="0" dirty="0" smtClean="0"/>
+              <a:t>It is also keeps </a:t>
+            </a:r>
+            <a:r>
+              <a:rPr lang="en-US" baseline="0" smtClean="0"/>
+              <a:t>you honest</a:t>
             </a:r>
             <a:endParaRPr lang="en-US" dirty="0"/>
           </a:p>
@@ -1404,7 +1403,7 @@
             <a:fld id="{4355A105-26B0-5043-A7EC-94C834C82E90}" type="slidenum">
               <a:rPr lang="en-US" smtClean="0"/>
               <a:pPr/>
-              <a:t>23</a:t>
+              <a:t>22</a:t>
             </a:fld>
             <a:endParaRPr lang="en-US"/>
           </a:p>
@@ -1464,6 +1463,38 @@
           </a:bodyPr>
           <a:lstStyle/>
           <a:p>
+            <a:r>
+              <a:rPr lang="en-US" dirty="0" smtClean="0"/>
+              <a:t>find . -name *.</a:t>
+            </a:r>
+            <a:r>
+              <a:rPr lang="en-US" dirty="0" err="1" smtClean="0"/>
+              <a:t>rb</a:t>
+            </a:r>
+            <a:r>
+              <a:rPr lang="en-US" dirty="0" smtClean="0"/>
+              <a:t> -print0 | </a:t>
+            </a:r>
+            <a:r>
+              <a:rPr lang="en-US" dirty="0" err="1" smtClean="0"/>
+              <a:t>xargs</a:t>
+            </a:r>
+            <a:r>
+              <a:rPr lang="en-US" dirty="0" smtClean="0"/>
+              <a:t> -0 </a:t>
+            </a:r>
+            <a:r>
+              <a:rPr lang="en-US" dirty="0" err="1" smtClean="0"/>
+              <a:t>wc</a:t>
+            </a:r>
+            <a:r>
+              <a:rPr lang="en-US" dirty="0" smtClean="0"/>
+              <a:t> -</a:t>
+            </a:r>
+            <a:r>
+              <a:rPr lang="en-US" dirty="0" err="1" smtClean="0"/>
+              <a:t>l</a:t>
+            </a:r>
             <a:endParaRPr lang="en-US" dirty="0"/>
           </a:p>
         </p:txBody>
@@ -1486,7 +1517,105 @@
             <a:fld id="{4355A105-26B0-5043-A7EC-94C834C82E90}" type="slidenum">
               <a:rPr lang="en-US" smtClean="0"/>
               <a:pPr/>
-              <a:t>28</a:t>
+              <a:t>23</a:t>
+            </a:fld>
+            <a:endParaRPr lang="en-US"/>
+          </a:p>
+        </p:txBody>
+      </p:sp>
+    </p:spTree>
+  </p:cSld>
+  <p:clrMapOvr>
+    <a:masterClrMapping/>
+  </p:clrMapOvr>
+</p:notes>
+</file>
+
+<file path=ppt/notesSlides/notesSlide19.xml><?xml version="1.0" encoding="utf-8"?>
+<p:notes xmlns:a="http://schemas.openxmlformats.org/drawingml/2006/main" xmlns:r="http://schemas.openxmlformats.org/officeDocument/2006/relationships" xmlns:mc="http://schemas.openxmlformats.org/markup-compatibility/2006" xmlns:mv="urn:schemas-microsoft-com:mac:vml" xmlns:p="http://schemas.openxmlformats.org/presentationml/2006/main" mc:Ignorable="mv" mc:PreserveAttributes="mv:*">
+  <p:cSld>
+    <p:spTree>
+      <p:nvGrpSpPr>
+        <p:cNvPr id="1" name=""/>
+        <p:cNvGrpSpPr/>
+        <p:nvPr/>
+      </p:nvGrpSpPr>
+      <p:grpSpPr>
+        <a:xfrm>
+          <a:off x="0" y="0"/>
+          <a:ext cx="0" cy="0"/>
+          <a:chOff x="0" y="0"/>
+          <a:chExt cx="0" cy="0"/>
+        </a:xfrm>
+      </p:grpSpPr>
+      <p:sp>
+        <p:nvSpPr>
+          <p:cNvPr id="2" name="Slide Image Placeholder 1"/>
+          <p:cNvSpPr>
+            <a:spLocks noGrp="1" noRot="1" noChangeAspect="1"/>
+          </p:cNvSpPr>
+          <p:nvPr>
+            <p:ph type="sldImg"/>
+          </p:nvPr>
+        </p:nvSpPr>
+        <p:spPr/>
+      </p:sp>
+      <p:sp>
+        <p:nvSpPr>
+          <p:cNvPr id="3" name="Notes Placeholder 2"/>
+          <p:cNvSpPr>
+            <a:spLocks noGrp="1"/>
+          </p:cNvSpPr>
+          <p:nvPr>
+            <p:ph type="body" idx="1"/>
+          </p:nvPr>
+        </p:nvSpPr>
+        <p:spPr/>
+        <p:txBody>
+          <a:bodyPr>
+            <a:normAutofit/>
+          </a:bodyPr>
+          <a:lstStyle/>
+          <a:p>
+            <a:r>
+              <a:rPr lang="en-US" dirty="0" smtClean="0"/>
+              <a:t>Start</a:t>
+            </a:r>
+            <a:r>
+              <a:rPr lang="en-US" baseline="0" dirty="0" smtClean="0"/>
+              <a:t> up </a:t>
+            </a:r>
+            <a:r>
+              <a:rPr lang="en-US" baseline="0" dirty="0" err="1" smtClean="0"/>
+              <a:t>Jmeter</a:t>
+            </a:r>
+            <a:r>
+              <a:rPr lang="en-US" baseline="0" dirty="0" smtClean="0"/>
+              <a:t> and top to monitor</a:t>
+            </a:r>
+            <a:endParaRPr lang="en-US" dirty="0"/>
+          </a:p>
+        </p:txBody>
+      </p:sp>
+      <p:sp>
+        <p:nvSpPr>
+          <p:cNvPr id="4" name="Slide Number Placeholder 3"/>
+          <p:cNvSpPr>
+            <a:spLocks noGrp="1"/>
+          </p:cNvSpPr>
+          <p:nvPr>
+            <p:ph type="sldNum" sz="quarter" idx="10"/>
+          </p:nvPr>
+        </p:nvSpPr>
+        <p:spPr/>
+        <p:txBody>
+          <a:bodyPr/>
+          <a:lstStyle/>
+          <a:p>
+            <a:fld id="{4355A105-26B0-5043-A7EC-94C834C82E90}" type="slidenum">
+              <a:rPr lang="en-US" smtClean="0"/>
+              <a:pPr/>
+              <a:t>24</a:t>
             </a:fld>
             <a:endParaRPr lang="en-US"/>
           </a:p>
@@ -1548,17 +1677,15 @@
           <a:p>
             <a:r>
               <a:rPr lang="en-US" dirty="0" smtClean="0"/>
-              <a:t>To</a:t>
+              <a:t>These are just some compelling reasons to give Sinatra a strong</a:t>
             </a:r>
             <a:r>
               <a:rPr lang="en-US" baseline="0" dirty="0" smtClean="0"/>
-              <a:t> further qualify that Sinatra is more DSL than framework take a close look at the implementation details to the some of the more important things like</a:t>
-            </a:r>
-          </a:p>
-          <a:p>
-            <a:r>
-              <a:rPr lang="en-US" baseline="0" dirty="0" smtClean="0"/>
-              <a:t>logging, sessions, method override. These are all implemented by Rack, not Sinatra.</a:t>
+              <a:t> consideration </a:t>
+            </a:r>
+            <a:r>
+              <a:rPr lang="en-US" dirty="0" smtClean="0"/>
+              <a:t>the next time you start a new project</a:t>
             </a:r>
             <a:endParaRPr lang="en-US" dirty="0"/>
           </a:p>
@@ -1582,7 +1709,294 @@
             <a:fld id="{4355A105-26B0-5043-A7EC-94C834C82E90}" type="slidenum">
               <a:rPr lang="en-US" smtClean="0"/>
               <a:pPr/>
-              <a:t>4</a:t>
+              <a:t>3</a:t>
+            </a:fld>
+            <a:endParaRPr lang="en-US"/>
+          </a:p>
+        </p:txBody>
+      </p:sp>
+    </p:spTree>
+  </p:cSld>
+  <p:clrMapOvr>
+    <a:masterClrMapping/>
+  </p:clrMapOvr>
+</p:notes>
+</file>
+
+<file path=ppt/notesSlides/notesSlide20.xml><?xml version="1.0" encoding="utf-8"?>
+<p:notes xmlns:a="http://schemas.openxmlformats.org/drawingml/2006/main" xmlns:r="http://schemas.openxmlformats.org/officeDocument/2006/relationships" xmlns:mc="http://schemas.openxmlformats.org/markup-compatibility/2006" xmlns:mv="urn:schemas-microsoft-com:mac:vml" xmlns:p="http://schemas.openxmlformats.org/presentationml/2006/main" mc:Ignorable="mv" mc:PreserveAttributes="mv:*">
+  <p:cSld>
+    <p:spTree>
+      <p:nvGrpSpPr>
+        <p:cNvPr id="1" name=""/>
+        <p:cNvGrpSpPr/>
+        <p:nvPr/>
+      </p:nvGrpSpPr>
+      <p:grpSpPr>
+        <a:xfrm>
+          <a:off x="0" y="0"/>
+          <a:ext cx="0" cy="0"/>
+          <a:chOff x="0" y="0"/>
+          <a:chExt cx="0" cy="0"/>
+        </a:xfrm>
+      </p:grpSpPr>
+      <p:sp>
+        <p:nvSpPr>
+          <p:cNvPr id="2" name="Slide Image Placeholder 1"/>
+          <p:cNvSpPr>
+            <a:spLocks noGrp="1" noRot="1" noChangeAspect="1"/>
+          </p:cNvSpPr>
+          <p:nvPr>
+            <p:ph type="sldImg"/>
+          </p:nvPr>
+        </p:nvSpPr>
+        <p:spPr/>
+      </p:sp>
+      <p:sp>
+        <p:nvSpPr>
+          <p:cNvPr id="3" name="Notes Placeholder 2"/>
+          <p:cNvSpPr>
+            <a:spLocks noGrp="1"/>
+          </p:cNvSpPr>
+          <p:nvPr>
+            <p:ph type="body" idx="1"/>
+          </p:nvPr>
+        </p:nvSpPr>
+        <p:spPr/>
+        <p:txBody>
+          <a:bodyPr>
+            <a:normAutofit/>
+          </a:bodyPr>
+          <a:lstStyle/>
+          <a:p>
+            <a:r>
+              <a:rPr lang="en-US" dirty="0" err="1" smtClean="0"/>
+              <a:t>Jruby</a:t>
+            </a:r>
+            <a:r>
+              <a:rPr lang="en-US" dirty="0" smtClean="0"/>
+              <a:t>-rack Jar allows us to interface to all</a:t>
+            </a:r>
+            <a:r>
+              <a:rPr lang="en-US" baseline="0" dirty="0" smtClean="0"/>
+              <a:t> rack based </a:t>
+            </a:r>
+            <a:r>
+              <a:rPr lang="en-US" baseline="0" dirty="0" smtClean="0"/>
+              <a:t>apps via </a:t>
+            </a:r>
+            <a:r>
+              <a:rPr lang="en-US" baseline="0" dirty="0" err="1" smtClean="0"/>
+              <a:t>servlet</a:t>
+            </a:r>
+            <a:r>
+              <a:rPr lang="en-US" baseline="0" dirty="0" smtClean="0"/>
+              <a:t> filter in the </a:t>
+            </a:r>
+            <a:r>
+              <a:rPr lang="en-US" baseline="0" dirty="0" err="1" smtClean="0"/>
+              <a:t>web.xml</a:t>
+            </a:r>
+            <a:endParaRPr lang="en-US" baseline="0" dirty="0" smtClean="0"/>
+          </a:p>
+          <a:p>
+            <a:r>
+              <a:rPr lang="en-US" baseline="0" dirty="0" smtClean="0"/>
+              <a:t>Have to change </a:t>
+            </a:r>
+            <a:r>
+              <a:rPr lang="en-US" baseline="0" dirty="0" err="1" smtClean="0"/>
+              <a:t>config/warble.rb</a:t>
+            </a:r>
+            <a:r>
+              <a:rPr lang="en-US" baseline="0" dirty="0" smtClean="0"/>
+              <a:t> to accommodate your Sinatra app </a:t>
+            </a:r>
+            <a:r>
+              <a:rPr lang="en-US" baseline="0" dirty="0" smtClean="0"/>
+              <a:t>layout</a:t>
+            </a:r>
+          </a:p>
+          <a:p>
+            <a:endParaRPr lang="en-US" baseline="0" dirty="0" smtClean="0"/>
+          </a:p>
+          <a:p>
+            <a:r>
+              <a:rPr lang="en-US" baseline="0" dirty="0" smtClean="0"/>
+              <a:t>Deployable to your favorite JEE/</a:t>
+            </a:r>
+            <a:r>
+              <a:rPr lang="en-US" baseline="0" dirty="0" err="1" smtClean="0"/>
+              <a:t>Servlet</a:t>
+            </a:r>
+            <a:r>
+              <a:rPr lang="en-US" baseline="0" dirty="0" smtClean="0"/>
+              <a:t> container Tomcat, </a:t>
+            </a:r>
+            <a:r>
+              <a:rPr lang="en-US" baseline="0" dirty="0" err="1" smtClean="0"/>
+              <a:t>Jboss</a:t>
+            </a:r>
+            <a:r>
+              <a:rPr lang="en-US" baseline="0" dirty="0" smtClean="0"/>
+              <a:t>, Glassfish…</a:t>
+            </a:r>
+          </a:p>
+          <a:p>
+            <a:endParaRPr lang="en-US" baseline="0" dirty="0" smtClean="0"/>
+          </a:p>
+          <a:p>
+            <a:r>
+              <a:rPr lang="en-US" baseline="0" dirty="0" smtClean="0"/>
+              <a:t>http://</a:t>
+            </a:r>
+            <a:r>
+              <a:rPr lang="en-US" baseline="0" dirty="0" err="1" smtClean="0"/>
+              <a:t>github.com/nicksieger/jruby</a:t>
+            </a:r>
+            <a:r>
+              <a:rPr lang="en-US" baseline="0" dirty="0" smtClean="0"/>
+              <a:t>-rack/tree/master/examples</a:t>
+            </a:r>
+          </a:p>
+          <a:p>
+            <a:r>
+              <a:rPr lang="en-US" baseline="0" dirty="0" err="1" smtClean="0"/>
+              <a:t>http://github.com/nicksieger/jruby-rack.git</a:t>
+            </a:r>
+            <a:endParaRPr lang="en-US" baseline="0" dirty="0" smtClean="0"/>
+          </a:p>
+          <a:p>
+            <a:endParaRPr lang="en-US" dirty="0"/>
+          </a:p>
+        </p:txBody>
+      </p:sp>
+      <p:sp>
+        <p:nvSpPr>
+          <p:cNvPr id="4" name="Slide Number Placeholder 3"/>
+          <p:cNvSpPr>
+            <a:spLocks noGrp="1"/>
+          </p:cNvSpPr>
+          <p:nvPr>
+            <p:ph type="sldNum" sz="quarter" idx="10"/>
+          </p:nvPr>
+        </p:nvSpPr>
+        <p:spPr/>
+        <p:txBody>
+          <a:bodyPr/>
+          <a:lstStyle/>
+          <a:p>
+            <a:fld id="{4355A105-26B0-5043-A7EC-94C834C82E90}" type="slidenum">
+              <a:rPr lang="en-US" smtClean="0"/>
+              <a:pPr/>
+              <a:t>25</a:t>
+            </a:fld>
+            <a:endParaRPr lang="en-US"/>
+          </a:p>
+        </p:txBody>
+      </p:sp>
+    </p:spTree>
+  </p:cSld>
+  <p:clrMapOvr>
+    <a:masterClrMapping/>
+  </p:clrMapOvr>
+</p:notes>
+</file>
+
+<file path=ppt/notesSlides/notesSlide21.xml><?xml version="1.0" encoding="utf-8"?>
+<p:notes xmlns:a="http://schemas.openxmlformats.org/drawingml/2006/main" xmlns:r="http://schemas.openxmlformats.org/officeDocument/2006/relationships" xmlns:mc="http://schemas.openxmlformats.org/markup-compatibility/2006" xmlns:mv="urn:schemas-microsoft-com:mac:vml" xmlns:p="http://schemas.openxmlformats.org/presentationml/2006/main" mc:Ignorable="mv" mc:PreserveAttributes="mv:*">
+  <p:cSld>
+    <p:spTree>
+      <p:nvGrpSpPr>
+        <p:cNvPr id="1" name=""/>
+        <p:cNvGrpSpPr/>
+        <p:nvPr/>
+      </p:nvGrpSpPr>
+      <p:grpSpPr>
+        <a:xfrm>
+          <a:off x="0" y="0"/>
+          <a:ext cx="0" cy="0"/>
+          <a:chOff x="0" y="0"/>
+          <a:chExt cx="0" cy="0"/>
+        </a:xfrm>
+      </p:grpSpPr>
+      <p:sp>
+        <p:nvSpPr>
+          <p:cNvPr id="2" name="Slide Image Placeholder 1"/>
+          <p:cNvSpPr>
+            <a:spLocks noGrp="1" noRot="1" noChangeAspect="1"/>
+          </p:cNvSpPr>
+          <p:nvPr>
+            <p:ph type="sldImg"/>
+          </p:nvPr>
+        </p:nvSpPr>
+        <p:spPr/>
+      </p:sp>
+      <p:sp>
+        <p:nvSpPr>
+          <p:cNvPr id="3" name="Notes Placeholder 2"/>
+          <p:cNvSpPr>
+            <a:spLocks noGrp="1"/>
+          </p:cNvSpPr>
+          <p:nvPr>
+            <p:ph type="body" idx="1"/>
+          </p:nvPr>
+        </p:nvSpPr>
+        <p:spPr/>
+        <p:txBody>
+          <a:bodyPr>
+            <a:normAutofit/>
+          </a:bodyPr>
+          <a:lstStyle/>
+          <a:p>
+            <a:r>
+              <a:rPr lang="en-US" dirty="0" err="1" smtClean="0"/>
+              <a:t>Resque</a:t>
+            </a:r>
+            <a:r>
+              <a:rPr lang="en-US" baseline="0" dirty="0" smtClean="0"/>
+              <a:t> is background job processor with Sinatra UI for monitoring queues, jobs, workers</a:t>
+            </a:r>
+          </a:p>
+          <a:p>
+            <a:r>
+              <a:rPr lang="en-US" baseline="0" dirty="0" smtClean="0"/>
+              <a:t>Watchtower is a combo of Mongo DB, Mustache </a:t>
+            </a:r>
+            <a:r>
+              <a:rPr lang="en-US" baseline="0" dirty="0" err="1" smtClean="0"/>
+              <a:t>templating</a:t>
+            </a:r>
+            <a:r>
+              <a:rPr lang="en-US" baseline="0" dirty="0" smtClean="0"/>
+              <a:t>, </a:t>
+            </a:r>
+            <a:r>
+              <a:rPr lang="en-US" baseline="0" smtClean="0"/>
+              <a:t>and Sinatra UI</a:t>
+            </a:r>
+          </a:p>
+        </p:txBody>
+      </p:sp>
+      <p:sp>
+        <p:nvSpPr>
+          <p:cNvPr id="4" name="Slide Number Placeholder 3"/>
+          <p:cNvSpPr>
+            <a:spLocks noGrp="1"/>
+          </p:cNvSpPr>
+          <p:nvPr>
+            <p:ph type="sldNum" sz="quarter" idx="10"/>
+          </p:nvPr>
+        </p:nvSpPr>
+        <p:spPr/>
+        <p:txBody>
+          <a:bodyPr/>
+          <a:lstStyle/>
+          <a:p>
+            <a:fld id="{4355A105-26B0-5043-A7EC-94C834C82E90}" type="slidenum">
+              <a:rPr lang="en-US" smtClean="0"/>
+              <a:pPr/>
+              <a:t>27</a:t>
             </a:fld>
             <a:endParaRPr lang="en-US"/>
           </a:p>
@@ -1644,13 +2058,19 @@
           <a:p>
             <a:r>
               <a:rPr lang="en-US" dirty="0" smtClean="0"/>
-              <a:t>I’ve seen some configure their Sinatra app like a gem,</a:t>
+              <a:t>To</a:t>
             </a:r>
             <a:r>
               <a:rPr lang="en-US" baseline="0" dirty="0" smtClean="0"/>
-              <a:t> some like a Rails stack, and some are of the simple containing 1 or 2 files</a:t>
-            </a:r>
-            <a:endParaRPr lang="en-US" dirty="0" smtClean="0"/>
+              <a:t> further qualify that Sinatra is more DSL than framework take a close look at the implementation details to the some of the more important things like</a:t>
+            </a:r>
+          </a:p>
+          <a:p>
+            <a:r>
+              <a:rPr lang="en-US" baseline="0" dirty="0" smtClean="0"/>
+              <a:t>logging, sessions, method override. These are all implemented by Rack, not Sinatra.</a:t>
+            </a:r>
+            <a:endParaRPr lang="en-US" dirty="0"/>
           </a:p>
         </p:txBody>
       </p:sp>
@@ -1672,7 +2092,7 @@
             <a:fld id="{4355A105-26B0-5043-A7EC-94C834C82E90}" type="slidenum">
               <a:rPr lang="en-US" smtClean="0"/>
               <a:pPr/>
-              <a:t>5</a:t>
+              <a:t>4</a:t>
             </a:fld>
             <a:endParaRPr lang="en-US"/>
           </a:p>
@@ -1733,34 +2153,14 @@
           <a:lstStyle/>
           <a:p>
             <a:r>
-              <a:rPr lang="en-US" sz="1200" dirty="0" smtClean="0"/>
-              <a:t>All configuration</a:t>
-            </a:r>
-            <a:r>
-              <a:rPr lang="en-US" sz="1200" baseline="0" dirty="0" smtClean="0"/>
-              <a:t> settings are documented here </a:t>
-            </a:r>
-            <a:r>
-              <a:rPr lang="en-US" sz="1200" dirty="0" smtClean="0"/>
-              <a:t>http://</a:t>
-            </a:r>
-            <a:r>
-              <a:rPr lang="en-US" sz="1200" dirty="0" err="1" smtClean="0"/>
-              <a:t>www.sinatrarb.com/configuration.html</a:t>
-            </a:r>
-            <a:endParaRPr lang="en-US" sz="1200" dirty="0" smtClean="0"/>
-          </a:p>
-          <a:p>
-            <a:endParaRPr lang="en-US" sz="1200" dirty="0" smtClean="0"/>
-          </a:p>
-          <a:p>
-            <a:r>
-              <a:rPr lang="en-US" sz="1200" dirty="0" smtClean="0"/>
-              <a:t>Web server configurations will be discussed later in the deck</a:t>
-            </a:r>
-          </a:p>
-          <a:p>
-            <a:endParaRPr lang="en-US" dirty="0"/>
+              <a:rPr lang="en-US" dirty="0" smtClean="0"/>
+              <a:t>I’ve seen some configure their Sinatra app like a gem,</a:t>
+            </a:r>
+            <a:r>
+              <a:rPr lang="en-US" baseline="0" dirty="0" smtClean="0"/>
+              <a:t> some like a Rails stack, and some are of the simple containing 1 or 2 files</a:t>
+            </a:r>
+            <a:endParaRPr lang="en-US" dirty="0" smtClean="0"/>
           </a:p>
         </p:txBody>
       </p:sp>
@@ -1782,7 +2182,7 @@
             <a:fld id="{4355A105-26B0-5043-A7EC-94C834C82E90}" type="slidenum">
               <a:rPr lang="en-US" smtClean="0"/>
               <a:pPr/>
-              <a:t>6</a:t>
+              <a:t>5</a:t>
             </a:fld>
             <a:endParaRPr lang="en-US"/>
           </a:p>
@@ -1843,146 +2243,34 @@
           <a:lstStyle/>
           <a:p>
             <a:r>
-              <a:rPr lang="en-US" dirty="0" smtClean="0"/>
-              <a:t>If you need to customize your session cookie timeout,</a:t>
-            </a:r>
-            <a:r>
-              <a:rPr lang="en-US" baseline="0" dirty="0" smtClean="0"/>
-              <a:t> domain, or secret key</a:t>
-            </a:r>
-            <a:endParaRPr lang="en-US" dirty="0" smtClean="0"/>
-          </a:p>
-          <a:p>
-            <a:r>
-              <a:rPr lang="en-US" dirty="0" smtClean="0"/>
-              <a:t>use </a:t>
-            </a:r>
-            <a:r>
-              <a:rPr lang="en-US" dirty="0" err="1" smtClean="0"/>
-              <a:t>Rack::Session::Cookie</a:t>
-            </a:r>
-            <a:r>
-              <a:rPr lang="en-US" dirty="0" smtClean="0"/>
-              <a:t>, :key =&gt; '</a:t>
-            </a:r>
-            <a:r>
-              <a:rPr lang="en-US" dirty="0" err="1" smtClean="0"/>
-              <a:t>rack.session</a:t>
-            </a:r>
-            <a:r>
-              <a:rPr lang="en-US" dirty="0" smtClean="0"/>
-              <a:t>', :domain =&gt; '</a:t>
-            </a:r>
-            <a:r>
-              <a:rPr lang="en-US" dirty="0" err="1" smtClean="0"/>
-              <a:t>foo.com</a:t>
-            </a:r>
-            <a:r>
-              <a:rPr lang="en-US" dirty="0" smtClean="0"/>
-              <a:t>', :path =&gt; '/', :</a:t>
-            </a:r>
-            <a:r>
-              <a:rPr lang="en-US" dirty="0" err="1" smtClean="0"/>
-              <a:t>expire_after</a:t>
-            </a:r>
-            <a:r>
-              <a:rPr lang="en-US" dirty="0" smtClean="0"/>
-              <a:t> =&gt; 2592000, # In seconds :secret =&gt; '</a:t>
-            </a:r>
-            <a:r>
-              <a:rPr lang="en-US" dirty="0" err="1" smtClean="0"/>
-              <a:t>change_me</a:t>
-            </a:r>
-            <a:r>
-              <a:rPr lang="en-US" dirty="0" smtClean="0"/>
-              <a:t>’</a:t>
-            </a:r>
-          </a:p>
-          <a:p>
-            <a:endParaRPr lang="en-US" dirty="0" smtClean="0"/>
-          </a:p>
-          <a:p>
-            <a:r>
-              <a:rPr lang="en-US" dirty="0" smtClean="0"/>
-              <a:t>You can pass in the standard </a:t>
-            </a:r>
-            <a:r>
-              <a:rPr lang="en-US" dirty="0" err="1" smtClean="0"/>
-              <a:t>Memcache</a:t>
-            </a:r>
-            <a:r>
-              <a:rPr lang="en-US" dirty="0" smtClean="0"/>
-              <a:t> options,</a:t>
-            </a:r>
-            <a:r>
-              <a:rPr lang="en-US" baseline="0" dirty="0" smtClean="0"/>
-              <a:t> look at the </a:t>
-            </a:r>
-            <a:r>
-              <a:rPr lang="en-US" baseline="0" dirty="0" err="1" smtClean="0"/>
-              <a:t>memcache</a:t>
-            </a:r>
-            <a:r>
-              <a:rPr lang="en-US" baseline="0" dirty="0" smtClean="0"/>
-              <a:t>-client gem for more about the </a:t>
-            </a:r>
-            <a:r>
-              <a:rPr lang="en-US" baseline="0" dirty="0" err="1" smtClean="0"/>
-              <a:t>config</a:t>
-            </a:r>
-            <a:r>
-              <a:rPr lang="en-US" baseline="0" dirty="0" smtClean="0"/>
-              <a:t> settings</a:t>
-            </a:r>
-          </a:p>
-          <a:p>
-            <a:endParaRPr lang="en-US" baseline="0" dirty="0" smtClean="0"/>
-          </a:p>
-          <a:p>
-            <a:r>
-              <a:rPr lang="en-US" baseline="0" dirty="0" smtClean="0"/>
-              <a:t>Both the memory and </a:t>
-            </a:r>
-            <a:r>
-              <a:rPr lang="en-US" baseline="0" dirty="0" err="1" smtClean="0"/>
-              <a:t>memcache</a:t>
-            </a:r>
-            <a:r>
-              <a:rPr lang="en-US" baseline="0" dirty="0" smtClean="0"/>
-              <a:t> session stores still use the cookie to store the session key</a:t>
-            </a:r>
-          </a:p>
-          <a:p>
-            <a:r>
-              <a:rPr lang="en-US" baseline="0" dirty="0" smtClean="0"/>
-              <a:t>DON’T use enable :session or :session, true with alternate session stores</a:t>
-            </a:r>
-          </a:p>
-          <a:p>
-            <a:endParaRPr lang="en-US" baseline="0" dirty="0" smtClean="0"/>
-          </a:p>
-          <a:p>
-            <a:r>
-              <a:rPr lang="en-US" baseline="0" dirty="0" smtClean="0"/>
-              <a:t>Demonstrate the differences of the memory </a:t>
-            </a:r>
-            <a:r>
-              <a:rPr lang="en-US" baseline="0" dirty="0" err="1" smtClean="0"/>
-              <a:t>vs</a:t>
-            </a:r>
-            <a:r>
-              <a:rPr lang="en-US" baseline="0" dirty="0" smtClean="0"/>
-              <a:t> </a:t>
-            </a:r>
-            <a:r>
-              <a:rPr lang="en-US" baseline="0" dirty="0" err="1" smtClean="0"/>
-              <a:t>memcache</a:t>
-            </a:r>
-            <a:r>
-              <a:rPr lang="en-US" baseline="0" dirty="0" smtClean="0"/>
-              <a:t> by stopping and restarting the server</a:t>
-            </a:r>
-            <a:endParaRPr lang="en-US" dirty="0" smtClean="0"/>
+              <a:rPr lang="en-US" sz="1200" dirty="0" smtClean="0"/>
+              <a:t>All configuration</a:t>
+            </a:r>
+            <a:r>
+              <a:rPr lang="en-US" sz="1200" baseline="0" dirty="0" smtClean="0"/>
+              <a:t> settings are documented here </a:t>
+            </a:r>
+            <a:r>
+              <a:rPr lang="en-US" sz="1200" dirty="0" smtClean="0"/>
+              <a:t>http://</a:t>
+            </a:r>
+            <a:r>
+              <a:rPr lang="en-US" sz="1200" dirty="0" err="1" smtClean="0"/>
+              <a:t>www.sinatrarb.com/configuration.html</a:t>
+            </a:r>
+            <a:endParaRPr lang="en-US" sz="1200" dirty="0" smtClean="0"/>
+          </a:p>
+          <a:p>
+            <a:endParaRPr lang="en-US" sz="1200" dirty="0" smtClean="0"/>
+          </a:p>
+          <a:p>
+            <a:r>
+              <a:rPr lang="en-US" sz="1200" dirty="0" smtClean="0"/>
+              <a:t>Web server configurations will be discussed later in the deck</a:t>
+            </a:r>
+          </a:p>
+          <a:p>
+            <a:endParaRPr lang="en-US" dirty="0"/>
           </a:p>
         </p:txBody>
       </p:sp>
@@ -2004,7 +2292,7 @@
             <a:fld id="{4355A105-26B0-5043-A7EC-94C834C82E90}" type="slidenum">
               <a:rPr lang="en-US" smtClean="0"/>
               <a:pPr/>
-              <a:t>7</a:t>
+              <a:t>6</a:t>
             </a:fld>
             <a:endParaRPr lang="en-US"/>
           </a:p>
@@ -2064,54 +2352,175 @@
           </a:bodyPr>
           <a:lstStyle/>
           <a:p>
+            <a:pPr marL="0" marR="0" indent="0" algn="l" defTabSz="457200" rtl="0" eaLnBrk="1" fontAlgn="auto" latinLnBrk="0" hangingPunct="1">
+              <a:lnSpc>
+                <a:spcPct val="100000"/>
+              </a:lnSpc>
+              <a:spcBef>
+                <a:spcPts val="0"/>
+              </a:spcBef>
+              <a:spcAft>
+                <a:spcPts val="0"/>
+              </a:spcAft>
+              <a:buClrTx/>
+              <a:buSzTx/>
+              <a:buFontTx/>
+              <a:buNone/>
+              <a:tabLst/>
+              <a:defRPr/>
+            </a:pPr>
             <a:r>
               <a:rPr lang="en-US" dirty="0" smtClean="0"/>
-              <a:t>Cookie implementation</a:t>
+              <a:t>Refer to the </a:t>
+            </a:r>
+            <a:r>
+              <a:rPr lang="en-US" dirty="0" err="1" smtClean="0"/>
+              <a:t>cookie_sessions_controller.rb</a:t>
+            </a:r>
+            <a:r>
+              <a:rPr lang="en-US" dirty="0" smtClean="0"/>
+              <a:t>,</a:t>
             </a:r>
             <a:r>
               <a:rPr lang="en-US" baseline="0" dirty="0" smtClean="0"/>
-              <a:t> is again </a:t>
+              <a:t> </a:t>
             </a:r>
             <a:r>
               <a:rPr lang="en-US" baseline="0" dirty="0" err="1" smtClean="0"/>
-              <a:t>Rack::Request</a:t>
+              <a:t>memcache_sessions_controller.rb</a:t>
             </a:r>
             <a:r>
               <a:rPr lang="en-US" baseline="0" dirty="0" smtClean="0"/>
-              <a:t> and </a:t>
+              <a:t>, </a:t>
             </a:r>
             <a:r>
               <a:rPr lang="en-US" baseline="0" dirty="0" err="1" smtClean="0"/>
-              <a:t>Rack::Response</a:t>
+              <a:t>memory_sessions_controller.rb</a:t>
+            </a:r>
+            <a:endParaRPr lang="en-US" dirty="0" smtClean="0"/>
+          </a:p>
+          <a:p>
+            <a:endParaRPr lang="en-US" dirty="0" smtClean="0"/>
+          </a:p>
+          <a:p>
+            <a:r>
+              <a:rPr lang="en-US" dirty="0" smtClean="0"/>
+              <a:t>If </a:t>
+            </a:r>
+            <a:r>
+              <a:rPr lang="en-US" dirty="0" smtClean="0"/>
+              <a:t>you need to customize your session cookie timeout,</a:t>
             </a:r>
             <a:r>
               <a:rPr lang="en-US" baseline="0" dirty="0" smtClean="0"/>
-              <a:t> based, not Sinatra</a:t>
+              <a:t> domain, or secret key</a:t>
             </a:r>
             <a:endParaRPr lang="en-US" dirty="0" smtClean="0"/>
           </a:p>
           <a:p>
+            <a:r>
+              <a:rPr lang="en-US" dirty="0" smtClean="0"/>
+              <a:t>use </a:t>
+            </a:r>
+            <a:r>
+              <a:rPr lang="en-US" dirty="0" err="1" smtClean="0"/>
+              <a:t>Rack::Session::Cookie</a:t>
+            </a:r>
+            <a:r>
+              <a:rPr lang="en-US" dirty="0" smtClean="0"/>
+              <a:t>, :key =&gt; '</a:t>
+            </a:r>
+            <a:r>
+              <a:rPr lang="en-US" dirty="0" err="1" smtClean="0"/>
+              <a:t>rack.session</a:t>
+            </a:r>
+            <a:r>
+              <a:rPr lang="en-US" dirty="0" smtClean="0"/>
+              <a:t>', :domain =&gt; '</a:t>
+            </a:r>
+            <a:r>
+              <a:rPr lang="en-US" dirty="0" err="1" smtClean="0"/>
+              <a:t>foo.com</a:t>
+            </a:r>
+            <a:r>
+              <a:rPr lang="en-US" dirty="0" smtClean="0"/>
+              <a:t>', :path =&gt; '/', :</a:t>
+            </a:r>
+            <a:r>
+              <a:rPr lang="en-US" dirty="0" err="1" smtClean="0"/>
+              <a:t>expire_after</a:t>
+            </a:r>
+            <a:r>
+              <a:rPr lang="en-US" dirty="0" smtClean="0"/>
+              <a:t> =&gt; 2592000, # In seconds :secret =&gt; '</a:t>
+            </a:r>
+            <a:r>
+              <a:rPr lang="en-US" dirty="0" err="1" smtClean="0"/>
+              <a:t>change_me</a:t>
+            </a:r>
+            <a:r>
+              <a:rPr lang="en-US" dirty="0" smtClean="0"/>
+              <a:t>’</a:t>
+            </a:r>
+          </a:p>
+          <a:p>
             <a:endParaRPr lang="en-US" dirty="0" smtClean="0"/>
           </a:p>
           <a:p>
             <a:r>
               <a:rPr lang="en-US" dirty="0" smtClean="0"/>
-              <a:t>Can serialize</a:t>
+              <a:t>You can pass in the standard </a:t>
+            </a:r>
+            <a:r>
+              <a:rPr lang="en-US" dirty="0" err="1" smtClean="0"/>
+              <a:t>Memcache</a:t>
+            </a:r>
+            <a:r>
+              <a:rPr lang="en-US" dirty="0" smtClean="0"/>
+              <a:t> options,</a:t>
             </a:r>
             <a:r>
               <a:rPr lang="en-US" baseline="0" dirty="0" smtClean="0"/>
-              <a:t> Array objects, but you must parse them out yourself when delimited by &amp;’</a:t>
+              <a:t> look at the </a:t>
             </a:r>
             <a:r>
               <a:rPr lang="en-US" baseline="0" dirty="0" err="1" smtClean="0"/>
-              <a:t>s</a:t>
-            </a:r>
+              <a:t>memcache</a:t>
+            </a:r>
+            <a:r>
+              <a:rPr lang="en-US" baseline="0" dirty="0" smtClean="0"/>
+              <a:t>-client gem for more about the </a:t>
+            </a:r>
+            <a:r>
+              <a:rPr lang="en-US" baseline="0" dirty="0" err="1" smtClean="0"/>
+              <a:t>config</a:t>
+            </a:r>
+            <a:r>
+              <a:rPr lang="en-US" baseline="0" dirty="0" smtClean="0"/>
+              <a:t> settings</a:t>
+            </a:r>
+          </a:p>
+          <a:p>
             <a:endParaRPr lang="en-US" baseline="0" dirty="0" smtClean="0"/>
           </a:p>
           <a:p>
             <a:r>
               <a:rPr lang="en-US" baseline="0" dirty="0" smtClean="0"/>
-              <a:t>Can modify the domain, path, and expiration of the cookie </a:t>
+              <a:t>Both the memory and </a:t>
+            </a:r>
+            <a:r>
+              <a:rPr lang="en-US" baseline="0" dirty="0" err="1" smtClean="0"/>
+              <a:t>memcache</a:t>
+            </a:r>
+            <a:r>
+              <a:rPr lang="en-US" baseline="0" dirty="0" smtClean="0"/>
+              <a:t> session stores still use the cookie to store the session key</a:t>
+            </a:r>
+          </a:p>
+          <a:p>
+            <a:r>
+              <a:rPr lang="en-US" baseline="0" dirty="0" smtClean="0"/>
+              <a:t>DON’T use enable :session or :session, true with alternate session stores</a:t>
             </a:r>
           </a:p>
           <a:p>
@@ -2120,16 +2529,23 @@
           <a:p>
             <a:r>
               <a:rPr lang="en-US" baseline="0" dirty="0" smtClean="0"/>
-              <a:t>Strings will need to be manually escaped</a:t>
-            </a:r>
-          </a:p>
-          <a:p>
-            <a:endParaRPr lang="en-US" baseline="0" dirty="0" smtClean="0"/>
-          </a:p>
-          <a:p>
+              <a:t>Demonstrate the differences of the memory </a:t>
+            </a:r>
+            <a:r>
+              <a:rPr lang="en-US" baseline="0" dirty="0" err="1" smtClean="0"/>
+              <a:t>vs</a:t>
+            </a:r>
             <a:r>
               <a:rPr lang="en-US" baseline="0" dirty="0" smtClean="0"/>
-              <a:t>Look in the products controller show method</a:t>
+              <a:t> </a:t>
+            </a:r>
+            <a:r>
+              <a:rPr lang="en-US" baseline="0" dirty="0" err="1" smtClean="0"/>
+              <a:t>memcache</a:t>
+            </a:r>
+            <a:r>
+              <a:rPr lang="en-US" baseline="0" dirty="0" smtClean="0"/>
+              <a:t> by stopping and restarting the server</a:t>
             </a:r>
             <a:endParaRPr lang="en-US" dirty="0" smtClean="0"/>
           </a:p>
@@ -2153,7 +2569,7 @@
             <a:fld id="{4355A105-26B0-5043-A7EC-94C834C82E90}" type="slidenum">
               <a:rPr lang="en-US" smtClean="0"/>
               <a:pPr/>
-              <a:t>8</a:t>
+              <a:t>7</a:t>
             </a:fld>
             <a:endParaRPr lang="en-US"/>
           </a:p>
@@ -2215,17 +2631,101 @@
           <a:p>
             <a:r>
               <a:rPr lang="en-US" dirty="0" smtClean="0"/>
-              <a:t>If</a:t>
+              <a:t>Refer to </a:t>
+            </a:r>
+            <a:r>
+              <a:rPr lang="en-US" dirty="0" err="1" smtClean="0"/>
+              <a:t>products_controller.rb</a:t>
+            </a:r>
+            <a:r>
+              <a:rPr lang="en-US" dirty="0" smtClean="0"/>
+              <a:t> </a:t>
+            </a:r>
+            <a:r>
+              <a:rPr lang="en-US" dirty="0" err="1" smtClean="0"/>
+              <a:t>view_products</a:t>
+            </a:r>
+            <a:r>
+              <a:rPr lang="en-US" dirty="0" smtClean="0"/>
+              <a:t> method</a:t>
+            </a:r>
+          </a:p>
+          <a:p>
+            <a:endParaRPr lang="en-US" dirty="0" smtClean="0"/>
+          </a:p>
+          <a:p>
+            <a:r>
+              <a:rPr lang="en-US" dirty="0" smtClean="0"/>
+              <a:t>Cookie </a:t>
+            </a:r>
+            <a:r>
+              <a:rPr lang="en-US" dirty="0" smtClean="0"/>
+              <a:t>implementation</a:t>
             </a:r>
             <a:r>
               <a:rPr lang="en-US" baseline="0" dirty="0" smtClean="0"/>
-              <a:t> Sinatra isn’t in standalone mode and your using another web server be sure to specify </a:t>
+              <a:t> is again </a:t>
             </a:r>
             <a:r>
               <a:rPr lang="en-US" baseline="0" dirty="0" err="1" smtClean="0"/>
-              <a:t>Rack::Static</a:t>
-            </a:r>
-            <a:endParaRPr lang="en-US" dirty="0"/>
+              <a:t>Rack::Request</a:t>
+            </a:r>
+            <a:r>
+              <a:rPr lang="en-US" baseline="0" dirty="0" smtClean="0"/>
+              <a:t> and </a:t>
+            </a:r>
+            <a:r>
+              <a:rPr lang="en-US" baseline="0" dirty="0" err="1" smtClean="0"/>
+              <a:t>Rack::Response</a:t>
+            </a:r>
+            <a:r>
+              <a:rPr lang="en-US" baseline="0" dirty="0" smtClean="0"/>
+              <a:t> based, not Sinatra</a:t>
+            </a:r>
+            <a:endParaRPr lang="en-US" dirty="0" smtClean="0"/>
+          </a:p>
+          <a:p>
+            <a:endParaRPr lang="en-US" dirty="0" smtClean="0"/>
+          </a:p>
+          <a:p>
+            <a:r>
+              <a:rPr lang="en-US" dirty="0" smtClean="0"/>
+              <a:t>Can serialize</a:t>
+            </a:r>
+            <a:r>
+              <a:rPr lang="en-US" baseline="0" dirty="0" smtClean="0"/>
+              <a:t> Array objects, but you must parse them out yourself when delimited by &amp;’</a:t>
+            </a:r>
+            <a:r>
+              <a:rPr lang="en-US" baseline="0" dirty="0" err="1" smtClean="0"/>
+              <a:t>s</a:t>
+            </a:r>
+            <a:endParaRPr lang="en-US" baseline="0" dirty="0" smtClean="0"/>
+          </a:p>
+          <a:p>
+            <a:r>
+              <a:rPr lang="en-US" baseline="0" dirty="0" smtClean="0"/>
+              <a:t>Can modify the domain, path, and expiration of the cookie </a:t>
+            </a:r>
+          </a:p>
+          <a:p>
+            <a:endParaRPr lang="en-US" baseline="0" dirty="0" smtClean="0"/>
+          </a:p>
+          <a:p>
+            <a:r>
+              <a:rPr lang="en-US" baseline="0" dirty="0" smtClean="0"/>
+              <a:t>Strings will need to be manually escaped</a:t>
+            </a:r>
+          </a:p>
+          <a:p>
+            <a:endParaRPr lang="en-US" baseline="0" dirty="0" smtClean="0"/>
+          </a:p>
+          <a:p>
+            <a:r>
+              <a:rPr lang="en-US" baseline="0" dirty="0" smtClean="0"/>
+              <a:t>Look in the products controller show method</a:t>
+            </a:r>
+            <a:endParaRPr lang="en-US" dirty="0" smtClean="0"/>
           </a:p>
         </p:txBody>
       </p:sp>
@@ -2247,7 +2747,7 @@
             <a:fld id="{4355A105-26B0-5043-A7EC-94C834C82E90}" type="slidenum">
               <a:rPr lang="en-US" smtClean="0"/>
               <a:pPr/>
-              <a:t>9</a:t>
+              <a:t>8</a:t>
             </a:fld>
             <a:endParaRPr lang="en-US"/>
           </a:p>
@@ -2308,44 +2808,31 @@
           <a:lstStyle/>
           <a:p>
             <a:r>
-              <a:rPr lang="en-US" sz="1200" dirty="0" smtClean="0"/>
-              <a:t>URI definition should look similar to Rails</a:t>
+              <a:rPr lang="en-US" dirty="0" smtClean="0"/>
+              <a:t>Refer to the </a:t>
+            </a:r>
+            <a:r>
+              <a:rPr lang="en-US" dirty="0" err="1" smtClean="0"/>
+              <a:t>search_controller.rb</a:t>
             </a:r>
             <a:endParaRPr lang="en-US" dirty="0" smtClean="0"/>
           </a:p>
           <a:p>
             <a:r>
               <a:rPr lang="en-US" dirty="0" smtClean="0"/>
-              <a:t>Mention</a:t>
+              <a:t>If</a:t>
             </a:r>
             <a:r>
               <a:rPr lang="en-US" baseline="0" dirty="0" smtClean="0"/>
               <a:t> </a:t>
             </a:r>
             <a:r>
-              <a:rPr lang="en-US" dirty="0" err="1" smtClean="0"/>
-              <a:t>splatting</a:t>
-            </a:r>
-            <a:endParaRPr lang="en-US" dirty="0" smtClean="0"/>
-          </a:p>
-          <a:p>
-            <a:r>
-              <a:rPr lang="en-US" dirty="0" smtClean="0"/>
-              <a:t>	get '/say/*/to/*' do # matches /say/hello/to/world </a:t>
-            </a:r>
-          </a:p>
-          <a:p>
-            <a:r>
-              <a:rPr lang="en-US" dirty="0" smtClean="0"/>
-              <a:t>	</a:t>
-            </a:r>
-            <a:r>
-              <a:rPr lang="en-US" dirty="0" err="1" smtClean="0"/>
-              <a:t>params["splat</a:t>
-            </a:r>
-            <a:r>
-              <a:rPr lang="en-US" dirty="0" smtClean="0"/>
-              <a:t>"] # =&gt; ["hello", "world"] end </a:t>
+              <a:rPr lang="en-US" baseline="0" dirty="0" smtClean="0"/>
+              <a:t>Sinatra isn’t in standalone mode and your using another web server be sure to specify </a:t>
+            </a:r>
+            <a:r>
+              <a:rPr lang="en-US" baseline="0" dirty="0" err="1" smtClean="0"/>
+              <a:t>Rack::Static</a:t>
             </a:r>
             <a:endParaRPr lang="en-US" dirty="0"/>
           </a:p>
@@ -2369,7 +2856,7 @@
             <a:fld id="{4355A105-26B0-5043-A7EC-94C834C82E90}" type="slidenum">
               <a:rPr lang="en-US" smtClean="0"/>
               <a:pPr/>
-              <a:t>10</a:t>
+              <a:t>9</a:t>
             </a:fld>
             <a:endParaRPr lang="en-US"/>
           </a:p>
@@ -2430,12 +2917,44 @@
           <a:lstStyle/>
           <a:p>
             <a:r>
+              <a:rPr lang="en-US" sz="1200" dirty="0" smtClean="0"/>
+              <a:t>URI definition should look similar to Rails</a:t>
+            </a:r>
+            <a:endParaRPr lang="en-US" dirty="0" smtClean="0"/>
+          </a:p>
+          <a:p>
+            <a:r>
               <a:rPr lang="en-US" dirty="0" smtClean="0"/>
               <a:t>Mention</a:t>
             </a:r>
             <a:r>
               <a:rPr lang="en-US" baseline="0" dirty="0" smtClean="0"/>
-              <a:t> the gotcha with the XML builder templates, the xml variable in the template is automatically initialized for you</a:t>
+              <a:t> </a:t>
+            </a:r>
+            <a:r>
+              <a:rPr lang="en-US" dirty="0" err="1" smtClean="0"/>
+              <a:t>splatting</a:t>
+            </a:r>
+            <a:endParaRPr lang="en-US" dirty="0" smtClean="0"/>
+          </a:p>
+          <a:p>
+            <a:r>
+              <a:rPr lang="en-US" dirty="0" smtClean="0"/>
+              <a:t>	get '/say/*/to/*' do # matches /say/hello/to/world </a:t>
+            </a:r>
+          </a:p>
+          <a:p>
+            <a:r>
+              <a:rPr lang="en-US" dirty="0" smtClean="0"/>
+              <a:t>	</a:t>
+            </a:r>
+            <a:r>
+              <a:rPr lang="en-US" dirty="0" err="1" smtClean="0"/>
+              <a:t>params["splat</a:t>
+            </a:r>
+            <a:r>
+              <a:rPr lang="en-US" dirty="0" smtClean="0"/>
+              <a:t>"] # =&gt; ["hello", "world"] end </a:t>
             </a:r>
             <a:endParaRPr lang="en-US" dirty="0"/>
           </a:p>
@@ -2459,7 +2978,7 @@
             <a:fld id="{4355A105-26B0-5043-A7EC-94C834C82E90}" type="slidenum">
               <a:rPr lang="en-US" smtClean="0"/>
               <a:pPr/>
-              <a:t>11</a:t>
+              <a:t>10</a:t>
             </a:fld>
             <a:endParaRPr lang="en-US"/>
           </a:p>
@@ -2752,7 +3271,7 @@
             <a:fld id="{72AB9F51-C26B-4644-AC7E-A618488A626A}" type="datetimeFigureOut">
               <a:rPr lang="en-US"/>
               <a:pPr/>
-              <a:t>8/23/10</a:t>
+              <a:t>8/26/10</a:t>
             </a:fld>
             <a:endParaRPr/>
           </a:p>
@@ -2844,7 +3363,7 @@
             <a:fld id="{36BD7A5A-4508-41A3-A542-021284F44FD2}" type="datetime1">
               <a:rPr lang="en-US"/>
               <a:pPr/>
-              <a:t>8/23/10</a:t>
+              <a:t>8/26/10</a:t>
             </a:fld>
             <a:endParaRPr/>
           </a:p>
@@ -3428,7 +3947,7 @@
             <a:fld id="{5D6049BC-90DD-4F53-902A-0D72503E5497}" type="datetime1">
               <a:rPr lang="en-US"/>
               <a:pPr/>
-              <a:t>8/23/10</a:t>
+              <a:t>8/26/10</a:t>
             </a:fld>
             <a:endParaRPr/>
           </a:p>
@@ -3740,7 +4259,7 @@
             <a:fld id="{42D58EEC-9731-49DD-91E8-494A93B2DEC9}" type="datetime1">
               <a:rPr lang="en-US"/>
               <a:pPr/>
-              <a:t>8/23/10</a:t>
+              <a:t>8/26/10</a:t>
             </a:fld>
             <a:endParaRPr/>
           </a:p>
@@ -3913,7 +4432,7 @@
             <a:fld id="{7500C05C-B3EA-49FC-922A-1D3FFA7FF7F2}" type="datetime1">
               <a:rPr lang="en-US"/>
               <a:pPr/>
-              <a:t>8/23/10</a:t>
+              <a:t>8/26/10</a:t>
             </a:fld>
             <a:endParaRPr/>
           </a:p>
@@ -4271,7 +4790,7 @@
             <a:fld id="{6690622F-2886-4428-9227-475DC6DA1737}" type="datetime1">
               <a:rPr lang="en-US"/>
               <a:pPr/>
-              <a:t>8/23/10</a:t>
+              <a:t>8/26/10</a:t>
             </a:fld>
             <a:endParaRPr/>
           </a:p>
@@ -4571,7 +5090,7 @@
             <a:fld id="{72AAB499-F5DE-4BE5-BB26-90CC428051F7}" type="datetime1">
               <a:rPr lang="en-US"/>
               <a:pPr/>
-              <a:t>8/23/10</a:t>
+              <a:t>8/26/10</a:t>
             </a:fld>
             <a:endParaRPr/>
           </a:p>
@@ -4863,7 +5382,7 @@
             <a:fld id="{EFE21C87-FA30-4C7E-9CC2-3E29C7E6D70C}" type="datetime1">
               <a:rPr lang="en-US"/>
               <a:pPr/>
-              <a:t>8/23/10</a:t>
+              <a:t>8/26/10</a:t>
             </a:fld>
             <a:endParaRPr/>
           </a:p>
@@ -5293,7 +5812,7 @@
             <a:fld id="{FE61A93B-C135-4A78-A62B-B7D890B1D77D}" type="datetime1">
               <a:rPr lang="en-US"/>
               <a:pPr/>
-              <a:t>8/23/10</a:t>
+              <a:t>8/26/10</a:t>
             </a:fld>
             <a:endParaRPr/>
           </a:p>
@@ -5407,7 +5926,7 @@
             <a:fld id="{C5D7800F-ED33-4A55-872C-F1E2CF63B167}" type="datetime1">
               <a:rPr lang="en-US"/>
               <a:pPr/>
-              <a:t>8/23/10</a:t>
+              <a:t>8/26/10</a:t>
             </a:fld>
             <a:endParaRPr/>
           </a:p>
@@ -5503,7 +6022,7 @@
             <a:fld id="{CF789F90-FBE0-40FF-ACC1-F9FEE7C4DE13}" type="datetime1">
               <a:rPr lang="en-US"/>
               <a:pPr/>
-              <a:t>8/23/10</a:t>
+              <a:t>8/26/10</a:t>
             </a:fld>
             <a:endParaRPr/>
           </a:p>
@@ -5816,7 +6335,7 @@
             <a:fld id="{244C6E4D-6501-4890-AD5C-63A441F7EFF6}" type="datetime1">
               <a:rPr lang="en-US"/>
               <a:pPr/>
-              <a:t>8/23/10</a:t>
+              <a:t>8/26/10</a:t>
             </a:fld>
             <a:endParaRPr/>
           </a:p>
@@ -6056,7 +6575,7 @@
             <a:fld id="{6690622F-2886-4428-9227-475DC6DA1737}" type="datetime1">
               <a:rPr lang="en-US"/>
               <a:pPr/>
-              <a:t>8/23/10</a:t>
+              <a:t>8/26/10</a:t>
             </a:fld>
             <a:endParaRPr/>
           </a:p>
@@ -6592,14 +7111,6 @@
           <a:p>
             <a:r>
               <a:rPr lang="en-US" dirty="0" err="1" smtClean="0"/>
-              <a:t>RESTful</a:t>
-            </a:r>
-            <a:r>
-              <a:rPr lang="en-US" dirty="0" smtClean="0"/>
-              <a:t> </a:t>
-            </a:r>
-            <a:r>
-              <a:rPr lang="en-US" dirty="0" err="1" smtClean="0"/>
               <a:t>microframework</a:t>
             </a:r>
             <a:endParaRPr lang="en-US" dirty="0"/>
@@ -6615,7 +7126,7 @@
           <p:nvPr/>
         </p:nvPicPr>
         <p:blipFill>
-          <a:blip r:embed="rId2"/>
+          <a:blip r:embed="rId3"/>
           <a:stretch>
             <a:fillRect/>
           </a:stretch>
@@ -7174,11 +7685,7 @@
             </a:pPr>
             <a:r>
               <a:rPr lang="en-US" sz="3600" dirty="0" smtClean="0"/>
-              <a:t> </a:t>
-            </a:r>
-            <a:r>
-              <a:rPr lang="en-US" sz="3600" dirty="0" smtClean="0"/>
-              <a:t>Migrations</a:t>
+              <a:t> Migrations</a:t>
             </a:r>
           </a:p>
           <a:p>
@@ -7245,7 +7752,6 @@
               <a:rPr lang="en-US" sz="3600" dirty="0" smtClean="0"/>
               <a:t>-sequel</a:t>
             </a:r>
-            <a:endParaRPr lang="en-US" sz="3600" dirty="0" smtClean="0"/>
           </a:p>
         </p:txBody>
       </p:sp>
@@ -7390,15 +7896,7 @@
           <a:p>
             <a:r>
               <a:rPr lang="en-US" dirty="0" smtClean="0"/>
-              <a:t>Caching Gems</a:t>
-            </a:r>
-            <a:r>
-              <a:rPr lang="en-US" dirty="0" smtClean="0"/>
-              <a:t> &amp; </a:t>
-            </a:r>
-            <a:r>
-              <a:rPr lang="en-US" dirty="0" smtClean="0"/>
-              <a:t>Extensions</a:t>
+              <a:t>Caching Gems &amp; Extensions</a:t>
             </a:r>
             <a:endParaRPr lang="en-US" dirty="0"/>
           </a:p>
@@ -7444,11 +7942,7 @@
             </a:r>
             <a:r>
               <a:rPr lang="en-US" sz="3600" dirty="0" smtClean="0"/>
-              <a:t>-</a:t>
-            </a:r>
-            <a:r>
-              <a:rPr lang="en-US" sz="3600" dirty="0" smtClean="0"/>
-              <a:t>cache</a:t>
+              <a:t>-cache</a:t>
             </a:r>
           </a:p>
           <a:p>
@@ -7780,8 +8274,8 @@
         </p:nvSpPr>
         <p:spPr>
           <a:xfrm>
-            <a:off x="1392844" y="1492625"/>
-            <a:ext cx="6420754" cy="2308324"/>
+            <a:off x="914400" y="1492625"/>
+            <a:ext cx="7278538" cy="3539431"/>
           </a:xfrm>
           <a:prstGeom prst="rect">
             <a:avLst/>
@@ -7794,7 +8288,7 @@
           </a:bodyPr>
           <a:lstStyle/>
           <a:p>
-            <a:endParaRPr lang="en-US" sz="2400" dirty="0" smtClean="0"/>
+            <a:endParaRPr lang="en-US" sz="2800" dirty="0" smtClean="0"/>
           </a:p>
           <a:p>
             <a:pPr>
@@ -7803,7 +8297,7 @@
               </a:buBlip>
             </a:pPr>
             <a:r>
-              <a:rPr lang="en-US" sz="2400" dirty="0" smtClean="0"/>
+              <a:rPr lang="en-US" sz="2800" dirty="0" smtClean="0"/>
               <a:t> gem rack-test</a:t>
             </a:r>
           </a:p>
@@ -7814,14 +8308,14 @@
               </a:buBlip>
             </a:pPr>
             <a:r>
-              <a:rPr lang="en-US" sz="2400" dirty="0" smtClean="0"/>
+              <a:rPr lang="en-US" sz="2800" dirty="0" smtClean="0"/>
               <a:t> include </a:t>
             </a:r>
             <a:r>
-              <a:rPr lang="en-US" sz="2400" dirty="0" err="1" smtClean="0"/>
+              <a:rPr lang="en-US" sz="2800" dirty="0" err="1" smtClean="0"/>
               <a:t>Rack::Test::Methods</a:t>
             </a:r>
-            <a:endParaRPr lang="en-US" sz="2400" dirty="0" smtClean="0"/>
+            <a:endParaRPr lang="en-US" sz="2800" dirty="0" smtClean="0"/>
           </a:p>
           <a:p>
             <a:pPr>
@@ -7830,28 +8324,16 @@
               </a:buBlip>
             </a:pPr>
             <a:r>
-              <a:rPr lang="en-US" sz="2400" dirty="0" smtClean="0"/>
+              <a:rPr lang="en-US" sz="2800" dirty="0" smtClean="0"/>
               <a:t> </a:t>
             </a:r>
             <a:r>
-              <a:rPr lang="en-US" sz="2400" dirty="0" err="1" smtClean="0"/>
+              <a:rPr lang="en-US" sz="2800" dirty="0" err="1" smtClean="0"/>
               <a:t>last_response</a:t>
             </a:r>
             <a:r>
-              <a:rPr lang="en-US" sz="2400" dirty="0" smtClean="0"/>
-              <a:t> variable provides access to       </a:t>
-            </a:r>
-            <a:r>
-              <a:rPr lang="en-US" sz="2400" dirty="0" smtClean="0"/>
-              <a:t> 	response </a:t>
-            </a:r>
-            <a:r>
-              <a:rPr lang="en-US" sz="2400" dirty="0" smtClean="0"/>
-              <a:t>body, headers, and status </a:t>
-            </a:r>
-            <a:r>
-              <a:rPr lang="en-US" sz="2400" dirty="0" smtClean="0"/>
-              <a:t>codes</a:t>
+              <a:rPr lang="en-US" sz="2800" dirty="0" smtClean="0"/>
+              <a:t> variable provides access to	response body, headers, status, etc</a:t>
             </a:r>
           </a:p>
           <a:p>
@@ -7861,14 +8343,25 @@
               </a:buBlip>
             </a:pPr>
             <a:r>
-              <a:rPr lang="en-US" sz="2400" dirty="0" smtClean="0"/>
+              <a:rPr lang="en-US" sz="2800" dirty="0" smtClean="0"/>
               <a:t> </a:t>
             </a:r>
             <a:r>
-              <a:rPr lang="en-US" sz="2400" dirty="0" err="1" smtClean="0"/>
+              <a:rPr lang="en-US" sz="2800" dirty="0" err="1" smtClean="0"/>
               <a:t>last_request</a:t>
             </a:r>
-            <a:endParaRPr lang="en-US" sz="2400" dirty="0" smtClean="0"/>
+            <a:r>
+              <a:rPr lang="en-US" sz="2800" dirty="0" smtClean="0"/>
+              <a:t> variable provides access to host, 	cookies, referrer, </a:t>
+            </a:r>
+            <a:r>
+              <a:rPr lang="en-US" sz="2800" dirty="0" err="1" smtClean="0"/>
+              <a:t>params</a:t>
+            </a:r>
+            <a:r>
+              <a:rPr lang="en-US" sz="2800" dirty="0" smtClean="0"/>
+              <a:t>, post?, get?, delete?, 	put?, path, etc</a:t>
+            </a:r>
           </a:p>
         </p:txBody>
       </p:sp>
@@ -8258,13 +8751,8 @@
             </a:pPr>
             <a:r>
               <a:rPr lang="en-US" sz="2400" dirty="0" smtClean="0"/>
-              <a:t>Slides </a:t>
-            </a:r>
-            <a:r>
-              <a:rPr lang="en-US" sz="2400" dirty="0" smtClean="0"/>
-              <a:t>and code  examples for this presentation:</a:t>
-            </a:r>
-            <a:endParaRPr lang="en-US" sz="2400" dirty="0" smtClean="0"/>
+              <a:t>Slides and code  examples for this presentation:</a:t>
+            </a:r>
           </a:p>
           <a:p>
             <a:pPr lvl="1">
@@ -8274,15 +8762,7 @@
             </a:pPr>
             <a:r>
               <a:rPr lang="en-US" sz="2400" dirty="0" smtClean="0"/>
-              <a:t> git</a:t>
-            </a:r>
-            <a:r>
-              <a:rPr lang="en-US" sz="2400" dirty="0" smtClean="0"/>
-              <a:t>@github.com:techwhizbang/sinatra_slideshow.</a:t>
-            </a:r>
-            <a:r>
-              <a:rPr lang="en-US" sz="2400" dirty="0" smtClean="0"/>
-              <a:t>git</a:t>
+              <a:t> git@github.com:techwhizbang/sinatra_slideshow.git</a:t>
             </a:r>
           </a:p>
           <a:p>
@@ -8297,11 +8777,7 @@
             </a:r>
             <a:r>
               <a:rPr lang="en-US" sz="2400" dirty="0" err="1" smtClean="0"/>
-              <a:t>git@github.com:techwhizbang/sinatra_slideshow_code.</a:t>
-            </a:r>
-            <a:r>
-              <a:rPr lang="en-US" sz="2400" dirty="0" err="1" smtClean="0"/>
-              <a:t>git</a:t>
+              <a:t>git@github.com:techwhizbang/sinatra_slideshow_code.git</a:t>
             </a:r>
             <a:endParaRPr lang="en-US" sz="2400" dirty="0" smtClean="0"/>
           </a:p>
@@ -8405,53 +8881,137 @@
             <p:ph type="title"/>
           </p:nvPr>
         </p:nvSpPr>
-        <p:spPr/>
-        <p:txBody>
-          <a:bodyPr/>
-          <a:lstStyle/>
-          <a:p>
-            <a:r>
-              <a:rPr lang="en-US" dirty="0" smtClean="0"/>
-              <a:t>Sinatra Extensions</a:t>
-            </a:r>
-            <a:endParaRPr lang="en-US" dirty="0"/>
-          </a:p>
-        </p:txBody>
-      </p:sp>
-      <p:sp>
-        <p:nvSpPr>
-          <p:cNvPr id="3" name="TextBox 2"/>
-          <p:cNvSpPr txBox="1"/>
-          <p:nvPr/>
-        </p:nvSpPr>
         <p:spPr>
           <a:xfrm>
-            <a:off x="1392844" y="1492625"/>
-            <a:ext cx="6420754" cy="1200328"/>
+            <a:off x="914400" y="2248285"/>
+            <a:ext cx="7313613" cy="1264024"/>
+          </a:xfrm>
+        </p:spPr>
+        <p:txBody>
+          <a:bodyPr/>
+          <a:lstStyle/>
+          <a:p>
+            <a:r>
+              <a:rPr lang="en-US" dirty="0" smtClean="0"/>
+              <a:t>It would lead to Rack</a:t>
+            </a:r>
+            <a:endParaRPr lang="en-US" dirty="0"/>
+          </a:p>
+        </p:txBody>
+      </p:sp>
+      <p:sp>
+        <p:nvSpPr>
+          <p:cNvPr id="4" name="Title 1"/>
+          <p:cNvSpPr txBox="1">
+            <a:spLocks/>
+          </p:cNvSpPr>
+          <p:nvPr/>
+        </p:nvSpPr>
+        <p:spPr>
+          <a:xfrm>
+            <a:off x="1066800" y="381001"/>
+            <a:ext cx="7313613" cy="1264024"/>
           </a:xfrm>
           <a:prstGeom prst="rect">
             <a:avLst/>
           </a:prstGeom>
-          <a:noFill/>
+          <a:scene3d>
+            <a:camera prst="orthographicFront"/>
+            <a:lightRig rig="chilly" dir="t"/>
+          </a:scene3d>
+          <a:sp3d extrusionH="12700">
+            <a:extrusionClr>
+              <a:schemeClr val="bg1"/>
+            </a:extrusionClr>
+          </a:sp3d>
         </p:spPr>
         <p:txBody>
-          <a:bodyPr wrap="square" rtlCol="0">
-            <a:spAutoFit/>
+          <a:bodyPr vert="horz" lIns="91440" tIns="45720" rIns="91440" bIns="45720" rtlCol="0" anchor="ctr">
+            <a:noAutofit/>
+            <a:sp3d extrusionH="12700">
+              <a:extrusionClr>
+                <a:schemeClr val="bg1"/>
+              </a:extrusionClr>
+            </a:sp3d>
           </a:bodyPr>
           <a:lstStyle/>
           <a:p>
-            <a:endParaRPr lang="en-US" sz="2400" dirty="0" smtClean="0"/>
-          </a:p>
-          <a:p>
-            <a:pPr>
-              <a:buBlip>
-                <a:blip r:embed="rId2"/>
-              </a:buBlip>
+            <a:pPr marL="0" marR="0" lvl="0" indent="0" algn="ctr" defTabSz="914400" rtl="0" eaLnBrk="1" fontAlgn="auto" latinLnBrk="0" hangingPunct="1">
+              <a:lnSpc>
+                <a:spcPts val="5600"/>
+              </a:lnSpc>
+              <a:spcBef>
+                <a:spcPct val="0"/>
+              </a:spcBef>
+              <a:spcAft>
+                <a:spcPts val="0"/>
+              </a:spcAft>
+              <a:buClrTx/>
+              <a:buSzTx/>
+              <a:buFontTx/>
+              <a:buNone/>
+              <a:tabLst/>
+              <a:defRPr/>
             </a:pPr>
             <a:r>
-              <a:rPr lang="en-US" sz="2400" dirty="0" smtClean="0"/>
-              <a:t> Before you get carried away check for rack middleware </a:t>
-            </a:r>
+              <a:rPr kumimoji="0" lang="en-US" sz="5400" b="1" i="0" u="none" strike="noStrike" kern="1200" cap="none" spc="0" normalizeH="0" baseline="0" noProof="0" dirty="0" smtClean="0">
+                <a:ln>
+                  <a:noFill/>
+                </a:ln>
+                <a:gradFill>
+                  <a:gsLst>
+                    <a:gs pos="50000">
+                      <a:schemeClr val="tx1">
+                        <a:lumMod val="65000"/>
+                        <a:lumOff val="35000"/>
+                      </a:schemeClr>
+                    </a:gs>
+                    <a:gs pos="100000">
+                      <a:schemeClr val="tx1">
+                        <a:lumMod val="85000"/>
+                        <a:lumOff val="15000"/>
+                      </a:schemeClr>
+                    </a:gs>
+                  </a:gsLst>
+                  <a:lin ang="5400000" scaled="0"/>
+                </a:gradFill>
+                <a:effectLst/>
+                <a:uLnTx/>
+                <a:uFillTx/>
+                <a:latin typeface="+mj-lt"/>
+                <a:ea typeface="+mj-ea"/>
+                <a:cs typeface="+mj-cs"/>
+              </a:rPr>
+              <a:t>If Sinatra were a gateway drug…</a:t>
+            </a:r>
+            <a:endParaRPr kumimoji="0" lang="en-US" sz="5400" b="1" i="0" u="none" strike="noStrike" kern="1200" cap="none" spc="0" normalizeH="0" baseline="0" noProof="0" dirty="0">
+              <a:ln>
+                <a:noFill/>
+              </a:ln>
+              <a:gradFill>
+                <a:gsLst>
+                  <a:gs pos="50000">
+                    <a:schemeClr val="tx1">
+                      <a:lumMod val="65000"/>
+                      <a:lumOff val="35000"/>
+                    </a:schemeClr>
+                  </a:gs>
+                  <a:gs pos="100000">
+                    <a:schemeClr val="tx1">
+                      <a:lumMod val="85000"/>
+                      <a:lumOff val="15000"/>
+                    </a:schemeClr>
+                  </a:gs>
+                </a:gsLst>
+                <a:lin ang="5400000" scaled="0"/>
+              </a:gradFill>
+              <a:effectLst/>
+              <a:uLnTx/>
+              <a:uFillTx/>
+              <a:latin typeface="+mj-lt"/>
+              <a:ea typeface="+mj-ea"/>
+              <a:cs typeface="+mj-cs"/>
+            </a:endParaRPr>
           </a:p>
         </p:txBody>
       </p:sp>
@@ -8463,9 +9023,88 @@
   <p:timing>
     <p:tnLst>
       <p:par>
-        <p:cTn id="1" dur="indefinite" restart="never" nodeType="tmRoot"/>
+        <p:cTn id="1" dur="indefinite" restart="never" nodeType="tmRoot">
+          <p:childTnLst>
+            <p:seq concurrent="1" nextAc="seek">
+              <p:cTn id="2" dur="indefinite" nodeType="mainSeq">
+                <p:childTnLst>
+                  <p:par>
+                    <p:cTn id="3" fill="hold">
+                      <p:stCondLst>
+                        <p:cond delay="indefinite"/>
+                      </p:stCondLst>
+                      <p:childTnLst>
+                        <p:par>
+                          <p:cTn id="4" fill="hold">
+                            <p:stCondLst>
+                              <p:cond delay="0"/>
+                            </p:stCondLst>
+                            <p:childTnLst>
+                              <p:par>
+                                <p:cTn id="5" presetID="12" presetClass="entr" presetSubtype="4" fill="hold" grpId="0" nodeType="clickEffect">
+                                  <p:stCondLst>
+                                    <p:cond delay="0"/>
+                                  </p:stCondLst>
+                                  <p:childTnLst>
+                                    <p:set>
+                                      <p:cBhvr>
+                                        <p:cTn id="6" dur="1" fill="hold">
+                                          <p:stCondLst>
+                                            <p:cond delay="0"/>
+                                          </p:stCondLst>
+                                        </p:cTn>
+                                        <p:tgtEl>
+                                          <p:spTgt spid="2"/>
+                                        </p:tgtEl>
+                                        <p:attrNameLst>
+                                          <p:attrName>style.visibility</p:attrName>
+                                        </p:attrNameLst>
+                                      </p:cBhvr>
+                                      <p:to>
+                                        <p:strVal val="visible"/>
+                                      </p:to>
+                                    </p:set>
+                                    <p:animEffect transition="in" filter="slide(fromBottom)">
+                                      <p:cBhvr>
+                                        <p:cTn id="7" dur="500"/>
+                                        <p:tgtEl>
+                                          <p:spTgt spid="2"/>
+                                        </p:tgtEl>
+                                      </p:cBhvr>
+                                    </p:animEffect>
+                                  </p:childTnLst>
+                                </p:cTn>
+                              </p:par>
+                            </p:childTnLst>
+                          </p:cTn>
+                        </p:par>
+                      </p:childTnLst>
+                    </p:cTn>
+                  </p:par>
+                </p:childTnLst>
+              </p:cTn>
+              <p:prevCondLst>
+                <p:cond evt="onPrev" delay="0">
+                  <p:tgtEl>
+                    <p:sldTgt/>
+                  </p:tgtEl>
+                </p:cond>
+              </p:prevCondLst>
+              <p:nextCondLst>
+                <p:cond evt="onNext" delay="0">
+                  <p:tgtEl>
+                    <p:sldTgt/>
+                  </p:tgtEl>
+                </p:cond>
+              </p:nextCondLst>
+            </p:seq>
+          </p:childTnLst>
+        </p:cTn>
       </p:par>
     </p:tnLst>
+    <p:bldLst>
+      <p:bldP spid="2" grpId="0"/>
+    </p:bldLst>
   </p:timing>
 </p:sld>
 </file>
@@ -8522,8 +9161,8 @@
         </p:nvSpPr>
         <p:spPr>
           <a:xfrm>
-            <a:off x="1392844" y="1492625"/>
-            <a:ext cx="6420754" cy="2308324"/>
+            <a:off x="847288" y="1781109"/>
+            <a:ext cx="7380725" cy="3539431"/>
           </a:xfrm>
           <a:prstGeom prst="rect">
             <a:avLst/>
@@ -8536,7 +9175,7 @@
           </a:bodyPr>
           <a:lstStyle/>
           <a:p>
-            <a:endParaRPr lang="en-US" sz="2400" dirty="0" smtClean="0"/>
+            <a:endParaRPr lang="en-US" sz="2800" dirty="0" smtClean="0"/>
           </a:p>
           <a:p>
             <a:pPr>
@@ -8545,9 +9184,14 @@
               </a:buBlip>
             </a:pPr>
             <a:r>
-              <a:rPr lang="en-US" sz="2400" dirty="0" smtClean="0"/>
-              <a:t> basic-auth</a:t>
-            </a:r>
+              <a:rPr lang="en-US" sz="2800" dirty="0" smtClean="0"/>
+              <a:t> rack-</a:t>
+            </a:r>
+            <a:r>
+              <a:rPr lang="en-US" sz="2800" dirty="0" err="1" smtClean="0"/>
+              <a:t>contrib</a:t>
+            </a:r>
+            <a:endParaRPr lang="en-US" sz="2800" dirty="0" smtClean="0"/>
           </a:p>
           <a:p>
             <a:pPr>
@@ -8556,7 +9200,7 @@
               </a:buBlip>
             </a:pPr>
             <a:r>
-              <a:rPr lang="en-US" sz="2400" dirty="0" smtClean="0"/>
+              <a:rPr lang="en-US" sz="2800" dirty="0" smtClean="0"/>
               <a:t> rack-throttle</a:t>
             </a:r>
           </a:p>
@@ -8567,14 +9211,9 @@
               </a:buBlip>
             </a:pPr>
             <a:r>
-              <a:rPr lang="en-US" sz="2400" dirty="0" smtClean="0"/>
-              <a:t> </a:t>
-            </a:r>
-            <a:r>
-              <a:rPr lang="en-US" sz="2400" dirty="0" err="1" smtClean="0"/>
-              <a:t>Rack::Utils</a:t>
-            </a:r>
-            <a:endParaRPr lang="en-US" sz="2400" dirty="0" smtClean="0"/>
+              <a:rPr lang="en-US" sz="2800" dirty="0" smtClean="0"/>
+              <a:t> rack-bug</a:t>
+            </a:r>
           </a:p>
           <a:p>
             <a:pPr>
@@ -8583,7 +9222,7 @@
               </a:buBlip>
             </a:pPr>
             <a:r>
-              <a:rPr lang="en-US" sz="2400" dirty="0" smtClean="0"/>
+              <a:rPr lang="en-US" sz="2800" dirty="0" smtClean="0"/>
               <a:t> rack-flash</a:t>
             </a:r>
           </a:p>
@@ -8593,7 +9232,34 @@
                 <a:blip r:embed="rId2"/>
               </a:buBlip>
             </a:pPr>
-            <a:endParaRPr lang="en-US" sz="2400" dirty="0" smtClean="0"/>
+            <a:r>
+              <a:rPr lang="en-US" sz="2800" dirty="0" smtClean="0"/>
+              <a:t> warden</a:t>
+            </a:r>
+          </a:p>
+          <a:p>
+            <a:pPr>
+              <a:buBlip>
+                <a:blip r:embed="rId2"/>
+              </a:buBlip>
+            </a:pPr>
+            <a:r>
+              <a:rPr lang="en-US" sz="2800" dirty="0" smtClean="0"/>
+              <a:t> See for yourself and search “rack” on </a:t>
+            </a:r>
+            <a:r>
+              <a:rPr lang="en-US" sz="2800" dirty="0" err="1" smtClean="0"/>
+              <a:t>GitHub</a:t>
+            </a:r>
+            <a:endParaRPr lang="en-US" sz="2800" dirty="0" smtClean="0"/>
+          </a:p>
+          <a:p>
+            <a:pPr>
+              <a:buBlip>
+                <a:blip r:embed="rId2"/>
+              </a:buBlip>
+            </a:pPr>
+            <a:endParaRPr lang="en-US" sz="2800" dirty="0" smtClean="0"/>
           </a:p>
         </p:txBody>
       </p:sp>
@@ -8790,32 +9456,6 @@
           <a:chExt cx="0" cy="0"/>
         </a:xfrm>
       </p:grpSpPr>
-      <p:pic>
-        <p:nvPicPr>
-          <p:cNvPr id="10" name="Picture 9"/>
-          <p:cNvPicPr>
-            <a:picLocks noChangeAspect="1"/>
-          </p:cNvPicPr>
-          <p:nvPr/>
-        </p:nvPicPr>
-        <p:blipFill>
-          <a:blip r:embed="rId3">
-            <a:alphaModFix amt="17000"/>
-          </a:blip>
-          <a:stretch>
-            <a:fillRect/>
-          </a:stretch>
-        </p:blipFill>
-        <p:spPr>
-          <a:xfrm>
-            <a:off x="2349500" y="1439885"/>
-            <a:ext cx="4445000" cy="4445000"/>
-          </a:xfrm>
-          <a:prstGeom prst="rect">
-            <a:avLst/>
-          </a:prstGeom>
-        </p:spPr>
-      </p:pic>
       <p:sp>
         <p:nvSpPr>
           <p:cNvPr id="2" name="Title 1"/>
@@ -8832,8 +9472,8 @@
           <a:lstStyle/>
           <a:p>
             <a:r>
-              <a:rPr lang="en-US" dirty="0" err="1" smtClean="0"/>
-              <a:t>Cruft-o-Meter</a:t>
+              <a:rPr lang="en-US" dirty="0" smtClean="0"/>
+              <a:t>Code Counter</a:t>
             </a:r>
             <a:endParaRPr lang="en-US" dirty="0"/>
           </a:p>
@@ -8847,8 +9487,8 @@
         </p:nvSpPr>
         <p:spPr>
           <a:xfrm>
-            <a:off x="3101806" y="1492625"/>
-            <a:ext cx="3093515" cy="1200328"/>
+            <a:off x="2525852" y="1439885"/>
+            <a:ext cx="4445000" cy="1200328"/>
           </a:xfrm>
           <a:prstGeom prst="rect">
             <a:avLst/>
@@ -8864,15 +9504,16 @@
             <a:endParaRPr lang="en-US" sz="2400" dirty="0" smtClean="0"/>
           </a:p>
           <a:p>
+            <a:pPr algn="ctr"/>
             <a:r>
               <a:rPr lang="en-US" sz="2400" dirty="0" smtClean="0"/>
-              <a:t>Lines of code for tests?</a:t>
+              <a:t>Sinatra lines of code for tests?</a:t>
             </a:r>
           </a:p>
           <a:p>
             <a:pPr>
               <a:buBlip>
-                <a:blip r:embed="rId4"/>
+                <a:blip r:embed="rId3"/>
               </a:buBlip>
             </a:pPr>
             <a:endParaRPr lang="en-US" sz="2400" dirty="0"/>
@@ -8887,8 +9528,8 @@
         </p:nvSpPr>
         <p:spPr>
           <a:xfrm>
-            <a:off x="2349500" y="3062284"/>
-            <a:ext cx="4621352" cy="461665"/>
+            <a:off x="2086196" y="3200720"/>
+            <a:ext cx="5177892" cy="461665"/>
           </a:xfrm>
           <a:prstGeom prst="rect">
             <a:avLst/>
@@ -8903,7 +9544,7 @@
             <a:pPr lvl="1"/>
             <a:r>
               <a:rPr lang="en-US" sz="2400" dirty="0" smtClean="0"/>
-              <a:t>Actual lines of library code? </a:t>
+              <a:t>Sinatra actual lines of library code? </a:t>
             </a:r>
           </a:p>
         </p:txBody>
@@ -8966,6 +9607,88 @@
           </a:p>
         </p:txBody>
       </p:sp>
+      <p:sp>
+        <p:nvSpPr>
+          <p:cNvPr id="11" name="Rectangle 10"/>
+          <p:cNvSpPr/>
+          <p:nvPr/>
+        </p:nvSpPr>
+        <p:spPr>
+          <a:xfrm>
+            <a:off x="2349500" y="4501446"/>
+            <a:ext cx="4445000" cy="461665"/>
+          </a:xfrm>
+          <a:prstGeom prst="rect">
+            <a:avLst/>
+          </a:prstGeom>
+        </p:spPr>
+        <p:txBody>
+          <a:bodyPr wrap="square">
+            <a:spAutoFit/>
+          </a:bodyPr>
+          <a:lstStyle/>
+          <a:p>
+            <a:pPr lvl="1" algn="ctr"/>
+            <a:r>
+              <a:rPr lang="en-US" sz="2400" dirty="0" smtClean="0"/>
+              <a:t>Rails 2.3.x</a:t>
+            </a:r>
+          </a:p>
+        </p:txBody>
+      </p:sp>
+      <p:sp>
+        <p:nvSpPr>
+          <p:cNvPr id="12" name="Rectangle 11"/>
+          <p:cNvSpPr/>
+          <p:nvPr/>
+        </p:nvSpPr>
+        <p:spPr>
+          <a:xfrm>
+            <a:off x="3220660" y="5142531"/>
+            <a:ext cx="2890414" cy="461665"/>
+          </a:xfrm>
+          <a:prstGeom prst="rect">
+            <a:avLst/>
+          </a:prstGeom>
+        </p:spPr>
+        <p:txBody>
+          <a:bodyPr wrap="square">
+            <a:spAutoFit/>
+          </a:bodyPr>
+          <a:lstStyle/>
+          <a:p>
+            <a:pPr lvl="1"/>
+            <a:r>
+              <a:rPr lang="en-US" sz="2400" b="1" dirty="0" smtClean="0"/>
+              <a:t> approx 156000</a:t>
+            </a:r>
+          </a:p>
+        </p:txBody>
+      </p:sp>
+      <p:pic>
+        <p:nvPicPr>
+          <p:cNvPr id="14" name="Picture 13" descr="abacus-1.jpg"/>
+          <p:cNvPicPr>
+            <a:picLocks noChangeAspect="1"/>
+          </p:cNvPicPr>
+          <p:nvPr/>
+        </p:nvPicPr>
+        <p:blipFill>
+          <a:blip r:embed="rId4"/>
+          <a:stretch>
+            <a:fillRect/>
+          </a:stretch>
+        </p:blipFill>
+        <p:spPr>
+          <a:xfrm>
+            <a:off x="1966661" y="0"/>
+            <a:ext cx="5210678" cy="6858000"/>
+          </a:xfrm>
+          <a:prstGeom prst="rect">
+            <a:avLst/>
+          </a:prstGeom>
+        </p:spPr>
+      </p:pic>
     </p:spTree>
   </p:cSld>
   <p:clrMapOvr>
@@ -9069,6 +9792,392 @@
                       </p:childTnLst>
                     </p:cTn>
                   </p:par>
+                  <p:par>
+                    <p:cTn id="11" fill="hold">
+                      <p:stCondLst>
+                        <p:cond delay="indefinite"/>
+                      </p:stCondLst>
+                      <p:childTnLst>
+                        <p:par>
+                          <p:cTn id="12" fill="hold">
+                            <p:stCondLst>
+                              <p:cond delay="0"/>
+                            </p:stCondLst>
+                            <p:childTnLst>
+                              <p:par>
+                                <p:cTn id="13" presetID="1" presetClass="entr" presetSubtype="0" fill="hold" grpId="0" nodeType="clickEffect">
+                                  <p:stCondLst>
+                                    <p:cond delay="0"/>
+                                  </p:stCondLst>
+                                  <p:childTnLst>
+                                    <p:set>
+                                      <p:cBhvr>
+                                        <p:cTn id="14" dur="1" fill="hold">
+                                          <p:stCondLst>
+                                            <p:cond delay="0"/>
+                                          </p:stCondLst>
+                                        </p:cTn>
+                                        <p:tgtEl>
+                                          <p:spTgt spid="12"/>
+                                        </p:tgtEl>
+                                        <p:attrNameLst>
+                                          <p:attrName>style.visibility</p:attrName>
+                                        </p:attrNameLst>
+                                      </p:cBhvr>
+                                      <p:to>
+                                        <p:strVal val="visible"/>
+                                      </p:to>
+                                    </p:set>
+                                  </p:childTnLst>
+                                </p:cTn>
+                              </p:par>
+                            </p:childTnLst>
+                          </p:cTn>
+                        </p:par>
+                      </p:childTnLst>
+                    </p:cTn>
+                  </p:par>
+                  <p:par>
+                    <p:cTn id="15" fill="hold">
+                      <p:stCondLst>
+                        <p:cond delay="indefinite"/>
+                      </p:stCondLst>
+                      <p:childTnLst>
+                        <p:par>
+                          <p:cTn id="16" fill="hold">
+                            <p:stCondLst>
+                              <p:cond delay="0"/>
+                            </p:stCondLst>
+                            <p:childTnLst>
+                              <p:par>
+                                <p:cTn id="17" presetID="1" presetClass="entr" presetSubtype="0" fill="hold" grpId="1" nodeType="clickEffect">
+                                  <p:stCondLst>
+                                    <p:cond delay="0"/>
+                                  </p:stCondLst>
+                                  <p:childTnLst>
+                                    <p:set>
+                                      <p:cBhvr>
+                                        <p:cTn id="18" dur="1" fill="hold">
+                                          <p:stCondLst>
+                                            <p:cond delay="0"/>
+                                          </p:stCondLst>
+                                        </p:cTn>
+                                        <p:tgtEl>
+                                          <p:spTgt spid="12"/>
+                                        </p:tgtEl>
+                                        <p:attrNameLst>
+                                          <p:attrName>style.visibility</p:attrName>
+                                        </p:attrNameLst>
+                                      </p:cBhvr>
+                                      <p:to>
+                                        <p:strVal val="visible"/>
+                                      </p:to>
+                                    </p:set>
+                                  </p:childTnLst>
+                                </p:cTn>
+                              </p:par>
+                            </p:childTnLst>
+                          </p:cTn>
+                        </p:par>
+                      </p:childTnLst>
+                    </p:cTn>
+                  </p:par>
+                  <p:par>
+                    <p:cTn id="19" fill="hold">
+                      <p:stCondLst>
+                        <p:cond delay="indefinite"/>
+                      </p:stCondLst>
+                      <p:childTnLst>
+                        <p:par>
+                          <p:cTn id="20" fill="hold">
+                            <p:stCondLst>
+                              <p:cond delay="0"/>
+                            </p:stCondLst>
+                            <p:childTnLst>
+                              <p:par>
+                                <p:cTn id="21" presetID="26" presetClass="entr" presetSubtype="0" fill="hold" nodeType="clickEffect">
+                                  <p:stCondLst>
+                                    <p:cond delay="0"/>
+                                  </p:stCondLst>
+                                  <p:childTnLst>
+                                    <p:set>
+                                      <p:cBhvr>
+                                        <p:cTn id="22" dur="1" fill="hold">
+                                          <p:stCondLst>
+                                            <p:cond delay="0"/>
+                                          </p:stCondLst>
+                                        </p:cTn>
+                                        <p:tgtEl>
+                                          <p:spTgt spid="14"/>
+                                        </p:tgtEl>
+                                        <p:attrNameLst>
+                                          <p:attrName>style.visibility</p:attrName>
+                                        </p:attrNameLst>
+                                      </p:cBhvr>
+                                      <p:to>
+                                        <p:strVal val="visible"/>
+                                      </p:to>
+                                    </p:set>
+                                    <p:animEffect transition="in" filter="wipe(down)">
+                                      <p:cBhvr>
+                                        <p:cTn id="23" dur="580">
+                                          <p:stCondLst>
+                                            <p:cond delay="0"/>
+                                          </p:stCondLst>
+                                        </p:cTn>
+                                        <p:tgtEl>
+                                          <p:spTgt spid="14"/>
+                                        </p:tgtEl>
+                                      </p:cBhvr>
+                                    </p:animEffect>
+                                    <p:anim calcmode="lin" valueType="num">
+                                      <p:cBhvr>
+                                        <p:cTn id="24" dur="1822" tmFilter="0,0; 0.14,0.36; 0.43,0.73; 0.71,0.91; 1.0,1.0">
+                                          <p:stCondLst>
+                                            <p:cond delay="0"/>
+                                          </p:stCondLst>
+                                        </p:cTn>
+                                        <p:tgtEl>
+                                          <p:spTgt spid="14"/>
+                                        </p:tgtEl>
+                                        <p:attrNameLst>
+                                          <p:attrName>ppt_x</p:attrName>
+                                        </p:attrNameLst>
+                                      </p:cBhvr>
+                                      <p:tavLst>
+                                        <p:tav tm="0">
+                                          <p:val>
+                                            <p:strVal val="#ppt_x-0.25"/>
+                                          </p:val>
+                                        </p:tav>
+                                        <p:tav tm="100000">
+                                          <p:val>
+                                            <p:strVal val="#ppt_x"/>
+                                          </p:val>
+                                        </p:tav>
+                                      </p:tavLst>
+                                    </p:anim>
+                                    <p:anim calcmode="lin" valueType="num">
+                                      <p:cBhvr>
+                                        <p:cTn id="25" dur="664" tmFilter="0.0,0.0; 0.25,0.07; 0.50,0.2; 0.75,0.467; 1.0,1.0">
+                                          <p:stCondLst>
+                                            <p:cond delay="0"/>
+                                          </p:stCondLst>
+                                        </p:cTn>
+                                        <p:tgtEl>
+                                          <p:spTgt spid="14"/>
+                                        </p:tgtEl>
+                                        <p:attrNameLst>
+                                          <p:attrName>ppt_y</p:attrName>
+                                        </p:attrNameLst>
+                                      </p:cBhvr>
+                                      <p:tavLst>
+                                        <p:tav tm="0" fmla="#ppt_y-sin(pi*$)/3">
+                                          <p:val>
+                                            <p:fltVal val="0.5"/>
+                                          </p:val>
+                                        </p:tav>
+                                        <p:tav tm="100000">
+                                          <p:val>
+                                            <p:fltVal val="1"/>
+                                          </p:val>
+                                        </p:tav>
+                                      </p:tavLst>
+                                    </p:anim>
+                                    <p:anim calcmode="lin" valueType="num">
+                                      <p:cBhvr>
+                                        <p:cTn id="26" dur="664" tmFilter="0, 0; 0.125,0.2665; 0.25,0.4; 0.375,0.465; 0.5,0.5;  0.625,0.535; 0.75,0.6; 0.875,0.7335; 1,1">
+                                          <p:stCondLst>
+                                            <p:cond delay="664"/>
+                                          </p:stCondLst>
+                                        </p:cTn>
+                                        <p:tgtEl>
+                                          <p:spTgt spid="14"/>
+                                        </p:tgtEl>
+                                        <p:attrNameLst>
+                                          <p:attrName>ppt_y</p:attrName>
+                                        </p:attrNameLst>
+                                      </p:cBhvr>
+                                      <p:tavLst>
+                                        <p:tav tm="0" fmla="#ppt_y-sin(pi*$)/9">
+                                          <p:val>
+                                            <p:fltVal val="0"/>
+                                          </p:val>
+                                        </p:tav>
+                                        <p:tav tm="100000">
+                                          <p:val>
+                                            <p:fltVal val="1"/>
+                                          </p:val>
+                                        </p:tav>
+                                      </p:tavLst>
+                                    </p:anim>
+                                    <p:anim calcmode="lin" valueType="num">
+                                      <p:cBhvr>
+                                        <p:cTn id="27" dur="332" tmFilter="0, 0; 0.125,0.2665; 0.25,0.4; 0.375,0.465; 0.5,0.5;  0.625,0.535; 0.75,0.6; 0.875,0.7335; 1,1">
+                                          <p:stCondLst>
+                                            <p:cond delay="1324"/>
+                                          </p:stCondLst>
+                                        </p:cTn>
+                                        <p:tgtEl>
+                                          <p:spTgt spid="14"/>
+                                        </p:tgtEl>
+                                        <p:attrNameLst>
+                                          <p:attrName>ppt_y</p:attrName>
+                                        </p:attrNameLst>
+                                      </p:cBhvr>
+                                      <p:tavLst>
+                                        <p:tav tm="0" fmla="#ppt_y-sin(pi*$)/27">
+                                          <p:val>
+                                            <p:fltVal val="0"/>
+                                          </p:val>
+                                        </p:tav>
+                                        <p:tav tm="100000">
+                                          <p:val>
+                                            <p:fltVal val="1"/>
+                                          </p:val>
+                                        </p:tav>
+                                      </p:tavLst>
+                                    </p:anim>
+                                    <p:anim calcmode="lin" valueType="num">
+                                      <p:cBhvr>
+                                        <p:cTn id="28" dur="164" tmFilter="0, 0; 0.125,0.2665; 0.25,0.4; 0.375,0.465; 0.5,0.5;  0.625,0.535; 0.75,0.6; 0.875,0.7335; 1,1">
+                                          <p:stCondLst>
+                                            <p:cond delay="1656"/>
+                                          </p:stCondLst>
+                                        </p:cTn>
+                                        <p:tgtEl>
+                                          <p:spTgt spid="14"/>
+                                        </p:tgtEl>
+                                        <p:attrNameLst>
+                                          <p:attrName>ppt_y</p:attrName>
+                                        </p:attrNameLst>
+                                      </p:cBhvr>
+                                      <p:tavLst>
+                                        <p:tav tm="0" fmla="#ppt_y-sin(pi*$)/81">
+                                          <p:val>
+                                            <p:fltVal val="0"/>
+                                          </p:val>
+                                        </p:tav>
+                                        <p:tav tm="100000">
+                                          <p:val>
+                                            <p:fltVal val="1"/>
+                                          </p:val>
+                                        </p:tav>
+                                      </p:tavLst>
+                                    </p:anim>
+                                    <p:animScale>
+                                      <p:cBhvr>
+                                        <p:cTn id="29" dur="26">
+                                          <p:stCondLst>
+                                            <p:cond delay="650"/>
+                                          </p:stCondLst>
+                                        </p:cTn>
+                                        <p:tgtEl>
+                                          <p:spTgt spid="14"/>
+                                        </p:tgtEl>
+                                      </p:cBhvr>
+                                      <p:to x="100000" y="60000"/>
+                                    </p:animScale>
+                                    <p:animScale>
+                                      <p:cBhvr>
+                                        <p:cTn id="30" dur="166" decel="50000">
+                                          <p:stCondLst>
+                                            <p:cond delay="676"/>
+                                          </p:stCondLst>
+                                        </p:cTn>
+                                        <p:tgtEl>
+                                          <p:spTgt spid="14"/>
+                                        </p:tgtEl>
+                                      </p:cBhvr>
+                                      <p:to x="100000" y="100000"/>
+                                    </p:animScale>
+                                    <p:animScale>
+                                      <p:cBhvr>
+                                        <p:cTn id="31" dur="26">
+                                          <p:stCondLst>
+                                            <p:cond delay="1312"/>
+                                          </p:stCondLst>
+                                        </p:cTn>
+                                        <p:tgtEl>
+                                          <p:spTgt spid="14"/>
+                                        </p:tgtEl>
+                                      </p:cBhvr>
+                                      <p:to x="100000" y="80000"/>
+                                    </p:animScale>
+                                    <p:animScale>
+                                      <p:cBhvr>
+                                        <p:cTn id="32" dur="166" decel="50000">
+                                          <p:stCondLst>
+                                            <p:cond delay="1338"/>
+                                          </p:stCondLst>
+                                        </p:cTn>
+                                        <p:tgtEl>
+                                          <p:spTgt spid="14"/>
+                                        </p:tgtEl>
+                                      </p:cBhvr>
+                                      <p:to x="100000" y="100000"/>
+                                    </p:animScale>
+                                    <p:animScale>
+                                      <p:cBhvr>
+                                        <p:cTn id="33" dur="26">
+                                          <p:stCondLst>
+                                            <p:cond delay="1642"/>
+                                          </p:stCondLst>
+                                        </p:cTn>
+                                        <p:tgtEl>
+                                          <p:spTgt spid="14"/>
+                                        </p:tgtEl>
+                                      </p:cBhvr>
+                                      <p:to x="100000" y="90000"/>
+                                    </p:animScale>
+                                    <p:animScale>
+                                      <p:cBhvr>
+                                        <p:cTn id="34" dur="166" decel="50000">
+                                          <p:stCondLst>
+                                            <p:cond delay="1668"/>
+                                          </p:stCondLst>
+                                        </p:cTn>
+                                        <p:tgtEl>
+                                          <p:spTgt spid="14"/>
+                                        </p:tgtEl>
+                                      </p:cBhvr>
+                                      <p:to x="100000" y="100000"/>
+                                    </p:animScale>
+                                    <p:animScale>
+                                      <p:cBhvr>
+                                        <p:cTn id="35" dur="26">
+                                          <p:stCondLst>
+                                            <p:cond delay="1808"/>
+                                          </p:stCondLst>
+                                        </p:cTn>
+                                        <p:tgtEl>
+                                          <p:spTgt spid="14"/>
+                                        </p:tgtEl>
+                                      </p:cBhvr>
+                                      <p:to x="100000" y="95000"/>
+                                    </p:animScale>
+                                    <p:animScale>
+                                      <p:cBhvr>
+                                        <p:cTn id="36" dur="166" decel="50000">
+                                          <p:stCondLst>
+                                            <p:cond delay="1834"/>
+                                          </p:stCondLst>
+                                        </p:cTn>
+                                        <p:tgtEl>
+                                          <p:spTgt spid="14"/>
+                                        </p:tgtEl>
+                                      </p:cBhvr>
+                                      <p:to x="100000" y="100000"/>
+                                    </p:animScale>
+                                  </p:childTnLst>
+                                </p:cTn>
+                              </p:par>
+                            </p:childTnLst>
+                          </p:cTn>
+                        </p:par>
+                      </p:childTnLst>
+                    </p:cTn>
+                  </p:par>
                 </p:childTnLst>
               </p:cTn>
               <p:prevCondLst>
@@ -9093,6 +10202,8 @@
     <p:bldLst>
       <p:bldP spid="7" grpId="0"/>
       <p:bldP spid="9" grpId="0"/>
+      <p:bldP spid="12" grpId="0"/>
+      <p:bldP spid="12" grpId="1"/>
     </p:bldLst>
   </p:timing>
 </p:sld>
@@ -9146,8 +10257,8 @@
         </p:nvSpPr>
         <p:spPr>
           <a:xfrm>
-            <a:off x="1392844" y="1492625"/>
-            <a:ext cx="6420754" cy="1938992"/>
+            <a:off x="914400" y="1492625"/>
+            <a:ext cx="6575010" cy="1477328"/>
           </a:xfrm>
           <a:prstGeom prst="rect">
             <a:avLst/>
@@ -9160,51 +10271,64 @@
           </a:bodyPr>
           <a:lstStyle/>
           <a:p>
-            <a:endParaRPr lang="en-US" sz="2400" dirty="0" smtClean="0"/>
+            <a:endParaRPr lang="en-US" sz="3000" dirty="0" smtClean="0"/>
           </a:p>
           <a:p>
             <a:pPr>
               <a:buBlip>
-                <a:blip r:embed="rId2"/>
+                <a:blip r:embed="rId3"/>
               </a:buBlip>
             </a:pPr>
             <a:r>
-              <a:rPr lang="en-US" sz="2400" dirty="0" smtClean="0"/>
+              <a:rPr lang="en-US" sz="3000" dirty="0" smtClean="0"/>
               <a:t> How does it perform under load?</a:t>
             </a:r>
           </a:p>
           <a:p>
             <a:pPr>
               <a:buBlip>
-                <a:blip r:embed="rId2"/>
+                <a:blip r:embed="rId3"/>
               </a:buBlip>
             </a:pPr>
             <a:r>
-              <a:rPr lang="en-US" sz="2400" dirty="0" smtClean="0"/>
-              <a:t>Sinatra supports multithreading (works well with </a:t>
-            </a:r>
-            <a:r>
-              <a:rPr lang="en-US" sz="2400" dirty="0" err="1" smtClean="0"/>
-              <a:t>Jruby</a:t>
-            </a:r>
-            <a:r>
-              <a:rPr lang="en-US" sz="2400" dirty="0" smtClean="0"/>
+              <a:rPr lang="en-US" sz="3000" dirty="0" smtClean="0"/>
+              <a:t>Sinatra is thread safe (try </a:t>
+            </a:r>
+            <a:r>
+              <a:rPr lang="en-US" sz="3000" dirty="0" err="1" smtClean="0"/>
+              <a:t>w/JRuby</a:t>
+            </a:r>
+            <a:r>
+              <a:rPr lang="en-US" sz="3000" dirty="0" smtClean="0"/>
               <a:t>)</a:t>
             </a:r>
           </a:p>
-          <a:p>
-            <a:pPr>
-              <a:buBlip>
-                <a:blip r:embed="rId2"/>
-              </a:buBlip>
-            </a:pPr>
-            <a:r>
-              <a:rPr lang="en-US" sz="2400" dirty="0" smtClean="0"/>
-              <a:t> </a:t>
-            </a:r>
-          </a:p>
-        </p:txBody>
-      </p:sp>
+        </p:txBody>
+      </p:sp>
+      <p:pic>
+        <p:nvPicPr>
+          <p:cNvPr id="7" name="Picture 6"/>
+          <p:cNvPicPr>
+            <a:picLocks noChangeAspect="1"/>
+          </p:cNvPicPr>
+          <p:nvPr/>
+        </p:nvPicPr>
+        <p:blipFill>
+          <a:blip r:embed="rId4"/>
+          <a:stretch>
+            <a:fillRect/>
+          </a:stretch>
+        </p:blipFill>
+        <p:spPr>
+          <a:xfrm>
+            <a:off x="244221" y="2969953"/>
+            <a:ext cx="8645384" cy="1481328"/>
+          </a:xfrm>
+          <a:prstGeom prst="rect">
+            <a:avLst/>
+          </a:prstGeom>
+        </p:spPr>
+      </p:pic>
     </p:spTree>
   </p:cSld>
   <p:clrMapOvr>
@@ -9213,7 +10337,156 @@
   <p:timing>
     <p:tnLst>
       <p:par>
-        <p:cTn id="1" dur="indefinite" restart="never" nodeType="tmRoot"/>
+        <p:cTn id="1" dur="indefinite" restart="never" nodeType="tmRoot">
+          <p:childTnLst>
+            <p:seq concurrent="1" nextAc="seek">
+              <p:cTn id="2" dur="indefinite" nodeType="mainSeq">
+                <p:childTnLst>
+                  <p:par>
+                    <p:cTn id="3" fill="hold">
+                      <p:stCondLst>
+                        <p:cond delay="indefinite"/>
+                      </p:stCondLst>
+                      <p:childTnLst>
+                        <p:par>
+                          <p:cTn id="4" fill="hold">
+                            <p:stCondLst>
+                              <p:cond delay="0"/>
+                            </p:stCondLst>
+                            <p:childTnLst>
+                              <p:par>
+                                <p:cTn id="5" presetID="37" presetClass="entr" presetSubtype="0" fill="hold" nodeType="clickEffect">
+                                  <p:stCondLst>
+                                    <p:cond delay="0"/>
+                                  </p:stCondLst>
+                                  <p:childTnLst>
+                                    <p:set>
+                                      <p:cBhvr>
+                                        <p:cTn id="6" dur="1" fill="hold">
+                                          <p:stCondLst>
+                                            <p:cond delay="0"/>
+                                          </p:stCondLst>
+                                        </p:cTn>
+                                        <p:tgtEl>
+                                          <p:spTgt spid="7"/>
+                                        </p:tgtEl>
+                                        <p:attrNameLst>
+                                          <p:attrName>style.visibility</p:attrName>
+                                        </p:attrNameLst>
+                                      </p:cBhvr>
+                                      <p:to>
+                                        <p:strVal val="visible"/>
+                                      </p:to>
+                                    </p:set>
+                                    <p:animEffect transition="in" filter="fade">
+                                      <p:cBhvr>
+                                        <p:cTn id="7" dur="1000"/>
+                                        <p:tgtEl>
+                                          <p:spTgt spid="7"/>
+                                        </p:tgtEl>
+                                      </p:cBhvr>
+                                    </p:animEffect>
+                                    <p:anim calcmode="lin" valueType="num">
+                                      <p:cBhvr>
+                                        <p:cTn id="8" dur="1000" fill="hold"/>
+                                        <p:tgtEl>
+                                          <p:spTgt spid="7"/>
+                                        </p:tgtEl>
+                                        <p:attrNameLst>
+                                          <p:attrName>ppt_x</p:attrName>
+                                        </p:attrNameLst>
+                                      </p:cBhvr>
+                                      <p:tavLst>
+                                        <p:tav tm="0">
+                                          <p:val>
+                                            <p:strVal val="#ppt_x"/>
+                                          </p:val>
+                                        </p:tav>
+                                        <p:tav tm="100000">
+                                          <p:val>
+                                            <p:strVal val="#ppt_x"/>
+                                          </p:val>
+                                        </p:tav>
+                                      </p:tavLst>
+                                    </p:anim>
+                                    <p:anim calcmode="lin" valueType="num">
+                                      <p:cBhvr>
+                                        <p:cTn id="9" dur="900" decel="100000" fill="hold"/>
+                                        <p:tgtEl>
+                                          <p:spTgt spid="7"/>
+                                        </p:tgtEl>
+                                        <p:attrNameLst>
+                                          <p:attrName>ppt_y</p:attrName>
+                                        </p:attrNameLst>
+                                      </p:cBhvr>
+                                      <p:tavLst>
+                                        <p:tav tm="0">
+                                          <p:val>
+                                            <p:strVal val="#ppt_y+1"/>
+                                          </p:val>
+                                        </p:tav>
+                                        <p:tav tm="100000">
+                                          <p:val>
+                                            <p:strVal val="#ppt_y-.03"/>
+                                          </p:val>
+                                        </p:tav>
+                                      </p:tavLst>
+                                    </p:anim>
+                                    <p:anim calcmode="lin" valueType="num">
+                                      <p:cBhvr>
+                                        <p:cTn id="10" dur="100" accel="100000" fill="hold">
+                                          <p:stCondLst>
+                                            <p:cond delay="900"/>
+                                          </p:stCondLst>
+                                        </p:cTn>
+                                        <p:tgtEl>
+                                          <p:spTgt spid="7"/>
+                                        </p:tgtEl>
+                                        <p:attrNameLst>
+                                          <p:attrName>ppt_y</p:attrName>
+                                        </p:attrNameLst>
+                                      </p:cBhvr>
+                                      <p:tavLst>
+                                        <p:tav tm="0">
+                                          <p:val>
+                                            <p:strVal val="#ppt_y-.03"/>
+                                          </p:val>
+                                        </p:tav>
+                                        <p:tav tm="100000">
+                                          <p:val>
+                                            <p:strVal val="#ppt_y"/>
+                                          </p:val>
+                                        </p:tav>
+                                      </p:tavLst>
+                                    </p:anim>
+                                  </p:childTnLst>
+                                </p:cTn>
+                              </p:par>
+                            </p:childTnLst>
+                          </p:cTn>
+                        </p:par>
+                      </p:childTnLst>
+                    </p:cTn>
+                  </p:par>
+                </p:childTnLst>
+              </p:cTn>
+              <p:prevCondLst>
+                <p:cond evt="onPrev" delay="0">
+                  <p:tgtEl>
+                    <p:sldTgt/>
+                  </p:tgtEl>
+                </p:cond>
+              </p:prevCondLst>
+              <p:nextCondLst>
+                <p:cond evt="onNext" delay="0">
+                  <p:tgtEl>
+                    <p:sldTgt/>
+                  </p:tgtEl>
+                </p:cond>
+              </p:nextCondLst>
+            </p:seq>
+          </p:childTnLst>
+        </p:cTn>
       </p:par>
     </p:tnLst>
   </p:timing>
@@ -9254,7 +10527,15 @@
           <a:p>
             <a:r>
               <a:rPr lang="en-US" dirty="0" smtClean="0"/>
-              <a:t>Memory Footprint VS.</a:t>
+              <a:t>Sinatra + </a:t>
+            </a:r>
+            <a:r>
+              <a:rPr lang="en-US" dirty="0" err="1" smtClean="0"/>
+              <a:t>Jruby</a:t>
+            </a:r>
+            <a:r>
+              <a:rPr lang="en-US" dirty="0" smtClean="0"/>
+              <a:t> + Warbler</a:t>
             </a:r>
             <a:endParaRPr lang="en-US" dirty="0"/>
           </a:p>
@@ -9269,7 +10550,7 @@
         <p:spPr>
           <a:xfrm>
             <a:off x="1392844" y="1492625"/>
-            <a:ext cx="6420754" cy="1200328"/>
+            <a:ext cx="6420754" cy="2677656"/>
           </a:xfrm>
           <a:prstGeom prst="rect">
             <a:avLst/>
@@ -9282,26 +10563,86 @@
           </a:bodyPr>
           <a:lstStyle/>
           <a:p>
-            <a:endParaRPr lang="en-US" sz="2400" dirty="0" smtClean="0"/>
+            <a:endParaRPr lang="en-US" sz="3200" dirty="0" smtClean="0"/>
           </a:p>
           <a:p>
             <a:pPr>
               <a:buBlip>
-                <a:blip r:embed="rId2"/>
+                <a:blip r:embed="rId3"/>
               </a:buBlip>
             </a:pPr>
             <a:r>
-              <a:rPr lang="en-US" sz="2400" dirty="0" smtClean="0"/>
-              <a:t> Under load using ‘top’</a:t>
+              <a:rPr lang="en-US" sz="3200" dirty="0" smtClean="0"/>
+              <a:t>  </a:t>
+            </a:r>
+            <a:r>
+              <a:rPr lang="en-US" sz="3200" dirty="0" err="1" smtClean="0"/>
+              <a:t>jruby</a:t>
+            </a:r>
+            <a:r>
+              <a:rPr lang="en-US" sz="3200" dirty="0" smtClean="0"/>
+              <a:t> –S gem install warbler</a:t>
             </a:r>
           </a:p>
           <a:p>
             <a:pPr>
               <a:buBlip>
-                <a:blip r:embed="rId2"/>
+                <a:blip r:embed="rId3"/>
               </a:buBlip>
             </a:pPr>
-            <a:endParaRPr lang="en-US" sz="2400" dirty="0" smtClean="0"/>
+            <a:r>
+              <a:rPr lang="en-US" sz="3200" dirty="0" smtClean="0"/>
+              <a:t> </a:t>
+            </a:r>
+            <a:r>
+              <a:rPr lang="en-US" sz="3200" dirty="0" err="1" smtClean="0"/>
+              <a:t>mkdir</a:t>
+            </a:r>
+            <a:r>
+              <a:rPr lang="en-US" sz="3200" dirty="0" smtClean="0"/>
+              <a:t> </a:t>
+            </a:r>
+            <a:r>
+              <a:rPr lang="en-US" sz="3200" dirty="0" err="1" smtClean="0"/>
+              <a:t>config</a:t>
+            </a:r>
+            <a:endParaRPr lang="en-US" sz="3200" dirty="0" smtClean="0"/>
+          </a:p>
+          <a:p>
+            <a:pPr>
+              <a:buBlip>
+                <a:blip r:embed="rId3"/>
+              </a:buBlip>
+            </a:pPr>
+            <a:r>
+              <a:rPr lang="en-US" sz="3200" dirty="0" smtClean="0"/>
+              <a:t> warble </a:t>
+            </a:r>
+            <a:r>
+              <a:rPr lang="en-US" sz="3200" dirty="0" err="1" smtClean="0"/>
+              <a:t>config</a:t>
+            </a:r>
+            <a:endParaRPr lang="en-US" sz="3200" dirty="0" smtClean="0"/>
+          </a:p>
+          <a:p>
+            <a:pPr>
+              <a:buBlip>
+                <a:blip r:embed="rId3"/>
+              </a:buBlip>
+            </a:pPr>
+            <a:r>
+              <a:rPr lang="en-US" sz="3200" dirty="0" smtClean="0"/>
+              <a:t> Check </a:t>
+            </a:r>
+            <a:r>
+              <a:rPr lang="en-US" sz="4000" dirty="0" err="1" smtClean="0"/>
+              <a:t>config</a:t>
+            </a:r>
+            <a:r>
+              <a:rPr lang="en-US" sz="3200" dirty="0" err="1" smtClean="0"/>
+              <a:t>/warble.rb</a:t>
+            </a:r>
+            <a:endParaRPr lang="en-US" sz="3200" dirty="0" smtClean="0"/>
           </a:p>
         </p:txBody>
       </p:sp>
@@ -9354,11 +10695,11 @@
           <a:p>
             <a:r>
               <a:rPr lang="en-US" dirty="0" smtClean="0"/>
-              <a:t>Sinatra + </a:t>
+              <a:t>Sinatra on </a:t>
             </a:r>
             <a:r>
               <a:rPr lang="en-US" dirty="0" err="1" smtClean="0"/>
-              <a:t>JRuby</a:t>
+              <a:t>Heroku</a:t>
             </a:r>
             <a:endParaRPr lang="en-US" dirty="0"/>
           </a:p>
@@ -9373,7 +10714,7 @@
         <p:spPr>
           <a:xfrm>
             <a:off x="1392844" y="1492625"/>
-            <a:ext cx="6420754" cy="830997"/>
+            <a:ext cx="6420754" cy="3785652"/>
           </a:xfrm>
           <a:prstGeom prst="rect">
             <a:avLst/>
@@ -9396,7 +10737,137 @@
             </a:pPr>
             <a:r>
               <a:rPr lang="en-US" sz="2400" dirty="0" smtClean="0"/>
-              <a:t> Under load using ‘top’</a:t>
+              <a:t> Version your app with </a:t>
+            </a:r>
+            <a:r>
+              <a:rPr lang="en-US" sz="2400" dirty="0" err="1" smtClean="0"/>
+              <a:t>Git(hub</a:t>
+            </a:r>
+            <a:r>
+              <a:rPr lang="en-US" sz="2400" dirty="0" smtClean="0"/>
+              <a:t>)</a:t>
+            </a:r>
+          </a:p>
+          <a:p>
+            <a:pPr>
+              <a:buBlip>
+                <a:blip r:embed="rId2"/>
+              </a:buBlip>
+            </a:pPr>
+            <a:r>
+              <a:rPr lang="en-US" sz="2400" dirty="0" smtClean="0"/>
+              <a:t> Use Bundler or .gems file to manage Gems</a:t>
+            </a:r>
+          </a:p>
+          <a:p>
+            <a:pPr>
+              <a:buBlip>
+                <a:blip r:embed="rId2"/>
+              </a:buBlip>
+            </a:pPr>
+            <a:r>
+              <a:rPr lang="en-US" sz="2400" dirty="0" smtClean="0"/>
+              <a:t> </a:t>
+            </a:r>
+            <a:r>
+              <a:rPr lang="en-US" sz="2400" dirty="0" err="1" smtClean="0"/>
+              <a:t>sudo</a:t>
+            </a:r>
+            <a:r>
+              <a:rPr lang="en-US" sz="2400" dirty="0" smtClean="0"/>
+              <a:t> gem install </a:t>
+            </a:r>
+            <a:r>
+              <a:rPr lang="en-US" sz="2400" dirty="0" err="1" smtClean="0"/>
+              <a:t>heroku</a:t>
+            </a:r>
+            <a:endParaRPr lang="en-US" sz="2400" dirty="0" smtClean="0"/>
+          </a:p>
+          <a:p>
+            <a:pPr>
+              <a:buBlip>
+                <a:blip r:embed="rId2"/>
+              </a:buBlip>
+            </a:pPr>
+            <a:r>
+              <a:rPr lang="en-US" sz="2400" dirty="0" smtClean="0"/>
+              <a:t> </a:t>
+            </a:r>
+            <a:r>
+              <a:rPr lang="en-US" sz="2400" dirty="0" err="1" smtClean="0"/>
+              <a:t>heroku</a:t>
+            </a:r>
+            <a:r>
+              <a:rPr lang="en-US" sz="2400" dirty="0" smtClean="0"/>
+              <a:t> create</a:t>
+            </a:r>
+          </a:p>
+          <a:p>
+            <a:pPr>
+              <a:buBlip>
+                <a:blip r:embed="rId2"/>
+              </a:buBlip>
+            </a:pPr>
+            <a:r>
+              <a:rPr lang="en-US" sz="2400" dirty="0" smtClean="0"/>
+              <a:t> </a:t>
+            </a:r>
+            <a:r>
+              <a:rPr lang="en-US" sz="2400" dirty="0" err="1" smtClean="0"/>
+              <a:t>git</a:t>
+            </a:r>
+            <a:r>
+              <a:rPr lang="en-US" sz="2400" dirty="0" smtClean="0"/>
+              <a:t> push </a:t>
+            </a:r>
+            <a:r>
+              <a:rPr lang="en-US" sz="2400" dirty="0" err="1" smtClean="0"/>
+              <a:t>heroku</a:t>
+            </a:r>
+            <a:r>
+              <a:rPr lang="en-US" sz="2400" dirty="0" smtClean="0"/>
+              <a:t> master</a:t>
+            </a:r>
+          </a:p>
+          <a:p>
+            <a:pPr>
+              <a:buBlip>
+                <a:blip r:embed="rId2"/>
+              </a:buBlip>
+            </a:pPr>
+            <a:r>
+              <a:rPr lang="en-US" sz="2400" dirty="0" smtClean="0"/>
+              <a:t> See your gems installed in the terminal</a:t>
+            </a:r>
+          </a:p>
+          <a:p>
+            <a:pPr>
+              <a:buBlip>
+                <a:blip r:embed="rId2"/>
+              </a:buBlip>
+            </a:pPr>
+            <a:r>
+              <a:rPr lang="en-US" sz="2400" dirty="0" smtClean="0"/>
+              <a:t> It really is that easy!</a:t>
+            </a:r>
+          </a:p>
+          <a:p>
+            <a:pPr>
+              <a:buBlip>
+                <a:blip r:embed="rId2"/>
+              </a:buBlip>
+            </a:pPr>
+            <a:r>
+              <a:rPr lang="en-US" sz="2400" dirty="0" smtClean="0"/>
+              <a:t> http://simple-</a:t>
+            </a:r>
+            <a:r>
+              <a:rPr lang="en-US" sz="2400" dirty="0" err="1" smtClean="0"/>
+              <a:t>sinatra-meetup.heroku.com/standalone</a:t>
+            </a:r>
+            <a:r>
+              <a:rPr lang="en-US" sz="2400" dirty="0" smtClean="0"/>
+              <a:t>/</a:t>
             </a:r>
           </a:p>
         </p:txBody>
@@ -9450,11 +10921,7 @@
           <a:p>
             <a:r>
               <a:rPr lang="en-US" dirty="0" smtClean="0"/>
-              <a:t>Sinatra + </a:t>
-            </a:r>
-            <a:r>
-              <a:rPr lang="en-US" dirty="0" err="1" smtClean="0"/>
-              <a:t>JRuby</a:t>
+              <a:t>Sinatra in Action</a:t>
             </a:r>
             <a:endParaRPr lang="en-US" dirty="0"/>
           </a:p>
@@ -9469,7 +10936,7 @@
         <p:spPr>
           <a:xfrm>
             <a:off x="1392844" y="1492625"/>
-            <a:ext cx="6420754" cy="830997"/>
+            <a:ext cx="6420754" cy="1938992"/>
           </a:xfrm>
           <a:prstGeom prst="rect">
             <a:avLst/>
@@ -9487,12 +10954,85 @@
           <a:p>
             <a:pPr>
               <a:buBlip>
-                <a:blip r:embed="rId2"/>
+                <a:blip r:embed="rId3"/>
               </a:buBlip>
             </a:pPr>
             <a:r>
               <a:rPr lang="en-US" sz="2400" dirty="0" smtClean="0"/>
-              <a:t> Under load using ‘top’</a:t>
+              <a:t> </a:t>
+            </a:r>
+            <a:r>
+              <a:rPr lang="en-US" sz="2400" dirty="0" err="1" smtClean="0"/>
+              <a:t>GitHub</a:t>
+            </a:r>
+            <a:r>
+              <a:rPr lang="en-US" sz="2400" dirty="0" smtClean="0"/>
+              <a:t> </a:t>
+            </a:r>
+            <a:r>
+              <a:rPr lang="en-US" sz="2400" dirty="0" err="1" smtClean="0"/>
+              <a:t>resque</a:t>
+            </a:r>
+            <a:r>
+              <a:rPr lang="en-US" sz="2400" dirty="0" smtClean="0"/>
+              <a:t> gem</a:t>
+            </a:r>
+          </a:p>
+          <a:p>
+            <a:pPr>
+              <a:buBlip>
+                <a:blip r:embed="rId3"/>
+              </a:buBlip>
+            </a:pPr>
+            <a:r>
+              <a:rPr lang="en-US" sz="2400" dirty="0" smtClean="0"/>
+              <a:t> </a:t>
+            </a:r>
+            <a:r>
+              <a:rPr lang="en-US" sz="2400" dirty="0" err="1" smtClean="0"/>
+              <a:t>Github</a:t>
+            </a:r>
+            <a:r>
+              <a:rPr lang="en-US" sz="2400" dirty="0" smtClean="0"/>
+              <a:t> Watchtower</a:t>
+            </a:r>
+          </a:p>
+          <a:p>
+            <a:pPr>
+              <a:buBlip>
+                <a:blip r:embed="rId3"/>
+              </a:buBlip>
+            </a:pPr>
+            <a:r>
+              <a:rPr lang="en-US" sz="2400" dirty="0" smtClean="0"/>
+              <a:t> </a:t>
+            </a:r>
+            <a:r>
+              <a:rPr lang="en-US" sz="2400" dirty="0" err="1" smtClean="0"/>
+              <a:t>Heroku</a:t>
+            </a:r>
+            <a:r>
+              <a:rPr lang="en-US" sz="2400" dirty="0" smtClean="0"/>
+              <a:t>: processing background jobs</a:t>
+            </a:r>
+          </a:p>
+          <a:p>
+            <a:pPr>
+              <a:buBlip>
+                <a:blip r:embed="rId3"/>
+              </a:buBlip>
+            </a:pPr>
+            <a:r>
+              <a:rPr lang="en-US" sz="2400" dirty="0" smtClean="0"/>
+              <a:t> Cafepress: internal </a:t>
+            </a:r>
+            <a:r>
+              <a:rPr lang="en-US" sz="2400" dirty="0" err="1" smtClean="0"/>
+              <a:t>RESTful</a:t>
+            </a:r>
+            <a:r>
+              <a:rPr lang="en-US" sz="2400" dirty="0" smtClean="0"/>
+              <a:t> services</a:t>
             </a:r>
           </a:p>
         </p:txBody>
@@ -9529,32 +11069,6 @@
           <a:chExt cx="0" cy="0"/>
         </a:xfrm>
       </p:grpSpPr>
-      <p:pic>
-        <p:nvPicPr>
-          <p:cNvPr id="4" name="Picture 3"/>
-          <p:cNvPicPr>
-            <a:picLocks noChangeAspect="1"/>
-          </p:cNvPicPr>
-          <p:nvPr/>
-        </p:nvPicPr>
-        <p:blipFill>
-          <a:blip r:embed="rId3">
-            <a:alphaModFix amt="30000"/>
-          </a:blip>
-          <a:stretch>
-            <a:fillRect/>
-          </a:stretch>
-        </p:blipFill>
-        <p:spPr>
-          <a:xfrm>
-            <a:off x="-508000" y="1492625"/>
-            <a:ext cx="10160000" cy="3505200"/>
-          </a:xfrm>
-          <a:prstGeom prst="rect">
-            <a:avLst/>
-          </a:prstGeom>
-        </p:spPr>
-      </p:pic>
       <p:sp>
         <p:nvSpPr>
           <p:cNvPr id="2" name="Title 1"/>
@@ -9571,294 +11085,10 @@
           <a:lstStyle/>
           <a:p>
             <a:r>
-              <a:rPr lang="en-US" dirty="0" err="1" smtClean="0"/>
-              <a:t>JRuby</a:t>
-            </a:r>
-            <a:r>
               <a:rPr lang="en-US" dirty="0" smtClean="0"/>
-              <a:t>+ Warbler + Bundler</a:t>
+              <a:t>Q&amp;A</a:t>
             </a:r>
             <a:endParaRPr lang="en-US" dirty="0"/>
-          </a:p>
-        </p:txBody>
-      </p:sp>
-      <p:sp>
-        <p:nvSpPr>
-          <p:cNvPr id="3" name="TextBox 2"/>
-          <p:cNvSpPr txBox="1"/>
-          <p:nvPr/>
-        </p:nvSpPr>
-        <p:spPr>
-          <a:xfrm>
-            <a:off x="1392844" y="1492625"/>
-            <a:ext cx="6420754" cy="1200328"/>
-          </a:xfrm>
-          <a:prstGeom prst="rect">
-            <a:avLst/>
-          </a:prstGeom>
-          <a:noFill/>
-        </p:spPr>
-        <p:txBody>
-          <a:bodyPr wrap="square" rtlCol="0">
-            <a:spAutoFit/>
-          </a:bodyPr>
-          <a:lstStyle/>
-          <a:p>
-            <a:endParaRPr lang="en-US" sz="2400" dirty="0" smtClean="0"/>
-          </a:p>
-          <a:p>
-            <a:pPr>
-              <a:buBlip>
-                <a:blip r:embed="rId4"/>
-              </a:buBlip>
-            </a:pPr>
-            <a:r>
-              <a:rPr lang="en-US" sz="2400" dirty="0" smtClean="0"/>
-              <a:t> </a:t>
-            </a:r>
-            <a:r>
-              <a:rPr lang="en-US" sz="2400" dirty="0" err="1" smtClean="0"/>
-              <a:t>Gemfile</a:t>
-            </a:r>
-            <a:endParaRPr lang="en-US" sz="2400" dirty="0" smtClean="0"/>
-          </a:p>
-          <a:p>
-            <a:pPr>
-              <a:buBlip>
-                <a:blip r:embed="rId4"/>
-              </a:buBlip>
-            </a:pPr>
-            <a:r>
-              <a:rPr lang="en-US" sz="2400" dirty="0" err="1" smtClean="0"/>
-              <a:t>Bundler.require_env</a:t>
-            </a:r>
-            <a:endParaRPr lang="en-US" sz="2400" dirty="0" smtClean="0"/>
-          </a:p>
-        </p:txBody>
-      </p:sp>
-    </p:spTree>
-  </p:cSld>
-  <p:clrMapOvr>
-    <a:masterClrMapping/>
-  </p:clrMapOvr>
-  <p:timing>
-    <p:tnLst>
-      <p:par>
-        <p:cTn id="1" dur="indefinite" restart="never" nodeType="tmRoot"/>
-      </p:par>
-    </p:tnLst>
-  </p:timing>
-</p:sld>
-</file>
-
-<file path=ppt/slides/slide29.xml><?xml version="1.0" encoding="utf-8"?>
-<p:sld xmlns:a="http://schemas.openxmlformats.org/drawingml/2006/main" xmlns:r="http://schemas.openxmlformats.org/officeDocument/2006/relationships" xmlns:mc="http://schemas.openxmlformats.org/markup-compatibility/2006" xmlns:mv="urn:schemas-microsoft-com:mac:vml" xmlns:p="http://schemas.openxmlformats.org/presentationml/2006/main" mc:Ignorable="mv" mc:PreserveAttributes="mv:*">
-  <p:cSld>
-    <p:spTree>
-      <p:nvGrpSpPr>
-        <p:cNvPr id="1" name=""/>
-        <p:cNvGrpSpPr/>
-        <p:nvPr/>
-      </p:nvGrpSpPr>
-      <p:grpSpPr>
-        <a:xfrm>
-          <a:off x="0" y="0"/>
-          <a:ext cx="0" cy="0"/>
-          <a:chOff x="0" y="0"/>
-          <a:chExt cx="0" cy="0"/>
-        </a:xfrm>
-      </p:grpSpPr>
-      <p:sp>
-        <p:nvSpPr>
-          <p:cNvPr id="2" name="Title 1"/>
-          <p:cNvSpPr>
-            <a:spLocks noGrp="1"/>
-          </p:cNvSpPr>
-          <p:nvPr>
-            <p:ph type="title"/>
-          </p:nvPr>
-        </p:nvSpPr>
-        <p:spPr/>
-        <p:txBody>
-          <a:bodyPr/>
-          <a:lstStyle/>
-          <a:p>
-            <a:r>
-              <a:rPr lang="en-US" dirty="0" smtClean="0"/>
-              <a:t>Sinatra on </a:t>
-            </a:r>
-            <a:r>
-              <a:rPr lang="en-US" dirty="0" err="1" smtClean="0"/>
-              <a:t>Heroku</a:t>
-            </a:r>
-            <a:endParaRPr lang="en-US" dirty="0"/>
-          </a:p>
-        </p:txBody>
-      </p:sp>
-      <p:sp>
-        <p:nvSpPr>
-          <p:cNvPr id="3" name="TextBox 2"/>
-          <p:cNvSpPr txBox="1"/>
-          <p:nvPr/>
-        </p:nvSpPr>
-        <p:spPr>
-          <a:xfrm>
-            <a:off x="1392844" y="1492625"/>
-            <a:ext cx="6420754" cy="3785652"/>
-          </a:xfrm>
-          <a:prstGeom prst="rect">
-            <a:avLst/>
-          </a:prstGeom>
-          <a:noFill/>
-        </p:spPr>
-        <p:txBody>
-          <a:bodyPr wrap="square" rtlCol="0">
-            <a:spAutoFit/>
-          </a:bodyPr>
-          <a:lstStyle/>
-          <a:p>
-            <a:endParaRPr lang="en-US" sz="2400" dirty="0" smtClean="0"/>
-          </a:p>
-          <a:p>
-            <a:pPr>
-              <a:buBlip>
-                <a:blip r:embed="rId2"/>
-              </a:buBlip>
-            </a:pPr>
-            <a:r>
-              <a:rPr lang="en-US" sz="2400" dirty="0" smtClean="0"/>
-              <a:t> Version your app with </a:t>
-            </a:r>
-            <a:r>
-              <a:rPr lang="en-US" sz="2400" dirty="0" err="1" smtClean="0"/>
-              <a:t>Git(hub</a:t>
-            </a:r>
-            <a:r>
-              <a:rPr lang="en-US" sz="2400" dirty="0" smtClean="0"/>
-              <a:t>)</a:t>
-            </a:r>
-          </a:p>
-          <a:p>
-            <a:pPr>
-              <a:buBlip>
-                <a:blip r:embed="rId2"/>
-              </a:buBlip>
-            </a:pPr>
-            <a:r>
-              <a:rPr lang="en-US" sz="2400" dirty="0" smtClean="0"/>
-              <a:t> Use Bundler or .gems file to manage Gems</a:t>
-            </a:r>
-          </a:p>
-          <a:p>
-            <a:pPr>
-              <a:buBlip>
-                <a:blip r:embed="rId2"/>
-              </a:buBlip>
-            </a:pPr>
-            <a:r>
-              <a:rPr lang="en-US" sz="2400" dirty="0" smtClean="0"/>
-              <a:t> </a:t>
-            </a:r>
-            <a:r>
-              <a:rPr lang="en-US" sz="2400" dirty="0" err="1" smtClean="0"/>
-              <a:t>sudo</a:t>
-            </a:r>
-            <a:r>
-              <a:rPr lang="en-US" sz="2400" dirty="0" smtClean="0"/>
-              <a:t> gem install </a:t>
-            </a:r>
-            <a:r>
-              <a:rPr lang="en-US" sz="2400" dirty="0" err="1" smtClean="0"/>
-              <a:t>heroku</a:t>
-            </a:r>
-            <a:endParaRPr lang="en-US" sz="2400" dirty="0" smtClean="0"/>
-          </a:p>
-          <a:p>
-            <a:pPr>
-              <a:buBlip>
-                <a:blip r:embed="rId2"/>
-              </a:buBlip>
-            </a:pPr>
-            <a:r>
-              <a:rPr lang="en-US" sz="2400" dirty="0" smtClean="0"/>
-              <a:t> </a:t>
-            </a:r>
-            <a:r>
-              <a:rPr lang="en-US" sz="2400" dirty="0" err="1" smtClean="0"/>
-              <a:t>heroku</a:t>
-            </a:r>
-            <a:r>
-              <a:rPr lang="en-US" sz="2400" dirty="0" smtClean="0"/>
-              <a:t> create</a:t>
-            </a:r>
-          </a:p>
-          <a:p>
-            <a:pPr>
-              <a:buBlip>
-                <a:blip r:embed="rId2"/>
-              </a:buBlip>
-            </a:pPr>
-            <a:r>
-              <a:rPr lang="en-US" sz="2400" dirty="0" smtClean="0"/>
-              <a:t> </a:t>
-            </a:r>
-            <a:r>
-              <a:rPr lang="en-US" sz="2400" dirty="0" err="1" smtClean="0"/>
-              <a:t>git</a:t>
-            </a:r>
-            <a:r>
-              <a:rPr lang="en-US" sz="2400" dirty="0" smtClean="0"/>
-              <a:t> push </a:t>
-            </a:r>
-            <a:r>
-              <a:rPr lang="en-US" sz="2400" dirty="0" err="1" smtClean="0"/>
-              <a:t>heroku</a:t>
-            </a:r>
-            <a:r>
-              <a:rPr lang="en-US" sz="2400" dirty="0" smtClean="0"/>
-              <a:t> master</a:t>
-            </a:r>
-          </a:p>
-          <a:p>
-            <a:pPr>
-              <a:buBlip>
-                <a:blip r:embed="rId2"/>
-              </a:buBlip>
-            </a:pPr>
-            <a:r>
-              <a:rPr lang="en-US" sz="2400" dirty="0" smtClean="0"/>
-              <a:t> See your gems installed in the terminal</a:t>
-            </a:r>
-          </a:p>
-          <a:p>
-            <a:pPr>
-              <a:buBlip>
-                <a:blip r:embed="rId2"/>
-              </a:buBlip>
-            </a:pPr>
-            <a:r>
-              <a:rPr lang="en-US" sz="2400" dirty="0" smtClean="0"/>
-              <a:t> It really is that easy!</a:t>
-            </a:r>
-          </a:p>
-          <a:p>
-            <a:pPr>
-              <a:buBlip>
-                <a:blip r:embed="rId2"/>
-              </a:buBlip>
-            </a:pPr>
-            <a:r>
-              <a:rPr lang="en-US" sz="2400" dirty="0" smtClean="0"/>
-              <a:t> http://simple-</a:t>
-            </a:r>
-            <a:r>
-              <a:rPr lang="en-US" sz="2400" dirty="0" err="1" smtClean="0"/>
-              <a:t>sinatra-meetup.heroku.com/standalone</a:t>
-            </a:r>
-            <a:r>
-              <a:rPr lang="en-US" sz="2400" dirty="0" smtClean="0"/>
-              <a:t>/</a:t>
-            </a:r>
           </a:p>
         </p:txBody>
       </p:sp>
@@ -9911,7 +11141,7 @@
           <a:p>
             <a:r>
               <a:rPr lang="en-US" dirty="0" smtClean="0"/>
-              <a:t>Overview</a:t>
+              <a:t>Compelling Reasons</a:t>
             </a:r>
             <a:endParaRPr lang="en-US" dirty="0"/>
           </a:p>
@@ -9949,15 +11179,7 @@
             </a:pPr>
             <a:r>
               <a:rPr lang="en-US" sz="2400" dirty="0" smtClean="0"/>
-              <a:t> Sinatra is a </a:t>
-            </a:r>
-            <a:r>
-              <a:rPr lang="en-US" sz="2400" dirty="0" err="1" smtClean="0"/>
-              <a:t>RESTful</a:t>
-            </a:r>
-            <a:r>
-              <a:rPr lang="en-US" sz="2400" dirty="0" smtClean="0"/>
-              <a:t> “</a:t>
+              <a:t> Sinatra is a “</a:t>
             </a:r>
             <a:r>
               <a:rPr lang="en-US" sz="2400" dirty="0" err="1" smtClean="0"/>
@@ -9976,7 +11198,7 @@
             </a:pPr>
             <a:r>
               <a:rPr lang="en-US" sz="2400" dirty="0" smtClean="0"/>
-              <a:t> Easy and practical</a:t>
+              <a:t> Easy, practical, go fast!</a:t>
             </a:r>
           </a:p>
           <a:p>
@@ -10089,263 +11311,6 @@
               </a:buBlip>
             </a:pPr>
             <a:endParaRPr lang="en-US" sz="2400" dirty="0"/>
-          </a:p>
-        </p:txBody>
-      </p:sp>
-    </p:spTree>
-  </p:cSld>
-  <p:clrMapOvr>
-    <a:masterClrMapping/>
-  </p:clrMapOvr>
-  <p:timing>
-    <p:tnLst>
-      <p:par>
-        <p:cTn id="1" dur="indefinite" restart="never" nodeType="tmRoot"/>
-      </p:par>
-    </p:tnLst>
-  </p:timing>
-</p:sld>
-</file>
-
-<file path=ppt/slides/slide30.xml><?xml version="1.0" encoding="utf-8"?>
-<p:sld xmlns:a="http://schemas.openxmlformats.org/drawingml/2006/main" xmlns:r="http://schemas.openxmlformats.org/officeDocument/2006/relationships" xmlns:mc="http://schemas.openxmlformats.org/markup-compatibility/2006" xmlns:mv="urn:schemas-microsoft-com:mac:vml" xmlns:p="http://schemas.openxmlformats.org/presentationml/2006/main" mc:Ignorable="mv" mc:PreserveAttributes="mv:*">
-  <p:cSld>
-    <p:spTree>
-      <p:nvGrpSpPr>
-        <p:cNvPr id="1" name=""/>
-        <p:cNvGrpSpPr/>
-        <p:nvPr/>
-      </p:nvGrpSpPr>
-      <p:grpSpPr>
-        <a:xfrm>
-          <a:off x="0" y="0"/>
-          <a:ext cx="0" cy="0"/>
-          <a:chOff x="0" y="0"/>
-          <a:chExt cx="0" cy="0"/>
-        </a:xfrm>
-      </p:grpSpPr>
-      <p:sp>
-        <p:nvSpPr>
-          <p:cNvPr id="2" name="Title 1"/>
-          <p:cNvSpPr>
-            <a:spLocks noGrp="1"/>
-          </p:cNvSpPr>
-          <p:nvPr>
-            <p:ph type="title"/>
-          </p:nvPr>
-        </p:nvSpPr>
-        <p:spPr/>
-        <p:txBody>
-          <a:bodyPr/>
-          <a:lstStyle/>
-          <a:p>
-            <a:r>
-              <a:rPr lang="en-US" dirty="0" smtClean="0"/>
-              <a:t>Sinatra in Action</a:t>
-            </a:r>
-            <a:endParaRPr lang="en-US" dirty="0"/>
-          </a:p>
-        </p:txBody>
-      </p:sp>
-      <p:sp>
-        <p:nvSpPr>
-          <p:cNvPr id="3" name="TextBox 2"/>
-          <p:cNvSpPr txBox="1"/>
-          <p:nvPr/>
-        </p:nvSpPr>
-        <p:spPr>
-          <a:xfrm>
-            <a:off x="1392844" y="1492625"/>
-            <a:ext cx="6420754" cy="1938992"/>
-          </a:xfrm>
-          <a:prstGeom prst="rect">
-            <a:avLst/>
-          </a:prstGeom>
-          <a:noFill/>
-        </p:spPr>
-        <p:txBody>
-          <a:bodyPr wrap="square" rtlCol="0">
-            <a:spAutoFit/>
-          </a:bodyPr>
-          <a:lstStyle/>
-          <a:p>
-            <a:endParaRPr lang="en-US" sz="2400" dirty="0" smtClean="0"/>
-          </a:p>
-          <a:p>
-            <a:pPr>
-              <a:buBlip>
-                <a:blip r:embed="rId2"/>
-              </a:buBlip>
-            </a:pPr>
-            <a:r>
-              <a:rPr lang="en-US" sz="2400" dirty="0" smtClean="0"/>
-              <a:t> </a:t>
-            </a:r>
-            <a:r>
-              <a:rPr lang="en-US" sz="2400" dirty="0" err="1" smtClean="0"/>
-              <a:t>GitHub</a:t>
-            </a:r>
-            <a:r>
-              <a:rPr lang="en-US" sz="2400" dirty="0" smtClean="0"/>
-              <a:t> </a:t>
-            </a:r>
-            <a:r>
-              <a:rPr lang="en-US" sz="2400" dirty="0" err="1" smtClean="0"/>
-              <a:t>resque</a:t>
-            </a:r>
-            <a:r>
-              <a:rPr lang="en-US" sz="2400" dirty="0" smtClean="0"/>
-              <a:t> gem</a:t>
-            </a:r>
-          </a:p>
-          <a:p>
-            <a:pPr>
-              <a:buBlip>
-                <a:blip r:embed="rId2"/>
-              </a:buBlip>
-            </a:pPr>
-            <a:r>
-              <a:rPr lang="en-US" sz="2400" dirty="0" smtClean="0"/>
-              <a:t> </a:t>
-            </a:r>
-            <a:r>
-              <a:rPr lang="en-US" sz="2400" dirty="0" err="1" smtClean="0"/>
-              <a:t>Github</a:t>
-            </a:r>
-            <a:r>
-              <a:rPr lang="en-US" sz="2400" dirty="0" smtClean="0"/>
-              <a:t> Watchtower</a:t>
-            </a:r>
-          </a:p>
-          <a:p>
-            <a:pPr>
-              <a:buBlip>
-                <a:blip r:embed="rId2"/>
-              </a:buBlip>
-            </a:pPr>
-            <a:r>
-              <a:rPr lang="en-US" sz="2400" dirty="0" smtClean="0"/>
-              <a:t> </a:t>
-            </a:r>
-            <a:r>
-              <a:rPr lang="en-US" sz="2400" dirty="0" err="1" smtClean="0"/>
-              <a:t>Heroku</a:t>
-            </a:r>
-            <a:r>
-              <a:rPr lang="en-US" sz="2400" dirty="0" smtClean="0"/>
-              <a:t>: processing background jobs</a:t>
-            </a:r>
-          </a:p>
-          <a:p>
-            <a:pPr>
-              <a:buBlip>
-                <a:blip r:embed="rId2"/>
-              </a:buBlip>
-            </a:pPr>
-            <a:r>
-              <a:rPr lang="en-US" sz="2400" dirty="0" smtClean="0"/>
-              <a:t> Cafepress: internal </a:t>
-            </a:r>
-            <a:r>
-              <a:rPr lang="en-US" sz="2400" dirty="0" err="1" smtClean="0"/>
-              <a:t>RESTful</a:t>
-            </a:r>
-            <a:r>
-              <a:rPr lang="en-US" sz="2400" dirty="0" smtClean="0"/>
-              <a:t> services</a:t>
-            </a:r>
-          </a:p>
-        </p:txBody>
-      </p:sp>
-    </p:spTree>
-  </p:cSld>
-  <p:clrMapOvr>
-    <a:masterClrMapping/>
-  </p:clrMapOvr>
-  <p:timing>
-    <p:tnLst>
-      <p:par>
-        <p:cTn id="1" dur="indefinite" restart="never" nodeType="tmRoot"/>
-      </p:par>
-    </p:tnLst>
-  </p:timing>
-</p:sld>
-</file>
-
-<file path=ppt/slides/slide31.xml><?xml version="1.0" encoding="utf-8"?>
-<p:sld xmlns:a="http://schemas.openxmlformats.org/drawingml/2006/main" xmlns:r="http://schemas.openxmlformats.org/officeDocument/2006/relationships" xmlns:mc="http://schemas.openxmlformats.org/markup-compatibility/2006" xmlns:mv="urn:schemas-microsoft-com:mac:vml" xmlns:p="http://schemas.openxmlformats.org/presentationml/2006/main" mc:Ignorable="mv" mc:PreserveAttributes="mv:*">
-  <p:cSld>
-    <p:spTree>
-      <p:nvGrpSpPr>
-        <p:cNvPr id="1" name=""/>
-        <p:cNvGrpSpPr/>
-        <p:nvPr/>
-      </p:nvGrpSpPr>
-      <p:grpSpPr>
-        <a:xfrm>
-          <a:off x="0" y="0"/>
-          <a:ext cx="0" cy="0"/>
-          <a:chOff x="0" y="0"/>
-          <a:chExt cx="0" cy="0"/>
-        </a:xfrm>
-      </p:grpSpPr>
-      <p:sp>
-        <p:nvSpPr>
-          <p:cNvPr id="2" name="Title 1"/>
-          <p:cNvSpPr>
-            <a:spLocks noGrp="1"/>
-          </p:cNvSpPr>
-          <p:nvPr>
-            <p:ph type="title"/>
-          </p:nvPr>
-        </p:nvSpPr>
-        <p:spPr/>
-        <p:txBody>
-          <a:bodyPr/>
-          <a:lstStyle/>
-          <a:p>
-            <a:r>
-              <a:rPr lang="en-US" dirty="0" smtClean="0"/>
-              <a:t>Sinatra Ideas</a:t>
-            </a:r>
-            <a:endParaRPr lang="en-US" dirty="0"/>
-          </a:p>
-        </p:txBody>
-      </p:sp>
-      <p:sp>
-        <p:nvSpPr>
-          <p:cNvPr id="3" name="TextBox 2"/>
-          <p:cNvSpPr txBox="1"/>
-          <p:nvPr/>
-        </p:nvSpPr>
-        <p:spPr>
-          <a:xfrm>
-            <a:off x="1392844" y="1492625"/>
-            <a:ext cx="6420754" cy="830997"/>
-          </a:xfrm>
-          <a:prstGeom prst="rect">
-            <a:avLst/>
-          </a:prstGeom>
-          <a:noFill/>
-        </p:spPr>
-        <p:txBody>
-          <a:bodyPr wrap="square" rtlCol="0">
-            <a:spAutoFit/>
-          </a:bodyPr>
-          <a:lstStyle/>
-          <a:p>
-            <a:endParaRPr lang="en-US" sz="2400" dirty="0" smtClean="0"/>
-          </a:p>
-          <a:p>
-            <a:pPr>
-              <a:buBlip>
-                <a:blip r:embed="rId2"/>
-              </a:buBlip>
-            </a:pPr>
-            <a:r>
-              <a:rPr lang="en-US" sz="2400" dirty="0" smtClean="0"/>
-              <a:t> Under load using ‘top’</a:t>
-            </a:r>
           </a:p>
         </p:txBody>
       </p:sp>
@@ -10436,15 +11401,7 @@
             </a:pPr>
             <a:r>
               <a:rPr lang="en-US" sz="2600" dirty="0" smtClean="0"/>
-              <a:t> Sinatra is more DSL atop Rack than</a:t>
-            </a:r>
-            <a:r>
-              <a:rPr lang="en-US" sz="2600" dirty="0" smtClean="0"/>
-              <a:t> your typical </a:t>
-            </a:r>
-            <a:r>
-              <a:rPr lang="en-US" sz="2600" dirty="0" smtClean="0"/>
-              <a:t>“framework”</a:t>
+              <a:t> Sinatra is more DSL atop Rack than your typical “framework”</a:t>
             </a:r>
           </a:p>
           <a:p>
@@ -10934,7 +11891,6 @@
               <a:rPr lang="en-US" sz="3600" dirty="0" smtClean="0"/>
               <a:t> Default cookie based sessions via Rack</a:t>
             </a:r>
-            <a:endParaRPr lang="en-US" sz="3600" dirty="0" smtClean="0"/>
           </a:p>
           <a:p>
             <a:pPr>
@@ -10944,11 +11900,7 @@
             </a:pPr>
             <a:r>
               <a:rPr lang="en-US" sz="3600" dirty="0" smtClean="0"/>
-              <a:t> Memory</a:t>
-            </a:r>
-            <a:r>
-              <a:rPr lang="en-US" sz="3600" dirty="0" smtClean="0"/>
-              <a:t>? </a:t>
+              <a:t> Memory? </a:t>
             </a:r>
             <a:r>
               <a:rPr lang="en-US" sz="3600" dirty="0" err="1" smtClean="0"/>
@@ -11073,11 +12025,7 @@
             </a:r>
             <a:r>
               <a:rPr lang="en-US" sz="2800" dirty="0" err="1" smtClean="0"/>
-              <a:t>response.</a:t>
-            </a:r>
-            <a:r>
-              <a:rPr lang="en-US" sz="2800" dirty="0" err="1" smtClean="0"/>
-              <a:t>set_cookie(“viewed_products</a:t>
+              <a:t>response.set_cookie(“viewed_products</a:t>
             </a:r>
             <a:r>
               <a:rPr lang="en-US" sz="2800" dirty="0" smtClean="0"/>
@@ -11134,17 +12082,12 @@
             </a:r>
             <a:r>
               <a:rPr lang="en-US" sz="2800" dirty="0" err="1" smtClean="0"/>
-              <a:t>request.cookies[“</a:t>
-            </a:r>
-            <a:r>
-              <a:rPr lang="en-US" sz="2800" dirty="0" err="1" smtClean="0"/>
-              <a:t>viewed_products</a:t>
+              <a:t>request.cookies[“viewed_products</a:t>
             </a:r>
             <a:r>
               <a:rPr lang="en-US" sz="2800" dirty="0" smtClean="0"/>
               <a:t>”]</a:t>
             </a:r>
-            <a:endParaRPr lang="en-US" sz="2800" dirty="0" smtClean="0"/>
           </a:p>
         </p:txBody>
       </p:sp>

</xml_diff>

<commit_message>
nz: audio file from presentation
</commit_message>
<xml_diff>
--- a/sinatra.pptx
+++ b/sinatra.pptx
@@ -5,7 +5,7 @@
     <p:sldMasterId id="2147483660" r:id="rId1"/>
   </p:sldMasterIdLst>
   <p:notesMasterIdLst>
-    <p:notesMasterId r:id="rId30"/>
+    <p:notesMasterId r:id="rId31"/>
   </p:notesMasterIdLst>
   <p:sldIdLst>
     <p:sldId id="256" r:id="rId2"/>
@@ -33,9 +33,10 @@
     <p:sldId id="260" r:id="rId24"/>
     <p:sldId id="263" r:id="rId25"/>
     <p:sldId id="271" r:id="rId26"/>
-    <p:sldId id="268" r:id="rId27"/>
-    <p:sldId id="283" r:id="rId28"/>
-    <p:sldId id="272" r:id="rId29"/>
+    <p:sldId id="288" r:id="rId27"/>
+    <p:sldId id="268" r:id="rId28"/>
+    <p:sldId id="283" r:id="rId29"/>
+    <p:sldId id="272" r:id="rId30"/>
   </p:sldIdLst>
   <p:sldSz cx="9144000" cy="6858000" type="screen4x3"/>
   <p:notesSz cx="6858000" cy="9144000"/>
@@ -615,12 +616,8 @@
           <a:lstStyle/>
           <a:p>
             <a:r>
-              <a:rPr lang="en-US" dirty="0" smtClean="0"/>
-              <a:t>Refer to the </a:t>
-            </a:r>
-            <a:r>
-              <a:rPr lang="en-US" dirty="0" err="1" smtClean="0"/>
-              <a:t>standalone_controller.rb</a:t>
+              <a:rPr lang="en-US" sz="1200" dirty="0" smtClean="0"/>
+              <a:t>URI definition should look similar to Rails</a:t>
             </a:r>
             <a:endParaRPr lang="en-US" dirty="0" smtClean="0"/>
           </a:p>
@@ -634,8 +631,29 @@
               <a:t> </a:t>
             </a:r>
             <a:r>
-              <a:rPr lang="en-US" baseline="0" dirty="0" smtClean="0"/>
-              <a:t>the gotcha with the XML builder templates, the xml variable in the template is automatically initialized for you</a:t>
+              <a:rPr lang="en-US" dirty="0" err="1" smtClean="0"/>
+              <a:t>splatting</a:t>
+            </a:r>
+            <a:endParaRPr lang="en-US" dirty="0" smtClean="0"/>
+          </a:p>
+          <a:p>
+            <a:r>
+              <a:rPr lang="en-US" dirty="0" smtClean="0"/>
+              <a:t>	get '/say/*/to/*' do # matches /say/hello/to/world </a:t>
+            </a:r>
+          </a:p>
+          <a:p>
+            <a:r>
+              <a:rPr lang="en-US" dirty="0" smtClean="0"/>
+              <a:t>	</a:t>
+            </a:r>
+            <a:r>
+              <a:rPr lang="en-US" dirty="0" err="1" smtClean="0"/>
+              <a:t>params["splat</a:t>
+            </a:r>
+            <a:r>
+              <a:rPr lang="en-US" dirty="0" smtClean="0"/>
+              <a:t>"] # =&gt; ["hello", "world"] end </a:t>
             </a:r>
             <a:endParaRPr lang="en-US" dirty="0"/>
           </a:p>
@@ -659,7 +677,7 @@
             <a:fld id="{4355A105-26B0-5043-A7EC-94C834C82E90}" type="slidenum">
               <a:rPr lang="en-US" smtClean="0"/>
               <a:pPr/>
-              <a:t>11</a:t>
+              <a:t>10</a:t>
             </a:fld>
             <a:endParaRPr lang="en-US"/>
           </a:p>
@@ -719,6 +737,25 @@
           </a:bodyPr>
           <a:lstStyle/>
           <a:p>
+            <a:r>
+              <a:rPr lang="en-US" dirty="0" smtClean="0"/>
+              <a:t>Refer to the </a:t>
+            </a:r>
+            <a:r>
+              <a:rPr lang="en-US" dirty="0" err="1" smtClean="0"/>
+              <a:t>standalone_controller.rb</a:t>
+            </a:r>
+            <a:endParaRPr lang="en-US" dirty="0" smtClean="0"/>
+          </a:p>
+          <a:p>
+            <a:r>
+              <a:rPr lang="en-US" dirty="0" smtClean="0"/>
+              <a:t>Mention</a:t>
+            </a:r>
+            <a:r>
+              <a:rPr lang="en-US" baseline="0" dirty="0" smtClean="0"/>
+              <a:t> the gotcha with the XML builder templates, the xml variable in the template is automatically initialized for you</a:t>
+            </a:r>
             <a:endParaRPr lang="en-US" dirty="0"/>
           </a:p>
         </p:txBody>
@@ -741,7 +778,7 @@
             <a:fld id="{4355A105-26B0-5043-A7EC-94C834C82E90}" type="slidenum">
               <a:rPr lang="en-US" smtClean="0"/>
               <a:pPr/>
-              <a:t>12</a:t>
+              <a:t>11</a:t>
             </a:fld>
             <a:endParaRPr lang="en-US"/>
           </a:p>
@@ -801,18 +838,6 @@
           </a:bodyPr>
           <a:lstStyle/>
           <a:p>
-            <a:r>
-              <a:rPr lang="en-US" dirty="0" smtClean="0"/>
-              <a:t>Refer to</a:t>
-            </a:r>
-            <a:r>
-              <a:rPr lang="en-US" baseline="0" dirty="0" smtClean="0"/>
-              <a:t> the </a:t>
-            </a:r>
-            <a:r>
-              <a:rPr lang="en-US" baseline="0" dirty="0" err="1" smtClean="0"/>
-              <a:t>search_controller.rb</a:t>
-            </a:r>
             <a:endParaRPr lang="en-US" dirty="0"/>
           </a:p>
         </p:txBody>
@@ -835,7 +860,7 @@
             <a:fld id="{4355A105-26B0-5043-A7EC-94C834C82E90}" type="slidenum">
               <a:rPr lang="en-US" smtClean="0"/>
               <a:pPr/>
-              <a:t>13</a:t>
+              <a:t>12</a:t>
             </a:fld>
             <a:endParaRPr lang="en-US"/>
           </a:p>
@@ -897,11 +922,15 @@
           <a:p>
             <a:r>
               <a:rPr lang="en-US" dirty="0" smtClean="0"/>
-              <a:t>Refer to the </a:t>
-            </a:r>
-            <a:r>
-              <a:rPr lang="en-US" dirty="0" err="1" smtClean="0"/>
-              <a:t>products_controller.rb</a:t>
+              <a:t>Refer to</a:t>
+            </a:r>
+            <a:r>
+              <a:rPr lang="en-US" baseline="0" dirty="0" smtClean="0"/>
+              <a:t> the </a:t>
+            </a:r>
+            <a:r>
+              <a:rPr lang="en-US" baseline="0" dirty="0" err="1" smtClean="0"/>
+              <a:t>search_controller.rb</a:t>
             </a:r>
             <a:endParaRPr lang="en-US" dirty="0"/>
           </a:p>
@@ -925,7 +954,7 @@
             <a:fld id="{4355A105-26B0-5043-A7EC-94C834C82E90}" type="slidenum">
               <a:rPr lang="en-US" smtClean="0"/>
               <a:pPr/>
-              <a:t>14</a:t>
+              <a:t>13</a:t>
             </a:fld>
             <a:endParaRPr lang="en-US"/>
           </a:p>
@@ -987,27 +1016,11 @@
           <a:p>
             <a:r>
               <a:rPr lang="en-US" dirty="0" smtClean="0"/>
-              <a:t>Go back to the </a:t>
+              <a:t>Refer to the </a:t>
             </a:r>
             <a:r>
               <a:rPr lang="en-US" dirty="0" err="1" smtClean="0"/>
-              <a:t>db_migrate</a:t>
-            </a:r>
-            <a:r>
-              <a:rPr lang="en-US" dirty="0" smtClean="0"/>
-              <a:t> task to show how</a:t>
-            </a:r>
-            <a:r>
-              <a:rPr lang="en-US" baseline="0" dirty="0" smtClean="0"/>
-              <a:t> easy </a:t>
-            </a:r>
-            <a:r>
-              <a:rPr lang="en-US" baseline="0" dirty="0" err="1" smtClean="0"/>
-              <a:t>db:migrate</a:t>
-            </a:r>
-            <a:r>
-              <a:rPr lang="en-US" baseline="0" dirty="0" smtClean="0"/>
-              <a:t> can be done yourself</a:t>
+              <a:t>products_controller.rb</a:t>
             </a:r>
             <a:endParaRPr lang="en-US" dirty="0"/>
           </a:p>
@@ -1031,7 +1044,7 @@
             <a:fld id="{4355A105-26B0-5043-A7EC-94C834C82E90}" type="slidenum">
               <a:rPr lang="en-US" smtClean="0"/>
               <a:pPr/>
-              <a:t>15</a:t>
+              <a:t>14</a:t>
             </a:fld>
             <a:endParaRPr lang="en-US"/>
           </a:p>
@@ -1092,112 +1105,28 @@
           <a:lstStyle/>
           <a:p>
             <a:r>
+              <a:rPr lang="en-US" dirty="0" smtClean="0"/>
+              <a:t>Go back to the </a:t>
+            </a:r>
+            <a:r>
               <a:rPr lang="en-US" dirty="0" err="1" smtClean="0"/>
-              <a:t>sinatra</a:t>
+              <a:t>db_migrate</a:t>
             </a:r>
             <a:r>
               <a:rPr lang="en-US" dirty="0" smtClean="0"/>
-              <a:t>-cache extension does</a:t>
+              <a:t> task to show how</a:t>
             </a:r>
             <a:r>
               <a:rPr lang="en-US" baseline="0" dirty="0" smtClean="0"/>
-              <a:t> file based page and fragment caching, this is completely file based</a:t>
-            </a:r>
-          </a:p>
-          <a:p>
-            <a:endParaRPr lang="en-US" baseline="0" dirty="0" smtClean="0"/>
-          </a:p>
-          <a:p>
+              <a:t> easy </a:t>
+            </a:r>
             <a:r>
               <a:rPr lang="en-US" baseline="0" dirty="0" err="1" smtClean="0"/>
-              <a:t>sinatra</a:t>
+              <a:t>db:migrate</a:t>
             </a:r>
             <a:r>
               <a:rPr lang="en-US" baseline="0" dirty="0" smtClean="0"/>
-              <a:t>-cache is implemented in the search controller and views within the examples</a:t>
-            </a:r>
-            <a:endParaRPr lang="en-US" baseline="0" dirty="0" smtClean="0"/>
-          </a:p>
-          <a:p>
-            <a:endParaRPr lang="en-US" baseline="0" dirty="0" smtClean="0"/>
-          </a:p>
-          <a:p>
-            <a:r>
-              <a:rPr lang="en-US" baseline="0" dirty="0" smtClean="0"/>
-              <a:t>For rack-cache refer to </a:t>
-            </a:r>
-            <a:r>
-              <a:rPr lang="en-US" baseline="0" dirty="0" err="1" smtClean="0"/>
-              <a:t>products_controller.rb</a:t>
-            </a:r>
-            <a:r>
-              <a:rPr lang="en-US" baseline="0" dirty="0" smtClean="0"/>
-              <a:t> </a:t>
-            </a:r>
-          </a:p>
-          <a:p>
-            <a:r>
-              <a:rPr lang="en-US" baseline="0" dirty="0" smtClean="0"/>
-              <a:t>rack-cache is HTTP based caching based on </a:t>
-            </a:r>
-            <a:r>
-              <a:rPr lang="en-US" baseline="0" dirty="0" err="1" smtClean="0"/>
-              <a:t>Etag</a:t>
-            </a:r>
-            <a:r>
-              <a:rPr lang="en-US" baseline="0" dirty="0" smtClean="0"/>
-              <a:t> and Last modified headers that supports memory, disk, and </a:t>
-            </a:r>
-            <a:r>
-              <a:rPr lang="en-US" baseline="0" dirty="0" err="1" smtClean="0"/>
-              <a:t>memcache</a:t>
-            </a:r>
-            <a:r>
-              <a:rPr lang="en-US" baseline="0" dirty="0" smtClean="0"/>
-              <a:t> stores</a:t>
-            </a:r>
-          </a:p>
-          <a:p>
-            <a:r>
-              <a:rPr lang="en-US" baseline="0" dirty="0" smtClean="0"/>
-              <a:t>	</a:t>
-            </a:r>
-            <a:r>
-              <a:rPr lang="en-US" dirty="0" smtClean="0"/>
-              <a:t>Entity stores are used to cache response bodies across requests.</a:t>
-            </a:r>
-          </a:p>
-          <a:p>
-            <a:r>
-              <a:rPr lang="en-US" dirty="0" smtClean="0"/>
-              <a:t>	Meta stores</a:t>
-            </a:r>
-            <a:r>
-              <a:rPr lang="en-US" baseline="0" dirty="0" smtClean="0"/>
-              <a:t> are used for </a:t>
-            </a:r>
-            <a:r>
-              <a:rPr lang="en-US" dirty="0" smtClean="0"/>
-              <a:t>request/response pair keyed by the request's URL</a:t>
-            </a:r>
-          </a:p>
-          <a:p>
-            <a:r>
-              <a:rPr lang="en-US" dirty="0" smtClean="0"/>
-              <a:t>rack-cache</a:t>
-            </a:r>
-            <a:r>
-              <a:rPr lang="en-US" baseline="0" dirty="0" smtClean="0"/>
-              <a:t> is a lightweight alternative to squid or other high throughput proxy servers</a:t>
-            </a:r>
-          </a:p>
-          <a:p>
-            <a:endParaRPr lang="en-US" baseline="0" dirty="0" smtClean="0"/>
-          </a:p>
-          <a:p>
-            <a:r>
-              <a:rPr lang="en-US" baseline="0" dirty="0" smtClean="0"/>
-              <a:t>rack-cache is implemented in the products controller within the examples</a:t>
+              <a:t> can be done yourself</a:t>
             </a:r>
             <a:endParaRPr lang="en-US" dirty="0"/>
           </a:p>
@@ -1221,7 +1150,7 @@
             <a:fld id="{4355A105-26B0-5043-A7EC-94C834C82E90}" type="slidenum">
               <a:rPr lang="en-US" smtClean="0"/>
               <a:pPr/>
-              <a:t>16</a:t>
+              <a:t>15</a:t>
             </a:fld>
             <a:endParaRPr lang="en-US"/>
           </a:p>
@@ -1281,6 +1210,113 @@
           </a:bodyPr>
           <a:lstStyle/>
           <a:p>
+            <a:r>
+              <a:rPr lang="en-US" dirty="0" err="1" smtClean="0"/>
+              <a:t>sinatra</a:t>
+            </a:r>
+            <a:r>
+              <a:rPr lang="en-US" dirty="0" smtClean="0"/>
+              <a:t>-cache extension does</a:t>
+            </a:r>
+            <a:r>
+              <a:rPr lang="en-US" baseline="0" dirty="0" smtClean="0"/>
+              <a:t> file based page and fragment caching, this is completely file based</a:t>
+            </a:r>
+          </a:p>
+          <a:p>
+            <a:endParaRPr lang="en-US" baseline="0" dirty="0" smtClean="0"/>
+          </a:p>
+          <a:p>
+            <a:r>
+              <a:rPr lang="en-US" baseline="0" dirty="0" err="1" smtClean="0"/>
+              <a:t>sinatra</a:t>
+            </a:r>
+            <a:r>
+              <a:rPr lang="en-US" baseline="0" dirty="0" smtClean="0"/>
+              <a:t>-cache is implemented in the search controller and views within the examples</a:t>
+            </a:r>
+          </a:p>
+          <a:p>
+            <a:endParaRPr lang="en-US" baseline="0" dirty="0" smtClean="0"/>
+          </a:p>
+          <a:p>
+            <a:r>
+              <a:rPr lang="en-US" baseline="0" dirty="0" smtClean="0"/>
+              <a:t>For rack-cache refer to </a:t>
+            </a:r>
+            <a:r>
+              <a:rPr lang="en-US" baseline="0" dirty="0" err="1" smtClean="0"/>
+              <a:t>products_controller.rb</a:t>
+            </a:r>
+            <a:r>
+              <a:rPr lang="en-US" baseline="0" dirty="0" smtClean="0"/>
+              <a:t> </a:t>
+            </a:r>
+          </a:p>
+          <a:p>
+            <a:r>
+              <a:rPr lang="en-US" baseline="0" dirty="0" smtClean="0"/>
+              <a:t>rack-cache is HTTP based caching based on </a:t>
+            </a:r>
+            <a:r>
+              <a:rPr lang="en-US" baseline="0" dirty="0" err="1" smtClean="0"/>
+              <a:t>Etag</a:t>
+            </a:r>
+            <a:r>
+              <a:rPr lang="en-US" baseline="0" dirty="0" smtClean="0"/>
+              <a:t> and Last modified headers that supports memory, disk, and </a:t>
+            </a:r>
+            <a:r>
+              <a:rPr lang="en-US" baseline="0" dirty="0" err="1" smtClean="0"/>
+              <a:t>memcache</a:t>
+            </a:r>
+            <a:r>
+              <a:rPr lang="en-US" baseline="0" dirty="0" smtClean="0"/>
+              <a:t> stores</a:t>
+            </a:r>
+          </a:p>
+          <a:p>
+            <a:r>
+              <a:rPr lang="en-US" baseline="0" dirty="0" smtClean="0"/>
+              <a:t>	</a:t>
+            </a:r>
+            <a:r>
+              <a:rPr lang="en-US" dirty="0" smtClean="0"/>
+              <a:t>Entity stores are used to cache response bodies across requests.</a:t>
+            </a:r>
+          </a:p>
+          <a:p>
+            <a:r>
+              <a:rPr lang="en-US" dirty="0" smtClean="0"/>
+              <a:t>	Meta stores</a:t>
+            </a:r>
+            <a:r>
+              <a:rPr lang="en-US" baseline="0" dirty="0" smtClean="0"/>
+              <a:t> are used for </a:t>
+            </a:r>
+            <a:r>
+              <a:rPr lang="en-US" dirty="0" smtClean="0"/>
+              <a:t>request/response pair keyed by the request's URL</a:t>
+            </a:r>
+          </a:p>
+          <a:p>
+            <a:r>
+              <a:rPr lang="en-US" dirty="0" smtClean="0"/>
+              <a:t>rack-cache</a:t>
+            </a:r>
+            <a:r>
+              <a:rPr lang="en-US" baseline="0" dirty="0" smtClean="0"/>
+              <a:t> is a lightweight alternative to squid or other high throughput proxy servers</a:t>
+            </a:r>
+          </a:p>
+          <a:p>
+            <a:endParaRPr lang="en-US" baseline="0" dirty="0" smtClean="0"/>
+          </a:p>
+          <a:p>
+            <a:r>
+              <a:rPr lang="en-US" baseline="0" dirty="0" smtClean="0"/>
+              <a:t>rack-cache is implemented in the products controller within the examples</a:t>
+            </a:r>
             <a:endParaRPr lang="en-US" dirty="0"/>
           </a:p>
         </p:txBody>
@@ -1303,7 +1339,7 @@
             <a:fld id="{4355A105-26B0-5043-A7EC-94C834C82E90}" type="slidenum">
               <a:rPr lang="en-US" smtClean="0"/>
               <a:pPr/>
-              <a:t>17</a:t>
+              <a:t>16</a:t>
             </a:fld>
             <a:endParaRPr lang="en-US"/>
           </a:p>
@@ -1363,24 +1399,6 @@
           </a:bodyPr>
           <a:lstStyle/>
           <a:p>
-            <a:r>
-              <a:rPr lang="en-US" dirty="0" smtClean="0"/>
-              <a:t>Bundler</a:t>
-            </a:r>
-            <a:r>
-              <a:rPr lang="en-US" baseline="0" dirty="0" smtClean="0"/>
-              <a:t> is great since it makes your application completely portable without worrying about gems on the deploy server</a:t>
-            </a:r>
-          </a:p>
-          <a:p>
-            <a:r>
-              <a:rPr lang="en-US" baseline="0" dirty="0" smtClean="0"/>
-              <a:t>It is also keeps </a:t>
-            </a:r>
-            <a:r>
-              <a:rPr lang="en-US" baseline="0" smtClean="0"/>
-              <a:t>you honest</a:t>
-            </a:r>
             <a:endParaRPr lang="en-US" dirty="0"/>
           </a:p>
         </p:txBody>
@@ -1403,7 +1421,7 @@
             <a:fld id="{4355A105-26B0-5043-A7EC-94C834C82E90}" type="slidenum">
               <a:rPr lang="en-US" smtClean="0"/>
               <a:pPr/>
-              <a:t>22</a:t>
+              <a:t>17</a:t>
             </a:fld>
             <a:endParaRPr lang="en-US"/>
           </a:p>
@@ -1465,35 +1483,21 @@
           <a:p>
             <a:r>
               <a:rPr lang="en-US" dirty="0" smtClean="0"/>
-              <a:t>find . -name *.</a:t>
-            </a:r>
-            <a:r>
-              <a:rPr lang="en-US" dirty="0" err="1" smtClean="0"/>
-              <a:t>rb</a:t>
-            </a:r>
-            <a:r>
-              <a:rPr lang="en-US" dirty="0" smtClean="0"/>
-              <a:t> -print0 | </a:t>
-            </a:r>
-            <a:r>
-              <a:rPr lang="en-US" dirty="0" err="1" smtClean="0"/>
-              <a:t>xargs</a:t>
-            </a:r>
-            <a:r>
-              <a:rPr lang="en-US" dirty="0" smtClean="0"/>
-              <a:t> -0 </a:t>
-            </a:r>
-            <a:r>
-              <a:rPr lang="en-US" dirty="0" err="1" smtClean="0"/>
-              <a:t>wc</a:t>
-            </a:r>
-            <a:r>
-              <a:rPr lang="en-US" dirty="0" smtClean="0"/>
-              <a:t> -</a:t>
-            </a:r>
-            <a:r>
-              <a:rPr lang="en-US" dirty="0" err="1" smtClean="0"/>
-              <a:t>l</a:t>
+              <a:t>Bundler</a:t>
+            </a:r>
+            <a:r>
+              <a:rPr lang="en-US" baseline="0" dirty="0" smtClean="0"/>
+              <a:t> is great since it makes your application completely portable without worrying about gems on the deploy server</a:t>
+            </a:r>
+          </a:p>
+          <a:p>
+            <a:r>
+              <a:rPr lang="en-US" baseline="0" dirty="0" smtClean="0"/>
+              <a:t>It is also keeps </a:t>
+            </a:r>
+            <a:r>
+              <a:rPr lang="en-US" baseline="0" smtClean="0"/>
+              <a:t>you honest</a:t>
             </a:r>
             <a:endParaRPr lang="en-US" dirty="0"/>
           </a:p>
@@ -1517,7 +1521,7 @@
             <a:fld id="{4355A105-26B0-5043-A7EC-94C834C82E90}" type="slidenum">
               <a:rPr lang="en-US" smtClean="0"/>
               <a:pPr/>
-              <a:t>23</a:t>
+              <a:t>22</a:t>
             </a:fld>
             <a:endParaRPr lang="en-US"/>
           </a:p>
@@ -1579,19 +1583,35 @@
           <a:p>
             <a:r>
               <a:rPr lang="en-US" dirty="0" smtClean="0"/>
-              <a:t>Start</a:t>
-            </a:r>
-            <a:r>
-              <a:rPr lang="en-US" baseline="0" dirty="0" smtClean="0"/>
-              <a:t> up </a:t>
-            </a:r>
-            <a:r>
-              <a:rPr lang="en-US" baseline="0" dirty="0" err="1" smtClean="0"/>
-              <a:t>Jmeter</a:t>
-            </a:r>
-            <a:r>
-              <a:rPr lang="en-US" baseline="0" dirty="0" smtClean="0"/>
-              <a:t> and top to monitor</a:t>
+              <a:t>find . -name *.</a:t>
+            </a:r>
+            <a:r>
+              <a:rPr lang="en-US" dirty="0" err="1" smtClean="0"/>
+              <a:t>rb</a:t>
+            </a:r>
+            <a:r>
+              <a:rPr lang="en-US" dirty="0" smtClean="0"/>
+              <a:t> -print0 | </a:t>
+            </a:r>
+            <a:r>
+              <a:rPr lang="en-US" dirty="0" err="1" smtClean="0"/>
+              <a:t>xargs</a:t>
+            </a:r>
+            <a:r>
+              <a:rPr lang="en-US" dirty="0" smtClean="0"/>
+              <a:t> -0 </a:t>
+            </a:r>
+            <a:r>
+              <a:rPr lang="en-US" dirty="0" err="1" smtClean="0"/>
+              <a:t>wc</a:t>
+            </a:r>
+            <a:r>
+              <a:rPr lang="en-US" dirty="0" smtClean="0"/>
+              <a:t> -</a:t>
+            </a:r>
+            <a:r>
+              <a:rPr lang="en-US" dirty="0" err="1" smtClean="0"/>
+              <a:t>l</a:t>
             </a:r>
             <a:endParaRPr lang="en-US" dirty="0"/>
           </a:p>
@@ -1615,7 +1635,7 @@
             <a:fld id="{4355A105-26B0-5043-A7EC-94C834C82E90}" type="slidenum">
               <a:rPr lang="en-US" smtClean="0"/>
               <a:pPr/>
-              <a:t>24</a:t>
+              <a:t>23</a:t>
             </a:fld>
             <a:endParaRPr lang="en-US"/>
           </a:p>
@@ -1675,18 +1695,6 @@
           </a:bodyPr>
           <a:lstStyle/>
           <a:p>
-            <a:r>
-              <a:rPr lang="en-US" dirty="0" smtClean="0"/>
-              <a:t>These are just some compelling reasons to give Sinatra a strong</a:t>
-            </a:r>
-            <a:r>
-              <a:rPr lang="en-US" baseline="0" dirty="0" smtClean="0"/>
-              <a:t> consideration </a:t>
-            </a:r>
-            <a:r>
-              <a:rPr lang="en-US" dirty="0" smtClean="0"/>
-              <a:t>the next time you start a new project</a:t>
-            </a:r>
             <a:endParaRPr lang="en-US" dirty="0"/>
           </a:p>
         </p:txBody>
@@ -1709,7 +1717,7 @@
             <a:fld id="{4355A105-26B0-5043-A7EC-94C834C82E90}" type="slidenum">
               <a:rPr lang="en-US" smtClean="0"/>
               <a:pPr/>
-              <a:t>3</a:t>
+              <a:t>2</a:t>
             </a:fld>
             <a:endParaRPr lang="en-US"/>
           </a:p>
@@ -1770,103 +1778,21 @@
           <a:lstStyle/>
           <a:p>
             <a:r>
-              <a:rPr lang="en-US" dirty="0" err="1" smtClean="0"/>
-              <a:t>Jruby</a:t>
-            </a:r>
-            <a:r>
               <a:rPr lang="en-US" dirty="0" smtClean="0"/>
-              <a:t>-rack Jar allows us to interface to all</a:t>
+              <a:t>Start</a:t>
             </a:r>
             <a:r>
               <a:rPr lang="en-US" baseline="0" dirty="0" smtClean="0"/>
-              <a:t> rack based </a:t>
+              <a:t> up </a:t>
+            </a:r>
+            <a:r>
+              <a:rPr lang="en-US" baseline="0" dirty="0" err="1" smtClean="0"/>
+              <a:t>Jmeter</a:t>
             </a:r>
             <a:r>
               <a:rPr lang="en-US" baseline="0" dirty="0" smtClean="0"/>
-              <a:t>apps via </a:t>
-            </a:r>
-            <a:r>
-              <a:rPr lang="en-US" baseline="0" dirty="0" err="1" smtClean="0"/>
-              <a:t>servlet</a:t>
-            </a:r>
-            <a:r>
-              <a:rPr lang="en-US" baseline="0" dirty="0" smtClean="0"/>
-              <a:t> filter in the </a:t>
-            </a:r>
-            <a:r>
-              <a:rPr lang="en-US" baseline="0" dirty="0" err="1" smtClean="0"/>
-              <a:t>web.xml</a:t>
-            </a:r>
-            <a:endParaRPr lang="en-US" baseline="0" dirty="0" smtClean="0"/>
-          </a:p>
-          <a:p>
-            <a:r>
-              <a:rPr lang="en-US" baseline="0" dirty="0" smtClean="0"/>
-              <a:t>Have to change </a:t>
-            </a:r>
-            <a:r>
-              <a:rPr lang="en-US" baseline="0" dirty="0" err="1" smtClean="0"/>
-              <a:t>config/warble.rb</a:t>
-            </a:r>
-            <a:r>
-              <a:rPr lang="en-US" baseline="0" dirty="0" smtClean="0"/>
-              <a:t> to accommodate your Sinatra app </a:t>
-            </a:r>
-            <a:r>
-              <a:rPr lang="en-US" baseline="0" dirty="0" smtClean="0"/>
-              <a:t>layout</a:t>
-            </a:r>
-          </a:p>
-          <a:p>
-            <a:endParaRPr lang="en-US" baseline="0" dirty="0" smtClean="0"/>
-          </a:p>
-          <a:p>
-            <a:r>
-              <a:rPr lang="en-US" baseline="0" dirty="0" smtClean="0"/>
-              <a:t>Deployable to your favorite JEE/</a:t>
-            </a:r>
-            <a:r>
-              <a:rPr lang="en-US" baseline="0" dirty="0" err="1" smtClean="0"/>
-              <a:t>Servlet</a:t>
-            </a:r>
-            <a:r>
-              <a:rPr lang="en-US" baseline="0" dirty="0" smtClean="0"/>
-              <a:t> container Tomcat, </a:t>
-            </a:r>
-            <a:r>
-              <a:rPr lang="en-US" baseline="0" dirty="0" err="1" smtClean="0"/>
-              <a:t>Jboss</a:t>
-            </a:r>
-            <a:r>
-              <a:rPr lang="en-US" baseline="0" dirty="0" smtClean="0"/>
-              <a:t>, Glassfish…</a:t>
-            </a:r>
-          </a:p>
-          <a:p>
-            <a:endParaRPr lang="en-US" baseline="0" dirty="0" smtClean="0"/>
-          </a:p>
-          <a:p>
-            <a:r>
-              <a:rPr lang="en-US" baseline="0" dirty="0" smtClean="0"/>
-              <a:t>http://</a:t>
-            </a:r>
-            <a:r>
-              <a:rPr lang="en-US" baseline="0" dirty="0" err="1" smtClean="0"/>
-              <a:t>github.com/nicksieger/jruby</a:t>
-            </a:r>
-            <a:r>
-              <a:rPr lang="en-US" baseline="0" dirty="0" smtClean="0"/>
-              <a:t>-rack/tree/master/examples</a:t>
-            </a:r>
-          </a:p>
-          <a:p>
-            <a:r>
-              <a:rPr lang="en-US" baseline="0" dirty="0" err="1" smtClean="0"/>
-              <a:t>http://github.com/nicksieger/jruby-rack.git</a:t>
-            </a:r>
-            <a:endParaRPr lang="en-US" baseline="0" dirty="0" smtClean="0"/>
-          </a:p>
-          <a:p>
+              <a:t> and top to monitor</a:t>
+            </a:r>
             <a:endParaRPr lang="en-US" dirty="0"/>
           </a:p>
         </p:txBody>
@@ -1889,7 +1815,7 @@
             <a:fld id="{4355A105-26B0-5043-A7EC-94C834C82E90}" type="slidenum">
               <a:rPr lang="en-US" smtClean="0"/>
               <a:pPr/>
-              <a:t>25</a:t>
+              <a:t>24</a:t>
             </a:fld>
             <a:endParaRPr lang="en-US"/>
           </a:p>
@@ -1951,26 +1877,95 @@
           <a:p>
             <a:r>
               <a:rPr lang="en-US" dirty="0" err="1" smtClean="0"/>
-              <a:t>Resque</a:t>
+              <a:t>Jruby</a:t>
+            </a:r>
+            <a:r>
+              <a:rPr lang="en-US" dirty="0" smtClean="0"/>
+              <a:t>-rack Jar allows us to interface to all</a:t>
             </a:r>
             <a:r>
               <a:rPr lang="en-US" baseline="0" dirty="0" smtClean="0"/>
-              <a:t> is background job processor with Sinatra UI for monitoring queues, jobs, workers</a:t>
-            </a:r>
-          </a:p>
-          <a:p>
+              <a:t> rack based apps via </a:t>
+            </a:r>
+            <a:r>
+              <a:rPr lang="en-US" baseline="0" dirty="0" err="1" smtClean="0"/>
+              <a:t>servlet</a:t>
+            </a:r>
             <a:r>
               <a:rPr lang="en-US" baseline="0" dirty="0" smtClean="0"/>
-              <a:t>Watchtower is a combo of Mongo DB, Mustache </a:t>
+              <a:t> filter in the </a:t>
             </a:r>
             <a:r>
               <a:rPr lang="en-US" baseline="0" dirty="0" err="1" smtClean="0"/>
-              <a:t>templating</a:t>
-            </a:r>
+              <a:t>web.xml</a:t>
+            </a:r>
+            <a:endParaRPr lang="en-US" baseline="0" dirty="0" smtClean="0"/>
+          </a:p>
+          <a:p>
             <a:r>
               <a:rPr lang="en-US" baseline="0" dirty="0" smtClean="0"/>
-              <a:t>, and Sinatra UI</a:t>
-            </a:r>
+              <a:t>Have to change </a:t>
+            </a:r>
+            <a:r>
+              <a:rPr lang="en-US" baseline="0" dirty="0" err="1" smtClean="0"/>
+              <a:t>config/warble.rb</a:t>
+            </a:r>
+            <a:r>
+              <a:rPr lang="en-US" baseline="0" dirty="0" smtClean="0"/>
+              <a:t> to accommodate your Sinatra app layout</a:t>
+            </a:r>
+          </a:p>
+          <a:p>
+            <a:endParaRPr lang="en-US" baseline="0" dirty="0" smtClean="0"/>
+          </a:p>
+          <a:p>
+            <a:r>
+              <a:rPr lang="en-US" baseline="0" dirty="0" smtClean="0"/>
+              <a:t>Deployable to your favorite JEE/</a:t>
+            </a:r>
+            <a:r>
+              <a:rPr lang="en-US" baseline="0" dirty="0" err="1" smtClean="0"/>
+              <a:t>Servlet</a:t>
+            </a:r>
+            <a:r>
+              <a:rPr lang="en-US" baseline="0" dirty="0" smtClean="0"/>
+              <a:t> container Tomcat, </a:t>
+            </a:r>
+            <a:r>
+              <a:rPr lang="en-US" baseline="0" dirty="0" err="1" smtClean="0"/>
+              <a:t>Jboss</a:t>
+            </a:r>
+            <a:r>
+              <a:rPr lang="en-US" baseline="0" dirty="0" smtClean="0"/>
+              <a:t>, Glassfish…</a:t>
+            </a:r>
+          </a:p>
+          <a:p>
+            <a:endParaRPr lang="en-US" baseline="0" dirty="0" smtClean="0"/>
+          </a:p>
+          <a:p>
+            <a:r>
+              <a:rPr lang="en-US" baseline="0" dirty="0" smtClean="0"/>
+              <a:t>http://</a:t>
+            </a:r>
+            <a:r>
+              <a:rPr lang="en-US" baseline="0" dirty="0" err="1" smtClean="0"/>
+              <a:t>github.com/nicksieger/jruby</a:t>
+            </a:r>
+            <a:r>
+              <a:rPr lang="en-US" baseline="0" dirty="0" smtClean="0"/>
+              <a:t>-rack/tree/master/examples</a:t>
+            </a:r>
+          </a:p>
+          <a:p>
+            <a:r>
+              <a:rPr lang="en-US" baseline="0" dirty="0" err="1" smtClean="0"/>
+              <a:t>http://github.com/nicksieger/jruby-rack.git</a:t>
+            </a:r>
+            <a:endParaRPr lang="en-US" baseline="0" dirty="0" smtClean="0"/>
+          </a:p>
+          <a:p>
+            <a:endParaRPr lang="en-US" dirty="0"/>
           </a:p>
         </p:txBody>
       </p:sp>
@@ -1992,7 +1987,258 @@
             <a:fld id="{4355A105-26B0-5043-A7EC-94C834C82E90}" type="slidenum">
               <a:rPr lang="en-US" smtClean="0"/>
               <a:pPr/>
-              <a:t>27</a:t>
+              <a:t>25</a:t>
+            </a:fld>
+            <a:endParaRPr lang="en-US"/>
+          </a:p>
+        </p:txBody>
+      </p:sp>
+    </p:spTree>
+  </p:cSld>
+  <p:clrMapOvr>
+    <a:masterClrMapping/>
+  </p:clrMapOvr>
+</p:notes>
+</file>
+
+<file path=ppt/notesSlides/notesSlide22.xml><?xml version="1.0" encoding="utf-8"?>
+<p:notes xmlns:a="http://schemas.openxmlformats.org/drawingml/2006/main" xmlns:r="http://schemas.openxmlformats.org/officeDocument/2006/relationships" xmlns:mc="http://schemas.openxmlformats.org/markup-compatibility/2006" xmlns:mv="urn:schemas-microsoft-com:mac:vml" xmlns:p="http://schemas.openxmlformats.org/presentationml/2006/main" mc:Ignorable="mv" mc:PreserveAttributes="mv:*">
+  <p:cSld>
+    <p:spTree>
+      <p:nvGrpSpPr>
+        <p:cNvPr id="1" name=""/>
+        <p:cNvGrpSpPr/>
+        <p:nvPr/>
+      </p:nvGrpSpPr>
+      <p:grpSpPr>
+        <a:xfrm>
+          <a:off x="0" y="0"/>
+          <a:ext cx="0" cy="0"/>
+          <a:chOff x="0" y="0"/>
+          <a:chExt cx="0" cy="0"/>
+        </a:xfrm>
+      </p:grpSpPr>
+      <p:sp>
+        <p:nvSpPr>
+          <p:cNvPr id="2" name="Slide Image Placeholder 1"/>
+          <p:cNvSpPr>
+            <a:spLocks noGrp="1" noRot="1" noChangeAspect="1"/>
+          </p:cNvSpPr>
+          <p:nvPr>
+            <p:ph type="sldImg"/>
+          </p:nvPr>
+        </p:nvSpPr>
+        <p:spPr/>
+      </p:sp>
+      <p:sp>
+        <p:nvSpPr>
+          <p:cNvPr id="3" name="Notes Placeholder 2"/>
+          <p:cNvSpPr>
+            <a:spLocks noGrp="1"/>
+          </p:cNvSpPr>
+          <p:nvPr>
+            <p:ph type="body" idx="1"/>
+          </p:nvPr>
+        </p:nvSpPr>
+        <p:spPr/>
+        <p:txBody>
+          <a:bodyPr>
+            <a:normAutofit/>
+          </a:bodyPr>
+          <a:lstStyle/>
+          <a:p>
+            <a:r>
+              <a:rPr lang="en-US" dirty="0" smtClean="0"/>
+              <a:t>Use</a:t>
+            </a:r>
+            <a:r>
+              <a:rPr lang="en-US" baseline="0" dirty="0" smtClean="0"/>
+              <a:t> passenger gem to install </a:t>
+            </a:r>
+            <a:r>
+              <a:rPr lang="en-US" baseline="0" dirty="0" err="1" smtClean="0"/>
+              <a:t>nginx</a:t>
+            </a:r>
+            <a:r>
+              <a:rPr lang="en-US" baseline="0" dirty="0" smtClean="0"/>
+              <a:t> and passenger</a:t>
+            </a:r>
+          </a:p>
+          <a:p>
+            <a:r>
+              <a:rPr lang="en-US" baseline="0" dirty="0" smtClean="0"/>
+              <a:t>/opt/</a:t>
+            </a:r>
+            <a:r>
+              <a:rPr lang="en-US" baseline="0" dirty="0" err="1" smtClean="0"/>
+              <a:t>nginx</a:t>
+            </a:r>
+            <a:r>
+              <a:rPr lang="en-US" baseline="0" dirty="0" smtClean="0"/>
+              <a:t>/conf/sites-available /opt/</a:t>
+            </a:r>
+            <a:r>
+              <a:rPr lang="en-US" baseline="0" dirty="0" err="1" smtClean="0"/>
+              <a:t>nginx</a:t>
+            </a:r>
+            <a:r>
+              <a:rPr lang="en-US" baseline="0" dirty="0" smtClean="0"/>
+              <a:t>/conf/sites-enabled</a:t>
+            </a:r>
+          </a:p>
+          <a:p>
+            <a:r>
+              <a:rPr lang="en-US" baseline="0" dirty="0" smtClean="0"/>
+              <a:t>Make sure you run </a:t>
+            </a:r>
+            <a:r>
+              <a:rPr lang="en-US" baseline="0" dirty="0" err="1" smtClean="0"/>
+              <a:t>nginx</a:t>
+            </a:r>
+            <a:r>
+              <a:rPr lang="en-US" baseline="0" dirty="0" smtClean="0"/>
+              <a:t> as the proper </a:t>
+            </a:r>
+            <a:r>
+              <a:rPr lang="en-US" baseline="0" dirty="0" err="1" smtClean="0"/>
+              <a:t>user:group</a:t>
+            </a:r>
+            <a:r>
+              <a:rPr lang="en-US" baseline="0" dirty="0" smtClean="0"/>
+              <a:t>, not root or nobody!</a:t>
+            </a:r>
+            <a:endParaRPr lang="en-US" baseline="0" smtClean="0"/>
+          </a:p>
+          <a:p>
+            <a:endParaRPr lang="en-US" baseline="0" smtClean="0"/>
+          </a:p>
+          <a:p>
+            <a:endParaRPr lang="en-US" dirty="0"/>
+          </a:p>
+        </p:txBody>
+      </p:sp>
+      <p:sp>
+        <p:nvSpPr>
+          <p:cNvPr id="4" name="Slide Number Placeholder 3"/>
+          <p:cNvSpPr>
+            <a:spLocks noGrp="1"/>
+          </p:cNvSpPr>
+          <p:nvPr>
+            <p:ph type="sldNum" sz="quarter" idx="10"/>
+          </p:nvPr>
+        </p:nvSpPr>
+        <p:spPr/>
+        <p:txBody>
+          <a:bodyPr/>
+          <a:lstStyle/>
+          <a:p>
+            <a:fld id="{4355A105-26B0-5043-A7EC-94C834C82E90}" type="slidenum">
+              <a:rPr lang="en-US" smtClean="0"/>
+              <a:pPr/>
+              <a:t>26</a:t>
+            </a:fld>
+            <a:endParaRPr lang="en-US"/>
+          </a:p>
+        </p:txBody>
+      </p:sp>
+    </p:spTree>
+  </p:cSld>
+  <p:clrMapOvr>
+    <a:masterClrMapping/>
+  </p:clrMapOvr>
+</p:notes>
+</file>
+
+<file path=ppt/notesSlides/notesSlide23.xml><?xml version="1.0" encoding="utf-8"?>
+<p:notes xmlns:a="http://schemas.openxmlformats.org/drawingml/2006/main" xmlns:r="http://schemas.openxmlformats.org/officeDocument/2006/relationships" xmlns:mc="http://schemas.openxmlformats.org/markup-compatibility/2006" xmlns:mv="urn:schemas-microsoft-com:mac:vml" xmlns:p="http://schemas.openxmlformats.org/presentationml/2006/main" mc:Ignorable="mv" mc:PreserveAttributes="mv:*">
+  <p:cSld>
+    <p:spTree>
+      <p:nvGrpSpPr>
+        <p:cNvPr id="1" name=""/>
+        <p:cNvGrpSpPr/>
+        <p:nvPr/>
+      </p:nvGrpSpPr>
+      <p:grpSpPr>
+        <a:xfrm>
+          <a:off x="0" y="0"/>
+          <a:ext cx="0" cy="0"/>
+          <a:chOff x="0" y="0"/>
+          <a:chExt cx="0" cy="0"/>
+        </a:xfrm>
+      </p:grpSpPr>
+      <p:sp>
+        <p:nvSpPr>
+          <p:cNvPr id="2" name="Slide Image Placeholder 1"/>
+          <p:cNvSpPr>
+            <a:spLocks noGrp="1" noRot="1" noChangeAspect="1"/>
+          </p:cNvSpPr>
+          <p:nvPr>
+            <p:ph type="sldImg"/>
+          </p:nvPr>
+        </p:nvSpPr>
+        <p:spPr/>
+      </p:sp>
+      <p:sp>
+        <p:nvSpPr>
+          <p:cNvPr id="3" name="Notes Placeholder 2"/>
+          <p:cNvSpPr>
+            <a:spLocks noGrp="1"/>
+          </p:cNvSpPr>
+          <p:nvPr>
+            <p:ph type="body" idx="1"/>
+          </p:nvPr>
+        </p:nvSpPr>
+        <p:spPr/>
+        <p:txBody>
+          <a:bodyPr>
+            <a:normAutofit/>
+          </a:bodyPr>
+          <a:lstStyle/>
+          <a:p>
+            <a:r>
+              <a:rPr lang="en-US" dirty="0" err="1" smtClean="0"/>
+              <a:t>Resque</a:t>
+            </a:r>
+            <a:r>
+              <a:rPr lang="en-US" baseline="0" dirty="0" smtClean="0"/>
+              <a:t> is background job processor with Sinatra UI for monitoring queues, jobs, workers</a:t>
+            </a:r>
+          </a:p>
+          <a:p>
+            <a:r>
+              <a:rPr lang="en-US" baseline="0" dirty="0" smtClean="0"/>
+              <a:t>Watchtower is a combo of Mongo DB, Mustache </a:t>
+            </a:r>
+            <a:r>
+              <a:rPr lang="en-US" baseline="0" dirty="0" err="1" smtClean="0"/>
+              <a:t>templating</a:t>
+            </a:r>
+            <a:r>
+              <a:rPr lang="en-US" baseline="0" dirty="0" smtClean="0"/>
+              <a:t>, and Sinatra UI</a:t>
+            </a:r>
+          </a:p>
+        </p:txBody>
+      </p:sp>
+      <p:sp>
+        <p:nvSpPr>
+          <p:cNvPr id="4" name="Slide Number Placeholder 3"/>
+          <p:cNvSpPr>
+            <a:spLocks noGrp="1"/>
+          </p:cNvSpPr>
+          <p:nvPr>
+            <p:ph type="sldNum" sz="quarter" idx="10"/>
+          </p:nvPr>
+        </p:nvSpPr>
+        <p:spPr/>
+        <p:txBody>
+          <a:bodyPr/>
+          <a:lstStyle/>
+          <a:p>
+            <a:fld id="{4355A105-26B0-5043-A7EC-94C834C82E90}" type="slidenum">
+              <a:rPr lang="en-US" smtClean="0"/>
+              <a:pPr/>
+              <a:t>28</a:t>
             </a:fld>
             <a:endParaRPr lang="en-US"/>
           </a:p>
@@ -2054,17 +2300,15 @@
           <a:p>
             <a:r>
               <a:rPr lang="en-US" dirty="0" smtClean="0"/>
-              <a:t>To</a:t>
+              <a:t>These are just some compelling reasons to give Sinatra a strong</a:t>
             </a:r>
             <a:r>
               <a:rPr lang="en-US" baseline="0" dirty="0" smtClean="0"/>
-              <a:t> further qualify that Sinatra is more DSL than framework take a close look at the implementation details to the some of the more important things like</a:t>
-            </a:r>
-          </a:p>
-          <a:p>
-            <a:r>
-              <a:rPr lang="en-US" baseline="0" dirty="0" smtClean="0"/>
-              <a:t>logging, sessions, method override. These are all implemented by Rack, not Sinatra.</a:t>
+              <a:t> consideration </a:t>
+            </a:r>
+            <a:r>
+              <a:rPr lang="en-US" dirty="0" smtClean="0"/>
+              <a:t>the next time you start a new project</a:t>
             </a:r>
             <a:endParaRPr lang="en-US" dirty="0"/>
           </a:p>
@@ -2088,7 +2332,7 @@
             <a:fld id="{4355A105-26B0-5043-A7EC-94C834C82E90}" type="slidenum">
               <a:rPr lang="en-US" smtClean="0"/>
               <a:pPr/>
-              <a:t>4</a:t>
+              <a:t>3</a:t>
             </a:fld>
             <a:endParaRPr lang="en-US"/>
           </a:p>
@@ -2150,13 +2394,19 @@
           <a:p>
             <a:r>
               <a:rPr lang="en-US" dirty="0" smtClean="0"/>
-              <a:t>I’ve seen some configure their Sinatra app like a gem,</a:t>
+              <a:t>To</a:t>
             </a:r>
             <a:r>
               <a:rPr lang="en-US" baseline="0" dirty="0" smtClean="0"/>
-              <a:t> some like a Rails stack, and some are of the simple containing 1 or 2 files</a:t>
-            </a:r>
-            <a:endParaRPr lang="en-US" dirty="0" smtClean="0"/>
+              <a:t> further qualify that Sinatra is more DSL than framework take a close look at the implementation details to the some of the more important things like</a:t>
+            </a:r>
+          </a:p>
+          <a:p>
+            <a:r>
+              <a:rPr lang="en-US" baseline="0" dirty="0" smtClean="0"/>
+              <a:t>logging, sessions, method override. These are all implemented by Rack, not Sinatra.</a:t>
+            </a:r>
+            <a:endParaRPr lang="en-US" dirty="0"/>
           </a:p>
         </p:txBody>
       </p:sp>
@@ -2178,7 +2428,7 @@
             <a:fld id="{4355A105-26B0-5043-A7EC-94C834C82E90}" type="slidenum">
               <a:rPr lang="en-US" smtClean="0"/>
               <a:pPr/>
-              <a:t>5</a:t>
+              <a:t>4</a:t>
             </a:fld>
             <a:endParaRPr lang="en-US"/>
           </a:p>
@@ -2239,34 +2489,14 @@
           <a:lstStyle/>
           <a:p>
             <a:r>
-              <a:rPr lang="en-US" sz="1200" dirty="0" smtClean="0"/>
-              <a:t>All configuration</a:t>
-            </a:r>
-            <a:r>
-              <a:rPr lang="en-US" sz="1200" baseline="0" dirty="0" smtClean="0"/>
-              <a:t> settings are documented here </a:t>
-            </a:r>
-            <a:r>
-              <a:rPr lang="en-US" sz="1200" dirty="0" smtClean="0"/>
-              <a:t>http://</a:t>
-            </a:r>
-            <a:r>
-              <a:rPr lang="en-US" sz="1200" dirty="0" err="1" smtClean="0"/>
-              <a:t>www.sinatrarb.com/configuration.html</a:t>
-            </a:r>
-            <a:endParaRPr lang="en-US" sz="1200" dirty="0" smtClean="0"/>
-          </a:p>
-          <a:p>
-            <a:endParaRPr lang="en-US" sz="1200" dirty="0" smtClean="0"/>
-          </a:p>
-          <a:p>
-            <a:r>
-              <a:rPr lang="en-US" sz="1200" dirty="0" smtClean="0"/>
-              <a:t>Web server configurations will be discussed later in the deck</a:t>
-            </a:r>
-          </a:p>
-          <a:p>
-            <a:endParaRPr lang="en-US" dirty="0"/>
+              <a:rPr lang="en-US" dirty="0" smtClean="0"/>
+              <a:t>I’ve seen some configure their Sinatra app like a gem,</a:t>
+            </a:r>
+            <a:r>
+              <a:rPr lang="en-US" baseline="0" dirty="0" smtClean="0"/>
+              <a:t> some like a Rails stack, and some are of the simple containing 1 or 2 files</a:t>
+            </a:r>
+            <a:endParaRPr lang="en-US" dirty="0" smtClean="0"/>
           </a:p>
         </p:txBody>
       </p:sp>
@@ -2288,7 +2518,7 @@
             <a:fld id="{4355A105-26B0-5043-A7EC-94C834C82E90}" type="slidenum">
               <a:rPr lang="en-US" smtClean="0"/>
               <a:pPr/>
-              <a:t>6</a:t>
+              <a:t>5</a:t>
             </a:fld>
             <a:endParaRPr lang="en-US"/>
           </a:p>
@@ -2348,202 +2578,35 @@
           </a:bodyPr>
           <a:lstStyle/>
           <a:p>
-            <a:pPr marL="0" marR="0" indent="0" algn="l" defTabSz="457200" rtl="0" eaLnBrk="1" fontAlgn="auto" latinLnBrk="0" hangingPunct="1">
-              <a:lnSpc>
-                <a:spcPct val="100000"/>
-              </a:lnSpc>
-              <a:spcBef>
-                <a:spcPts val="0"/>
-              </a:spcBef>
-              <a:spcAft>
-                <a:spcPts val="0"/>
-              </a:spcAft>
-              <a:buClrTx/>
-              <a:buSzTx/>
-              <a:buFontTx/>
-              <a:buNone/>
-              <a:tabLst/>
-              <a:defRPr/>
-            </a:pPr>
-            <a:r>
-              <a:rPr lang="en-US" dirty="0" smtClean="0"/>
-              <a:t>Refer to the </a:t>
-            </a:r>
-            <a:r>
-              <a:rPr lang="en-US" dirty="0" err="1" smtClean="0"/>
-              <a:t>cookie_sessions_controller.rb</a:t>
-            </a:r>
-            <a:r>
-              <a:rPr lang="en-US" dirty="0" smtClean="0"/>
-              <a:t>,</a:t>
-            </a:r>
-            <a:r>
-              <a:rPr lang="en-US" baseline="0" dirty="0" smtClean="0"/>
-              <a:t> </a:t>
-            </a:r>
-            <a:r>
-              <a:rPr lang="en-US" baseline="0" dirty="0" err="1" smtClean="0"/>
-              <a:t>memcache_sessions_controller.rb</a:t>
-            </a:r>
-            <a:r>
-              <a:rPr lang="en-US" baseline="0" dirty="0" smtClean="0"/>
-              <a:t>, </a:t>
-            </a:r>
-            <a:r>
-              <a:rPr lang="en-US" baseline="0" dirty="0" err="1" smtClean="0"/>
-              <a:t>memory_sessions_controller.rb</a:t>
-            </a:r>
-            <a:endParaRPr lang="en-US" dirty="0" smtClean="0"/>
-          </a:p>
-          <a:p>
-            <a:endParaRPr lang="en-US" dirty="0" smtClean="0"/>
-          </a:p>
-          <a:p>
-            <a:r>
-              <a:rPr lang="en-US" dirty="0" smtClean="0"/>
-              <a:t>If </a:t>
-            </a:r>
-            <a:r>
-              <a:rPr lang="en-US" dirty="0" smtClean="0"/>
-              <a:t>you need to customize your session cookie timeout,</a:t>
-            </a:r>
-            <a:r>
-              <a:rPr lang="en-US" baseline="0" dirty="0" smtClean="0"/>
-              <a:t> domain, or secret key</a:t>
-            </a:r>
-            <a:endParaRPr lang="en-US" dirty="0" smtClean="0"/>
-          </a:p>
-          <a:p>
-            <a:r>
-              <a:rPr lang="en-US" dirty="0" smtClean="0"/>
-              <a:t>use </a:t>
-            </a:r>
-            <a:r>
-              <a:rPr lang="en-US" dirty="0" err="1" smtClean="0"/>
-              <a:t>Rack::Session::Cookie</a:t>
-            </a:r>
-            <a:r>
-              <a:rPr lang="en-US" dirty="0" smtClean="0"/>
-              <a:t>, :key =&gt; '</a:t>
-            </a:r>
-            <a:r>
-              <a:rPr lang="en-US" dirty="0" err="1" smtClean="0"/>
-              <a:t>rack.session</a:t>
-            </a:r>
-            <a:r>
-              <a:rPr lang="en-US" dirty="0" smtClean="0"/>
-              <a:t>', :domain =&gt; '</a:t>
-            </a:r>
-            <a:r>
-              <a:rPr lang="en-US" dirty="0" err="1" smtClean="0"/>
-              <a:t>foo.com</a:t>
-            </a:r>
-            <a:r>
-              <a:rPr lang="en-US" dirty="0" smtClean="0"/>
-              <a:t>', :path =&gt; '/', :</a:t>
-            </a:r>
-            <a:r>
-              <a:rPr lang="en-US" dirty="0" err="1" smtClean="0"/>
-              <a:t>expire_after</a:t>
-            </a:r>
-            <a:r>
-              <a:rPr lang="en-US" dirty="0" smtClean="0"/>
-              <a:t> =&gt; 2592000, # In seconds :secret =&gt; '</a:t>
-            </a:r>
-            <a:r>
-              <a:rPr lang="en-US" dirty="0" err="1" smtClean="0"/>
-              <a:t>change_me</a:t>
-            </a:r>
-            <a:r>
-              <a:rPr lang="en-US" dirty="0" smtClean="0"/>
-              <a:t>’</a:t>
-            </a:r>
-          </a:p>
-          <a:p>
-            <a:endParaRPr lang="en-US" dirty="0" smtClean="0"/>
-          </a:p>
-          <a:p>
-            <a:r>
-              <a:rPr lang="en-US" dirty="0" smtClean="0"/>
-              <a:t>You can pass in the standard </a:t>
-            </a:r>
-            <a:r>
-              <a:rPr lang="en-US" dirty="0" err="1" smtClean="0"/>
-              <a:t>Memcache</a:t>
-            </a:r>
-            <a:r>
-              <a:rPr lang="en-US" dirty="0" smtClean="0"/>
-              <a:t> options,</a:t>
-            </a:r>
-            <a:r>
-              <a:rPr lang="en-US" baseline="0" dirty="0" smtClean="0"/>
-              <a:t> look at the </a:t>
-            </a:r>
-            <a:r>
-              <a:rPr lang="en-US" baseline="0" dirty="0" err="1" smtClean="0"/>
-              <a:t>memcache</a:t>
-            </a:r>
-            <a:r>
-              <a:rPr lang="en-US" baseline="0" dirty="0" smtClean="0"/>
-              <a:t>-client gem for more about the </a:t>
-            </a:r>
-            <a:r>
-              <a:rPr lang="en-US" baseline="0" dirty="0" err="1" smtClean="0"/>
-              <a:t>config</a:t>
-            </a:r>
-            <a:r>
-              <a:rPr lang="en-US" baseline="0" dirty="0" smtClean="0"/>
-              <a:t> settings</a:t>
-            </a:r>
-          </a:p>
-          <a:p>
-            <a:endParaRPr lang="en-US" baseline="0" dirty="0" smtClean="0"/>
-          </a:p>
-          <a:p>
-            <a:r>
-              <a:rPr lang="en-US" baseline="0" dirty="0" smtClean="0"/>
-              <a:t>Both the memory and </a:t>
-            </a:r>
-            <a:r>
-              <a:rPr lang="en-US" baseline="0" dirty="0" err="1" smtClean="0"/>
-              <a:t>memcache</a:t>
-            </a:r>
-            <a:r>
-              <a:rPr lang="en-US" baseline="0" dirty="0" smtClean="0"/>
-              <a:t> session stores still use the cookie to store the session key</a:t>
-            </a:r>
-          </a:p>
-          <a:p>
-            <a:r>
-              <a:rPr lang="en-US" baseline="0" dirty="0" smtClean="0"/>
-              <a:t>DON’T use enable :session or :session, true with alternate session stores</a:t>
-            </a:r>
-          </a:p>
-          <a:p>
-            <a:endParaRPr lang="en-US" baseline="0" dirty="0" smtClean="0"/>
-          </a:p>
-          <a:p>
-            <a:r>
-              <a:rPr lang="en-US" baseline="0" dirty="0" smtClean="0"/>
-              <a:t>Demonstrate the differences of the memory </a:t>
-            </a:r>
-            <a:r>
-              <a:rPr lang="en-US" baseline="0" dirty="0" err="1" smtClean="0"/>
-              <a:t>vs</a:t>
-            </a:r>
-            <a:r>
-              <a:rPr lang="en-US" baseline="0" dirty="0" smtClean="0"/>
-              <a:t> </a:t>
-            </a:r>
-            <a:r>
-              <a:rPr lang="en-US" baseline="0" dirty="0" err="1" smtClean="0"/>
-              <a:t>memcache</a:t>
-            </a:r>
-            <a:r>
-              <a:rPr lang="en-US" baseline="0" dirty="0" smtClean="0"/>
-              <a:t> by stopping and restarting the server</a:t>
-            </a:r>
-            <a:endParaRPr lang="en-US" dirty="0" smtClean="0"/>
+            <a:r>
+              <a:rPr lang="en-US" sz="1200" dirty="0" smtClean="0"/>
+              <a:t>All configuration</a:t>
+            </a:r>
+            <a:r>
+              <a:rPr lang="en-US" sz="1200" baseline="0" dirty="0" smtClean="0"/>
+              <a:t> settings are documented here </a:t>
+            </a:r>
+            <a:r>
+              <a:rPr lang="en-US" sz="1200" dirty="0" smtClean="0"/>
+              <a:t>http://</a:t>
+            </a:r>
+            <a:r>
+              <a:rPr lang="en-US" sz="1200" dirty="0" err="1" smtClean="0"/>
+              <a:t>www.sinatrarb.com/configuration.html</a:t>
+            </a:r>
+            <a:endParaRPr lang="en-US" sz="1200" dirty="0" smtClean="0"/>
+          </a:p>
+          <a:p>
+            <a:endParaRPr lang="en-US" sz="1200" dirty="0" smtClean="0"/>
+          </a:p>
+          <a:p>
+            <a:r>
+              <a:rPr lang="en-US" sz="1200" dirty="0" smtClean="0"/>
+              <a:t>Web server configurations will be discussed later in the deck</a:t>
+            </a:r>
+          </a:p>
+          <a:p>
+            <a:endParaRPr lang="en-US" dirty="0"/>
           </a:p>
         </p:txBody>
       </p:sp>
@@ -2565,7 +2628,7 @@
             <a:fld id="{4355A105-26B0-5043-A7EC-94C834C82E90}" type="slidenum">
               <a:rPr lang="en-US" smtClean="0"/>
               <a:pPr/>
-              <a:t>7</a:t>
+              <a:t>6</a:t>
             </a:fld>
             <a:endParaRPr lang="en-US"/>
           </a:p>
@@ -2625,25 +2688,111 @@
           </a:bodyPr>
           <a:lstStyle/>
           <a:p>
+            <a:pPr marL="0" marR="0" indent="0" algn="l" defTabSz="457200" rtl="0" eaLnBrk="1" fontAlgn="auto" latinLnBrk="0" hangingPunct="1">
+              <a:lnSpc>
+                <a:spcPct val="100000"/>
+              </a:lnSpc>
+              <a:spcBef>
+                <a:spcPts val="0"/>
+              </a:spcBef>
+              <a:spcAft>
+                <a:spcPts val="0"/>
+              </a:spcAft>
+              <a:buClrTx/>
+              <a:buSzTx/>
+              <a:buFontTx/>
+              <a:buNone/>
+              <a:tabLst/>
+              <a:defRPr/>
+            </a:pPr>
             <a:r>
               <a:rPr lang="en-US" dirty="0" smtClean="0"/>
-              <a:t>Refer to </a:t>
+              <a:t>Refer to the </a:t>
             </a:r>
             <a:r>
               <a:rPr lang="en-US" dirty="0" err="1" smtClean="0"/>
-              <a:t>products_controller.rb</a:t>
+              <a:t>cookie_sessions_controller.rb</a:t>
             </a:r>
             <a:r>
               <a:rPr lang="en-US" dirty="0" smtClean="0"/>
+              <a:t>,</a:t>
+            </a:r>
+            <a:r>
+              <a:rPr lang="en-US" baseline="0" dirty="0" smtClean="0"/>
               <a:t> </a:t>
             </a:r>
             <a:r>
+              <a:rPr lang="en-US" baseline="0" dirty="0" err="1" smtClean="0"/>
+              <a:t>memcache_sessions_controller.rb</a:t>
+            </a:r>
+            <a:r>
+              <a:rPr lang="en-US" baseline="0" dirty="0" smtClean="0"/>
+              <a:t>, </a:t>
+            </a:r>
+            <a:r>
+              <a:rPr lang="en-US" baseline="0" dirty="0" err="1" smtClean="0"/>
+              <a:t>memory_sessions_controller.rb</a:t>
+            </a:r>
+            <a:endParaRPr lang="en-US" dirty="0" smtClean="0"/>
+          </a:p>
+          <a:p>
+            <a:endParaRPr lang="en-US" dirty="0" smtClean="0"/>
+          </a:p>
+          <a:p>
+            <a:r>
+              <a:rPr lang="en-US" dirty="0" smtClean="0"/>
+              <a:t>If you need to customize your session cookie timeout,</a:t>
+            </a:r>
+            <a:r>
+              <a:rPr lang="en-US" baseline="0" dirty="0" smtClean="0"/>
+              <a:t> domain, or secret key</a:t>
+            </a:r>
+            <a:endParaRPr lang="en-US" dirty="0" smtClean="0"/>
+          </a:p>
+          <a:p>
+            <a:r>
+              <a:rPr lang="en-US" dirty="0" smtClean="0"/>
+              <a:t>use </a:t>
+            </a:r>
+            <a:r>
               <a:rPr lang="en-US" dirty="0" err="1" smtClean="0"/>
-              <a:t>view_products</a:t>
+              <a:t>Rack::Session::Cookie</a:t>
             </a:r>
             <a:r>
               <a:rPr lang="en-US" dirty="0" smtClean="0"/>
-              <a:t> method</a:t>
+              <a:t>, :key =&gt; '</a:t>
+            </a:r>
+            <a:r>
+              <a:rPr lang="en-US" dirty="0" err="1" smtClean="0"/>
+              <a:t>rack.session</a:t>
+            </a:r>
+            <a:r>
+              <a:rPr lang="en-US" dirty="0" smtClean="0"/>
+              <a:t>', :domain =&gt; '</a:t>
+            </a:r>
+            <a:r>
+              <a:rPr lang="en-US" dirty="0" err="1" smtClean="0"/>
+              <a:t>foo.com</a:t>
+            </a:r>
+            <a:r>
+              <a:rPr lang="en-US" dirty="0" smtClean="0"/>
+              <a:t>', :path =&gt; '/', :</a:t>
+            </a:r>
+            <a:r>
+              <a:rPr lang="en-US" dirty="0" err="1" smtClean="0"/>
+              <a:t>expire_after</a:t>
+            </a:r>
+            <a:r>
+              <a:rPr lang="en-US" dirty="0" smtClean="0"/>
+              <a:t> =&gt; 2592000, # In seconds :secret =&gt; '</a:t>
+            </a:r>
+            <a:r>
+              <a:rPr lang="en-US" dirty="0" err="1" smtClean="0"/>
+              <a:t>change_me</a:t>
+            </a:r>
+            <a:r>
+              <a:rPr lang="en-US" dirty="0" smtClean="0"/>
+              <a:t>’</a:t>
             </a:r>
           </a:p>
           <a:p>
@@ -2652,74 +2801,83 @@
           <a:p>
             <a:r>
               <a:rPr lang="en-US" dirty="0" smtClean="0"/>
-              <a:t>Cookie </a:t>
+              <a:t>You can pass in the standard </a:t>
+            </a:r>
+            <a:r>
+              <a:rPr lang="en-US" dirty="0" err="1" smtClean="0"/>
+              <a:t>Memcache</a:t>
             </a:r>
             <a:r>
               <a:rPr lang="en-US" dirty="0" smtClean="0"/>
-              <a:t>implementation</a:t>
+              <a:t> options,</a:t>
             </a:r>
             <a:r>
               <a:rPr lang="en-US" baseline="0" dirty="0" smtClean="0"/>
-              <a:t> is again </a:t>
+              <a:t> look at the </a:t>
             </a:r>
             <a:r>
               <a:rPr lang="en-US" baseline="0" dirty="0" err="1" smtClean="0"/>
-              <a:t>Rack::Request</a:t>
+              <a:t>memcache</a:t>
             </a:r>
             <a:r>
               <a:rPr lang="en-US" baseline="0" dirty="0" smtClean="0"/>
-              <a:t> and </a:t>
+              <a:t>-client gem for more about the </a:t>
             </a:r>
             <a:r>
               <a:rPr lang="en-US" baseline="0" dirty="0" err="1" smtClean="0"/>
-              <a:t>Rack::Response</a:t>
+              <a:t>config</a:t>
             </a:r>
             <a:r>
               <a:rPr lang="en-US" baseline="0" dirty="0" smtClean="0"/>
-              <a:t> based, not Sinatra</a:t>
-            </a:r>
-            <a:endParaRPr lang="en-US" dirty="0" smtClean="0"/>
-          </a:p>
-          <a:p>
-            <a:endParaRPr lang="en-US" dirty="0" smtClean="0"/>
-          </a:p>
-          <a:p>
-            <a:r>
-              <a:rPr lang="en-US" dirty="0" smtClean="0"/>
-              <a:t>Can serialize</a:t>
-            </a:r>
+              <a:t> settings</a:t>
+            </a:r>
+          </a:p>
+          <a:p>
+            <a:endParaRPr lang="en-US" baseline="0" dirty="0" smtClean="0"/>
+          </a:p>
+          <a:p>
             <a:r>
               <a:rPr lang="en-US" baseline="0" dirty="0" smtClean="0"/>
-              <a:t> Array objects, but you must parse them out yourself when delimited by &amp;’</a:t>
+              <a:t>Both the memory and </a:t>
             </a:r>
             <a:r>
               <a:rPr lang="en-US" baseline="0" dirty="0" err="1" smtClean="0"/>
-              <a:t>s</a:t>
-            </a:r>
+              <a:t>memcache</a:t>
+            </a:r>
+            <a:r>
+              <a:rPr lang="en-US" baseline="0" dirty="0" smtClean="0"/>
+              <a:t> session stores still use the cookie to store the session key</a:t>
+            </a:r>
+          </a:p>
+          <a:p>
+            <a:r>
+              <a:rPr lang="en-US" baseline="0" dirty="0" smtClean="0"/>
+              <a:t>DON’T use enable :session or :session, true with alternate session stores</a:t>
+            </a:r>
+          </a:p>
+          <a:p>
             <a:endParaRPr lang="en-US" baseline="0" dirty="0" smtClean="0"/>
           </a:p>
           <a:p>
             <a:r>
               <a:rPr lang="en-US" baseline="0" dirty="0" smtClean="0"/>
-              <a:t>Can modify the domain, path, and expiration of the cookie </a:t>
-            </a:r>
-          </a:p>
-          <a:p>
-            <a:endParaRPr lang="en-US" baseline="0" dirty="0" smtClean="0"/>
-          </a:p>
-          <a:p>
+              <a:t>Demonstrate the differences of the memory </a:t>
+            </a:r>
+            <a:r>
+              <a:rPr lang="en-US" baseline="0" dirty="0" err="1" smtClean="0"/>
+              <a:t>vs</a:t>
+            </a:r>
             <a:r>
               <a:rPr lang="en-US" baseline="0" dirty="0" smtClean="0"/>
-              <a:t>Strings will need to be manually escaped</a:t>
-            </a:r>
-          </a:p>
-          <a:p>
-            <a:endParaRPr lang="en-US" baseline="0" dirty="0" smtClean="0"/>
-          </a:p>
-          <a:p>
+              <a:t> </a:t>
+            </a:r>
+            <a:r>
+              <a:rPr lang="en-US" baseline="0" dirty="0" err="1" smtClean="0"/>
+              <a:t>memcache</a:t>
+            </a:r>
             <a:r>
               <a:rPr lang="en-US" baseline="0" dirty="0" smtClean="0"/>
-              <a:t>Look in the products controller show method</a:t>
+              <a:t> by stopping and restarting the server</a:t>
             </a:r>
             <a:endParaRPr lang="en-US" dirty="0" smtClean="0"/>
           </a:p>
@@ -2743,7 +2901,7 @@
             <a:fld id="{4355A105-26B0-5043-A7EC-94C834C82E90}" type="slidenum">
               <a:rPr lang="en-US" smtClean="0"/>
               <a:pPr/>
-              <a:t>8</a:t>
+              <a:t>7</a:t>
             </a:fld>
             <a:endParaRPr lang="en-US"/>
           </a:p>
@@ -2805,32 +2963,97 @@
           <a:p>
             <a:r>
               <a:rPr lang="en-US" dirty="0" smtClean="0"/>
-              <a:t>Refer to the </a:t>
+              <a:t>Refer to </a:t>
             </a:r>
             <a:r>
               <a:rPr lang="en-US" dirty="0" err="1" smtClean="0"/>
-              <a:t>search_controller.rb</a:t>
-            </a:r>
+              <a:t>products_controller.rb</a:t>
+            </a:r>
+            <a:r>
+              <a:rPr lang="en-US" dirty="0" smtClean="0"/>
+              <a:t> </a:t>
+            </a:r>
+            <a:r>
+              <a:rPr lang="en-US" dirty="0" err="1" smtClean="0"/>
+              <a:t>view_products</a:t>
+            </a:r>
+            <a:r>
+              <a:rPr lang="en-US" dirty="0" smtClean="0"/>
+              <a:t> method</a:t>
+            </a:r>
+          </a:p>
+          <a:p>
             <a:endParaRPr lang="en-US" dirty="0" smtClean="0"/>
           </a:p>
           <a:p>
             <a:r>
               <a:rPr lang="en-US" dirty="0" smtClean="0"/>
-              <a:t>If</a:t>
+              <a:t>Cookie implementation</a:t>
             </a:r>
             <a:r>
               <a:rPr lang="en-US" baseline="0" dirty="0" smtClean="0"/>
-              <a:t> </a:t>
+              <a:t> is again </a:t>
+            </a:r>
+            <a:r>
+              <a:rPr lang="en-US" baseline="0" dirty="0" err="1" smtClean="0"/>
+              <a:t>Rack::Request</a:t>
             </a:r>
             <a:r>
               <a:rPr lang="en-US" baseline="0" dirty="0" smtClean="0"/>
-              <a:t>Sinatra isn’t in standalone mode and your using another web server be sure to specify </a:t>
+              <a:t> and </a:t>
             </a:r>
             <a:r>
               <a:rPr lang="en-US" baseline="0" dirty="0" err="1" smtClean="0"/>
-              <a:t>Rack::Static</a:t>
-            </a:r>
-            <a:endParaRPr lang="en-US" dirty="0"/>
+              <a:t>Rack::Response</a:t>
+            </a:r>
+            <a:r>
+              <a:rPr lang="en-US" baseline="0" dirty="0" smtClean="0"/>
+              <a:t> based, not Sinatra</a:t>
+            </a:r>
+            <a:endParaRPr lang="en-US" dirty="0" smtClean="0"/>
+          </a:p>
+          <a:p>
+            <a:endParaRPr lang="en-US" dirty="0" smtClean="0"/>
+          </a:p>
+          <a:p>
+            <a:r>
+              <a:rPr lang="en-US" dirty="0" smtClean="0"/>
+              <a:t>Can serialize</a:t>
+            </a:r>
+            <a:r>
+              <a:rPr lang="en-US" baseline="0" dirty="0" smtClean="0"/>
+              <a:t> Array objects, but you must parse them out yourself when delimited by &amp;’</a:t>
+            </a:r>
+            <a:r>
+              <a:rPr lang="en-US" baseline="0" dirty="0" err="1" smtClean="0"/>
+              <a:t>s</a:t>
+            </a:r>
+            <a:endParaRPr lang="en-US" baseline="0" dirty="0" smtClean="0"/>
+          </a:p>
+          <a:p>
+            <a:r>
+              <a:rPr lang="en-US" baseline="0" dirty="0" smtClean="0"/>
+              <a:t>Can modify the domain, path, and expiration of the cookie </a:t>
+            </a:r>
+          </a:p>
+          <a:p>
+            <a:endParaRPr lang="en-US" baseline="0" dirty="0" smtClean="0"/>
+          </a:p>
+          <a:p>
+            <a:r>
+              <a:rPr lang="en-US" baseline="0" dirty="0" smtClean="0"/>
+              <a:t>Strings will need to be manually escaped</a:t>
+            </a:r>
+          </a:p>
+          <a:p>
+            <a:endParaRPr lang="en-US" baseline="0" dirty="0" smtClean="0"/>
+          </a:p>
+          <a:p>
+            <a:r>
+              <a:rPr lang="en-US" baseline="0" dirty="0" smtClean="0"/>
+              <a:t>Look in the products controller show method</a:t>
+            </a:r>
+            <a:endParaRPr lang="en-US" dirty="0" smtClean="0"/>
           </a:p>
         </p:txBody>
       </p:sp>
@@ -2852,7 +3075,7 @@
             <a:fld id="{4355A105-26B0-5043-A7EC-94C834C82E90}" type="slidenum">
               <a:rPr lang="en-US" smtClean="0"/>
               <a:pPr/>
-              <a:t>9</a:t>
+              <a:t>8</a:t>
             </a:fld>
             <a:endParaRPr lang="en-US"/>
           </a:p>
@@ -2913,44 +3136,27 @@
           <a:lstStyle/>
           <a:p>
             <a:r>
-              <a:rPr lang="en-US" sz="1200" dirty="0" smtClean="0"/>
-              <a:t>URI definition should look similar to Rails</a:t>
+              <a:rPr lang="en-US" dirty="0" smtClean="0"/>
+              <a:t>Refer to the </a:t>
+            </a:r>
+            <a:r>
+              <a:rPr lang="en-US" dirty="0" err="1" smtClean="0"/>
+              <a:t>search_controller.rb</a:t>
             </a:r>
             <a:endParaRPr lang="en-US" dirty="0" smtClean="0"/>
           </a:p>
           <a:p>
             <a:r>
               <a:rPr lang="en-US" dirty="0" smtClean="0"/>
-              <a:t>Mention</a:t>
+              <a:t>If</a:t>
             </a:r>
             <a:r>
               <a:rPr lang="en-US" baseline="0" dirty="0" smtClean="0"/>
-              <a:t> </a:t>
-            </a:r>
-            <a:r>
-              <a:rPr lang="en-US" dirty="0" err="1" smtClean="0"/>
-              <a:t>splatting</a:t>
-            </a:r>
-            <a:endParaRPr lang="en-US" dirty="0" smtClean="0"/>
-          </a:p>
-          <a:p>
-            <a:r>
-              <a:rPr lang="en-US" dirty="0" smtClean="0"/>
-              <a:t>	get '/say/*/to/*' do # matches /say/hello/to/world </a:t>
-            </a:r>
-          </a:p>
-          <a:p>
-            <a:r>
-              <a:rPr lang="en-US" dirty="0" smtClean="0"/>
-              <a:t>	</a:t>
-            </a:r>
-            <a:r>
-              <a:rPr lang="en-US" dirty="0" err="1" smtClean="0"/>
-              <a:t>params["splat</a:t>
-            </a:r>
-            <a:r>
-              <a:rPr lang="en-US" dirty="0" smtClean="0"/>
-              <a:t>"] # =&gt; ["hello", "world"] end </a:t>
+              <a:t> Sinatra isn’t in standalone mode and your using another web server be sure to specify </a:t>
+            </a:r>
+            <a:r>
+              <a:rPr lang="en-US" baseline="0" dirty="0" err="1" smtClean="0"/>
+              <a:t>Rack::Static</a:t>
             </a:r>
             <a:endParaRPr lang="en-US" dirty="0"/>
           </a:p>
@@ -2974,7 +3180,7 @@
             <a:fld id="{4355A105-26B0-5043-A7EC-94C834C82E90}" type="slidenum">
               <a:rPr lang="en-US" smtClean="0"/>
               <a:pPr/>
-              <a:t>10</a:t>
+              <a:t>9</a:t>
             </a:fld>
             <a:endParaRPr lang="en-US"/>
           </a:p>
@@ -8726,7 +8932,7 @@
           <a:p>
             <a:pPr>
               <a:buBlip>
-                <a:blip r:embed="rId2"/>
+                <a:blip r:embed="rId3"/>
               </a:buBlip>
             </a:pPr>
             <a:r>
@@ -8742,7 +8948,7 @@
           <a:p>
             <a:pPr>
               <a:buBlip>
-                <a:blip r:embed="rId2"/>
+                <a:blip r:embed="rId3"/>
               </a:buBlip>
             </a:pPr>
             <a:r>
@@ -8753,7 +8959,7 @@
           <a:p>
             <a:pPr lvl="1">
               <a:buBlip>
-                <a:blip r:embed="rId2"/>
+                <a:blip r:embed="rId3"/>
               </a:buBlip>
             </a:pPr>
             <a:r>
@@ -8764,7 +8970,7 @@
           <a:p>
             <a:pPr lvl="1">
               <a:buBlip>
-                <a:blip r:embed="rId2"/>
+                <a:blip r:embed="rId3"/>
               </a:buBlip>
             </a:pPr>
             <a:r>
@@ -8780,7 +8986,7 @@
           <a:p>
             <a:pPr>
               <a:buBlip>
-                <a:blip r:embed="rId2"/>
+                <a:blip r:embed="rId3"/>
               </a:buBlip>
             </a:pPr>
             <a:r>
@@ -8796,7 +9002,7 @@
           <a:p>
             <a:pPr>
               <a:buBlip>
-                <a:blip r:embed="rId2"/>
+                <a:blip r:embed="rId3"/>
               </a:buBlip>
             </a:pPr>
             <a:r>
@@ -8812,7 +9018,7 @@
           <a:p>
             <a:pPr>
               <a:buBlip>
-                <a:blip r:embed="rId2"/>
+                <a:blip r:embed="rId3"/>
               </a:buBlip>
             </a:pPr>
             <a:endParaRPr lang="en-US" sz="2400" dirty="0" smtClean="0"/>
@@ -8820,7 +9026,7 @@
           <a:p>
             <a:pPr>
               <a:buBlip>
-                <a:blip r:embed="rId2"/>
+                <a:blip r:embed="rId3"/>
               </a:buBlip>
             </a:pPr>
             <a:endParaRPr lang="en-US" sz="2400" dirty="0" smtClean="0"/>
@@ -8828,7 +9034,7 @@
           <a:p>
             <a:pPr>
               <a:buBlip>
-                <a:blip r:embed="rId2"/>
+                <a:blip r:embed="rId3"/>
               </a:buBlip>
             </a:pPr>
             <a:endParaRPr lang="en-US" sz="2400" dirty="0"/>
@@ -10676,33 +10882,6 @@
       </p:grpSpPr>
       <p:sp>
         <p:nvSpPr>
-          <p:cNvPr id="2" name="Title 1"/>
-          <p:cNvSpPr>
-            <a:spLocks noGrp="1"/>
-          </p:cNvSpPr>
-          <p:nvPr>
-            <p:ph type="title"/>
-          </p:nvPr>
-        </p:nvSpPr>
-        <p:spPr/>
-        <p:txBody>
-          <a:bodyPr/>
-          <a:lstStyle/>
-          <a:p>
-            <a:r>
-              <a:rPr lang="en-US" dirty="0" smtClean="0"/>
-              <a:t>Sinatra on </a:t>
-            </a:r>
-            <a:r>
-              <a:rPr lang="en-US" dirty="0" err="1" smtClean="0"/>
-              <a:t>Heroku</a:t>
-            </a:r>
-            <a:endParaRPr lang="en-US" dirty="0"/>
-          </a:p>
-        </p:txBody>
-      </p:sp>
-      <p:sp>
-        <p:nvSpPr>
           <p:cNvPr id="3" name="TextBox 2"/>
           <p:cNvSpPr txBox="1"/>
           <p:nvPr/>
@@ -10710,7 +10889,7 @@
         <p:spPr>
           <a:xfrm>
             <a:off x="1392844" y="1492625"/>
-            <a:ext cx="6420754" cy="3416320"/>
+            <a:ext cx="6420754" cy="2554545"/>
           </a:xfrm>
           <a:prstGeom prst="rect">
             <a:avLst/>
@@ -10723,157 +10902,79 @@
           </a:bodyPr>
           <a:lstStyle/>
           <a:p>
-            <a:endParaRPr lang="en-US" sz="2400" dirty="0" smtClean="0"/>
+            <a:endParaRPr lang="en-US" sz="3200" dirty="0" smtClean="0"/>
           </a:p>
           <a:p>
             <a:pPr>
               <a:buBlip>
-                <a:blip r:embed="rId2"/>
+                <a:blip r:embed="rId3"/>
               </a:buBlip>
             </a:pPr>
             <a:r>
-              <a:rPr lang="en-US" sz="2400" dirty="0" smtClean="0"/>
-              <a:t> Version your app with </a:t>
-            </a:r>
-            <a:r>
-              <a:rPr lang="en-US" sz="2400" dirty="0" err="1" smtClean="0"/>
-              <a:t>Git(hub</a:t>
-            </a:r>
-            <a:r>
-              <a:rPr lang="en-US" sz="2400" dirty="0" smtClean="0"/>
-              <a:t>) (</a:t>
-            </a:r>
-            <a:r>
-              <a:rPr lang="en-US" sz="2400" dirty="0" err="1" smtClean="0"/>
-              <a:t>git</a:t>
-            </a:r>
-            <a:r>
-              <a:rPr lang="en-US" sz="2400" dirty="0" smtClean="0"/>
-              <a:t> init)</a:t>
+              <a:rPr lang="en-US" sz="3200" dirty="0" smtClean="0"/>
+              <a:t> Passenger is Rack friendly</a:t>
             </a:r>
           </a:p>
           <a:p>
             <a:pPr>
               <a:buBlip>
-                <a:blip r:embed="rId2"/>
+                <a:blip r:embed="rId3"/>
               </a:buBlip>
             </a:pPr>
             <a:r>
-              <a:rPr lang="en-US" sz="2400" dirty="0" smtClean="0"/>
-              <a:t> Use Bundler or .gems file to manage Gems</a:t>
+              <a:rPr lang="en-US" sz="3200" dirty="0" smtClean="0"/>
+              <a:t> root points to apps ‘public’ dir</a:t>
             </a:r>
           </a:p>
           <a:p>
             <a:pPr>
               <a:buBlip>
-                <a:blip r:embed="rId2"/>
+                <a:blip r:embed="rId3"/>
               </a:buBlip>
             </a:pPr>
             <a:r>
-              <a:rPr lang="en-US" sz="2400" dirty="0" smtClean="0"/>
+              <a:rPr lang="en-US" sz="3200" dirty="0" smtClean="0"/>
               <a:t> </a:t>
             </a:r>
             <a:r>
-              <a:rPr lang="en-US" sz="2400" dirty="0" err="1" smtClean="0"/>
-              <a:t>sudo</a:t>
-            </a:r>
-            <a:r>
-              <a:rPr lang="en-US" sz="2400" dirty="0" smtClean="0"/>
-              <a:t> gem install </a:t>
-            </a:r>
-            <a:r>
-              <a:rPr lang="en-US" sz="2400" dirty="0" err="1" smtClean="0"/>
-              <a:t>heroku</a:t>
-            </a:r>
-            <a:endParaRPr lang="en-US" sz="2400" dirty="0" smtClean="0"/>
-          </a:p>
-          <a:p>
-            <a:pPr>
-              <a:buBlip>
-                <a:blip r:embed="rId2"/>
-              </a:buBlip>
-            </a:pPr>
-            <a:r>
-              <a:rPr lang="en-US" sz="2400" dirty="0" smtClean="0"/>
-              <a:t> </a:t>
-            </a:r>
-            <a:r>
-              <a:rPr lang="en-US" sz="2400" dirty="0" err="1" smtClean="0"/>
-              <a:t>heroku</a:t>
-            </a:r>
-            <a:r>
-              <a:rPr lang="en-US" sz="2400" dirty="0" smtClean="0"/>
-              <a:t> create</a:t>
-            </a:r>
-          </a:p>
-          <a:p>
-            <a:pPr>
-              <a:buBlip>
-                <a:blip r:embed="rId2"/>
-              </a:buBlip>
-            </a:pPr>
-            <a:r>
-              <a:rPr lang="en-US" sz="2400" dirty="0" smtClean="0"/>
-              <a:t> </a:t>
-            </a:r>
-            <a:r>
-              <a:rPr lang="en-US" sz="2400" dirty="0" err="1" smtClean="0"/>
-              <a:t>git</a:t>
-            </a:r>
-            <a:r>
-              <a:rPr lang="en-US" sz="2400" dirty="0" smtClean="0"/>
-              <a:t> push </a:t>
-            </a:r>
-            <a:r>
-              <a:rPr lang="en-US" sz="2400" dirty="0" err="1" smtClean="0"/>
-              <a:t>heroku</a:t>
-            </a:r>
-            <a:r>
-              <a:rPr lang="en-US" sz="2400" dirty="0" smtClean="0"/>
-              <a:t> master</a:t>
-            </a:r>
-          </a:p>
-          <a:p>
-            <a:pPr>
-              <a:buBlip>
-                <a:blip r:embed="rId2"/>
-              </a:buBlip>
-            </a:pPr>
-            <a:r>
-              <a:rPr lang="en-US" sz="2400" dirty="0" smtClean="0"/>
-              <a:t> See your gems installed in the terminal</a:t>
-            </a:r>
-          </a:p>
-          <a:p>
-            <a:pPr>
-              <a:buBlip>
-                <a:blip r:embed="rId2"/>
-              </a:buBlip>
-            </a:pPr>
-            <a:r>
-              <a:rPr lang="en-US" sz="2400" dirty="0" smtClean="0"/>
-              <a:t> It really is that easy</a:t>
-            </a:r>
-            <a:r>
-              <a:rPr lang="en-US" sz="2400" dirty="0" smtClean="0"/>
-              <a:t>!</a:t>
-            </a:r>
-            <a:endParaRPr lang="en-US" sz="2400" dirty="0" smtClean="0"/>
-          </a:p>
-          <a:p>
-            <a:pPr>
-              <a:buBlip>
-                <a:blip r:embed="rId2"/>
-              </a:buBlip>
-            </a:pPr>
-            <a:r>
-              <a:rPr lang="en-US" sz="2400" dirty="0" smtClean="0"/>
-              <a:t>http://stormy-earth-60.heroku.com/products</a:t>
-            </a:r>
-            <a:endParaRPr lang="en-US" sz="2400" dirty="0" smtClean="0"/>
-          </a:p>
-        </p:txBody>
-      </p:sp>
+              <a:rPr lang="en-US" sz="3200" dirty="0" err="1" smtClean="0"/>
+              <a:t>config.ru</a:t>
+            </a:r>
+            <a:r>
+              <a:rPr lang="en-US" sz="3200" dirty="0" smtClean="0"/>
+              <a:t> must be present</a:t>
+            </a:r>
+            <a:endParaRPr lang="en-US" sz="3200" dirty="0" smtClean="0"/>
+          </a:p>
+          <a:p>
+            <a:endParaRPr lang="en-US" sz="3200" dirty="0" smtClean="0"/>
+          </a:p>
+        </p:txBody>
+      </p:sp>
+      <p:pic>
+        <p:nvPicPr>
+          <p:cNvPr id="4" name="Picture 3"/>
+          <p:cNvPicPr>
+            <a:picLocks noChangeAspect="1"/>
+          </p:cNvPicPr>
+          <p:nvPr/>
+        </p:nvPicPr>
+        <p:blipFill>
+          <a:blip r:embed="rId4"/>
+          <a:stretch>
+            <a:fillRect/>
+          </a:stretch>
+        </p:blipFill>
+        <p:spPr>
+          <a:xfrm>
+            <a:off x="1643242" y="163609"/>
+            <a:ext cx="5334000" cy="1651000"/>
+          </a:xfrm>
+          <a:prstGeom prst="rect">
+            <a:avLst/>
+          </a:prstGeom>
+        </p:spPr>
+      </p:pic>
     </p:spTree>
   </p:cSld>
   <p:clrMapOvr>
@@ -10923,7 +11024,11 @@
           <a:p>
             <a:r>
               <a:rPr lang="en-US" dirty="0" smtClean="0"/>
-              <a:t>Sinatra in Action</a:t>
+              <a:t>Sinatra on </a:t>
+            </a:r>
+            <a:r>
+              <a:rPr lang="en-US" dirty="0" err="1" smtClean="0"/>
+              <a:t>Heroku</a:t>
             </a:r>
             <a:endParaRPr lang="en-US" dirty="0"/>
           </a:p>
@@ -10938,7 +11043,7 @@
         <p:spPr>
           <a:xfrm>
             <a:off x="1392844" y="1492625"/>
-            <a:ext cx="6420754" cy="1938992"/>
+            <a:ext cx="6420754" cy="3416320"/>
           </a:xfrm>
           <a:prstGeom prst="rect">
             <a:avLst/>
@@ -10956,34 +11061,69 @@
           <a:p>
             <a:pPr>
               <a:buBlip>
-                <a:blip r:embed="rId3"/>
+                <a:blip r:embed="rId2"/>
               </a:buBlip>
             </a:pPr>
             <a:r>
               <a:rPr lang="en-US" sz="2400" dirty="0" smtClean="0"/>
-              <a:t> </a:t>
+              <a:t> Version your app with </a:t>
             </a:r>
             <a:r>
               <a:rPr lang="en-US" sz="2400" dirty="0" err="1" smtClean="0"/>
-              <a:t>GitHub</a:t>
-            </a:r>
+              <a:t>Git(hub</a:t>
+            </a:r>
+            <a:r>
+              <a:rPr lang="en-US" sz="2400" dirty="0" smtClean="0"/>
+              <a:t>) (</a:t>
+            </a:r>
+            <a:r>
+              <a:rPr lang="en-US" sz="2400" dirty="0" err="1" smtClean="0"/>
+              <a:t>git</a:t>
+            </a:r>
+            <a:r>
+              <a:rPr lang="en-US" sz="2400" dirty="0" smtClean="0"/>
+              <a:t> init)</a:t>
+            </a:r>
+          </a:p>
+          <a:p>
+            <a:pPr>
+              <a:buBlip>
+                <a:blip r:embed="rId2"/>
+              </a:buBlip>
+            </a:pPr>
+            <a:r>
+              <a:rPr lang="en-US" sz="2400" dirty="0" smtClean="0"/>
+              <a:t> Use Bundler or .gems file to manage Gems</a:t>
+            </a:r>
+          </a:p>
+          <a:p>
+            <a:pPr>
+              <a:buBlip>
+                <a:blip r:embed="rId2"/>
+              </a:buBlip>
+            </a:pPr>
             <a:r>
               <a:rPr lang="en-US" sz="2400" dirty="0" smtClean="0"/>
               <a:t> </a:t>
             </a:r>
             <a:r>
               <a:rPr lang="en-US" sz="2400" dirty="0" err="1" smtClean="0"/>
-              <a:t>resque</a:t>
+              <a:t>sudo</a:t>
             </a:r>
             <a:r>
               <a:rPr lang="en-US" sz="2400" dirty="0" smtClean="0"/>
-              <a:t> gem</a:t>
-            </a:r>
+              <a:t> gem install </a:t>
+            </a:r>
+            <a:r>
+              <a:rPr lang="en-US" sz="2400" dirty="0" err="1" smtClean="0"/>
+              <a:t>heroku</a:t>
+            </a:r>
+            <a:endParaRPr lang="en-US" sz="2400" dirty="0" smtClean="0"/>
           </a:p>
           <a:p>
             <a:pPr>
               <a:buBlip>
-                <a:blip r:embed="rId3"/>
+                <a:blip r:embed="rId2"/>
               </a:buBlip>
             </a:pPr>
             <a:r>
@@ -10992,17 +11132,17 @@
             </a:r>
             <a:r>
               <a:rPr lang="en-US" sz="2400" dirty="0" err="1" smtClean="0"/>
-              <a:t>Github</a:t>
+              <a:t>heroku</a:t>
             </a:r>
             <a:r>
               <a:rPr lang="en-US" sz="2400" dirty="0" smtClean="0"/>
-              <a:t> Watchtower</a:t>
+              <a:t> create</a:t>
             </a:r>
           </a:p>
           <a:p>
             <a:pPr>
               <a:buBlip>
-                <a:blip r:embed="rId3"/>
+                <a:blip r:embed="rId2"/>
               </a:buBlip>
             </a:pPr>
             <a:r>
@@ -11011,30 +11151,52 @@
             </a:r>
             <a:r>
               <a:rPr lang="en-US" sz="2400" dirty="0" err="1" smtClean="0"/>
-              <a:t>Heroku</a:t>
+              <a:t>git</a:t>
             </a:r>
             <a:r>
               <a:rPr lang="en-US" sz="2400" dirty="0" smtClean="0"/>
-              <a:t>: processing background jobs</a:t>
+              <a:t> push </a:t>
+            </a:r>
+            <a:r>
+              <a:rPr lang="en-US" sz="2400" dirty="0" err="1" smtClean="0"/>
+              <a:t>heroku</a:t>
+            </a:r>
+            <a:r>
+              <a:rPr lang="en-US" sz="2400" dirty="0" smtClean="0"/>
+              <a:t> master</a:t>
             </a:r>
           </a:p>
           <a:p>
             <a:pPr>
               <a:buBlip>
-                <a:blip r:embed="rId3"/>
+                <a:blip r:embed="rId2"/>
               </a:buBlip>
             </a:pPr>
             <a:r>
               <a:rPr lang="en-US" sz="2400" dirty="0" smtClean="0"/>
-              <a:t> Cafepress: internal </a:t>
-            </a:r>
-            <a:r>
-              <a:rPr lang="en-US" sz="2400" dirty="0" err="1" smtClean="0"/>
-              <a:t>RESTful</a:t>
-            </a:r>
+              <a:t> See your gems installed in the terminal</a:t>
+            </a:r>
+          </a:p>
+          <a:p>
+            <a:pPr>
+              <a:buBlip>
+                <a:blip r:embed="rId2"/>
+              </a:buBlip>
+            </a:pPr>
             <a:r>
               <a:rPr lang="en-US" sz="2400" dirty="0" smtClean="0"/>
-              <a:t> services</a:t>
+              <a:t> It really is that easy!</a:t>
+            </a:r>
+          </a:p>
+          <a:p>
+            <a:pPr>
+              <a:buBlip>
+                <a:blip r:embed="rId2"/>
+              </a:buBlip>
+            </a:pPr>
+            <a:r>
+              <a:rPr lang="en-US" sz="2400" dirty="0" smtClean="0"/>
+              <a:t>http://stormy-earth-60.heroku.com/products</a:t>
             </a:r>
           </a:p>
         </p:txBody>
@@ -11055,6 +11217,171 @@
 </file>
 
 <file path=ppt/slides/slide28.xml><?xml version="1.0" encoding="utf-8"?>
+<p:sld xmlns:a="http://schemas.openxmlformats.org/drawingml/2006/main" xmlns:r="http://schemas.openxmlformats.org/officeDocument/2006/relationships" xmlns:mc="http://schemas.openxmlformats.org/markup-compatibility/2006" xmlns:mv="urn:schemas-microsoft-com:mac:vml" xmlns:p="http://schemas.openxmlformats.org/presentationml/2006/main" mc:Ignorable="mv" mc:PreserveAttributes="mv:*">
+  <p:cSld>
+    <p:spTree>
+      <p:nvGrpSpPr>
+        <p:cNvPr id="1" name=""/>
+        <p:cNvGrpSpPr/>
+        <p:nvPr/>
+      </p:nvGrpSpPr>
+      <p:grpSpPr>
+        <a:xfrm>
+          <a:off x="0" y="0"/>
+          <a:ext cx="0" cy="0"/>
+          <a:chOff x="0" y="0"/>
+          <a:chExt cx="0" cy="0"/>
+        </a:xfrm>
+      </p:grpSpPr>
+      <p:sp>
+        <p:nvSpPr>
+          <p:cNvPr id="2" name="Title 1"/>
+          <p:cNvSpPr>
+            <a:spLocks noGrp="1"/>
+          </p:cNvSpPr>
+          <p:nvPr>
+            <p:ph type="title"/>
+          </p:nvPr>
+        </p:nvSpPr>
+        <p:spPr/>
+        <p:txBody>
+          <a:bodyPr/>
+          <a:lstStyle/>
+          <a:p>
+            <a:r>
+              <a:rPr lang="en-US" dirty="0" smtClean="0"/>
+              <a:t>Sinatra in Action</a:t>
+            </a:r>
+            <a:endParaRPr lang="en-US" dirty="0"/>
+          </a:p>
+        </p:txBody>
+      </p:sp>
+      <p:sp>
+        <p:nvSpPr>
+          <p:cNvPr id="3" name="TextBox 2"/>
+          <p:cNvSpPr txBox="1"/>
+          <p:nvPr/>
+        </p:nvSpPr>
+        <p:spPr>
+          <a:xfrm>
+            <a:off x="1392844" y="1492625"/>
+            <a:ext cx="6420754" cy="1938992"/>
+          </a:xfrm>
+          <a:prstGeom prst="rect">
+            <a:avLst/>
+          </a:prstGeom>
+          <a:noFill/>
+        </p:spPr>
+        <p:txBody>
+          <a:bodyPr wrap="square" rtlCol="0">
+            <a:spAutoFit/>
+          </a:bodyPr>
+          <a:lstStyle/>
+          <a:p>
+            <a:endParaRPr lang="en-US" sz="2400" dirty="0" smtClean="0"/>
+          </a:p>
+          <a:p>
+            <a:pPr>
+              <a:buBlip>
+                <a:blip r:embed="rId3"/>
+              </a:buBlip>
+            </a:pPr>
+            <a:r>
+              <a:rPr lang="en-US" sz="2400" dirty="0" smtClean="0"/>
+              <a:t> </a:t>
+            </a:r>
+            <a:r>
+              <a:rPr lang="en-US" sz="2400" dirty="0" err="1" smtClean="0"/>
+              <a:t>GitHub</a:t>
+            </a:r>
+            <a:r>
+              <a:rPr lang="en-US" sz="2400" dirty="0" smtClean="0"/>
+              <a:t> </a:t>
+            </a:r>
+            <a:r>
+              <a:rPr lang="en-US" sz="2400" dirty="0" err="1" smtClean="0"/>
+              <a:t>resque</a:t>
+            </a:r>
+            <a:r>
+              <a:rPr lang="en-US" sz="2400" dirty="0" smtClean="0"/>
+              <a:t> gem</a:t>
+            </a:r>
+          </a:p>
+          <a:p>
+            <a:pPr>
+              <a:buBlip>
+                <a:blip r:embed="rId3"/>
+              </a:buBlip>
+            </a:pPr>
+            <a:r>
+              <a:rPr lang="en-US" sz="2400" dirty="0" smtClean="0"/>
+              <a:t> </a:t>
+            </a:r>
+            <a:r>
+              <a:rPr lang="en-US" sz="2400" dirty="0" err="1" smtClean="0"/>
+              <a:t>Github</a:t>
+            </a:r>
+            <a:r>
+              <a:rPr lang="en-US" sz="2400" dirty="0" smtClean="0"/>
+              <a:t> Watchtower</a:t>
+            </a:r>
+          </a:p>
+          <a:p>
+            <a:pPr>
+              <a:buBlip>
+                <a:blip r:embed="rId3"/>
+              </a:buBlip>
+            </a:pPr>
+            <a:r>
+              <a:rPr lang="en-US" sz="2400" dirty="0" smtClean="0"/>
+              <a:t> </a:t>
+            </a:r>
+            <a:r>
+              <a:rPr lang="en-US" sz="2400" dirty="0" err="1" smtClean="0"/>
+              <a:t>Heroku</a:t>
+            </a:r>
+            <a:r>
+              <a:rPr lang="en-US" sz="2400" dirty="0" smtClean="0"/>
+              <a:t>: processing background jobs</a:t>
+            </a:r>
+          </a:p>
+          <a:p>
+            <a:pPr>
+              <a:buBlip>
+                <a:blip r:embed="rId3"/>
+              </a:buBlip>
+            </a:pPr>
+            <a:r>
+              <a:rPr lang="en-US" sz="2400" dirty="0" smtClean="0"/>
+              <a:t> Cafepress: internal </a:t>
+            </a:r>
+            <a:r>
+              <a:rPr lang="en-US" sz="2400" dirty="0" err="1" smtClean="0"/>
+              <a:t>RESTful</a:t>
+            </a:r>
+            <a:r>
+              <a:rPr lang="en-US" sz="2400" dirty="0" smtClean="0"/>
+              <a:t> services</a:t>
+            </a:r>
+          </a:p>
+        </p:txBody>
+      </p:sp>
+    </p:spTree>
+  </p:cSld>
+  <p:clrMapOvr>
+    <a:masterClrMapping/>
+  </p:clrMapOvr>
+  <p:timing>
+    <p:tnLst>
+      <p:par>
+        <p:cTn id="1" dur="indefinite" restart="never" nodeType="tmRoot"/>
+      </p:par>
+    </p:tnLst>
+  </p:timing>
+</p:sld>
+</file>
+
+<file path=ppt/slides/slide29.xml><?xml version="1.0" encoding="utf-8"?>
 <p:sld xmlns:a="http://schemas.openxmlformats.org/drawingml/2006/main" xmlns:r="http://schemas.openxmlformats.org/officeDocument/2006/relationships" xmlns:mc="http://schemas.openxmlformats.org/markup-compatibility/2006" xmlns:mv="urn:schemas-microsoft-com:mac:vml" xmlns:p="http://schemas.openxmlformats.org/presentationml/2006/main" mc:Ignorable="mv" mc:PreserveAttributes="mv:*">
   <p:cSld>
     <p:spTree>

</xml_diff>